<commit_message>
Updated background with new logo.
</commit_message>
<xml_diff>
--- a/src/exampleModuleAintCore.pptx
+++ b/src/exampleModuleAintCore.pptx
@@ -8,6 +8,9 @@
     <p:sldId id="256" r:id="rId2"/>
     <p:sldId id="257" r:id="rId3"/>
     <p:sldId id="258" r:id="rId4"/>
+    <p:sldId id="259" r:id="rId5"/>
+    <p:sldId id="260" r:id="rId6"/>
+    <p:sldId id="261" r:id="rId7"/>
   </p:sldIdLst>
   <p:sldSz cx="9144000" cy="6858000" type="screen4x3"/>
   <p:notesSz cx="6858000" cy="9144000"/>
@@ -3112,7 +3115,19 @@
           <a:bodyPr/>
           <a:lstStyle/>
           <a:p>
-            <a:endParaRPr lang="en-US"/>
+            <a:r>
+              <a:rPr lang="en-US" dirty="0" smtClean="0"/>
+              <a:t>Example Module </a:t>
+            </a:r>
+            <a:r>
+              <a:rPr lang="en-US" dirty="0" err="1" smtClean="0"/>
+              <a:t>Ain’t</a:t>
+            </a:r>
+            <a:r>
+              <a:rPr lang="en-US" dirty="0" smtClean="0"/>
+              <a:t> Core</a:t>
+            </a:r>
+            <a:endParaRPr lang="en-US" dirty="0"/>
           </a:p>
         </p:txBody>
       </p:sp>
@@ -3131,7 +3146,27 @@
           <a:bodyPr/>
           <a:lstStyle/>
           <a:p>
-            <a:endParaRPr lang="en-US"/>
+            <a:r>
+              <a:rPr lang="en-US" dirty="0" smtClean="0"/>
+              <a:t>But it </a:t>
+            </a:r>
+            <a:r>
+              <a:rPr lang="en-US" dirty="0" err="1" smtClean="0"/>
+              <a:t>ain’t</a:t>
+            </a:r>
+            <a:r>
+              <a:rPr lang="en-US" dirty="0" smtClean="0"/>
+              <a:t> </a:t>
+            </a:r>
+            <a:r>
+              <a:rPr lang="en-US" dirty="0" err="1" smtClean="0"/>
+              <a:t>contrib</a:t>
+            </a:r>
+            <a:r>
+              <a:rPr lang="en-US" dirty="0" smtClean="0"/>
+              <a:t> neither</a:t>
+            </a:r>
+            <a:endParaRPr lang="en-US" dirty="0"/>
           </a:p>
         </p:txBody>
       </p:sp>
@@ -3497,6 +3532,912 @@
     <p:extLst>
       <p:ext uri="{BB962C8B-B14F-4D97-AF65-F5344CB8AC3E}">
         <p14:creationId xmlns:p14="http://schemas.microsoft.com/office/powerpoint/2010/main" val="632751883"/>
+      </p:ext>
+    </p:extLst>
+  </p:cSld>
+  <p:clrMapOvr>
+    <a:masterClrMapping/>
+  </p:clrMapOvr>
+</p:sld>
+</file>
+
+<file path=ppt/slides/slide4.xml><?xml version="1.0" encoding="utf-8"?>
+<p:sld xmlns:a="http://schemas.openxmlformats.org/drawingml/2006/main" xmlns:r="http://schemas.openxmlformats.org/officeDocument/2006/relationships" xmlns:p="http://schemas.openxmlformats.org/presentationml/2006/main">
+  <p:cSld>
+    <p:bg>
+      <p:bgPr>
+        <a:solidFill>
+          <a:schemeClr val="tx1"/>
+        </a:solidFill>
+        <a:effectLst/>
+      </p:bgPr>
+    </p:bg>
+    <p:spTree>
+      <p:nvGrpSpPr>
+        <p:cNvPr id="1" name=""/>
+        <p:cNvGrpSpPr/>
+        <p:nvPr/>
+      </p:nvGrpSpPr>
+      <p:grpSpPr>
+        <a:xfrm>
+          <a:off x="0" y="0"/>
+          <a:ext cx="0" cy="0"/>
+          <a:chOff x="0" y="0"/>
+          <a:chExt cx="0" cy="0"/>
+        </a:xfrm>
+      </p:grpSpPr>
+      <p:pic>
+        <p:nvPicPr>
+          <p:cNvPr id="2" name="Picture 1"/>
+          <p:cNvPicPr>
+            <a:picLocks noChangeAspect="1"/>
+          </p:cNvPicPr>
+          <p:nvPr/>
+        </p:nvPicPr>
+        <p:blipFill>
+          <a:blip r:embed="rId2"/>
+          <a:stretch>
+            <a:fillRect/>
+          </a:stretch>
+        </p:blipFill>
+        <p:spPr>
+          <a:xfrm>
+            <a:off x="777978" y="2222724"/>
+            <a:ext cx="1956311" cy="2219272"/>
+          </a:xfrm>
+          <a:prstGeom prst="rect">
+            <a:avLst/>
+          </a:prstGeom>
+        </p:spPr>
+      </p:pic>
+      <p:sp>
+        <p:nvSpPr>
+          <p:cNvPr id="3" name="TextBox 2"/>
+          <p:cNvSpPr txBox="1"/>
+          <p:nvPr/>
+        </p:nvSpPr>
+        <p:spPr>
+          <a:xfrm>
+            <a:off x="777978" y="4597310"/>
+            <a:ext cx="1956311" cy="369332"/>
+          </a:xfrm>
+          <a:prstGeom prst="rect">
+            <a:avLst/>
+          </a:prstGeom>
+          <a:noFill/>
+        </p:spPr>
+        <p:txBody>
+          <a:bodyPr wrap="square" rtlCol="0">
+            <a:spAutoFit/>
+          </a:bodyPr>
+          <a:lstStyle/>
+          <a:p>
+            <a:pPr algn="r"/>
+            <a:r>
+              <a:rPr lang="en-US" dirty="0" smtClean="0">
+                <a:solidFill>
+                  <a:schemeClr val="bg1"/>
+                </a:solidFill>
+                <a:latin typeface="Anime Ace 2.0 BB"/>
+                <a:cs typeface="Anime Ace 2.0 BB"/>
+              </a:rPr>
+              <a:t>No core</a:t>
+            </a:r>
+            <a:endParaRPr lang="en-US" dirty="0">
+              <a:solidFill>
+                <a:schemeClr val="bg1"/>
+              </a:solidFill>
+              <a:latin typeface="Anime Ace 2.0 BB"/>
+              <a:cs typeface="Anime Ace 2.0 BB"/>
+            </a:endParaRPr>
+          </a:p>
+        </p:txBody>
+      </p:sp>
+      <p:sp>
+        <p:nvSpPr>
+          <p:cNvPr id="5" name="Left Brace 4"/>
+          <p:cNvSpPr/>
+          <p:nvPr/>
+        </p:nvSpPr>
+        <p:spPr>
+          <a:xfrm>
+            <a:off x="3893519" y="2222724"/>
+            <a:ext cx="303707" cy="704093"/>
+          </a:xfrm>
+          <a:prstGeom prst="leftBrace">
+            <a:avLst/>
+          </a:prstGeom>
+          <a:ln w="57150" cmpd="sng">
+            <a:solidFill>
+              <a:srgbClr val="FFFFFF"/>
+            </a:solidFill>
+          </a:ln>
+        </p:spPr>
+        <p:style>
+          <a:lnRef idx="2">
+            <a:schemeClr val="accent1"/>
+          </a:lnRef>
+          <a:fillRef idx="0">
+            <a:schemeClr val="accent1"/>
+          </a:fillRef>
+          <a:effectRef idx="1">
+            <a:schemeClr val="accent1"/>
+          </a:effectRef>
+          <a:fontRef idx="minor">
+            <a:schemeClr val="tx1"/>
+          </a:fontRef>
+        </p:style>
+        <p:txBody>
+          <a:bodyPr rtlCol="0" anchor="ctr"/>
+          <a:lstStyle/>
+          <a:p>
+            <a:pPr algn="r"/>
+            <a:endParaRPr lang="en-US"/>
+          </a:p>
+        </p:txBody>
+      </p:sp>
+      <p:sp>
+        <p:nvSpPr>
+          <p:cNvPr id="6" name="Left Brace 5"/>
+          <p:cNvSpPr/>
+          <p:nvPr/>
+        </p:nvSpPr>
+        <p:spPr>
+          <a:xfrm flipH="1">
+            <a:off x="3894065" y="3737903"/>
+            <a:ext cx="303707" cy="704093"/>
+          </a:xfrm>
+          <a:prstGeom prst="leftBrace">
+            <a:avLst/>
+          </a:prstGeom>
+          <a:ln w="57150" cmpd="sng">
+            <a:solidFill>
+              <a:srgbClr val="FFFFFF"/>
+            </a:solidFill>
+          </a:ln>
+        </p:spPr>
+        <p:style>
+          <a:lnRef idx="2">
+            <a:schemeClr val="accent1"/>
+          </a:lnRef>
+          <a:fillRef idx="0">
+            <a:schemeClr val="accent1"/>
+          </a:fillRef>
+          <a:effectRef idx="1">
+            <a:schemeClr val="accent1"/>
+          </a:effectRef>
+          <a:fontRef idx="minor">
+            <a:schemeClr val="tx1"/>
+          </a:fontRef>
+        </p:style>
+        <p:txBody>
+          <a:bodyPr rtlCol="0" anchor="ctr"/>
+          <a:lstStyle/>
+          <a:p>
+            <a:pPr algn="r"/>
+            <a:endParaRPr lang="en-US"/>
+          </a:p>
+        </p:txBody>
+      </p:sp>
+      <p:cxnSp>
+        <p:nvCxnSpPr>
+          <p:cNvPr id="8" name="Straight Connector 7"/>
+          <p:cNvCxnSpPr/>
+          <p:nvPr/>
+        </p:nvCxnSpPr>
+        <p:spPr>
+          <a:xfrm>
+            <a:off x="4376690" y="2595480"/>
+            <a:ext cx="773073" cy="0"/>
+          </a:xfrm>
+          <a:prstGeom prst="line">
+            <a:avLst/>
+          </a:prstGeom>
+          <a:ln w="76200" cap="rnd" cmpd="sng">
+            <a:solidFill>
+              <a:srgbClr val="FFFFFF"/>
+            </a:solidFill>
+          </a:ln>
+        </p:spPr>
+        <p:style>
+          <a:lnRef idx="2">
+            <a:schemeClr val="accent1"/>
+          </a:lnRef>
+          <a:fillRef idx="0">
+            <a:schemeClr val="accent1"/>
+          </a:fillRef>
+          <a:effectRef idx="1">
+            <a:schemeClr val="accent1"/>
+          </a:effectRef>
+          <a:fontRef idx="minor">
+            <a:schemeClr val="tx1"/>
+          </a:fontRef>
+        </p:style>
+      </p:cxnSp>
+      <p:cxnSp>
+        <p:nvCxnSpPr>
+          <p:cNvPr id="9" name="Straight Connector 8"/>
+          <p:cNvCxnSpPr/>
+          <p:nvPr/>
+        </p:nvCxnSpPr>
+        <p:spPr>
+          <a:xfrm>
+            <a:off x="4529090" y="2982041"/>
+            <a:ext cx="1062429" cy="0"/>
+          </a:xfrm>
+          <a:prstGeom prst="line">
+            <a:avLst/>
+          </a:prstGeom>
+          <a:ln w="76200" cap="rnd" cmpd="sng">
+            <a:solidFill>
+              <a:srgbClr val="FFFFFF"/>
+            </a:solidFill>
+          </a:ln>
+        </p:spPr>
+        <p:style>
+          <a:lnRef idx="2">
+            <a:schemeClr val="accent1"/>
+          </a:lnRef>
+          <a:fillRef idx="0">
+            <a:schemeClr val="accent1"/>
+          </a:fillRef>
+          <a:effectRef idx="1">
+            <a:schemeClr val="accent1"/>
+          </a:effectRef>
+          <a:fontRef idx="minor">
+            <a:schemeClr val="tx1"/>
+          </a:fontRef>
+        </p:style>
+      </p:cxnSp>
+      <p:cxnSp>
+        <p:nvCxnSpPr>
+          <p:cNvPr id="11" name="Straight Connector 10"/>
+          <p:cNvCxnSpPr/>
+          <p:nvPr/>
+        </p:nvCxnSpPr>
+        <p:spPr>
+          <a:xfrm>
+            <a:off x="4818446" y="3342065"/>
+            <a:ext cx="482624" cy="0"/>
+          </a:xfrm>
+          <a:prstGeom prst="line">
+            <a:avLst/>
+          </a:prstGeom>
+          <a:ln w="76200" cap="rnd" cmpd="sng">
+            <a:solidFill>
+              <a:srgbClr val="FFFFFF"/>
+            </a:solidFill>
+          </a:ln>
+        </p:spPr>
+        <p:style>
+          <a:lnRef idx="2">
+            <a:schemeClr val="accent1"/>
+          </a:lnRef>
+          <a:fillRef idx="0">
+            <a:schemeClr val="accent1"/>
+          </a:fillRef>
+          <a:effectRef idx="1">
+            <a:schemeClr val="accent1"/>
+          </a:effectRef>
+          <a:fontRef idx="minor">
+            <a:schemeClr val="tx1"/>
+          </a:fontRef>
+        </p:style>
+      </p:cxnSp>
+      <p:cxnSp>
+        <p:nvCxnSpPr>
+          <p:cNvPr id="13" name="Straight Connector 12"/>
+          <p:cNvCxnSpPr/>
+          <p:nvPr/>
+        </p:nvCxnSpPr>
+        <p:spPr>
+          <a:xfrm>
+            <a:off x="4376690" y="4061040"/>
+            <a:ext cx="193814" cy="0"/>
+          </a:xfrm>
+          <a:prstGeom prst="line">
+            <a:avLst/>
+          </a:prstGeom>
+          <a:ln w="76200" cap="rnd" cmpd="sng">
+            <a:solidFill>
+              <a:srgbClr val="FFFFFF"/>
+            </a:solidFill>
+          </a:ln>
+        </p:spPr>
+        <p:style>
+          <a:lnRef idx="2">
+            <a:schemeClr val="accent1"/>
+          </a:lnRef>
+          <a:fillRef idx="0">
+            <a:schemeClr val="accent1"/>
+          </a:fillRef>
+          <a:effectRef idx="1">
+            <a:schemeClr val="accent1"/>
+          </a:effectRef>
+          <a:fontRef idx="minor">
+            <a:schemeClr val="tx1"/>
+          </a:fontRef>
+        </p:style>
+      </p:cxnSp>
+      <p:cxnSp>
+        <p:nvCxnSpPr>
+          <p:cNvPr id="14" name="Straight Connector 13"/>
+          <p:cNvCxnSpPr/>
+          <p:nvPr/>
+        </p:nvCxnSpPr>
+        <p:spPr>
+          <a:xfrm>
+            <a:off x="4529090" y="3779858"/>
+            <a:ext cx="773073" cy="0"/>
+          </a:xfrm>
+          <a:prstGeom prst="line">
+            <a:avLst/>
+          </a:prstGeom>
+          <a:ln w="76200" cap="rnd" cmpd="sng">
+            <a:solidFill>
+              <a:srgbClr val="FFFFFF"/>
+            </a:solidFill>
+          </a:ln>
+        </p:spPr>
+        <p:style>
+          <a:lnRef idx="2">
+            <a:schemeClr val="accent1"/>
+          </a:lnRef>
+          <a:fillRef idx="0">
+            <a:schemeClr val="accent1"/>
+          </a:fillRef>
+          <a:effectRef idx="1">
+            <a:schemeClr val="accent1"/>
+          </a:effectRef>
+          <a:fontRef idx="minor">
+            <a:schemeClr val="tx1"/>
+          </a:fontRef>
+        </p:style>
+      </p:cxnSp>
+      <p:sp>
+        <p:nvSpPr>
+          <p:cNvPr id="16" name="TextBox 15"/>
+          <p:cNvSpPr txBox="1"/>
+          <p:nvPr/>
+        </p:nvSpPr>
+        <p:spPr>
+          <a:xfrm>
+            <a:off x="3635208" y="4565044"/>
+            <a:ext cx="1956311" cy="369332"/>
+          </a:xfrm>
+          <a:prstGeom prst="rect">
+            <a:avLst/>
+          </a:prstGeom>
+          <a:noFill/>
+        </p:spPr>
+        <p:txBody>
+          <a:bodyPr wrap="square" rtlCol="0">
+            <a:spAutoFit/>
+          </a:bodyPr>
+          <a:lstStyle/>
+          <a:p>
+            <a:pPr algn="r"/>
+            <a:r>
+              <a:rPr lang="en-US" dirty="0" smtClean="0">
+                <a:solidFill>
+                  <a:schemeClr val="bg1"/>
+                </a:solidFill>
+                <a:latin typeface="Anime Ace 2.0 BB"/>
+                <a:cs typeface="Anime Ace 2.0 BB"/>
+              </a:rPr>
+              <a:t>No code</a:t>
+            </a:r>
+            <a:endParaRPr lang="en-US" dirty="0">
+              <a:solidFill>
+                <a:schemeClr val="bg1"/>
+              </a:solidFill>
+              <a:latin typeface="Anime Ace 2.0 BB"/>
+              <a:cs typeface="Anime Ace 2.0 BB"/>
+            </a:endParaRPr>
+          </a:p>
+        </p:txBody>
+      </p:sp>
+      <p:sp>
+        <p:nvSpPr>
+          <p:cNvPr id="17" name="&quot;No&quot; Symbol 16"/>
+          <p:cNvSpPr/>
+          <p:nvPr/>
+        </p:nvSpPr>
+        <p:spPr>
+          <a:xfrm>
+            <a:off x="6474483" y="2222729"/>
+            <a:ext cx="2222584" cy="2222584"/>
+          </a:xfrm>
+          <a:prstGeom prst="noSmoking">
+            <a:avLst>
+              <a:gd name="adj" fmla="val 6328"/>
+            </a:avLst>
+          </a:prstGeom>
+        </p:spPr>
+        <p:style>
+          <a:lnRef idx="2">
+            <a:schemeClr val="dk1"/>
+          </a:lnRef>
+          <a:fillRef idx="1">
+            <a:schemeClr val="lt1"/>
+          </a:fillRef>
+          <a:effectRef idx="0">
+            <a:schemeClr val="dk1"/>
+          </a:effectRef>
+          <a:fontRef idx="minor">
+            <a:schemeClr val="dk1"/>
+          </a:fontRef>
+        </p:style>
+        <p:txBody>
+          <a:bodyPr rtlCol="0" anchor="ctr"/>
+          <a:lstStyle/>
+          <a:p>
+            <a:pPr algn="r"/>
+            <a:endParaRPr lang="en-US">
+              <a:solidFill>
+                <a:schemeClr val="tx1"/>
+              </a:solidFill>
+            </a:endParaRPr>
+          </a:p>
+        </p:txBody>
+      </p:sp>
+      <p:sp>
+        <p:nvSpPr>
+          <p:cNvPr id="18" name="TextBox 17"/>
+          <p:cNvSpPr txBox="1"/>
+          <p:nvPr/>
+        </p:nvSpPr>
+        <p:spPr>
+          <a:xfrm>
+            <a:off x="6474483" y="4597310"/>
+            <a:ext cx="2222584" cy="369332"/>
+          </a:xfrm>
+          <a:prstGeom prst="rect">
+            <a:avLst/>
+          </a:prstGeom>
+          <a:noFill/>
+        </p:spPr>
+        <p:txBody>
+          <a:bodyPr wrap="square" rtlCol="0">
+            <a:spAutoFit/>
+          </a:bodyPr>
+          <a:lstStyle/>
+          <a:p>
+            <a:pPr algn="r"/>
+            <a:r>
+              <a:rPr lang="en-US" dirty="0" smtClean="0">
+                <a:solidFill>
+                  <a:schemeClr val="bg1"/>
+                </a:solidFill>
+                <a:latin typeface="Anime Ace 2.0 BB"/>
+                <a:cs typeface="Anime Ace 2.0 BB"/>
+              </a:rPr>
+              <a:t>No Example</a:t>
+            </a:r>
+            <a:endParaRPr lang="en-US" dirty="0">
+              <a:solidFill>
+                <a:schemeClr val="bg1"/>
+              </a:solidFill>
+              <a:latin typeface="Anime Ace 2.0 BB"/>
+              <a:cs typeface="Anime Ace 2.0 BB"/>
+            </a:endParaRPr>
+          </a:p>
+        </p:txBody>
+      </p:sp>
+    </p:spTree>
+    <p:extLst>
+      <p:ext uri="{BB962C8B-B14F-4D97-AF65-F5344CB8AC3E}">
+        <p14:creationId xmlns:p14="http://schemas.microsoft.com/office/powerpoint/2010/main" val="2554666022"/>
+      </p:ext>
+    </p:extLst>
+  </p:cSld>
+  <p:clrMapOvr>
+    <a:masterClrMapping/>
+  </p:clrMapOvr>
+</p:sld>
+</file>
+
+<file path=ppt/slides/slide5.xml><?xml version="1.0" encoding="utf-8"?>
+<p:sld xmlns:a="http://schemas.openxmlformats.org/drawingml/2006/main" xmlns:r="http://schemas.openxmlformats.org/officeDocument/2006/relationships" xmlns:p="http://schemas.openxmlformats.org/presentationml/2006/main">
+  <p:cSld>
+    <p:bg>
+      <p:bgPr>
+        <a:solidFill>
+          <a:schemeClr val="tx1"/>
+        </a:solidFill>
+        <a:effectLst/>
+      </p:bgPr>
+    </p:bg>
+    <p:spTree>
+      <p:nvGrpSpPr>
+        <p:cNvPr id="1" name=""/>
+        <p:cNvGrpSpPr/>
+        <p:nvPr/>
+      </p:nvGrpSpPr>
+      <p:grpSpPr>
+        <a:xfrm>
+          <a:off x="0" y="0"/>
+          <a:ext cx="0" cy="0"/>
+          <a:chOff x="0" y="0"/>
+          <a:chExt cx="0" cy="0"/>
+        </a:xfrm>
+      </p:grpSpPr>
+      <p:sp>
+        <p:nvSpPr>
+          <p:cNvPr id="3" name="TextBox 2"/>
+          <p:cNvSpPr txBox="1"/>
+          <p:nvPr/>
+        </p:nvSpPr>
+        <p:spPr>
+          <a:xfrm>
+            <a:off x="455557" y="4992449"/>
+            <a:ext cx="3161315" cy="1862048"/>
+          </a:xfrm>
+          <a:prstGeom prst="rect">
+            <a:avLst/>
+          </a:prstGeom>
+          <a:noFill/>
+        </p:spPr>
+        <p:txBody>
+          <a:bodyPr wrap="square" rtlCol="0">
+            <a:spAutoFit/>
+          </a:bodyPr>
+          <a:lstStyle/>
+          <a:p>
+            <a:r>
+              <a:rPr lang="en-US" sz="11500" dirty="0" smtClean="0">
+                <a:solidFill>
+                  <a:srgbClr val="FFFFFF"/>
+                </a:solidFill>
+                <a:latin typeface="Anime Ace 2.0 BB"/>
+                <a:cs typeface="Anime Ace 2.0 BB"/>
+              </a:rPr>
+              <a:t>/</a:t>
+            </a:r>
+            <a:endParaRPr lang="en-US" sz="11500" dirty="0">
+              <a:solidFill>
+                <a:srgbClr val="FFFFFF"/>
+              </a:solidFill>
+              <a:latin typeface="Anime Ace 2.0 BB"/>
+              <a:cs typeface="Anime Ace 2.0 BB"/>
+            </a:endParaRPr>
+          </a:p>
+        </p:txBody>
+      </p:sp>
+      <p:grpSp>
+        <p:nvGrpSpPr>
+          <p:cNvPr id="11" name="Group 10"/>
+          <p:cNvGrpSpPr/>
+          <p:nvPr/>
+        </p:nvGrpSpPr>
+        <p:grpSpPr>
+          <a:xfrm>
+            <a:off x="1615201" y="5353408"/>
+            <a:ext cx="537280" cy="545082"/>
+            <a:chOff x="3230369" y="3465240"/>
+            <a:chExt cx="2429829" cy="2465113"/>
+          </a:xfrm>
+        </p:grpSpPr>
+        <p:sp>
+          <p:nvSpPr>
+            <p:cNvPr id="7" name="Shape 6"/>
+            <p:cNvSpPr/>
+            <p:nvPr/>
+          </p:nvSpPr>
+          <p:spPr>
+            <a:xfrm>
+              <a:off x="3230369" y="3465240"/>
+              <a:ext cx="2429829" cy="2465113"/>
+            </a:xfrm>
+            <a:prstGeom prst="gear9">
+              <a:avLst>
+                <a:gd name="adj1" fmla="val 20000"/>
+                <a:gd name="adj2" fmla="val 1763"/>
+              </a:avLst>
+            </a:prstGeom>
+            <a:solidFill>
+              <a:srgbClr val="FFFFFF"/>
+            </a:solidFill>
+            <a:ln>
+              <a:noFill/>
+            </a:ln>
+          </p:spPr>
+          <p:style>
+            <a:lnRef idx="2">
+              <a:schemeClr val="dk1"/>
+            </a:lnRef>
+            <a:fillRef idx="1">
+              <a:schemeClr val="lt1"/>
+            </a:fillRef>
+            <a:effectRef idx="0">
+              <a:schemeClr val="dk1"/>
+            </a:effectRef>
+            <a:fontRef idx="minor">
+              <a:schemeClr val="dk1"/>
+            </a:fontRef>
+          </p:style>
+        </p:sp>
+        <p:pic>
+          <p:nvPicPr>
+            <p:cNvPr id="10" name="Picture 9"/>
+            <p:cNvPicPr>
+              <a:picLocks noChangeAspect="1"/>
+            </p:cNvPicPr>
+            <p:nvPr/>
+          </p:nvPicPr>
+          <p:blipFill>
+            <a:blip r:embed="rId2"/>
+            <a:stretch>
+              <a:fillRect/>
+            </a:stretch>
+          </p:blipFill>
+          <p:spPr>
+            <a:xfrm>
+              <a:off x="3847201" y="4553696"/>
+              <a:ext cx="1355828" cy="831575"/>
+            </a:xfrm>
+            <a:prstGeom prst="rect">
+              <a:avLst/>
+            </a:prstGeom>
+          </p:spPr>
+        </p:pic>
+      </p:grpSp>
+      <p:grpSp>
+        <p:nvGrpSpPr>
+          <p:cNvPr id="12" name="Group 11"/>
+          <p:cNvGrpSpPr/>
+          <p:nvPr/>
+        </p:nvGrpSpPr>
+        <p:grpSpPr>
+          <a:xfrm>
+            <a:off x="2333599" y="5353408"/>
+            <a:ext cx="537280" cy="545082"/>
+            <a:chOff x="3230369" y="3465240"/>
+            <a:chExt cx="2429829" cy="2465113"/>
+          </a:xfrm>
+        </p:grpSpPr>
+        <p:sp>
+          <p:nvSpPr>
+            <p:cNvPr id="13" name="Shape 12"/>
+            <p:cNvSpPr/>
+            <p:nvPr/>
+          </p:nvSpPr>
+          <p:spPr>
+            <a:xfrm>
+              <a:off x="3230369" y="3465240"/>
+              <a:ext cx="2429829" cy="2465113"/>
+            </a:xfrm>
+            <a:prstGeom prst="gear9">
+              <a:avLst>
+                <a:gd name="adj1" fmla="val 20000"/>
+                <a:gd name="adj2" fmla="val 1763"/>
+              </a:avLst>
+            </a:prstGeom>
+            <a:solidFill>
+              <a:srgbClr val="FFFFFF"/>
+            </a:solidFill>
+            <a:ln>
+              <a:noFill/>
+            </a:ln>
+          </p:spPr>
+          <p:style>
+            <a:lnRef idx="2">
+              <a:schemeClr val="dk1"/>
+            </a:lnRef>
+            <a:fillRef idx="1">
+              <a:schemeClr val="lt1"/>
+            </a:fillRef>
+            <a:effectRef idx="0">
+              <a:schemeClr val="dk1"/>
+            </a:effectRef>
+            <a:fontRef idx="minor">
+              <a:schemeClr val="dk1"/>
+            </a:fontRef>
+          </p:style>
+        </p:sp>
+        <p:pic>
+          <p:nvPicPr>
+            <p:cNvPr id="14" name="Picture 13"/>
+            <p:cNvPicPr>
+              <a:picLocks noChangeAspect="1"/>
+            </p:cNvPicPr>
+            <p:nvPr/>
+          </p:nvPicPr>
+          <p:blipFill>
+            <a:blip r:embed="rId2"/>
+            <a:stretch>
+              <a:fillRect/>
+            </a:stretch>
+          </p:blipFill>
+          <p:spPr>
+            <a:xfrm>
+              <a:off x="3847201" y="4553696"/>
+              <a:ext cx="1355828" cy="831575"/>
+            </a:xfrm>
+            <a:prstGeom prst="rect">
+              <a:avLst/>
+            </a:prstGeom>
+          </p:spPr>
+        </p:pic>
+      </p:grpSp>
+    </p:spTree>
+    <p:extLst>
+      <p:ext uri="{BB962C8B-B14F-4D97-AF65-F5344CB8AC3E}">
+        <p14:creationId xmlns:p14="http://schemas.microsoft.com/office/powerpoint/2010/main" val="1528690446"/>
+      </p:ext>
+    </p:extLst>
+  </p:cSld>
+  <p:clrMapOvr>
+    <a:masterClrMapping/>
+  </p:clrMapOvr>
+</p:sld>
+</file>
+
+<file path=ppt/slides/slide6.xml><?xml version="1.0" encoding="utf-8"?>
+<p:sld xmlns:a="http://schemas.openxmlformats.org/drawingml/2006/main" xmlns:r="http://schemas.openxmlformats.org/officeDocument/2006/relationships" xmlns:p="http://schemas.openxmlformats.org/presentationml/2006/main">
+  <p:cSld>
+    <p:spTree>
+      <p:nvGrpSpPr>
+        <p:cNvPr id="1" name=""/>
+        <p:cNvGrpSpPr/>
+        <p:nvPr/>
+      </p:nvGrpSpPr>
+      <p:grpSpPr>
+        <a:xfrm>
+          <a:off x="0" y="0"/>
+          <a:ext cx="0" cy="0"/>
+          <a:chOff x="0" y="0"/>
+          <a:chExt cx="0" cy="0"/>
+        </a:xfrm>
+      </p:grpSpPr>
+      <p:pic>
+        <p:nvPicPr>
+          <p:cNvPr id="3" name="Picture 2"/>
+          <p:cNvPicPr>
+            <a:picLocks noChangeAspect="1"/>
+          </p:cNvPicPr>
+          <p:nvPr/>
+        </p:nvPicPr>
+        <p:blipFill>
+          <a:blip r:embed="rId2"/>
+          <a:stretch>
+            <a:fillRect/>
+          </a:stretch>
+        </p:blipFill>
+        <p:spPr>
+          <a:xfrm>
+            <a:off x="2413000" y="571500"/>
+            <a:ext cx="4318000" cy="5715000"/>
+          </a:xfrm>
+          <a:prstGeom prst="rect">
+            <a:avLst/>
+          </a:prstGeom>
+        </p:spPr>
+      </p:pic>
+      <p:sp>
+        <p:nvSpPr>
+          <p:cNvPr id="4" name="TextBox 3"/>
+          <p:cNvSpPr txBox="1"/>
+          <p:nvPr/>
+        </p:nvSpPr>
+        <p:spPr>
+          <a:xfrm>
+            <a:off x="2954238" y="3042337"/>
+            <a:ext cx="3161315" cy="2215991"/>
+          </a:xfrm>
+          <a:prstGeom prst="rect">
+            <a:avLst/>
+          </a:prstGeom>
+          <a:noFill/>
+        </p:spPr>
+        <p:txBody>
+          <a:bodyPr wrap="square" rtlCol="0">
+            <a:spAutoFit/>
+          </a:bodyPr>
+          <a:lstStyle/>
+          <a:p>
+            <a:r>
+              <a:rPr lang="en-US" sz="13800" dirty="0" smtClean="0">
+                <a:solidFill>
+                  <a:srgbClr val="39B5F2"/>
+                </a:solidFill>
+                <a:latin typeface="Anime Ace 2.0 BB"/>
+                <a:cs typeface="Anime Ace 2.0 BB"/>
+              </a:rPr>
+              <a:t>/</a:t>
+            </a:r>
+            <a:endParaRPr lang="en-US" sz="13800" dirty="0">
+              <a:solidFill>
+                <a:srgbClr val="39B5F2"/>
+              </a:solidFill>
+              <a:latin typeface="Anime Ace 2.0 BB"/>
+              <a:cs typeface="Anime Ace 2.0 BB"/>
+            </a:endParaRPr>
+          </a:p>
+        </p:txBody>
+      </p:sp>
+      <p:sp>
+        <p:nvSpPr>
+          <p:cNvPr id="6" name="Shape 5"/>
+          <p:cNvSpPr/>
+          <p:nvPr/>
+        </p:nvSpPr>
+        <p:spPr>
+          <a:xfrm>
+            <a:off x="4320957" y="3472326"/>
+            <a:ext cx="537280" cy="545082"/>
+          </a:xfrm>
+          <a:prstGeom prst="gear9">
+            <a:avLst>
+              <a:gd name="adj1" fmla="val 20000"/>
+              <a:gd name="adj2" fmla="val 1763"/>
+            </a:avLst>
+          </a:prstGeom>
+          <a:solidFill>
+            <a:srgbClr val="39B5F2"/>
+          </a:solidFill>
+          <a:ln>
+            <a:noFill/>
+          </a:ln>
+        </p:spPr>
+        <p:style>
+          <a:lnRef idx="2">
+            <a:schemeClr val="dk1"/>
+          </a:lnRef>
+          <a:fillRef idx="1">
+            <a:schemeClr val="lt1"/>
+          </a:fillRef>
+          <a:effectRef idx="0">
+            <a:schemeClr val="dk1"/>
+          </a:effectRef>
+          <a:fontRef idx="minor">
+            <a:schemeClr val="dk1"/>
+          </a:fontRef>
+        </p:style>
+      </p:sp>
+      <p:sp>
+        <p:nvSpPr>
+          <p:cNvPr id="9" name="Shape 8"/>
+          <p:cNvSpPr/>
+          <p:nvPr/>
+        </p:nvSpPr>
+        <p:spPr>
+          <a:xfrm>
+            <a:off x="5177405" y="3472326"/>
+            <a:ext cx="537280" cy="545082"/>
+          </a:xfrm>
+          <a:prstGeom prst="gear9">
+            <a:avLst>
+              <a:gd name="adj1" fmla="val 20000"/>
+              <a:gd name="adj2" fmla="val 1763"/>
+            </a:avLst>
+          </a:prstGeom>
+          <a:solidFill>
+            <a:srgbClr val="39B5F2"/>
+          </a:solidFill>
+          <a:ln>
+            <a:noFill/>
+          </a:ln>
+        </p:spPr>
+        <p:style>
+          <a:lnRef idx="2">
+            <a:schemeClr val="dk1"/>
+          </a:lnRef>
+          <a:fillRef idx="1">
+            <a:schemeClr val="lt1"/>
+          </a:fillRef>
+          <a:effectRef idx="0">
+            <a:schemeClr val="dk1"/>
+          </a:effectRef>
+          <a:fontRef idx="minor">
+            <a:schemeClr val="dk1"/>
+          </a:fontRef>
+        </p:style>
+      </p:sp>
+    </p:spTree>
+    <p:extLst>
+      <p:ext uri="{BB962C8B-B14F-4D97-AF65-F5344CB8AC3E}">
+        <p14:creationId xmlns:p14="http://schemas.microsoft.com/office/powerpoint/2010/main" val="3691719163"/>
       </p:ext>
     </p:extLst>
   </p:cSld>

</xml_diff>

<commit_message>
Added Why Example Code section
</commit_message>
<xml_diff>
--- a/src/exampleModuleAintCore.pptx
+++ b/src/exampleModuleAintCore.pptx
@@ -11,6 +11,13 @@
     <p:sldId id="259" r:id="rId5"/>
     <p:sldId id="260" r:id="rId6"/>
     <p:sldId id="261" r:id="rId7"/>
+    <p:sldId id="262" r:id="rId8"/>
+    <p:sldId id="263" r:id="rId9"/>
+    <p:sldId id="265" r:id="rId10"/>
+    <p:sldId id="264" r:id="rId11"/>
+    <p:sldId id="266" r:id="rId12"/>
+    <p:sldId id="267" r:id="rId13"/>
+    <p:sldId id="268" r:id="rId14"/>
   </p:sldIdLst>
   <p:sldSz cx="9144000" cy="6858000" type="screen4x3"/>
   <p:notesSz cx="6858000" cy="9144000"/>
@@ -293,7 +300,7 @@
           <a:p>
             <a:fld id="{70DC5382-D98D-F04A-8CFC-7615139F1868}" type="datetimeFigureOut">
               <a:rPr lang="en-US" smtClean="0"/>
-              <a:t>7/26/14</a:t>
+              <a:t>7/29/14</a:t>
             </a:fld>
             <a:endParaRPr lang="en-US"/>
           </a:p>
@@ -463,7 +470,7 @@
           <a:p>
             <a:fld id="{70DC5382-D98D-F04A-8CFC-7615139F1868}" type="datetimeFigureOut">
               <a:rPr lang="en-US" smtClean="0"/>
-              <a:t>7/26/14</a:t>
+              <a:t>7/29/14</a:t>
             </a:fld>
             <a:endParaRPr lang="en-US"/>
           </a:p>
@@ -643,7 +650,7 @@
           <a:p>
             <a:fld id="{70DC5382-D98D-F04A-8CFC-7615139F1868}" type="datetimeFigureOut">
               <a:rPr lang="en-US" smtClean="0"/>
-              <a:t>7/26/14</a:t>
+              <a:t>7/29/14</a:t>
             </a:fld>
             <a:endParaRPr lang="en-US"/>
           </a:p>
@@ -813,7 +820,7 @@
           <a:p>
             <a:fld id="{70DC5382-D98D-F04A-8CFC-7615139F1868}" type="datetimeFigureOut">
               <a:rPr lang="en-US" smtClean="0"/>
-              <a:t>7/26/14</a:t>
+              <a:t>7/29/14</a:t>
             </a:fld>
             <a:endParaRPr lang="en-US"/>
           </a:p>
@@ -1059,7 +1066,7 @@
           <a:p>
             <a:fld id="{70DC5382-D98D-F04A-8CFC-7615139F1868}" type="datetimeFigureOut">
               <a:rPr lang="en-US" smtClean="0"/>
-              <a:t>7/26/14</a:t>
+              <a:t>7/29/14</a:t>
             </a:fld>
             <a:endParaRPr lang="en-US"/>
           </a:p>
@@ -1347,7 +1354,7 @@
           <a:p>
             <a:fld id="{70DC5382-D98D-F04A-8CFC-7615139F1868}" type="datetimeFigureOut">
               <a:rPr lang="en-US" smtClean="0"/>
-              <a:t>7/26/14</a:t>
+              <a:t>7/29/14</a:t>
             </a:fld>
             <a:endParaRPr lang="en-US"/>
           </a:p>
@@ -1769,7 +1776,7 @@
           <a:p>
             <a:fld id="{70DC5382-D98D-F04A-8CFC-7615139F1868}" type="datetimeFigureOut">
               <a:rPr lang="en-US" smtClean="0"/>
-              <a:t>7/26/14</a:t>
+              <a:t>7/29/14</a:t>
             </a:fld>
             <a:endParaRPr lang="en-US"/>
           </a:p>
@@ -1887,7 +1894,7 @@
           <a:p>
             <a:fld id="{70DC5382-D98D-F04A-8CFC-7615139F1868}" type="datetimeFigureOut">
               <a:rPr lang="en-US" smtClean="0"/>
-              <a:t>7/26/14</a:t>
+              <a:t>7/29/14</a:t>
             </a:fld>
             <a:endParaRPr lang="en-US"/>
           </a:p>
@@ -1982,7 +1989,7 @@
           <a:p>
             <a:fld id="{70DC5382-D98D-F04A-8CFC-7615139F1868}" type="datetimeFigureOut">
               <a:rPr lang="en-US" smtClean="0"/>
-              <a:t>7/26/14</a:t>
+              <a:t>7/29/14</a:t>
             </a:fld>
             <a:endParaRPr lang="en-US"/>
           </a:p>
@@ -2259,7 +2266,7 @@
           <a:p>
             <a:fld id="{70DC5382-D98D-F04A-8CFC-7615139F1868}" type="datetimeFigureOut">
               <a:rPr lang="en-US" smtClean="0"/>
-              <a:t>7/26/14</a:t>
+              <a:t>7/29/14</a:t>
             </a:fld>
             <a:endParaRPr lang="en-US"/>
           </a:p>
@@ -2512,7 +2519,7 @@
           <a:p>
             <a:fld id="{70DC5382-D98D-F04A-8CFC-7615139F1868}" type="datetimeFigureOut">
               <a:rPr lang="en-US" smtClean="0"/>
-              <a:t>7/26/14</a:t>
+              <a:t>7/29/14</a:t>
             </a:fld>
             <a:endParaRPr lang="en-US"/>
           </a:p>
@@ -2577,9 +2584,12 @@
 <p:sldMaster xmlns:a="http://schemas.openxmlformats.org/drawingml/2006/main" xmlns:r="http://schemas.openxmlformats.org/officeDocument/2006/relationships" xmlns:p="http://schemas.openxmlformats.org/presentationml/2006/main">
   <p:cSld>
     <p:bg>
-      <p:bgRef idx="1001">
-        <a:schemeClr val="bg1"/>
-      </p:bgRef>
+      <p:bgPr>
+        <a:solidFill>
+          <a:schemeClr val="tx1"/>
+        </a:solidFill>
+        <a:effectLst/>
+      </p:bgPr>
     </p:bg>
     <p:spTree>
       <p:nvGrpSpPr>
@@ -2725,7 +2735,7 @@
           <a:p>
             <a:fld id="{70DC5382-D98D-F04A-8CFC-7615139F1868}" type="datetimeFigureOut">
               <a:rPr lang="en-US" smtClean="0"/>
-              <a:t>7/26/14</a:t>
+              <a:t>7/29/14</a:t>
             </a:fld>
             <a:endParaRPr lang="en-US"/>
           </a:p>
@@ -3116,18 +3126,34 @@
           <a:lstStyle/>
           <a:p>
             <a:r>
-              <a:rPr lang="en-US" dirty="0" smtClean="0"/>
+              <a:rPr lang="en-US" dirty="0" smtClean="0">
+                <a:solidFill>
+                  <a:srgbClr val="FFFFFF"/>
+                </a:solidFill>
+              </a:rPr>
               <a:t>Example Module </a:t>
             </a:r>
             <a:r>
-              <a:rPr lang="en-US" dirty="0" err="1" smtClean="0"/>
+              <a:rPr lang="en-US" dirty="0" err="1" smtClean="0">
+                <a:solidFill>
+                  <a:srgbClr val="FFFFFF"/>
+                </a:solidFill>
+              </a:rPr>
               <a:t>Ain’t</a:t>
             </a:r>
             <a:r>
-              <a:rPr lang="en-US" dirty="0" smtClean="0"/>
+              <a:rPr lang="en-US" dirty="0" smtClean="0">
+                <a:solidFill>
+                  <a:srgbClr val="FFFFFF"/>
+                </a:solidFill>
+              </a:rPr>
               <a:t> Core</a:t>
             </a:r>
-            <a:endParaRPr lang="en-US" dirty="0"/>
+            <a:endParaRPr lang="en-US" dirty="0">
+              <a:solidFill>
+                <a:srgbClr val="FFFFFF"/>
+              </a:solidFill>
+            </a:endParaRPr>
           </a:p>
         </p:txBody>
       </p:sp>
@@ -3174,6 +3200,2183 @@
     <p:extLst>
       <p:ext uri="{BB962C8B-B14F-4D97-AF65-F5344CB8AC3E}">
         <p14:creationId xmlns:p14="http://schemas.microsoft.com/office/powerpoint/2010/main" val="753463885"/>
+      </p:ext>
+    </p:extLst>
+  </p:cSld>
+  <p:clrMapOvr>
+    <a:masterClrMapping/>
+  </p:clrMapOvr>
+</p:sld>
+</file>
+
+<file path=ppt/slides/slide10.xml><?xml version="1.0" encoding="utf-8"?>
+<p:sld xmlns:a="http://schemas.openxmlformats.org/drawingml/2006/main" xmlns:r="http://schemas.openxmlformats.org/officeDocument/2006/relationships" xmlns:p="http://schemas.openxmlformats.org/presentationml/2006/main">
+  <p:cSld>
+    <p:spTree>
+      <p:nvGrpSpPr>
+        <p:cNvPr id="1" name=""/>
+        <p:cNvGrpSpPr/>
+        <p:nvPr/>
+      </p:nvGrpSpPr>
+      <p:grpSpPr>
+        <a:xfrm>
+          <a:off x="0" y="0"/>
+          <a:ext cx="0" cy="0"/>
+          <a:chOff x="0" y="0"/>
+          <a:chExt cx="0" cy="0"/>
+        </a:xfrm>
+      </p:grpSpPr>
+      <p:sp>
+        <p:nvSpPr>
+          <p:cNvPr id="17" name="Rectangle 16"/>
+          <p:cNvSpPr/>
+          <p:nvPr/>
+        </p:nvSpPr>
+        <p:spPr>
+          <a:xfrm>
+            <a:off x="834244" y="1282567"/>
+            <a:ext cx="7570454" cy="4395596"/>
+          </a:xfrm>
+          <a:prstGeom prst="rect">
+            <a:avLst/>
+          </a:prstGeom>
+          <a:noFill/>
+          <a:ln>
+            <a:noFill/>
+          </a:ln>
+        </p:spPr>
+        <p:style>
+          <a:lnRef idx="1">
+            <a:schemeClr val="accent1"/>
+          </a:lnRef>
+          <a:fillRef idx="3">
+            <a:schemeClr val="accent1"/>
+          </a:fillRef>
+          <a:effectRef idx="2">
+            <a:schemeClr val="accent1"/>
+          </a:effectRef>
+          <a:fontRef idx="minor">
+            <a:schemeClr val="lt1"/>
+          </a:fontRef>
+        </p:style>
+        <p:txBody>
+          <a:bodyPr rtlCol="0" anchor="ctr"/>
+          <a:lstStyle/>
+          <a:p>
+            <a:pPr algn="ctr"/>
+            <a:endParaRPr lang="en-US"/>
+          </a:p>
+        </p:txBody>
+      </p:sp>
+      <p:cxnSp>
+        <p:nvCxnSpPr>
+          <p:cNvPr id="3" name="Straight Connector 2"/>
+          <p:cNvCxnSpPr/>
+          <p:nvPr/>
+        </p:nvCxnSpPr>
+        <p:spPr>
+          <a:xfrm>
+            <a:off x="1431911" y="1494253"/>
+            <a:ext cx="0" cy="3723181"/>
+          </a:xfrm>
+          <a:prstGeom prst="line">
+            <a:avLst/>
+          </a:prstGeom>
+        </p:spPr>
+        <p:style>
+          <a:lnRef idx="2">
+            <a:schemeClr val="accent1"/>
+          </a:lnRef>
+          <a:fillRef idx="0">
+            <a:schemeClr val="accent1"/>
+          </a:fillRef>
+          <a:effectRef idx="1">
+            <a:schemeClr val="accent1"/>
+          </a:effectRef>
+          <a:fontRef idx="minor">
+            <a:schemeClr val="tx1"/>
+          </a:fontRef>
+        </p:style>
+      </p:cxnSp>
+      <p:cxnSp>
+        <p:nvCxnSpPr>
+          <p:cNvPr id="5" name="Straight Arrow Connector 4"/>
+          <p:cNvCxnSpPr/>
+          <p:nvPr/>
+        </p:nvCxnSpPr>
+        <p:spPr>
+          <a:xfrm>
+            <a:off x="1431911" y="5217434"/>
+            <a:ext cx="6088737" cy="0"/>
+          </a:xfrm>
+          <a:prstGeom prst="straightConnector1">
+            <a:avLst/>
+          </a:prstGeom>
+          <a:ln>
+            <a:tailEnd type="arrow"/>
+          </a:ln>
+        </p:spPr>
+        <p:style>
+          <a:lnRef idx="2">
+            <a:schemeClr val="accent1"/>
+          </a:lnRef>
+          <a:fillRef idx="0">
+            <a:schemeClr val="accent1"/>
+          </a:fillRef>
+          <a:effectRef idx="1">
+            <a:schemeClr val="accent1"/>
+          </a:effectRef>
+          <a:fontRef idx="minor">
+            <a:schemeClr val="tx1"/>
+          </a:fontRef>
+        </p:style>
+      </p:cxnSp>
+      <p:sp>
+        <p:nvSpPr>
+          <p:cNvPr id="6" name="Freeform 5"/>
+          <p:cNvSpPr/>
+          <p:nvPr/>
+        </p:nvSpPr>
+        <p:spPr>
+          <a:xfrm>
+            <a:off x="1431911" y="2689656"/>
+            <a:ext cx="5951772" cy="2347889"/>
+          </a:xfrm>
+          <a:custGeom>
+            <a:avLst/>
+            <a:gdLst>
+              <a:gd name="connsiteX0" fmla="*/ 0 w 6972787"/>
+              <a:gd name="connsiteY0" fmla="*/ 115210 h 1685879"/>
+              <a:gd name="connsiteX1" fmla="*/ 224126 w 6972787"/>
+              <a:gd name="connsiteY1" fmla="*/ 239731 h 1685879"/>
+              <a:gd name="connsiteX2" fmla="*/ 796890 w 6972787"/>
+              <a:gd name="connsiteY2" fmla="*/ 1509846 h 1685879"/>
+              <a:gd name="connsiteX3" fmla="*/ 1282495 w 6972787"/>
+              <a:gd name="connsiteY3" fmla="*/ 3141 h 1685879"/>
+              <a:gd name="connsiteX4" fmla="*/ 1705843 w 6972787"/>
+              <a:gd name="connsiteY4" fmla="*/ 1098927 h 1685879"/>
+              <a:gd name="connsiteX5" fmla="*/ 2104288 w 6972787"/>
+              <a:gd name="connsiteY5" fmla="*/ 551034 h 1685879"/>
+              <a:gd name="connsiteX6" fmla="*/ 2465379 w 6972787"/>
+              <a:gd name="connsiteY6" fmla="*/ 1273256 h 1685879"/>
+              <a:gd name="connsiteX7" fmla="*/ 2714407 w 6972787"/>
+              <a:gd name="connsiteY7" fmla="*/ 937049 h 1685879"/>
+              <a:gd name="connsiteX8" fmla="*/ 3000789 w 6972787"/>
+              <a:gd name="connsiteY8" fmla="*/ 1534750 h 1685879"/>
+              <a:gd name="connsiteX9" fmla="*/ 3424137 w 6972787"/>
+              <a:gd name="connsiteY9" fmla="*/ 1559655 h 1685879"/>
+              <a:gd name="connsiteX10" fmla="*/ 3598456 w 6972787"/>
+              <a:gd name="connsiteY10" fmla="*/ 77853 h 1685879"/>
+              <a:gd name="connsiteX11" fmla="*/ 3971998 w 6972787"/>
+              <a:gd name="connsiteY11" fmla="*/ 1422681 h 1685879"/>
+              <a:gd name="connsiteX12" fmla="*/ 4221027 w 6972787"/>
+              <a:gd name="connsiteY12" fmla="*/ 650651 h 1685879"/>
+              <a:gd name="connsiteX13" fmla="*/ 4507409 w 6972787"/>
+              <a:gd name="connsiteY13" fmla="*/ 1460038 h 1685879"/>
+              <a:gd name="connsiteX14" fmla="*/ 5154882 w 6972787"/>
+              <a:gd name="connsiteY14" fmla="*/ 1597011 h 1685879"/>
+              <a:gd name="connsiteX15" fmla="*/ 5379007 w 6972787"/>
+              <a:gd name="connsiteY15" fmla="*/ 1210996 h 1685879"/>
+              <a:gd name="connsiteX16" fmla="*/ 5628035 w 6972787"/>
+              <a:gd name="connsiteY16" fmla="*/ 1547203 h 1685879"/>
+              <a:gd name="connsiteX17" fmla="*/ 5839709 w 6972787"/>
+              <a:gd name="connsiteY17" fmla="*/ 1210996 h 1685879"/>
+              <a:gd name="connsiteX18" fmla="*/ 6026480 w 6972787"/>
+              <a:gd name="connsiteY18" fmla="*/ 1522298 h 1685879"/>
+              <a:gd name="connsiteX19" fmla="*/ 6263057 w 6972787"/>
+              <a:gd name="connsiteY19" fmla="*/ 1235900 h 1685879"/>
+              <a:gd name="connsiteX20" fmla="*/ 6424925 w 6972787"/>
+              <a:gd name="connsiteY20" fmla="*/ 1547203 h 1685879"/>
+              <a:gd name="connsiteX21" fmla="*/ 6636599 w 6972787"/>
+              <a:gd name="connsiteY21" fmla="*/ 1223448 h 1685879"/>
+              <a:gd name="connsiteX22" fmla="*/ 6848273 w 6972787"/>
+              <a:gd name="connsiteY22" fmla="*/ 1559655 h 1685879"/>
+              <a:gd name="connsiteX23" fmla="*/ 6972787 w 6972787"/>
+              <a:gd name="connsiteY23" fmla="*/ 1534750 h 1685879"/>
+              <a:gd name="connsiteX0" fmla="*/ 0 w 6748661"/>
+              <a:gd name="connsiteY0" fmla="*/ 239731 h 1685879"/>
+              <a:gd name="connsiteX1" fmla="*/ 572764 w 6748661"/>
+              <a:gd name="connsiteY1" fmla="*/ 1509846 h 1685879"/>
+              <a:gd name="connsiteX2" fmla="*/ 1058369 w 6748661"/>
+              <a:gd name="connsiteY2" fmla="*/ 3141 h 1685879"/>
+              <a:gd name="connsiteX3" fmla="*/ 1481717 w 6748661"/>
+              <a:gd name="connsiteY3" fmla="*/ 1098927 h 1685879"/>
+              <a:gd name="connsiteX4" fmla="*/ 1880162 w 6748661"/>
+              <a:gd name="connsiteY4" fmla="*/ 551034 h 1685879"/>
+              <a:gd name="connsiteX5" fmla="*/ 2241253 w 6748661"/>
+              <a:gd name="connsiteY5" fmla="*/ 1273256 h 1685879"/>
+              <a:gd name="connsiteX6" fmla="*/ 2490281 w 6748661"/>
+              <a:gd name="connsiteY6" fmla="*/ 937049 h 1685879"/>
+              <a:gd name="connsiteX7" fmla="*/ 2776663 w 6748661"/>
+              <a:gd name="connsiteY7" fmla="*/ 1534750 h 1685879"/>
+              <a:gd name="connsiteX8" fmla="*/ 3200011 w 6748661"/>
+              <a:gd name="connsiteY8" fmla="*/ 1559655 h 1685879"/>
+              <a:gd name="connsiteX9" fmla="*/ 3374330 w 6748661"/>
+              <a:gd name="connsiteY9" fmla="*/ 77853 h 1685879"/>
+              <a:gd name="connsiteX10" fmla="*/ 3747872 w 6748661"/>
+              <a:gd name="connsiteY10" fmla="*/ 1422681 h 1685879"/>
+              <a:gd name="connsiteX11" fmla="*/ 3996901 w 6748661"/>
+              <a:gd name="connsiteY11" fmla="*/ 650651 h 1685879"/>
+              <a:gd name="connsiteX12" fmla="*/ 4283283 w 6748661"/>
+              <a:gd name="connsiteY12" fmla="*/ 1460038 h 1685879"/>
+              <a:gd name="connsiteX13" fmla="*/ 4930756 w 6748661"/>
+              <a:gd name="connsiteY13" fmla="*/ 1597011 h 1685879"/>
+              <a:gd name="connsiteX14" fmla="*/ 5154881 w 6748661"/>
+              <a:gd name="connsiteY14" fmla="*/ 1210996 h 1685879"/>
+              <a:gd name="connsiteX15" fmla="*/ 5403909 w 6748661"/>
+              <a:gd name="connsiteY15" fmla="*/ 1547203 h 1685879"/>
+              <a:gd name="connsiteX16" fmla="*/ 5615583 w 6748661"/>
+              <a:gd name="connsiteY16" fmla="*/ 1210996 h 1685879"/>
+              <a:gd name="connsiteX17" fmla="*/ 5802354 w 6748661"/>
+              <a:gd name="connsiteY17" fmla="*/ 1522298 h 1685879"/>
+              <a:gd name="connsiteX18" fmla="*/ 6038931 w 6748661"/>
+              <a:gd name="connsiteY18" fmla="*/ 1235900 h 1685879"/>
+              <a:gd name="connsiteX19" fmla="*/ 6200799 w 6748661"/>
+              <a:gd name="connsiteY19" fmla="*/ 1547203 h 1685879"/>
+              <a:gd name="connsiteX20" fmla="*/ 6412473 w 6748661"/>
+              <a:gd name="connsiteY20" fmla="*/ 1223448 h 1685879"/>
+              <a:gd name="connsiteX21" fmla="*/ 6624147 w 6748661"/>
+              <a:gd name="connsiteY21" fmla="*/ 1559655 h 1685879"/>
+              <a:gd name="connsiteX22" fmla="*/ 6748661 w 6748661"/>
+              <a:gd name="connsiteY22" fmla="*/ 1534750 h 1685879"/>
+              <a:gd name="connsiteX0" fmla="*/ 0 w 6175897"/>
+              <a:gd name="connsiteY0" fmla="*/ 1509846 h 1685879"/>
+              <a:gd name="connsiteX1" fmla="*/ 485605 w 6175897"/>
+              <a:gd name="connsiteY1" fmla="*/ 3141 h 1685879"/>
+              <a:gd name="connsiteX2" fmla="*/ 908953 w 6175897"/>
+              <a:gd name="connsiteY2" fmla="*/ 1098927 h 1685879"/>
+              <a:gd name="connsiteX3" fmla="*/ 1307398 w 6175897"/>
+              <a:gd name="connsiteY3" fmla="*/ 551034 h 1685879"/>
+              <a:gd name="connsiteX4" fmla="*/ 1668489 w 6175897"/>
+              <a:gd name="connsiteY4" fmla="*/ 1273256 h 1685879"/>
+              <a:gd name="connsiteX5" fmla="*/ 1917517 w 6175897"/>
+              <a:gd name="connsiteY5" fmla="*/ 937049 h 1685879"/>
+              <a:gd name="connsiteX6" fmla="*/ 2203899 w 6175897"/>
+              <a:gd name="connsiteY6" fmla="*/ 1534750 h 1685879"/>
+              <a:gd name="connsiteX7" fmla="*/ 2627247 w 6175897"/>
+              <a:gd name="connsiteY7" fmla="*/ 1559655 h 1685879"/>
+              <a:gd name="connsiteX8" fmla="*/ 2801566 w 6175897"/>
+              <a:gd name="connsiteY8" fmla="*/ 77853 h 1685879"/>
+              <a:gd name="connsiteX9" fmla="*/ 3175108 w 6175897"/>
+              <a:gd name="connsiteY9" fmla="*/ 1422681 h 1685879"/>
+              <a:gd name="connsiteX10" fmla="*/ 3424137 w 6175897"/>
+              <a:gd name="connsiteY10" fmla="*/ 650651 h 1685879"/>
+              <a:gd name="connsiteX11" fmla="*/ 3710519 w 6175897"/>
+              <a:gd name="connsiteY11" fmla="*/ 1460038 h 1685879"/>
+              <a:gd name="connsiteX12" fmla="*/ 4357992 w 6175897"/>
+              <a:gd name="connsiteY12" fmla="*/ 1597011 h 1685879"/>
+              <a:gd name="connsiteX13" fmla="*/ 4582117 w 6175897"/>
+              <a:gd name="connsiteY13" fmla="*/ 1210996 h 1685879"/>
+              <a:gd name="connsiteX14" fmla="*/ 4831145 w 6175897"/>
+              <a:gd name="connsiteY14" fmla="*/ 1547203 h 1685879"/>
+              <a:gd name="connsiteX15" fmla="*/ 5042819 w 6175897"/>
+              <a:gd name="connsiteY15" fmla="*/ 1210996 h 1685879"/>
+              <a:gd name="connsiteX16" fmla="*/ 5229590 w 6175897"/>
+              <a:gd name="connsiteY16" fmla="*/ 1522298 h 1685879"/>
+              <a:gd name="connsiteX17" fmla="*/ 5466167 w 6175897"/>
+              <a:gd name="connsiteY17" fmla="*/ 1235900 h 1685879"/>
+              <a:gd name="connsiteX18" fmla="*/ 5628035 w 6175897"/>
+              <a:gd name="connsiteY18" fmla="*/ 1547203 h 1685879"/>
+              <a:gd name="connsiteX19" fmla="*/ 5839709 w 6175897"/>
+              <a:gd name="connsiteY19" fmla="*/ 1223448 h 1685879"/>
+              <a:gd name="connsiteX20" fmla="*/ 6051383 w 6175897"/>
+              <a:gd name="connsiteY20" fmla="*/ 1559655 h 1685879"/>
+              <a:gd name="connsiteX21" fmla="*/ 6175897 w 6175897"/>
+              <a:gd name="connsiteY21" fmla="*/ 1534750 h 1685879"/>
+              <a:gd name="connsiteX0" fmla="*/ 0 w 6175897"/>
+              <a:gd name="connsiteY0" fmla="*/ 1509846 h 1615598"/>
+              <a:gd name="connsiteX1" fmla="*/ 485605 w 6175897"/>
+              <a:gd name="connsiteY1" fmla="*/ 3141 h 1615598"/>
+              <a:gd name="connsiteX2" fmla="*/ 908953 w 6175897"/>
+              <a:gd name="connsiteY2" fmla="*/ 1098927 h 1615598"/>
+              <a:gd name="connsiteX3" fmla="*/ 1307398 w 6175897"/>
+              <a:gd name="connsiteY3" fmla="*/ 551034 h 1615598"/>
+              <a:gd name="connsiteX4" fmla="*/ 1668489 w 6175897"/>
+              <a:gd name="connsiteY4" fmla="*/ 1273256 h 1615598"/>
+              <a:gd name="connsiteX5" fmla="*/ 1917517 w 6175897"/>
+              <a:gd name="connsiteY5" fmla="*/ 937049 h 1615598"/>
+              <a:gd name="connsiteX6" fmla="*/ 2203899 w 6175897"/>
+              <a:gd name="connsiteY6" fmla="*/ 1534750 h 1615598"/>
+              <a:gd name="connsiteX7" fmla="*/ 2801566 w 6175897"/>
+              <a:gd name="connsiteY7" fmla="*/ 77853 h 1615598"/>
+              <a:gd name="connsiteX8" fmla="*/ 3175108 w 6175897"/>
+              <a:gd name="connsiteY8" fmla="*/ 1422681 h 1615598"/>
+              <a:gd name="connsiteX9" fmla="*/ 3424137 w 6175897"/>
+              <a:gd name="connsiteY9" fmla="*/ 650651 h 1615598"/>
+              <a:gd name="connsiteX10" fmla="*/ 3710519 w 6175897"/>
+              <a:gd name="connsiteY10" fmla="*/ 1460038 h 1615598"/>
+              <a:gd name="connsiteX11" fmla="*/ 4357992 w 6175897"/>
+              <a:gd name="connsiteY11" fmla="*/ 1597011 h 1615598"/>
+              <a:gd name="connsiteX12" fmla="*/ 4582117 w 6175897"/>
+              <a:gd name="connsiteY12" fmla="*/ 1210996 h 1615598"/>
+              <a:gd name="connsiteX13" fmla="*/ 4831145 w 6175897"/>
+              <a:gd name="connsiteY13" fmla="*/ 1547203 h 1615598"/>
+              <a:gd name="connsiteX14" fmla="*/ 5042819 w 6175897"/>
+              <a:gd name="connsiteY14" fmla="*/ 1210996 h 1615598"/>
+              <a:gd name="connsiteX15" fmla="*/ 5229590 w 6175897"/>
+              <a:gd name="connsiteY15" fmla="*/ 1522298 h 1615598"/>
+              <a:gd name="connsiteX16" fmla="*/ 5466167 w 6175897"/>
+              <a:gd name="connsiteY16" fmla="*/ 1235900 h 1615598"/>
+              <a:gd name="connsiteX17" fmla="*/ 5628035 w 6175897"/>
+              <a:gd name="connsiteY17" fmla="*/ 1547203 h 1615598"/>
+              <a:gd name="connsiteX18" fmla="*/ 5839709 w 6175897"/>
+              <a:gd name="connsiteY18" fmla="*/ 1223448 h 1615598"/>
+              <a:gd name="connsiteX19" fmla="*/ 6051383 w 6175897"/>
+              <a:gd name="connsiteY19" fmla="*/ 1559655 h 1615598"/>
+              <a:gd name="connsiteX20" fmla="*/ 6175897 w 6175897"/>
+              <a:gd name="connsiteY20" fmla="*/ 1534750 h 1615598"/>
+              <a:gd name="connsiteX0" fmla="*/ 0 w 6051383"/>
+              <a:gd name="connsiteY0" fmla="*/ 1509846 h 1615598"/>
+              <a:gd name="connsiteX1" fmla="*/ 485605 w 6051383"/>
+              <a:gd name="connsiteY1" fmla="*/ 3141 h 1615598"/>
+              <a:gd name="connsiteX2" fmla="*/ 908953 w 6051383"/>
+              <a:gd name="connsiteY2" fmla="*/ 1098927 h 1615598"/>
+              <a:gd name="connsiteX3" fmla="*/ 1307398 w 6051383"/>
+              <a:gd name="connsiteY3" fmla="*/ 551034 h 1615598"/>
+              <a:gd name="connsiteX4" fmla="*/ 1668489 w 6051383"/>
+              <a:gd name="connsiteY4" fmla="*/ 1273256 h 1615598"/>
+              <a:gd name="connsiteX5" fmla="*/ 1917517 w 6051383"/>
+              <a:gd name="connsiteY5" fmla="*/ 937049 h 1615598"/>
+              <a:gd name="connsiteX6" fmla="*/ 2203899 w 6051383"/>
+              <a:gd name="connsiteY6" fmla="*/ 1534750 h 1615598"/>
+              <a:gd name="connsiteX7" fmla="*/ 2801566 w 6051383"/>
+              <a:gd name="connsiteY7" fmla="*/ 77853 h 1615598"/>
+              <a:gd name="connsiteX8" fmla="*/ 3175108 w 6051383"/>
+              <a:gd name="connsiteY8" fmla="*/ 1422681 h 1615598"/>
+              <a:gd name="connsiteX9" fmla="*/ 3424137 w 6051383"/>
+              <a:gd name="connsiteY9" fmla="*/ 650651 h 1615598"/>
+              <a:gd name="connsiteX10" fmla="*/ 3710519 w 6051383"/>
+              <a:gd name="connsiteY10" fmla="*/ 1460038 h 1615598"/>
+              <a:gd name="connsiteX11" fmla="*/ 4357992 w 6051383"/>
+              <a:gd name="connsiteY11" fmla="*/ 1597011 h 1615598"/>
+              <a:gd name="connsiteX12" fmla="*/ 4582117 w 6051383"/>
+              <a:gd name="connsiteY12" fmla="*/ 1210996 h 1615598"/>
+              <a:gd name="connsiteX13" fmla="*/ 4831145 w 6051383"/>
+              <a:gd name="connsiteY13" fmla="*/ 1547203 h 1615598"/>
+              <a:gd name="connsiteX14" fmla="*/ 5042819 w 6051383"/>
+              <a:gd name="connsiteY14" fmla="*/ 1210996 h 1615598"/>
+              <a:gd name="connsiteX15" fmla="*/ 5229590 w 6051383"/>
+              <a:gd name="connsiteY15" fmla="*/ 1522298 h 1615598"/>
+              <a:gd name="connsiteX16" fmla="*/ 5466167 w 6051383"/>
+              <a:gd name="connsiteY16" fmla="*/ 1235900 h 1615598"/>
+              <a:gd name="connsiteX17" fmla="*/ 5628035 w 6051383"/>
+              <a:gd name="connsiteY17" fmla="*/ 1547203 h 1615598"/>
+              <a:gd name="connsiteX18" fmla="*/ 5839709 w 6051383"/>
+              <a:gd name="connsiteY18" fmla="*/ 1223448 h 1615598"/>
+              <a:gd name="connsiteX19" fmla="*/ 6051383 w 6051383"/>
+              <a:gd name="connsiteY19" fmla="*/ 1559655 h 1615598"/>
+              <a:gd name="connsiteX0" fmla="*/ 0 w 5839709"/>
+              <a:gd name="connsiteY0" fmla="*/ 1509846 h 1615598"/>
+              <a:gd name="connsiteX1" fmla="*/ 485605 w 5839709"/>
+              <a:gd name="connsiteY1" fmla="*/ 3141 h 1615598"/>
+              <a:gd name="connsiteX2" fmla="*/ 908953 w 5839709"/>
+              <a:gd name="connsiteY2" fmla="*/ 1098927 h 1615598"/>
+              <a:gd name="connsiteX3" fmla="*/ 1307398 w 5839709"/>
+              <a:gd name="connsiteY3" fmla="*/ 551034 h 1615598"/>
+              <a:gd name="connsiteX4" fmla="*/ 1668489 w 5839709"/>
+              <a:gd name="connsiteY4" fmla="*/ 1273256 h 1615598"/>
+              <a:gd name="connsiteX5" fmla="*/ 1917517 w 5839709"/>
+              <a:gd name="connsiteY5" fmla="*/ 937049 h 1615598"/>
+              <a:gd name="connsiteX6" fmla="*/ 2203899 w 5839709"/>
+              <a:gd name="connsiteY6" fmla="*/ 1534750 h 1615598"/>
+              <a:gd name="connsiteX7" fmla="*/ 2801566 w 5839709"/>
+              <a:gd name="connsiteY7" fmla="*/ 77853 h 1615598"/>
+              <a:gd name="connsiteX8" fmla="*/ 3175108 w 5839709"/>
+              <a:gd name="connsiteY8" fmla="*/ 1422681 h 1615598"/>
+              <a:gd name="connsiteX9" fmla="*/ 3424137 w 5839709"/>
+              <a:gd name="connsiteY9" fmla="*/ 650651 h 1615598"/>
+              <a:gd name="connsiteX10" fmla="*/ 3710519 w 5839709"/>
+              <a:gd name="connsiteY10" fmla="*/ 1460038 h 1615598"/>
+              <a:gd name="connsiteX11" fmla="*/ 4357992 w 5839709"/>
+              <a:gd name="connsiteY11" fmla="*/ 1597011 h 1615598"/>
+              <a:gd name="connsiteX12" fmla="*/ 4582117 w 5839709"/>
+              <a:gd name="connsiteY12" fmla="*/ 1210996 h 1615598"/>
+              <a:gd name="connsiteX13" fmla="*/ 4831145 w 5839709"/>
+              <a:gd name="connsiteY13" fmla="*/ 1547203 h 1615598"/>
+              <a:gd name="connsiteX14" fmla="*/ 5042819 w 5839709"/>
+              <a:gd name="connsiteY14" fmla="*/ 1210996 h 1615598"/>
+              <a:gd name="connsiteX15" fmla="*/ 5229590 w 5839709"/>
+              <a:gd name="connsiteY15" fmla="*/ 1522298 h 1615598"/>
+              <a:gd name="connsiteX16" fmla="*/ 5466167 w 5839709"/>
+              <a:gd name="connsiteY16" fmla="*/ 1235900 h 1615598"/>
+              <a:gd name="connsiteX17" fmla="*/ 5628035 w 5839709"/>
+              <a:gd name="connsiteY17" fmla="*/ 1547203 h 1615598"/>
+              <a:gd name="connsiteX18" fmla="*/ 5839709 w 5839709"/>
+              <a:gd name="connsiteY18" fmla="*/ 1223448 h 1615598"/>
+              <a:gd name="connsiteX0" fmla="*/ 0 w 5628035"/>
+              <a:gd name="connsiteY0" fmla="*/ 1509846 h 1615598"/>
+              <a:gd name="connsiteX1" fmla="*/ 485605 w 5628035"/>
+              <a:gd name="connsiteY1" fmla="*/ 3141 h 1615598"/>
+              <a:gd name="connsiteX2" fmla="*/ 908953 w 5628035"/>
+              <a:gd name="connsiteY2" fmla="*/ 1098927 h 1615598"/>
+              <a:gd name="connsiteX3" fmla="*/ 1307398 w 5628035"/>
+              <a:gd name="connsiteY3" fmla="*/ 551034 h 1615598"/>
+              <a:gd name="connsiteX4" fmla="*/ 1668489 w 5628035"/>
+              <a:gd name="connsiteY4" fmla="*/ 1273256 h 1615598"/>
+              <a:gd name="connsiteX5" fmla="*/ 1917517 w 5628035"/>
+              <a:gd name="connsiteY5" fmla="*/ 937049 h 1615598"/>
+              <a:gd name="connsiteX6" fmla="*/ 2203899 w 5628035"/>
+              <a:gd name="connsiteY6" fmla="*/ 1534750 h 1615598"/>
+              <a:gd name="connsiteX7" fmla="*/ 2801566 w 5628035"/>
+              <a:gd name="connsiteY7" fmla="*/ 77853 h 1615598"/>
+              <a:gd name="connsiteX8" fmla="*/ 3175108 w 5628035"/>
+              <a:gd name="connsiteY8" fmla="*/ 1422681 h 1615598"/>
+              <a:gd name="connsiteX9" fmla="*/ 3424137 w 5628035"/>
+              <a:gd name="connsiteY9" fmla="*/ 650651 h 1615598"/>
+              <a:gd name="connsiteX10" fmla="*/ 3710519 w 5628035"/>
+              <a:gd name="connsiteY10" fmla="*/ 1460038 h 1615598"/>
+              <a:gd name="connsiteX11" fmla="*/ 4357992 w 5628035"/>
+              <a:gd name="connsiteY11" fmla="*/ 1597011 h 1615598"/>
+              <a:gd name="connsiteX12" fmla="*/ 4582117 w 5628035"/>
+              <a:gd name="connsiteY12" fmla="*/ 1210996 h 1615598"/>
+              <a:gd name="connsiteX13" fmla="*/ 4831145 w 5628035"/>
+              <a:gd name="connsiteY13" fmla="*/ 1547203 h 1615598"/>
+              <a:gd name="connsiteX14" fmla="*/ 5042819 w 5628035"/>
+              <a:gd name="connsiteY14" fmla="*/ 1210996 h 1615598"/>
+              <a:gd name="connsiteX15" fmla="*/ 5229590 w 5628035"/>
+              <a:gd name="connsiteY15" fmla="*/ 1522298 h 1615598"/>
+              <a:gd name="connsiteX16" fmla="*/ 5466167 w 5628035"/>
+              <a:gd name="connsiteY16" fmla="*/ 1235900 h 1615598"/>
+              <a:gd name="connsiteX17" fmla="*/ 5628035 w 5628035"/>
+              <a:gd name="connsiteY17" fmla="*/ 1547203 h 1615598"/>
+              <a:gd name="connsiteX0" fmla="*/ 0 w 5466167"/>
+              <a:gd name="connsiteY0" fmla="*/ 1509846 h 1615598"/>
+              <a:gd name="connsiteX1" fmla="*/ 485605 w 5466167"/>
+              <a:gd name="connsiteY1" fmla="*/ 3141 h 1615598"/>
+              <a:gd name="connsiteX2" fmla="*/ 908953 w 5466167"/>
+              <a:gd name="connsiteY2" fmla="*/ 1098927 h 1615598"/>
+              <a:gd name="connsiteX3" fmla="*/ 1307398 w 5466167"/>
+              <a:gd name="connsiteY3" fmla="*/ 551034 h 1615598"/>
+              <a:gd name="connsiteX4" fmla="*/ 1668489 w 5466167"/>
+              <a:gd name="connsiteY4" fmla="*/ 1273256 h 1615598"/>
+              <a:gd name="connsiteX5" fmla="*/ 1917517 w 5466167"/>
+              <a:gd name="connsiteY5" fmla="*/ 937049 h 1615598"/>
+              <a:gd name="connsiteX6" fmla="*/ 2203899 w 5466167"/>
+              <a:gd name="connsiteY6" fmla="*/ 1534750 h 1615598"/>
+              <a:gd name="connsiteX7" fmla="*/ 2801566 w 5466167"/>
+              <a:gd name="connsiteY7" fmla="*/ 77853 h 1615598"/>
+              <a:gd name="connsiteX8" fmla="*/ 3175108 w 5466167"/>
+              <a:gd name="connsiteY8" fmla="*/ 1422681 h 1615598"/>
+              <a:gd name="connsiteX9" fmla="*/ 3424137 w 5466167"/>
+              <a:gd name="connsiteY9" fmla="*/ 650651 h 1615598"/>
+              <a:gd name="connsiteX10" fmla="*/ 3710519 w 5466167"/>
+              <a:gd name="connsiteY10" fmla="*/ 1460038 h 1615598"/>
+              <a:gd name="connsiteX11" fmla="*/ 4357992 w 5466167"/>
+              <a:gd name="connsiteY11" fmla="*/ 1597011 h 1615598"/>
+              <a:gd name="connsiteX12" fmla="*/ 4582117 w 5466167"/>
+              <a:gd name="connsiteY12" fmla="*/ 1210996 h 1615598"/>
+              <a:gd name="connsiteX13" fmla="*/ 4831145 w 5466167"/>
+              <a:gd name="connsiteY13" fmla="*/ 1547203 h 1615598"/>
+              <a:gd name="connsiteX14" fmla="*/ 5042819 w 5466167"/>
+              <a:gd name="connsiteY14" fmla="*/ 1210996 h 1615598"/>
+              <a:gd name="connsiteX15" fmla="*/ 5229590 w 5466167"/>
+              <a:gd name="connsiteY15" fmla="*/ 1522298 h 1615598"/>
+              <a:gd name="connsiteX16" fmla="*/ 5466167 w 5466167"/>
+              <a:gd name="connsiteY16" fmla="*/ 1235900 h 1615598"/>
+              <a:gd name="connsiteX0" fmla="*/ 0 w 5229590"/>
+              <a:gd name="connsiteY0" fmla="*/ 1509846 h 1615598"/>
+              <a:gd name="connsiteX1" fmla="*/ 485605 w 5229590"/>
+              <a:gd name="connsiteY1" fmla="*/ 3141 h 1615598"/>
+              <a:gd name="connsiteX2" fmla="*/ 908953 w 5229590"/>
+              <a:gd name="connsiteY2" fmla="*/ 1098927 h 1615598"/>
+              <a:gd name="connsiteX3" fmla="*/ 1307398 w 5229590"/>
+              <a:gd name="connsiteY3" fmla="*/ 551034 h 1615598"/>
+              <a:gd name="connsiteX4" fmla="*/ 1668489 w 5229590"/>
+              <a:gd name="connsiteY4" fmla="*/ 1273256 h 1615598"/>
+              <a:gd name="connsiteX5" fmla="*/ 1917517 w 5229590"/>
+              <a:gd name="connsiteY5" fmla="*/ 937049 h 1615598"/>
+              <a:gd name="connsiteX6" fmla="*/ 2203899 w 5229590"/>
+              <a:gd name="connsiteY6" fmla="*/ 1534750 h 1615598"/>
+              <a:gd name="connsiteX7" fmla="*/ 2801566 w 5229590"/>
+              <a:gd name="connsiteY7" fmla="*/ 77853 h 1615598"/>
+              <a:gd name="connsiteX8" fmla="*/ 3175108 w 5229590"/>
+              <a:gd name="connsiteY8" fmla="*/ 1422681 h 1615598"/>
+              <a:gd name="connsiteX9" fmla="*/ 3424137 w 5229590"/>
+              <a:gd name="connsiteY9" fmla="*/ 650651 h 1615598"/>
+              <a:gd name="connsiteX10" fmla="*/ 3710519 w 5229590"/>
+              <a:gd name="connsiteY10" fmla="*/ 1460038 h 1615598"/>
+              <a:gd name="connsiteX11" fmla="*/ 4357992 w 5229590"/>
+              <a:gd name="connsiteY11" fmla="*/ 1597011 h 1615598"/>
+              <a:gd name="connsiteX12" fmla="*/ 4582117 w 5229590"/>
+              <a:gd name="connsiteY12" fmla="*/ 1210996 h 1615598"/>
+              <a:gd name="connsiteX13" fmla="*/ 4831145 w 5229590"/>
+              <a:gd name="connsiteY13" fmla="*/ 1547203 h 1615598"/>
+              <a:gd name="connsiteX14" fmla="*/ 5042819 w 5229590"/>
+              <a:gd name="connsiteY14" fmla="*/ 1210996 h 1615598"/>
+              <a:gd name="connsiteX15" fmla="*/ 5229590 w 5229590"/>
+              <a:gd name="connsiteY15" fmla="*/ 1522298 h 1615598"/>
+              <a:gd name="connsiteX0" fmla="*/ 0 w 5042819"/>
+              <a:gd name="connsiteY0" fmla="*/ 1509846 h 1615598"/>
+              <a:gd name="connsiteX1" fmla="*/ 485605 w 5042819"/>
+              <a:gd name="connsiteY1" fmla="*/ 3141 h 1615598"/>
+              <a:gd name="connsiteX2" fmla="*/ 908953 w 5042819"/>
+              <a:gd name="connsiteY2" fmla="*/ 1098927 h 1615598"/>
+              <a:gd name="connsiteX3" fmla="*/ 1307398 w 5042819"/>
+              <a:gd name="connsiteY3" fmla="*/ 551034 h 1615598"/>
+              <a:gd name="connsiteX4" fmla="*/ 1668489 w 5042819"/>
+              <a:gd name="connsiteY4" fmla="*/ 1273256 h 1615598"/>
+              <a:gd name="connsiteX5" fmla="*/ 1917517 w 5042819"/>
+              <a:gd name="connsiteY5" fmla="*/ 937049 h 1615598"/>
+              <a:gd name="connsiteX6" fmla="*/ 2203899 w 5042819"/>
+              <a:gd name="connsiteY6" fmla="*/ 1534750 h 1615598"/>
+              <a:gd name="connsiteX7" fmla="*/ 2801566 w 5042819"/>
+              <a:gd name="connsiteY7" fmla="*/ 77853 h 1615598"/>
+              <a:gd name="connsiteX8" fmla="*/ 3175108 w 5042819"/>
+              <a:gd name="connsiteY8" fmla="*/ 1422681 h 1615598"/>
+              <a:gd name="connsiteX9" fmla="*/ 3424137 w 5042819"/>
+              <a:gd name="connsiteY9" fmla="*/ 650651 h 1615598"/>
+              <a:gd name="connsiteX10" fmla="*/ 3710519 w 5042819"/>
+              <a:gd name="connsiteY10" fmla="*/ 1460038 h 1615598"/>
+              <a:gd name="connsiteX11" fmla="*/ 4357992 w 5042819"/>
+              <a:gd name="connsiteY11" fmla="*/ 1597011 h 1615598"/>
+              <a:gd name="connsiteX12" fmla="*/ 4582117 w 5042819"/>
+              <a:gd name="connsiteY12" fmla="*/ 1210996 h 1615598"/>
+              <a:gd name="connsiteX13" fmla="*/ 4831145 w 5042819"/>
+              <a:gd name="connsiteY13" fmla="*/ 1547203 h 1615598"/>
+              <a:gd name="connsiteX14" fmla="*/ 5042819 w 5042819"/>
+              <a:gd name="connsiteY14" fmla="*/ 1210996 h 1615598"/>
+              <a:gd name="connsiteX0" fmla="*/ 0 w 4831145"/>
+              <a:gd name="connsiteY0" fmla="*/ 1509846 h 1615598"/>
+              <a:gd name="connsiteX1" fmla="*/ 485605 w 4831145"/>
+              <a:gd name="connsiteY1" fmla="*/ 3141 h 1615598"/>
+              <a:gd name="connsiteX2" fmla="*/ 908953 w 4831145"/>
+              <a:gd name="connsiteY2" fmla="*/ 1098927 h 1615598"/>
+              <a:gd name="connsiteX3" fmla="*/ 1307398 w 4831145"/>
+              <a:gd name="connsiteY3" fmla="*/ 551034 h 1615598"/>
+              <a:gd name="connsiteX4" fmla="*/ 1668489 w 4831145"/>
+              <a:gd name="connsiteY4" fmla="*/ 1273256 h 1615598"/>
+              <a:gd name="connsiteX5" fmla="*/ 1917517 w 4831145"/>
+              <a:gd name="connsiteY5" fmla="*/ 937049 h 1615598"/>
+              <a:gd name="connsiteX6" fmla="*/ 2203899 w 4831145"/>
+              <a:gd name="connsiteY6" fmla="*/ 1534750 h 1615598"/>
+              <a:gd name="connsiteX7" fmla="*/ 2801566 w 4831145"/>
+              <a:gd name="connsiteY7" fmla="*/ 77853 h 1615598"/>
+              <a:gd name="connsiteX8" fmla="*/ 3175108 w 4831145"/>
+              <a:gd name="connsiteY8" fmla="*/ 1422681 h 1615598"/>
+              <a:gd name="connsiteX9" fmla="*/ 3424137 w 4831145"/>
+              <a:gd name="connsiteY9" fmla="*/ 650651 h 1615598"/>
+              <a:gd name="connsiteX10" fmla="*/ 3710519 w 4831145"/>
+              <a:gd name="connsiteY10" fmla="*/ 1460038 h 1615598"/>
+              <a:gd name="connsiteX11" fmla="*/ 4357992 w 4831145"/>
+              <a:gd name="connsiteY11" fmla="*/ 1597011 h 1615598"/>
+              <a:gd name="connsiteX12" fmla="*/ 4582117 w 4831145"/>
+              <a:gd name="connsiteY12" fmla="*/ 1210996 h 1615598"/>
+              <a:gd name="connsiteX13" fmla="*/ 4831145 w 4831145"/>
+              <a:gd name="connsiteY13" fmla="*/ 1547203 h 1615598"/>
+              <a:gd name="connsiteX0" fmla="*/ 0 w 4582117"/>
+              <a:gd name="connsiteY0" fmla="*/ 1509846 h 1615598"/>
+              <a:gd name="connsiteX1" fmla="*/ 485605 w 4582117"/>
+              <a:gd name="connsiteY1" fmla="*/ 3141 h 1615598"/>
+              <a:gd name="connsiteX2" fmla="*/ 908953 w 4582117"/>
+              <a:gd name="connsiteY2" fmla="*/ 1098927 h 1615598"/>
+              <a:gd name="connsiteX3" fmla="*/ 1307398 w 4582117"/>
+              <a:gd name="connsiteY3" fmla="*/ 551034 h 1615598"/>
+              <a:gd name="connsiteX4" fmla="*/ 1668489 w 4582117"/>
+              <a:gd name="connsiteY4" fmla="*/ 1273256 h 1615598"/>
+              <a:gd name="connsiteX5" fmla="*/ 1917517 w 4582117"/>
+              <a:gd name="connsiteY5" fmla="*/ 937049 h 1615598"/>
+              <a:gd name="connsiteX6" fmla="*/ 2203899 w 4582117"/>
+              <a:gd name="connsiteY6" fmla="*/ 1534750 h 1615598"/>
+              <a:gd name="connsiteX7" fmla="*/ 2801566 w 4582117"/>
+              <a:gd name="connsiteY7" fmla="*/ 77853 h 1615598"/>
+              <a:gd name="connsiteX8" fmla="*/ 3175108 w 4582117"/>
+              <a:gd name="connsiteY8" fmla="*/ 1422681 h 1615598"/>
+              <a:gd name="connsiteX9" fmla="*/ 3424137 w 4582117"/>
+              <a:gd name="connsiteY9" fmla="*/ 650651 h 1615598"/>
+              <a:gd name="connsiteX10" fmla="*/ 3710519 w 4582117"/>
+              <a:gd name="connsiteY10" fmla="*/ 1460038 h 1615598"/>
+              <a:gd name="connsiteX11" fmla="*/ 4357992 w 4582117"/>
+              <a:gd name="connsiteY11" fmla="*/ 1597011 h 1615598"/>
+              <a:gd name="connsiteX12" fmla="*/ 4582117 w 4582117"/>
+              <a:gd name="connsiteY12" fmla="*/ 1210996 h 1615598"/>
+              <a:gd name="connsiteX0" fmla="*/ 0 w 4357992"/>
+              <a:gd name="connsiteY0" fmla="*/ 1509846 h 1615598"/>
+              <a:gd name="connsiteX1" fmla="*/ 485605 w 4357992"/>
+              <a:gd name="connsiteY1" fmla="*/ 3141 h 1615598"/>
+              <a:gd name="connsiteX2" fmla="*/ 908953 w 4357992"/>
+              <a:gd name="connsiteY2" fmla="*/ 1098927 h 1615598"/>
+              <a:gd name="connsiteX3" fmla="*/ 1307398 w 4357992"/>
+              <a:gd name="connsiteY3" fmla="*/ 551034 h 1615598"/>
+              <a:gd name="connsiteX4" fmla="*/ 1668489 w 4357992"/>
+              <a:gd name="connsiteY4" fmla="*/ 1273256 h 1615598"/>
+              <a:gd name="connsiteX5" fmla="*/ 1917517 w 4357992"/>
+              <a:gd name="connsiteY5" fmla="*/ 937049 h 1615598"/>
+              <a:gd name="connsiteX6" fmla="*/ 2203899 w 4357992"/>
+              <a:gd name="connsiteY6" fmla="*/ 1534750 h 1615598"/>
+              <a:gd name="connsiteX7" fmla="*/ 2801566 w 4357992"/>
+              <a:gd name="connsiteY7" fmla="*/ 77853 h 1615598"/>
+              <a:gd name="connsiteX8" fmla="*/ 3175108 w 4357992"/>
+              <a:gd name="connsiteY8" fmla="*/ 1422681 h 1615598"/>
+              <a:gd name="connsiteX9" fmla="*/ 3424137 w 4357992"/>
+              <a:gd name="connsiteY9" fmla="*/ 650651 h 1615598"/>
+              <a:gd name="connsiteX10" fmla="*/ 3710519 w 4357992"/>
+              <a:gd name="connsiteY10" fmla="*/ 1460038 h 1615598"/>
+              <a:gd name="connsiteX11" fmla="*/ 4357992 w 4357992"/>
+              <a:gd name="connsiteY11" fmla="*/ 1597011 h 1615598"/>
+              <a:gd name="connsiteX0" fmla="*/ 0 w 3710519"/>
+              <a:gd name="connsiteY0" fmla="*/ 1509846 h 1554095"/>
+              <a:gd name="connsiteX1" fmla="*/ 485605 w 3710519"/>
+              <a:gd name="connsiteY1" fmla="*/ 3141 h 1554095"/>
+              <a:gd name="connsiteX2" fmla="*/ 908953 w 3710519"/>
+              <a:gd name="connsiteY2" fmla="*/ 1098927 h 1554095"/>
+              <a:gd name="connsiteX3" fmla="*/ 1307398 w 3710519"/>
+              <a:gd name="connsiteY3" fmla="*/ 551034 h 1554095"/>
+              <a:gd name="connsiteX4" fmla="*/ 1668489 w 3710519"/>
+              <a:gd name="connsiteY4" fmla="*/ 1273256 h 1554095"/>
+              <a:gd name="connsiteX5" fmla="*/ 1917517 w 3710519"/>
+              <a:gd name="connsiteY5" fmla="*/ 937049 h 1554095"/>
+              <a:gd name="connsiteX6" fmla="*/ 2203899 w 3710519"/>
+              <a:gd name="connsiteY6" fmla="*/ 1534750 h 1554095"/>
+              <a:gd name="connsiteX7" fmla="*/ 2801566 w 3710519"/>
+              <a:gd name="connsiteY7" fmla="*/ 77853 h 1554095"/>
+              <a:gd name="connsiteX8" fmla="*/ 3175108 w 3710519"/>
+              <a:gd name="connsiteY8" fmla="*/ 1422681 h 1554095"/>
+              <a:gd name="connsiteX9" fmla="*/ 3424137 w 3710519"/>
+              <a:gd name="connsiteY9" fmla="*/ 650651 h 1554095"/>
+              <a:gd name="connsiteX10" fmla="*/ 3710519 w 3710519"/>
+              <a:gd name="connsiteY10" fmla="*/ 1460038 h 1554095"/>
+              <a:gd name="connsiteX0" fmla="*/ 0 w 3424137"/>
+              <a:gd name="connsiteY0" fmla="*/ 1509846 h 1554095"/>
+              <a:gd name="connsiteX1" fmla="*/ 485605 w 3424137"/>
+              <a:gd name="connsiteY1" fmla="*/ 3141 h 1554095"/>
+              <a:gd name="connsiteX2" fmla="*/ 908953 w 3424137"/>
+              <a:gd name="connsiteY2" fmla="*/ 1098927 h 1554095"/>
+              <a:gd name="connsiteX3" fmla="*/ 1307398 w 3424137"/>
+              <a:gd name="connsiteY3" fmla="*/ 551034 h 1554095"/>
+              <a:gd name="connsiteX4" fmla="*/ 1668489 w 3424137"/>
+              <a:gd name="connsiteY4" fmla="*/ 1273256 h 1554095"/>
+              <a:gd name="connsiteX5" fmla="*/ 1917517 w 3424137"/>
+              <a:gd name="connsiteY5" fmla="*/ 937049 h 1554095"/>
+              <a:gd name="connsiteX6" fmla="*/ 2203899 w 3424137"/>
+              <a:gd name="connsiteY6" fmla="*/ 1534750 h 1554095"/>
+              <a:gd name="connsiteX7" fmla="*/ 2801566 w 3424137"/>
+              <a:gd name="connsiteY7" fmla="*/ 77853 h 1554095"/>
+              <a:gd name="connsiteX8" fmla="*/ 3175108 w 3424137"/>
+              <a:gd name="connsiteY8" fmla="*/ 1422681 h 1554095"/>
+              <a:gd name="connsiteX9" fmla="*/ 3424137 w 3424137"/>
+              <a:gd name="connsiteY9" fmla="*/ 650651 h 1554095"/>
+              <a:gd name="connsiteX0" fmla="*/ 0 w 3175108"/>
+              <a:gd name="connsiteY0" fmla="*/ 1509846 h 1554095"/>
+              <a:gd name="connsiteX1" fmla="*/ 485605 w 3175108"/>
+              <a:gd name="connsiteY1" fmla="*/ 3141 h 1554095"/>
+              <a:gd name="connsiteX2" fmla="*/ 908953 w 3175108"/>
+              <a:gd name="connsiteY2" fmla="*/ 1098927 h 1554095"/>
+              <a:gd name="connsiteX3" fmla="*/ 1307398 w 3175108"/>
+              <a:gd name="connsiteY3" fmla="*/ 551034 h 1554095"/>
+              <a:gd name="connsiteX4" fmla="*/ 1668489 w 3175108"/>
+              <a:gd name="connsiteY4" fmla="*/ 1273256 h 1554095"/>
+              <a:gd name="connsiteX5" fmla="*/ 1917517 w 3175108"/>
+              <a:gd name="connsiteY5" fmla="*/ 937049 h 1554095"/>
+              <a:gd name="connsiteX6" fmla="*/ 2203899 w 3175108"/>
+              <a:gd name="connsiteY6" fmla="*/ 1534750 h 1554095"/>
+              <a:gd name="connsiteX7" fmla="*/ 2801566 w 3175108"/>
+              <a:gd name="connsiteY7" fmla="*/ 77853 h 1554095"/>
+              <a:gd name="connsiteX8" fmla="*/ 3175108 w 3175108"/>
+              <a:gd name="connsiteY8" fmla="*/ 1422681 h 1554095"/>
+              <a:gd name="connsiteX0" fmla="*/ 0 w 2801566"/>
+              <a:gd name="connsiteY0" fmla="*/ 1509846 h 1554095"/>
+              <a:gd name="connsiteX1" fmla="*/ 485605 w 2801566"/>
+              <a:gd name="connsiteY1" fmla="*/ 3141 h 1554095"/>
+              <a:gd name="connsiteX2" fmla="*/ 908953 w 2801566"/>
+              <a:gd name="connsiteY2" fmla="*/ 1098927 h 1554095"/>
+              <a:gd name="connsiteX3" fmla="*/ 1307398 w 2801566"/>
+              <a:gd name="connsiteY3" fmla="*/ 551034 h 1554095"/>
+              <a:gd name="connsiteX4" fmla="*/ 1668489 w 2801566"/>
+              <a:gd name="connsiteY4" fmla="*/ 1273256 h 1554095"/>
+              <a:gd name="connsiteX5" fmla="*/ 1917517 w 2801566"/>
+              <a:gd name="connsiteY5" fmla="*/ 937049 h 1554095"/>
+              <a:gd name="connsiteX6" fmla="*/ 2203899 w 2801566"/>
+              <a:gd name="connsiteY6" fmla="*/ 1534750 h 1554095"/>
+              <a:gd name="connsiteX7" fmla="*/ 2801566 w 2801566"/>
+              <a:gd name="connsiteY7" fmla="*/ 77853 h 1554095"/>
+              <a:gd name="connsiteX0" fmla="*/ 0 w 2203899"/>
+              <a:gd name="connsiteY0" fmla="*/ 1509846 h 1554095"/>
+              <a:gd name="connsiteX1" fmla="*/ 485605 w 2203899"/>
+              <a:gd name="connsiteY1" fmla="*/ 3141 h 1554095"/>
+              <a:gd name="connsiteX2" fmla="*/ 908953 w 2203899"/>
+              <a:gd name="connsiteY2" fmla="*/ 1098927 h 1554095"/>
+              <a:gd name="connsiteX3" fmla="*/ 1307398 w 2203899"/>
+              <a:gd name="connsiteY3" fmla="*/ 551034 h 1554095"/>
+              <a:gd name="connsiteX4" fmla="*/ 1668489 w 2203899"/>
+              <a:gd name="connsiteY4" fmla="*/ 1273256 h 1554095"/>
+              <a:gd name="connsiteX5" fmla="*/ 1917517 w 2203899"/>
+              <a:gd name="connsiteY5" fmla="*/ 937049 h 1554095"/>
+              <a:gd name="connsiteX6" fmla="*/ 2203899 w 2203899"/>
+              <a:gd name="connsiteY6" fmla="*/ 1534750 h 1554095"/>
+              <a:gd name="connsiteX0" fmla="*/ 0 w 2328413"/>
+              <a:gd name="connsiteY0" fmla="*/ 1509846 h 1554095"/>
+              <a:gd name="connsiteX1" fmla="*/ 485605 w 2328413"/>
+              <a:gd name="connsiteY1" fmla="*/ 3141 h 1554095"/>
+              <a:gd name="connsiteX2" fmla="*/ 908953 w 2328413"/>
+              <a:gd name="connsiteY2" fmla="*/ 1098927 h 1554095"/>
+              <a:gd name="connsiteX3" fmla="*/ 1307398 w 2328413"/>
+              <a:gd name="connsiteY3" fmla="*/ 551034 h 1554095"/>
+              <a:gd name="connsiteX4" fmla="*/ 1668489 w 2328413"/>
+              <a:gd name="connsiteY4" fmla="*/ 1273256 h 1554095"/>
+              <a:gd name="connsiteX5" fmla="*/ 1917517 w 2328413"/>
+              <a:gd name="connsiteY5" fmla="*/ 937049 h 1554095"/>
+              <a:gd name="connsiteX6" fmla="*/ 2328413 w 2328413"/>
+              <a:gd name="connsiteY6" fmla="*/ 1534750 h 1554095"/>
+            </a:gdLst>
+            <a:ahLst/>
+            <a:cxnLst>
+              <a:cxn ang="0">
+                <a:pos x="connsiteX0" y="connsiteY0"/>
+              </a:cxn>
+              <a:cxn ang="0">
+                <a:pos x="connsiteX1" y="connsiteY1"/>
+              </a:cxn>
+              <a:cxn ang="0">
+                <a:pos x="connsiteX2" y="connsiteY2"/>
+              </a:cxn>
+              <a:cxn ang="0">
+                <a:pos x="connsiteX3" y="connsiteY3"/>
+              </a:cxn>
+              <a:cxn ang="0">
+                <a:pos x="connsiteX4" y="connsiteY4"/>
+              </a:cxn>
+              <a:cxn ang="0">
+                <a:pos x="connsiteX5" y="connsiteY5"/>
+              </a:cxn>
+              <a:cxn ang="0">
+                <a:pos x="connsiteX6" y="connsiteY6"/>
+              </a:cxn>
+            </a:cxnLst>
+            <a:rect l="l" t="t" r="r" b="b"/>
+            <a:pathLst>
+              <a:path w="2328413" h="1554095">
+                <a:moveTo>
+                  <a:pt x="0" y="1509846"/>
+                </a:moveTo>
+                <a:cubicBezTo>
+                  <a:pt x="176395" y="1470414"/>
+                  <a:pt x="334113" y="71627"/>
+                  <a:pt x="485605" y="3141"/>
+                </a:cubicBezTo>
+                <a:cubicBezTo>
+                  <a:pt x="637097" y="-65345"/>
+                  <a:pt x="771988" y="1007612"/>
+                  <a:pt x="908953" y="1098927"/>
+                </a:cubicBezTo>
+                <a:cubicBezTo>
+                  <a:pt x="1045918" y="1190242"/>
+                  <a:pt x="1180809" y="521979"/>
+                  <a:pt x="1307398" y="551034"/>
+                </a:cubicBezTo>
+                <a:cubicBezTo>
+                  <a:pt x="1433987" y="580089"/>
+                  <a:pt x="1566803" y="1208920"/>
+                  <a:pt x="1668489" y="1273256"/>
+                </a:cubicBezTo>
+                <a:cubicBezTo>
+                  <a:pt x="1770175" y="1337592"/>
+                  <a:pt x="1807530" y="893467"/>
+                  <a:pt x="1917517" y="937049"/>
+                </a:cubicBezTo>
+                <a:cubicBezTo>
+                  <a:pt x="2027504" y="980631"/>
+                  <a:pt x="2181072" y="1677949"/>
+                  <a:pt x="2328413" y="1534750"/>
+                </a:cubicBezTo>
+              </a:path>
+            </a:pathLst>
+          </a:custGeom>
+        </p:spPr>
+        <p:style>
+          <a:lnRef idx="2">
+            <a:schemeClr val="accent1"/>
+          </a:lnRef>
+          <a:fillRef idx="0">
+            <a:schemeClr val="accent1"/>
+          </a:fillRef>
+          <a:effectRef idx="1">
+            <a:schemeClr val="accent1"/>
+          </a:effectRef>
+          <a:fontRef idx="minor">
+            <a:schemeClr val="tx1"/>
+          </a:fontRef>
+        </p:style>
+        <p:txBody>
+          <a:bodyPr rtlCol="0" anchor="ctr"/>
+          <a:lstStyle/>
+          <a:p>
+            <a:pPr algn="ctr"/>
+            <a:endParaRPr lang="en-US"/>
+          </a:p>
+        </p:txBody>
+      </p:sp>
+      <p:sp>
+        <p:nvSpPr>
+          <p:cNvPr id="7" name="TextBox 6"/>
+          <p:cNvSpPr txBox="1"/>
+          <p:nvPr/>
+        </p:nvSpPr>
+        <p:spPr>
+          <a:xfrm>
+            <a:off x="1715052" y="1494253"/>
+            <a:ext cx="1412309" cy="276999"/>
+          </a:xfrm>
+          <a:prstGeom prst="rect">
+            <a:avLst/>
+          </a:prstGeom>
+          <a:noFill/>
+        </p:spPr>
+        <p:txBody>
+          <a:bodyPr wrap="square" rtlCol="0">
+            <a:spAutoFit/>
+          </a:bodyPr>
+          <a:lstStyle/>
+          <a:p>
+            <a:pPr algn="ctr"/>
+            <a:r>
+              <a:rPr lang="en-US" sz="1200" dirty="0" smtClean="0">
+                <a:solidFill>
+                  <a:schemeClr val="bg1"/>
+                </a:solidFill>
+                <a:latin typeface="Anime Ace 2.0 BB"/>
+                <a:cs typeface="Anime Ace 2.0 BB"/>
+              </a:rPr>
+              <a:t>Core Alpha</a:t>
+            </a:r>
+            <a:endParaRPr lang="en-US" sz="1200" dirty="0">
+              <a:solidFill>
+                <a:schemeClr val="bg1"/>
+              </a:solidFill>
+              <a:latin typeface="Anime Ace 2.0 BB"/>
+              <a:cs typeface="Anime Ace 2.0 BB"/>
+            </a:endParaRPr>
+          </a:p>
+        </p:txBody>
+      </p:sp>
+      <p:cxnSp>
+        <p:nvCxnSpPr>
+          <p:cNvPr id="8" name="Straight Arrow Connector 7"/>
+          <p:cNvCxnSpPr>
+            <a:stCxn id="7" idx="2"/>
+          </p:cNvCxnSpPr>
+          <p:nvPr/>
+        </p:nvCxnSpPr>
+        <p:spPr>
+          <a:xfrm flipH="1">
+            <a:off x="1543975" y="1771252"/>
+            <a:ext cx="877232" cy="3022811"/>
+          </a:xfrm>
+          <a:prstGeom prst="straightConnector1">
+            <a:avLst/>
+          </a:prstGeom>
+          <a:ln>
+            <a:solidFill>
+              <a:srgbClr val="FFFFFF"/>
+            </a:solidFill>
+            <a:tailEnd type="arrow"/>
+          </a:ln>
+        </p:spPr>
+        <p:style>
+          <a:lnRef idx="2">
+            <a:schemeClr val="accent1"/>
+          </a:lnRef>
+          <a:fillRef idx="0">
+            <a:schemeClr val="accent1"/>
+          </a:fillRef>
+          <a:effectRef idx="1">
+            <a:schemeClr val="accent1"/>
+          </a:effectRef>
+          <a:fontRef idx="minor">
+            <a:schemeClr val="tx1"/>
+          </a:fontRef>
+        </p:style>
+      </p:cxnSp>
+      <p:sp>
+        <p:nvSpPr>
+          <p:cNvPr id="10" name="TextBox 9"/>
+          <p:cNvSpPr txBox="1"/>
+          <p:nvPr/>
+        </p:nvSpPr>
+        <p:spPr>
+          <a:xfrm rot="5400000">
+            <a:off x="-757884" y="3094235"/>
+            <a:ext cx="3723183" cy="523220"/>
+          </a:xfrm>
+          <a:prstGeom prst="rect">
+            <a:avLst/>
+          </a:prstGeom>
+          <a:noFill/>
+        </p:spPr>
+        <p:txBody>
+          <a:bodyPr wrap="square" rtlCol="0">
+            <a:spAutoFit/>
+          </a:bodyPr>
+          <a:lstStyle/>
+          <a:p>
+            <a:pPr algn="ctr"/>
+            <a:r>
+              <a:rPr lang="en-US" sz="1400" dirty="0" smtClean="0">
+                <a:solidFill>
+                  <a:srgbClr val="7F7F7F"/>
+                </a:solidFill>
+                <a:latin typeface="Anime Ace 2.0 BB"/>
+                <a:cs typeface="Anime Ace 2.0 BB"/>
+              </a:rPr>
+              <a:t>Example Modules Commits (Ideal)</a:t>
+            </a:r>
+            <a:endParaRPr lang="en-US" sz="1400" dirty="0">
+              <a:solidFill>
+                <a:srgbClr val="7F7F7F"/>
+              </a:solidFill>
+              <a:latin typeface="Anime Ace 2.0 BB"/>
+              <a:cs typeface="Anime Ace 2.0 BB"/>
+            </a:endParaRPr>
+          </a:p>
+        </p:txBody>
+      </p:sp>
+      <p:sp>
+        <p:nvSpPr>
+          <p:cNvPr id="15" name="TextBox 14"/>
+          <p:cNvSpPr txBox="1"/>
+          <p:nvPr/>
+        </p:nvSpPr>
+        <p:spPr>
+          <a:xfrm>
+            <a:off x="1431911" y="5267245"/>
+            <a:ext cx="6088737" cy="307777"/>
+          </a:xfrm>
+          <a:prstGeom prst="rect">
+            <a:avLst/>
+          </a:prstGeom>
+          <a:noFill/>
+        </p:spPr>
+        <p:txBody>
+          <a:bodyPr wrap="square" rtlCol="0">
+            <a:spAutoFit/>
+          </a:bodyPr>
+          <a:lstStyle/>
+          <a:p>
+            <a:pPr algn="ctr"/>
+            <a:r>
+              <a:rPr lang="en-US" sz="1400" dirty="0" smtClean="0">
+                <a:solidFill>
+                  <a:srgbClr val="7F7F7F"/>
+                </a:solidFill>
+                <a:latin typeface="Anime Ace 2.0 BB"/>
+                <a:cs typeface="Anime Ace 2.0 BB"/>
+              </a:rPr>
+              <a:t>Time</a:t>
+            </a:r>
+            <a:endParaRPr lang="en-US" sz="1400" dirty="0">
+              <a:solidFill>
+                <a:srgbClr val="7F7F7F"/>
+              </a:solidFill>
+              <a:latin typeface="Anime Ace 2.0 BB"/>
+              <a:cs typeface="Anime Ace 2.0 BB"/>
+            </a:endParaRPr>
+          </a:p>
+        </p:txBody>
+      </p:sp>
+      <p:sp>
+        <p:nvSpPr>
+          <p:cNvPr id="18" name="TextBox 17"/>
+          <p:cNvSpPr txBox="1"/>
+          <p:nvPr/>
+        </p:nvSpPr>
+        <p:spPr>
+          <a:xfrm>
+            <a:off x="3448781" y="2079502"/>
+            <a:ext cx="1412309" cy="276999"/>
+          </a:xfrm>
+          <a:prstGeom prst="rect">
+            <a:avLst/>
+          </a:prstGeom>
+          <a:noFill/>
+        </p:spPr>
+        <p:txBody>
+          <a:bodyPr wrap="square" rtlCol="0">
+            <a:spAutoFit/>
+          </a:bodyPr>
+          <a:lstStyle/>
+          <a:p>
+            <a:pPr algn="ctr"/>
+            <a:r>
+              <a:rPr lang="en-US" sz="1200" dirty="0" smtClean="0">
+                <a:solidFill>
+                  <a:schemeClr val="bg1"/>
+                </a:solidFill>
+                <a:latin typeface="Anime Ace 2.0 BB"/>
+                <a:cs typeface="Anime Ace 2.0 BB"/>
+              </a:rPr>
+              <a:t>Core Beta</a:t>
+            </a:r>
+            <a:endParaRPr lang="en-US" sz="1200" dirty="0">
+              <a:solidFill>
+                <a:schemeClr val="bg1"/>
+              </a:solidFill>
+              <a:latin typeface="Anime Ace 2.0 BB"/>
+              <a:cs typeface="Anime Ace 2.0 BB"/>
+            </a:endParaRPr>
+          </a:p>
+        </p:txBody>
+      </p:sp>
+      <p:cxnSp>
+        <p:nvCxnSpPr>
+          <p:cNvPr id="19" name="Straight Arrow Connector 18"/>
+          <p:cNvCxnSpPr>
+            <a:stCxn id="18" idx="2"/>
+          </p:cNvCxnSpPr>
+          <p:nvPr/>
+        </p:nvCxnSpPr>
+        <p:spPr>
+          <a:xfrm flipH="1">
+            <a:off x="3847484" y="2356501"/>
+            <a:ext cx="307452" cy="1877217"/>
+          </a:xfrm>
+          <a:prstGeom prst="straightConnector1">
+            <a:avLst/>
+          </a:prstGeom>
+          <a:ln>
+            <a:solidFill>
+              <a:srgbClr val="FFFFFF"/>
+            </a:solidFill>
+            <a:tailEnd type="arrow"/>
+          </a:ln>
+        </p:spPr>
+        <p:style>
+          <a:lnRef idx="2">
+            <a:schemeClr val="accent1"/>
+          </a:lnRef>
+          <a:fillRef idx="0">
+            <a:schemeClr val="accent1"/>
+          </a:fillRef>
+          <a:effectRef idx="1">
+            <a:schemeClr val="accent1"/>
+          </a:effectRef>
+          <a:fontRef idx="minor">
+            <a:schemeClr val="tx1"/>
+          </a:fontRef>
+        </p:style>
+      </p:cxnSp>
+      <p:sp>
+        <p:nvSpPr>
+          <p:cNvPr id="21" name="TextBox 20"/>
+          <p:cNvSpPr txBox="1"/>
+          <p:nvPr/>
+        </p:nvSpPr>
+        <p:spPr>
+          <a:xfrm>
+            <a:off x="5438022" y="2614943"/>
+            <a:ext cx="1412309" cy="276999"/>
+          </a:xfrm>
+          <a:prstGeom prst="rect">
+            <a:avLst/>
+          </a:prstGeom>
+          <a:noFill/>
+        </p:spPr>
+        <p:txBody>
+          <a:bodyPr wrap="square" rtlCol="0">
+            <a:spAutoFit/>
+          </a:bodyPr>
+          <a:lstStyle/>
+          <a:p>
+            <a:pPr algn="ctr"/>
+            <a:r>
+              <a:rPr lang="en-US" sz="1200" dirty="0" smtClean="0">
+                <a:solidFill>
+                  <a:schemeClr val="bg1"/>
+                </a:solidFill>
+                <a:latin typeface="Anime Ace 2.0 BB"/>
+                <a:cs typeface="Anime Ace 2.0 BB"/>
+              </a:rPr>
+              <a:t>Stable core</a:t>
+            </a:r>
+            <a:endParaRPr lang="en-US" sz="1200" dirty="0">
+              <a:solidFill>
+                <a:schemeClr val="bg1"/>
+              </a:solidFill>
+              <a:latin typeface="Anime Ace 2.0 BB"/>
+              <a:cs typeface="Anime Ace 2.0 BB"/>
+            </a:endParaRPr>
+          </a:p>
+        </p:txBody>
+      </p:sp>
+      <p:cxnSp>
+        <p:nvCxnSpPr>
+          <p:cNvPr id="22" name="Straight Arrow Connector 21"/>
+          <p:cNvCxnSpPr>
+            <a:stCxn id="21" idx="2"/>
+          </p:cNvCxnSpPr>
+          <p:nvPr/>
+        </p:nvCxnSpPr>
+        <p:spPr>
+          <a:xfrm flipH="1">
+            <a:off x="5740097" y="2891942"/>
+            <a:ext cx="404080" cy="1565914"/>
+          </a:xfrm>
+          <a:prstGeom prst="straightConnector1">
+            <a:avLst/>
+          </a:prstGeom>
+          <a:ln>
+            <a:solidFill>
+              <a:srgbClr val="FFFFFF"/>
+            </a:solidFill>
+            <a:tailEnd type="arrow"/>
+          </a:ln>
+        </p:spPr>
+        <p:style>
+          <a:lnRef idx="2">
+            <a:schemeClr val="accent1"/>
+          </a:lnRef>
+          <a:fillRef idx="0">
+            <a:schemeClr val="accent1"/>
+          </a:fillRef>
+          <a:effectRef idx="1">
+            <a:schemeClr val="accent1"/>
+          </a:effectRef>
+          <a:fontRef idx="minor">
+            <a:schemeClr val="tx1"/>
+          </a:fontRef>
+        </p:style>
+      </p:cxnSp>
+    </p:spTree>
+    <p:extLst>
+      <p:ext uri="{BB962C8B-B14F-4D97-AF65-F5344CB8AC3E}">
+        <p14:creationId xmlns:p14="http://schemas.microsoft.com/office/powerpoint/2010/main" val="4164204477"/>
+      </p:ext>
+    </p:extLst>
+  </p:cSld>
+  <p:clrMapOvr>
+    <a:masterClrMapping/>
+  </p:clrMapOvr>
+</p:sld>
+</file>
+
+<file path=ppt/slides/slide11.xml><?xml version="1.0" encoding="utf-8"?>
+<p:sld xmlns:a="http://schemas.openxmlformats.org/drawingml/2006/main" xmlns:r="http://schemas.openxmlformats.org/officeDocument/2006/relationships" xmlns:p="http://schemas.openxmlformats.org/presentationml/2006/main">
+  <p:cSld>
+    <p:spTree>
+      <p:nvGrpSpPr>
+        <p:cNvPr id="1" name=""/>
+        <p:cNvGrpSpPr/>
+        <p:nvPr/>
+      </p:nvGrpSpPr>
+      <p:grpSpPr>
+        <a:xfrm>
+          <a:off x="0" y="0"/>
+          <a:ext cx="0" cy="0"/>
+          <a:chOff x="0" y="0"/>
+          <a:chExt cx="0" cy="0"/>
+        </a:xfrm>
+      </p:grpSpPr>
+      <p:pic>
+        <p:nvPicPr>
+          <p:cNvPr id="2" name="Picture 1"/>
+          <p:cNvPicPr>
+            <a:picLocks noChangeAspect="1"/>
+          </p:cNvPicPr>
+          <p:nvPr/>
+        </p:nvPicPr>
+        <p:blipFill>
+          <a:blip r:embed="rId2"/>
+          <a:stretch>
+            <a:fillRect/>
+          </a:stretch>
+        </p:blipFill>
+        <p:spPr>
+          <a:xfrm>
+            <a:off x="-1322980" y="-1773528"/>
+            <a:ext cx="7214653" cy="8184424"/>
+          </a:xfrm>
+          <a:prstGeom prst="rect">
+            <a:avLst/>
+          </a:prstGeom>
+        </p:spPr>
+      </p:pic>
+      <p:grpSp>
+        <p:nvGrpSpPr>
+          <p:cNvPr id="11" name="Group 10"/>
+          <p:cNvGrpSpPr>
+            <a:grpSpLocks noChangeAspect="1"/>
+          </p:cNvGrpSpPr>
+          <p:nvPr/>
+        </p:nvGrpSpPr>
+        <p:grpSpPr>
+          <a:xfrm>
+            <a:off x="7169333" y="5133272"/>
+            <a:ext cx="874553" cy="1170541"/>
+            <a:chOff x="5381882" y="2873060"/>
+            <a:chExt cx="1361186" cy="1821873"/>
+          </a:xfrm>
+        </p:grpSpPr>
+        <p:sp>
+          <p:nvSpPr>
+            <p:cNvPr id="4" name="Chord 3"/>
+            <p:cNvSpPr/>
+            <p:nvPr/>
+          </p:nvSpPr>
+          <p:spPr>
+            <a:xfrm>
+              <a:off x="5381882" y="3890610"/>
+              <a:ext cx="1231640" cy="804323"/>
+            </a:xfrm>
+            <a:custGeom>
+              <a:avLst/>
+              <a:gdLst>
+                <a:gd name="connsiteX0" fmla="*/ 16608 w 2232278"/>
+                <a:gd name="connsiteY0" fmla="*/ 1307968 h 2232278"/>
+                <a:gd name="connsiteX1" fmla="*/ 589005 w 2232278"/>
+                <a:gd name="connsiteY1" fmla="*/ 132321 h 2232278"/>
+                <a:gd name="connsiteX2" fmla="*/ 1884880 w 2232278"/>
+                <a:gd name="connsiteY2" fmla="*/ 306939 h 2232278"/>
+                <a:gd name="connsiteX3" fmla="*/ 2125677 w 2232278"/>
+                <a:gd name="connsiteY3" fmla="*/ 1592163 h 2232278"/>
+                <a:gd name="connsiteX4" fmla="*/ 16608 w 2232278"/>
+                <a:gd name="connsiteY4" fmla="*/ 1307968 h 2232278"/>
+                <a:gd name="connsiteX0" fmla="*/ 16669 w 2232378"/>
+                <a:gd name="connsiteY0" fmla="*/ 1307991 h 1619407"/>
+                <a:gd name="connsiteX1" fmla="*/ 589066 w 2232378"/>
+                <a:gd name="connsiteY1" fmla="*/ 132344 h 1619407"/>
+                <a:gd name="connsiteX2" fmla="*/ 1884941 w 2232378"/>
+                <a:gd name="connsiteY2" fmla="*/ 306962 h 1619407"/>
+                <a:gd name="connsiteX3" fmla="*/ 2125738 w 2232378"/>
+                <a:gd name="connsiteY3" fmla="*/ 1592186 h 1619407"/>
+                <a:gd name="connsiteX4" fmla="*/ 16669 w 2232378"/>
+                <a:gd name="connsiteY4" fmla="*/ 1307991 h 1619407"/>
+                <a:gd name="connsiteX0" fmla="*/ 16669 w 2232378"/>
+                <a:gd name="connsiteY0" fmla="*/ 1307991 h 1698147"/>
+                <a:gd name="connsiteX1" fmla="*/ 589066 w 2232378"/>
+                <a:gd name="connsiteY1" fmla="*/ 132344 h 1698147"/>
+                <a:gd name="connsiteX2" fmla="*/ 1884941 w 2232378"/>
+                <a:gd name="connsiteY2" fmla="*/ 306962 h 1698147"/>
+                <a:gd name="connsiteX3" fmla="*/ 2125738 w 2232378"/>
+                <a:gd name="connsiteY3" fmla="*/ 1592186 h 1698147"/>
+                <a:gd name="connsiteX4" fmla="*/ 16669 w 2232378"/>
+                <a:gd name="connsiteY4" fmla="*/ 1307991 h 1698147"/>
+                <a:gd name="connsiteX0" fmla="*/ 16669 w 2232378"/>
+                <a:gd name="connsiteY0" fmla="*/ 1307991 h 1698147"/>
+                <a:gd name="connsiteX1" fmla="*/ 589066 w 2232378"/>
+                <a:gd name="connsiteY1" fmla="*/ 132344 h 1698147"/>
+                <a:gd name="connsiteX2" fmla="*/ 1884941 w 2232378"/>
+                <a:gd name="connsiteY2" fmla="*/ 306962 h 1698147"/>
+                <a:gd name="connsiteX3" fmla="*/ 2125738 w 2232378"/>
+                <a:gd name="connsiteY3" fmla="*/ 1592186 h 1698147"/>
+                <a:gd name="connsiteX4" fmla="*/ 16669 w 2232378"/>
+                <a:gd name="connsiteY4" fmla="*/ 1307991 h 1698147"/>
+                <a:gd name="connsiteX0" fmla="*/ 16669 w 2232378"/>
+                <a:gd name="connsiteY0" fmla="*/ 1175646 h 1565802"/>
+                <a:gd name="connsiteX1" fmla="*/ 589066 w 2232378"/>
+                <a:gd name="connsiteY1" fmla="*/ -1 h 1565802"/>
+                <a:gd name="connsiteX2" fmla="*/ 1884941 w 2232378"/>
+                <a:gd name="connsiteY2" fmla="*/ 174617 h 1565802"/>
+                <a:gd name="connsiteX3" fmla="*/ 2125738 w 2232378"/>
+                <a:gd name="connsiteY3" fmla="*/ 1459841 h 1565802"/>
+                <a:gd name="connsiteX4" fmla="*/ 16669 w 2232378"/>
+                <a:gd name="connsiteY4" fmla="*/ 1175646 h 1565802"/>
+                <a:gd name="connsiteX0" fmla="*/ 16669 w 2232378"/>
+                <a:gd name="connsiteY0" fmla="*/ 1175648 h 1565804"/>
+                <a:gd name="connsiteX1" fmla="*/ 589066 w 2232378"/>
+                <a:gd name="connsiteY1" fmla="*/ 1 h 1565804"/>
+                <a:gd name="connsiteX2" fmla="*/ 1884941 w 2232378"/>
+                <a:gd name="connsiteY2" fmla="*/ 174619 h 1565804"/>
+                <a:gd name="connsiteX3" fmla="*/ 2125738 w 2232378"/>
+                <a:gd name="connsiteY3" fmla="*/ 1459843 h 1565804"/>
+                <a:gd name="connsiteX4" fmla="*/ 16669 w 2232378"/>
+                <a:gd name="connsiteY4" fmla="*/ 1175648 h 1565804"/>
+                <a:gd name="connsiteX0" fmla="*/ 16669 w 2232378"/>
+                <a:gd name="connsiteY0" fmla="*/ 1175646 h 1565802"/>
+                <a:gd name="connsiteX1" fmla="*/ 589066 w 2232378"/>
+                <a:gd name="connsiteY1" fmla="*/ -1 h 1565802"/>
+                <a:gd name="connsiteX2" fmla="*/ 1884941 w 2232378"/>
+                <a:gd name="connsiteY2" fmla="*/ 174617 h 1565802"/>
+                <a:gd name="connsiteX3" fmla="*/ 2125738 w 2232378"/>
+                <a:gd name="connsiteY3" fmla="*/ 1459841 h 1565802"/>
+                <a:gd name="connsiteX4" fmla="*/ 16669 w 2232378"/>
+                <a:gd name="connsiteY4" fmla="*/ 1175646 h 1565802"/>
+              </a:gdLst>
+              <a:ahLst/>
+              <a:cxnLst>
+                <a:cxn ang="0">
+                  <a:pos x="connsiteX0" y="connsiteY0"/>
+                </a:cxn>
+                <a:cxn ang="0">
+                  <a:pos x="connsiteX1" y="connsiteY1"/>
+                </a:cxn>
+                <a:cxn ang="0">
+                  <a:pos x="connsiteX2" y="connsiteY2"/>
+                </a:cxn>
+                <a:cxn ang="0">
+                  <a:pos x="connsiteX3" y="connsiteY3"/>
+                </a:cxn>
+                <a:cxn ang="0">
+                  <a:pos x="connsiteX4" y="connsiteY4"/>
+                </a:cxn>
+              </a:cxnLst>
+              <a:rect l="l" t="t" r="r" b="b"/>
+              <a:pathLst>
+                <a:path w="2232378" h="1565802">
+                  <a:moveTo>
+                    <a:pt x="16669" y="1175646"/>
+                  </a:moveTo>
+                  <a:cubicBezTo>
+                    <a:pt x="-66084" y="701323"/>
+                    <a:pt x="164660" y="227398"/>
+                    <a:pt x="589066" y="-1"/>
+                  </a:cubicBezTo>
+                  <a:cubicBezTo>
+                    <a:pt x="1013471" y="543761"/>
+                    <a:pt x="1715366" y="47123"/>
+                    <a:pt x="1884941" y="174617"/>
+                  </a:cubicBezTo>
+                  <a:cubicBezTo>
+                    <a:pt x="2234019" y="506242"/>
+                    <a:pt x="2331089" y="1024340"/>
+                    <a:pt x="2125738" y="1459841"/>
+                  </a:cubicBezTo>
+                  <a:cubicBezTo>
+                    <a:pt x="1461202" y="1570351"/>
+                    <a:pt x="886471" y="1719347"/>
+                    <a:pt x="16669" y="1175646"/>
+                  </a:cubicBezTo>
+                  <a:close/>
+                </a:path>
+              </a:pathLst>
+            </a:custGeom>
+            <a:noFill/>
+            <a:ln w="38100" cmpd="sng">
+              <a:solidFill>
+                <a:schemeClr val="bg1"/>
+              </a:solidFill>
+            </a:ln>
+          </p:spPr>
+          <p:style>
+            <a:lnRef idx="1">
+              <a:schemeClr val="accent1"/>
+            </a:lnRef>
+            <a:fillRef idx="3">
+              <a:schemeClr val="accent1"/>
+            </a:fillRef>
+            <a:effectRef idx="2">
+              <a:schemeClr val="accent1"/>
+            </a:effectRef>
+            <a:fontRef idx="minor">
+              <a:schemeClr val="lt1"/>
+            </a:fontRef>
+          </p:style>
+          <p:txBody>
+            <a:bodyPr rtlCol="0" anchor="ctr"/>
+            <a:lstStyle/>
+            <a:p>
+              <a:pPr algn="ctr"/>
+              <a:endParaRPr lang="en-US"/>
+            </a:p>
+          </p:txBody>
+        </p:sp>
+        <p:sp>
+          <p:nvSpPr>
+            <p:cNvPr id="3" name="Oval 2"/>
+            <p:cNvSpPr/>
+            <p:nvPr/>
+          </p:nvSpPr>
+          <p:spPr>
+            <a:xfrm>
+              <a:off x="5652009" y="3117129"/>
+              <a:ext cx="794595" cy="773482"/>
+            </a:xfrm>
+            <a:prstGeom prst="ellipse">
+              <a:avLst/>
+            </a:prstGeom>
+            <a:noFill/>
+            <a:ln w="38100" cmpd="sng">
+              <a:solidFill>
+                <a:schemeClr val="bg1"/>
+              </a:solidFill>
+            </a:ln>
+          </p:spPr>
+          <p:style>
+            <a:lnRef idx="1">
+              <a:schemeClr val="accent1"/>
+            </a:lnRef>
+            <a:fillRef idx="3">
+              <a:schemeClr val="accent1"/>
+            </a:fillRef>
+            <a:effectRef idx="2">
+              <a:schemeClr val="accent1"/>
+            </a:effectRef>
+            <a:fontRef idx="minor">
+              <a:schemeClr val="lt1"/>
+            </a:fontRef>
+          </p:style>
+          <p:txBody>
+            <a:bodyPr rtlCol="0" anchor="ctr"/>
+            <a:lstStyle/>
+            <a:p>
+              <a:pPr algn="ctr"/>
+              <a:endParaRPr lang="en-US"/>
+            </a:p>
+          </p:txBody>
+        </p:sp>
+        <p:sp>
+          <p:nvSpPr>
+            <p:cNvPr id="6" name="Oval 5"/>
+            <p:cNvSpPr/>
+            <p:nvPr/>
+          </p:nvSpPr>
+          <p:spPr>
+            <a:xfrm>
+              <a:off x="5855905" y="3378756"/>
+              <a:ext cx="64081" cy="145636"/>
+            </a:xfrm>
+            <a:prstGeom prst="ellipse">
+              <a:avLst/>
+            </a:prstGeom>
+            <a:solidFill>
+              <a:srgbClr val="FFFFFF"/>
+            </a:solidFill>
+            <a:ln>
+              <a:noFill/>
+            </a:ln>
+          </p:spPr>
+          <p:style>
+            <a:lnRef idx="1">
+              <a:schemeClr val="accent1"/>
+            </a:lnRef>
+            <a:fillRef idx="3">
+              <a:schemeClr val="accent1"/>
+            </a:fillRef>
+            <a:effectRef idx="2">
+              <a:schemeClr val="accent1"/>
+            </a:effectRef>
+            <a:fontRef idx="minor">
+              <a:schemeClr val="lt1"/>
+            </a:fontRef>
+          </p:style>
+          <p:txBody>
+            <a:bodyPr rtlCol="0" anchor="ctr"/>
+            <a:lstStyle/>
+            <a:p>
+              <a:pPr algn="ctr"/>
+              <a:endParaRPr lang="en-US"/>
+            </a:p>
+          </p:txBody>
+        </p:sp>
+        <p:sp>
+          <p:nvSpPr>
+            <p:cNvPr id="7" name="Oval 6"/>
+            <p:cNvSpPr/>
+            <p:nvPr/>
+          </p:nvSpPr>
+          <p:spPr>
+            <a:xfrm>
+              <a:off x="6072386" y="3378756"/>
+              <a:ext cx="64081" cy="145636"/>
+            </a:xfrm>
+            <a:prstGeom prst="ellipse">
+              <a:avLst/>
+            </a:prstGeom>
+            <a:solidFill>
+              <a:srgbClr val="FFFFFF"/>
+            </a:solidFill>
+            <a:ln>
+              <a:noFill/>
+            </a:ln>
+          </p:spPr>
+          <p:style>
+            <a:lnRef idx="1">
+              <a:schemeClr val="accent1"/>
+            </a:lnRef>
+            <a:fillRef idx="3">
+              <a:schemeClr val="accent1"/>
+            </a:fillRef>
+            <a:effectRef idx="2">
+              <a:schemeClr val="accent1"/>
+            </a:effectRef>
+            <a:fontRef idx="minor">
+              <a:schemeClr val="lt1"/>
+            </a:fontRef>
+          </p:style>
+          <p:txBody>
+            <a:bodyPr rtlCol="0" anchor="ctr"/>
+            <a:lstStyle/>
+            <a:p>
+              <a:pPr algn="ctr"/>
+              <a:endParaRPr lang="en-US"/>
+            </a:p>
+          </p:txBody>
+        </p:sp>
+        <p:sp>
+          <p:nvSpPr>
+            <p:cNvPr id="10" name="Freeform 9"/>
+            <p:cNvSpPr/>
+            <p:nvPr/>
+          </p:nvSpPr>
+          <p:spPr>
+            <a:xfrm>
+              <a:off x="5392189" y="2873060"/>
+              <a:ext cx="1350879" cy="1151124"/>
+            </a:xfrm>
+            <a:custGeom>
+              <a:avLst/>
+              <a:gdLst>
+                <a:gd name="connsiteX0" fmla="*/ 224482 w 1242397"/>
+                <a:gd name="connsiteY0" fmla="*/ 837621 h 1084970"/>
+                <a:gd name="connsiteX1" fmla="*/ 34217 w 1242397"/>
+                <a:gd name="connsiteY1" fmla="*/ 637839 h 1084970"/>
+                <a:gd name="connsiteX2" fmla="*/ 148376 w 1242397"/>
+                <a:gd name="connsiteY2" fmla="*/ 476110 h 1084970"/>
+                <a:gd name="connsiteX3" fmla="*/ 921 w 1242397"/>
+                <a:gd name="connsiteY3" fmla="*/ 309625 h 1084970"/>
+                <a:gd name="connsiteX4" fmla="*/ 233995 w 1242397"/>
+                <a:gd name="connsiteY4" fmla="*/ 276328 h 1084970"/>
+                <a:gd name="connsiteX5" fmla="*/ 124593 w 1242397"/>
+                <a:gd name="connsiteY5" fmla="*/ 90816 h 1084970"/>
+                <a:gd name="connsiteX6" fmla="*/ 371937 w 1242397"/>
+                <a:gd name="connsiteY6" fmla="*/ 152653 h 1084970"/>
+                <a:gd name="connsiteX7" fmla="*/ 390963 w 1242397"/>
+                <a:gd name="connsiteY7" fmla="*/ 5195 h 1084970"/>
+                <a:gd name="connsiteX8" fmla="*/ 533662 w 1242397"/>
+                <a:gd name="connsiteY8" fmla="*/ 100330 h 1084970"/>
+                <a:gd name="connsiteX9" fmla="*/ 609768 w 1242397"/>
+                <a:gd name="connsiteY9" fmla="*/ 5195 h 1084970"/>
+                <a:gd name="connsiteX10" fmla="*/ 681117 w 1242397"/>
+                <a:gd name="connsiteY10" fmla="*/ 95573 h 1084970"/>
+                <a:gd name="connsiteX11" fmla="*/ 814302 w 1242397"/>
+                <a:gd name="connsiteY11" fmla="*/ 438 h 1084970"/>
+                <a:gd name="connsiteX12" fmla="*/ 823815 w 1242397"/>
+                <a:gd name="connsiteY12" fmla="*/ 143140 h 1084970"/>
+                <a:gd name="connsiteX13" fmla="*/ 971270 w 1242397"/>
+                <a:gd name="connsiteY13" fmla="*/ 124113 h 1084970"/>
+                <a:gd name="connsiteX14" fmla="*/ 937974 w 1242397"/>
+                <a:gd name="connsiteY14" fmla="*/ 243031 h 1084970"/>
+                <a:gd name="connsiteX15" fmla="*/ 1109212 w 1242397"/>
+                <a:gd name="connsiteY15" fmla="*/ 295355 h 1084970"/>
+                <a:gd name="connsiteX16" fmla="*/ 1071159 w 1242397"/>
+                <a:gd name="connsiteY16" fmla="*/ 466597 h 1084970"/>
+                <a:gd name="connsiteX17" fmla="*/ 1194831 w 1242397"/>
+                <a:gd name="connsiteY17" fmla="*/ 637839 h 1084970"/>
+                <a:gd name="connsiteX18" fmla="*/ 1056889 w 1242397"/>
+                <a:gd name="connsiteY18" fmla="*/ 804324 h 1084970"/>
+                <a:gd name="connsiteX19" fmla="*/ 1204345 w 1242397"/>
+                <a:gd name="connsiteY19" fmla="*/ 918485 h 1084970"/>
+                <a:gd name="connsiteX20" fmla="*/ 1137752 w 1242397"/>
+                <a:gd name="connsiteY20" fmla="*/ 994593 h 1084970"/>
+                <a:gd name="connsiteX21" fmla="*/ 1242397 w 1242397"/>
+                <a:gd name="connsiteY21" fmla="*/ 1084970 h 1084970"/>
+                <a:gd name="connsiteX22" fmla="*/ 1242397 w 1242397"/>
+                <a:gd name="connsiteY22" fmla="*/ 1084970 h 1084970"/>
+              </a:gdLst>
+              <a:ahLst/>
+              <a:cxnLst>
+                <a:cxn ang="0">
+                  <a:pos x="connsiteX0" y="connsiteY0"/>
+                </a:cxn>
+                <a:cxn ang="0">
+                  <a:pos x="connsiteX1" y="connsiteY1"/>
+                </a:cxn>
+                <a:cxn ang="0">
+                  <a:pos x="connsiteX2" y="connsiteY2"/>
+                </a:cxn>
+                <a:cxn ang="0">
+                  <a:pos x="connsiteX3" y="connsiteY3"/>
+                </a:cxn>
+                <a:cxn ang="0">
+                  <a:pos x="connsiteX4" y="connsiteY4"/>
+                </a:cxn>
+                <a:cxn ang="0">
+                  <a:pos x="connsiteX5" y="connsiteY5"/>
+                </a:cxn>
+                <a:cxn ang="0">
+                  <a:pos x="connsiteX6" y="connsiteY6"/>
+                </a:cxn>
+                <a:cxn ang="0">
+                  <a:pos x="connsiteX7" y="connsiteY7"/>
+                </a:cxn>
+                <a:cxn ang="0">
+                  <a:pos x="connsiteX8" y="connsiteY8"/>
+                </a:cxn>
+                <a:cxn ang="0">
+                  <a:pos x="connsiteX9" y="connsiteY9"/>
+                </a:cxn>
+                <a:cxn ang="0">
+                  <a:pos x="connsiteX10" y="connsiteY10"/>
+                </a:cxn>
+                <a:cxn ang="0">
+                  <a:pos x="connsiteX11" y="connsiteY11"/>
+                </a:cxn>
+                <a:cxn ang="0">
+                  <a:pos x="connsiteX12" y="connsiteY12"/>
+                </a:cxn>
+                <a:cxn ang="0">
+                  <a:pos x="connsiteX13" y="connsiteY13"/>
+                </a:cxn>
+                <a:cxn ang="0">
+                  <a:pos x="connsiteX14" y="connsiteY14"/>
+                </a:cxn>
+                <a:cxn ang="0">
+                  <a:pos x="connsiteX15" y="connsiteY15"/>
+                </a:cxn>
+                <a:cxn ang="0">
+                  <a:pos x="connsiteX16" y="connsiteY16"/>
+                </a:cxn>
+                <a:cxn ang="0">
+                  <a:pos x="connsiteX17" y="connsiteY17"/>
+                </a:cxn>
+                <a:cxn ang="0">
+                  <a:pos x="connsiteX18" y="connsiteY18"/>
+                </a:cxn>
+                <a:cxn ang="0">
+                  <a:pos x="connsiteX19" y="connsiteY19"/>
+                </a:cxn>
+                <a:cxn ang="0">
+                  <a:pos x="connsiteX20" y="connsiteY20"/>
+                </a:cxn>
+                <a:cxn ang="0">
+                  <a:pos x="connsiteX21" y="connsiteY21"/>
+                </a:cxn>
+                <a:cxn ang="0">
+                  <a:pos x="connsiteX22" y="connsiteY22"/>
+                </a:cxn>
+              </a:cxnLst>
+              <a:rect l="l" t="t" r="r" b="b"/>
+              <a:pathLst>
+                <a:path w="1242397" h="1084970">
+                  <a:moveTo>
+                    <a:pt x="224482" y="837621"/>
+                  </a:moveTo>
+                  <a:cubicBezTo>
+                    <a:pt x="135691" y="767856"/>
+                    <a:pt x="46901" y="698091"/>
+                    <a:pt x="34217" y="637839"/>
+                  </a:cubicBezTo>
+                  <a:cubicBezTo>
+                    <a:pt x="21533" y="577587"/>
+                    <a:pt x="153925" y="530812"/>
+                    <a:pt x="148376" y="476110"/>
+                  </a:cubicBezTo>
+                  <a:cubicBezTo>
+                    <a:pt x="142827" y="421408"/>
+                    <a:pt x="-13349" y="342922"/>
+                    <a:pt x="921" y="309625"/>
+                  </a:cubicBezTo>
+                  <a:cubicBezTo>
+                    <a:pt x="15191" y="276328"/>
+                    <a:pt x="213383" y="312796"/>
+                    <a:pt x="233995" y="276328"/>
+                  </a:cubicBezTo>
+                  <a:cubicBezTo>
+                    <a:pt x="254607" y="239860"/>
+                    <a:pt x="101603" y="111428"/>
+                    <a:pt x="124593" y="90816"/>
+                  </a:cubicBezTo>
+                  <a:cubicBezTo>
+                    <a:pt x="147583" y="70203"/>
+                    <a:pt x="327542" y="166923"/>
+                    <a:pt x="371937" y="152653"/>
+                  </a:cubicBezTo>
+                  <a:cubicBezTo>
+                    <a:pt x="416332" y="138383"/>
+                    <a:pt x="364009" y="13915"/>
+                    <a:pt x="390963" y="5195"/>
+                  </a:cubicBezTo>
+                  <a:cubicBezTo>
+                    <a:pt x="417917" y="-3525"/>
+                    <a:pt x="497195" y="100330"/>
+                    <a:pt x="533662" y="100330"/>
+                  </a:cubicBezTo>
+                  <a:cubicBezTo>
+                    <a:pt x="570129" y="100330"/>
+                    <a:pt x="585192" y="5988"/>
+                    <a:pt x="609768" y="5195"/>
+                  </a:cubicBezTo>
+                  <a:cubicBezTo>
+                    <a:pt x="634344" y="4402"/>
+                    <a:pt x="647028" y="96366"/>
+                    <a:pt x="681117" y="95573"/>
+                  </a:cubicBezTo>
+                  <a:cubicBezTo>
+                    <a:pt x="715206" y="94780"/>
+                    <a:pt x="790519" y="-7490"/>
+                    <a:pt x="814302" y="438"/>
+                  </a:cubicBezTo>
+                  <a:cubicBezTo>
+                    <a:pt x="838085" y="8366"/>
+                    <a:pt x="797654" y="122528"/>
+                    <a:pt x="823815" y="143140"/>
+                  </a:cubicBezTo>
+                  <a:cubicBezTo>
+                    <a:pt x="849976" y="163752"/>
+                    <a:pt x="952244" y="107465"/>
+                    <a:pt x="971270" y="124113"/>
+                  </a:cubicBezTo>
+                  <a:cubicBezTo>
+                    <a:pt x="990296" y="140761"/>
+                    <a:pt x="914984" y="214491"/>
+                    <a:pt x="937974" y="243031"/>
+                  </a:cubicBezTo>
+                  <a:cubicBezTo>
+                    <a:pt x="960964" y="271571"/>
+                    <a:pt x="1087015" y="258094"/>
+                    <a:pt x="1109212" y="295355"/>
+                  </a:cubicBezTo>
+                  <a:cubicBezTo>
+                    <a:pt x="1131409" y="332616"/>
+                    <a:pt x="1056889" y="409516"/>
+                    <a:pt x="1071159" y="466597"/>
+                  </a:cubicBezTo>
+                  <a:cubicBezTo>
+                    <a:pt x="1085429" y="523678"/>
+                    <a:pt x="1197209" y="581551"/>
+                    <a:pt x="1194831" y="637839"/>
+                  </a:cubicBezTo>
+                  <a:cubicBezTo>
+                    <a:pt x="1192453" y="694127"/>
+                    <a:pt x="1055303" y="757550"/>
+                    <a:pt x="1056889" y="804324"/>
+                  </a:cubicBezTo>
+                  <a:cubicBezTo>
+                    <a:pt x="1058475" y="851098"/>
+                    <a:pt x="1190868" y="886774"/>
+                    <a:pt x="1204345" y="918485"/>
+                  </a:cubicBezTo>
+                  <a:cubicBezTo>
+                    <a:pt x="1217822" y="950197"/>
+                    <a:pt x="1131410" y="966846"/>
+                    <a:pt x="1137752" y="994593"/>
+                  </a:cubicBezTo>
+                  <a:cubicBezTo>
+                    <a:pt x="1144094" y="1022341"/>
+                    <a:pt x="1242397" y="1084970"/>
+                    <a:pt x="1242397" y="1084970"/>
+                  </a:cubicBezTo>
+                  <a:lnTo>
+                    <a:pt x="1242397" y="1084970"/>
+                  </a:lnTo>
+                </a:path>
+              </a:pathLst>
+            </a:custGeom>
+            <a:ln>
+              <a:solidFill>
+                <a:srgbClr val="FFFFFF"/>
+              </a:solidFill>
+            </a:ln>
+          </p:spPr>
+          <p:style>
+            <a:lnRef idx="2">
+              <a:schemeClr val="accent1"/>
+            </a:lnRef>
+            <a:fillRef idx="0">
+              <a:schemeClr val="accent1"/>
+            </a:fillRef>
+            <a:effectRef idx="1">
+              <a:schemeClr val="accent1"/>
+            </a:effectRef>
+            <a:fontRef idx="minor">
+              <a:schemeClr val="tx1"/>
+            </a:fontRef>
+          </p:style>
+          <p:txBody>
+            <a:bodyPr rtlCol="0" anchor="ctr"/>
+            <a:lstStyle/>
+            <a:p>
+              <a:pPr algn="ctr"/>
+              <a:endParaRPr lang="en-US"/>
+            </a:p>
+          </p:txBody>
+        </p:sp>
+      </p:grpSp>
+      <p:sp>
+        <p:nvSpPr>
+          <p:cNvPr id="12" name="Oval Callout 11"/>
+          <p:cNvSpPr/>
+          <p:nvPr/>
+        </p:nvSpPr>
+        <p:spPr>
+          <a:xfrm>
+            <a:off x="6437007" y="2901605"/>
+            <a:ext cx="2259385" cy="1649813"/>
+          </a:xfrm>
+          <a:prstGeom prst="wedgeEllipseCallout">
+            <a:avLst>
+              <a:gd name="adj1" fmla="val 564"/>
+              <a:gd name="adj2" fmla="val 67914"/>
+            </a:avLst>
+          </a:prstGeom>
+          <a:noFill/>
+        </p:spPr>
+        <p:style>
+          <a:lnRef idx="3">
+            <a:schemeClr val="lt1"/>
+          </a:lnRef>
+          <a:fillRef idx="1">
+            <a:schemeClr val="dk1"/>
+          </a:fillRef>
+          <a:effectRef idx="1">
+            <a:schemeClr val="dk1"/>
+          </a:effectRef>
+          <a:fontRef idx="minor">
+            <a:schemeClr val="lt1"/>
+          </a:fontRef>
+        </p:style>
+        <p:txBody>
+          <a:bodyPr lIns="0" tIns="0" rIns="0" bIns="0" rtlCol="0" anchor="ctr"/>
+          <a:lstStyle/>
+          <a:p>
+            <a:pPr algn="ctr"/>
+            <a:r>
+              <a:rPr lang="en-US" dirty="0" smtClean="0">
+                <a:latin typeface="Anime Ace 2.0 BB"/>
+                <a:cs typeface="Anime Ace 2.0 BB"/>
+              </a:rPr>
+              <a:t>Where do I even start?</a:t>
+            </a:r>
+            <a:endParaRPr lang="en-US" dirty="0">
+              <a:latin typeface="Anime Ace 2.0 BB"/>
+              <a:cs typeface="Anime Ace 2.0 BB"/>
+            </a:endParaRPr>
+          </a:p>
+        </p:txBody>
+      </p:sp>
+    </p:spTree>
+    <p:extLst>
+      <p:ext uri="{BB962C8B-B14F-4D97-AF65-F5344CB8AC3E}">
+        <p14:creationId xmlns:p14="http://schemas.microsoft.com/office/powerpoint/2010/main" val="2465538405"/>
+      </p:ext>
+    </p:extLst>
+  </p:cSld>
+  <p:clrMapOvr>
+    <a:masterClrMapping/>
+  </p:clrMapOvr>
+</p:sld>
+</file>
+
+<file path=ppt/slides/slide12.xml><?xml version="1.0" encoding="utf-8"?>
+<p:sld xmlns:a="http://schemas.openxmlformats.org/drawingml/2006/main" xmlns:r="http://schemas.openxmlformats.org/officeDocument/2006/relationships" xmlns:p="http://schemas.openxmlformats.org/presentationml/2006/main">
+  <p:cSld>
+    <p:spTree>
+      <p:nvGrpSpPr>
+        <p:cNvPr id="1" name=""/>
+        <p:cNvGrpSpPr/>
+        <p:nvPr/>
+      </p:nvGrpSpPr>
+      <p:grpSpPr>
+        <a:xfrm>
+          <a:off x="0" y="0"/>
+          <a:ext cx="0" cy="0"/>
+          <a:chOff x="0" y="0"/>
+          <a:chExt cx="0" cy="0"/>
+        </a:xfrm>
+      </p:grpSpPr>
+      <p:sp>
+        <p:nvSpPr>
+          <p:cNvPr id="9" name="Trapezoid 8"/>
+          <p:cNvSpPr/>
+          <p:nvPr/>
+        </p:nvSpPr>
+        <p:spPr>
+          <a:xfrm>
+            <a:off x="1393546" y="4939522"/>
+            <a:ext cx="6171826" cy="1305445"/>
+          </a:xfrm>
+          <a:prstGeom prst="trapezoid">
+            <a:avLst>
+              <a:gd name="adj" fmla="val 43918"/>
+            </a:avLst>
+          </a:prstGeom>
+          <a:noFill/>
+          <a:ln w="38100" cmpd="sng">
+            <a:solidFill>
+              <a:schemeClr val="bg1"/>
+            </a:solidFill>
+          </a:ln>
+        </p:spPr>
+        <p:style>
+          <a:lnRef idx="1">
+            <a:schemeClr val="accent1"/>
+          </a:lnRef>
+          <a:fillRef idx="3">
+            <a:schemeClr val="accent1"/>
+          </a:fillRef>
+          <a:effectRef idx="2">
+            <a:schemeClr val="accent1"/>
+          </a:effectRef>
+          <a:fontRef idx="minor">
+            <a:schemeClr val="lt1"/>
+          </a:fontRef>
+        </p:style>
+        <p:txBody>
+          <a:bodyPr rtlCol="0" anchor="ctr"/>
+          <a:lstStyle/>
+          <a:p>
+            <a:pPr algn="ctr"/>
+            <a:r>
+              <a:rPr lang="en-US" dirty="0" smtClean="0">
+                <a:latin typeface="Anime Ace 2.0 BB"/>
+                <a:cs typeface="Anime Ace 2.0 BB"/>
+              </a:rPr>
+              <a:t>Community Documentation</a:t>
+            </a:r>
+            <a:endParaRPr lang="en-US" dirty="0">
+              <a:latin typeface="Anime Ace 2.0 BB"/>
+              <a:cs typeface="Anime Ace 2.0 BB"/>
+            </a:endParaRPr>
+          </a:p>
+        </p:txBody>
+      </p:sp>
+      <p:sp>
+        <p:nvSpPr>
+          <p:cNvPr id="14" name="Trapezoid 13"/>
+          <p:cNvSpPr/>
+          <p:nvPr/>
+        </p:nvSpPr>
+        <p:spPr>
+          <a:xfrm>
+            <a:off x="2046558" y="3420259"/>
+            <a:ext cx="4859785" cy="1305445"/>
+          </a:xfrm>
+          <a:prstGeom prst="trapezoid">
+            <a:avLst>
+              <a:gd name="adj" fmla="val 41215"/>
+            </a:avLst>
+          </a:prstGeom>
+          <a:noFill/>
+          <a:ln w="38100" cmpd="sng">
+            <a:solidFill>
+              <a:schemeClr val="bg1"/>
+            </a:solidFill>
+          </a:ln>
+        </p:spPr>
+        <p:style>
+          <a:lnRef idx="1">
+            <a:schemeClr val="accent1"/>
+          </a:lnRef>
+          <a:fillRef idx="3">
+            <a:schemeClr val="accent1"/>
+          </a:fillRef>
+          <a:effectRef idx="2">
+            <a:schemeClr val="accent1"/>
+          </a:effectRef>
+          <a:fontRef idx="minor">
+            <a:schemeClr val="lt1"/>
+          </a:fontRef>
+        </p:style>
+        <p:txBody>
+          <a:bodyPr rtlCol="0" anchor="ctr"/>
+          <a:lstStyle/>
+          <a:p>
+            <a:pPr algn="ctr"/>
+            <a:r>
+              <a:rPr lang="en-US" dirty="0" smtClean="0">
+                <a:latin typeface="Anime Ace 2.0 BB"/>
+                <a:cs typeface="Anime Ace 2.0 BB"/>
+              </a:rPr>
+              <a:t>Source code</a:t>
+            </a:r>
+            <a:endParaRPr lang="en-US" dirty="0">
+              <a:latin typeface="Anime Ace 2.0 BB"/>
+              <a:cs typeface="Anime Ace 2.0 BB"/>
+            </a:endParaRPr>
+          </a:p>
+        </p:txBody>
+      </p:sp>
+      <p:sp>
+        <p:nvSpPr>
+          <p:cNvPr id="15" name="Trapezoid 14"/>
+          <p:cNvSpPr/>
+          <p:nvPr/>
+        </p:nvSpPr>
+        <p:spPr>
+          <a:xfrm>
+            <a:off x="2646309" y="1900996"/>
+            <a:ext cx="3633786" cy="1305445"/>
+          </a:xfrm>
+          <a:prstGeom prst="trapezoid">
+            <a:avLst>
+              <a:gd name="adj" fmla="val 41215"/>
+            </a:avLst>
+          </a:prstGeom>
+          <a:noFill/>
+          <a:ln w="38100" cmpd="sng">
+            <a:solidFill>
+              <a:schemeClr val="bg1"/>
+            </a:solidFill>
+          </a:ln>
+        </p:spPr>
+        <p:style>
+          <a:lnRef idx="1">
+            <a:schemeClr val="accent1"/>
+          </a:lnRef>
+          <a:fillRef idx="3">
+            <a:schemeClr val="accent1"/>
+          </a:fillRef>
+          <a:effectRef idx="2">
+            <a:schemeClr val="accent1"/>
+          </a:effectRef>
+          <a:fontRef idx="minor">
+            <a:schemeClr val="lt1"/>
+          </a:fontRef>
+        </p:style>
+        <p:txBody>
+          <a:bodyPr rtlCol="0" anchor="ctr"/>
+          <a:lstStyle/>
+          <a:p>
+            <a:pPr algn="ctr"/>
+            <a:r>
+              <a:rPr lang="en-US" dirty="0" smtClean="0">
+                <a:latin typeface="Anime Ace 2.0 BB"/>
+                <a:cs typeface="Anime Ace 2.0 BB"/>
+              </a:rPr>
+              <a:t>Educational prose</a:t>
+            </a:r>
+            <a:endParaRPr lang="en-US" dirty="0">
+              <a:latin typeface="Anime Ace 2.0 BB"/>
+              <a:cs typeface="Anime Ace 2.0 BB"/>
+            </a:endParaRPr>
+          </a:p>
+        </p:txBody>
+      </p:sp>
+      <p:sp>
+        <p:nvSpPr>
+          <p:cNvPr id="16" name="Isosceles Triangle 15"/>
+          <p:cNvSpPr/>
+          <p:nvPr/>
+        </p:nvSpPr>
+        <p:spPr>
+          <a:xfrm>
+            <a:off x="3281340" y="381733"/>
+            <a:ext cx="2416644" cy="1305445"/>
+          </a:xfrm>
+          <a:prstGeom prst="triangle">
+            <a:avLst/>
+          </a:prstGeom>
+          <a:noFill/>
+          <a:ln w="38100" cmpd="sng">
+            <a:solidFill>
+              <a:schemeClr val="bg1"/>
+            </a:solidFill>
+          </a:ln>
+        </p:spPr>
+        <p:style>
+          <a:lnRef idx="1">
+            <a:schemeClr val="accent1"/>
+          </a:lnRef>
+          <a:fillRef idx="3">
+            <a:schemeClr val="accent1"/>
+          </a:fillRef>
+          <a:effectRef idx="2">
+            <a:schemeClr val="accent1"/>
+          </a:effectRef>
+          <a:fontRef idx="minor">
+            <a:schemeClr val="lt1"/>
+          </a:fontRef>
+        </p:style>
+        <p:txBody>
+          <a:bodyPr lIns="0" tIns="0" rIns="0" bIns="0" rtlCol="0" anchor="ctr"/>
+          <a:lstStyle/>
+          <a:p>
+            <a:pPr algn="ctr"/>
+            <a:r>
+              <a:rPr lang="en-US" dirty="0" smtClean="0">
+                <a:latin typeface="Anime Ace 2.0 BB"/>
+                <a:cs typeface="Anime Ace 2.0 BB"/>
+              </a:rPr>
+              <a:t>Training</a:t>
+            </a:r>
+            <a:endParaRPr lang="en-US" dirty="0">
+              <a:latin typeface="Anime Ace 2.0 BB"/>
+              <a:cs typeface="Anime Ace 2.0 BB"/>
+            </a:endParaRPr>
+          </a:p>
+        </p:txBody>
+      </p:sp>
+      <p:sp>
+        <p:nvSpPr>
+          <p:cNvPr id="18" name="Up Arrow 17"/>
+          <p:cNvSpPr/>
+          <p:nvPr/>
+        </p:nvSpPr>
+        <p:spPr>
+          <a:xfrm>
+            <a:off x="635031" y="899699"/>
+            <a:ext cx="758515" cy="5186500"/>
+          </a:xfrm>
+          <a:prstGeom prst="upArrow">
+            <a:avLst/>
+          </a:prstGeom>
+          <a:gradFill>
+            <a:gsLst>
+              <a:gs pos="0">
+                <a:schemeClr val="accent1">
+                  <a:tint val="100000"/>
+                  <a:shade val="100000"/>
+                  <a:satMod val="130000"/>
+                  <a:alpha val="0"/>
+                </a:schemeClr>
+              </a:gs>
+              <a:gs pos="100000">
+                <a:schemeClr val="accent1">
+                  <a:tint val="50000"/>
+                  <a:shade val="100000"/>
+                  <a:satMod val="350000"/>
+                </a:schemeClr>
+              </a:gs>
+            </a:gsLst>
+          </a:gradFill>
+          <a:ln>
+            <a:noFill/>
+          </a:ln>
+        </p:spPr>
+        <p:style>
+          <a:lnRef idx="1">
+            <a:schemeClr val="accent1"/>
+          </a:lnRef>
+          <a:fillRef idx="3">
+            <a:schemeClr val="accent1"/>
+          </a:fillRef>
+          <a:effectRef idx="2">
+            <a:schemeClr val="accent1"/>
+          </a:effectRef>
+          <a:fontRef idx="minor">
+            <a:schemeClr val="lt1"/>
+          </a:fontRef>
+        </p:style>
+        <p:txBody>
+          <a:bodyPr rtlCol="0" anchor="ctr"/>
+          <a:lstStyle/>
+          <a:p>
+            <a:pPr algn="ctr"/>
+            <a:endParaRPr lang="en-US"/>
+          </a:p>
+        </p:txBody>
+      </p:sp>
+    </p:spTree>
+    <p:extLst>
+      <p:ext uri="{BB962C8B-B14F-4D97-AF65-F5344CB8AC3E}">
+        <p14:creationId xmlns:p14="http://schemas.microsoft.com/office/powerpoint/2010/main" val="3460570565"/>
+      </p:ext>
+    </p:extLst>
+  </p:cSld>
+  <p:clrMapOvr>
+    <a:masterClrMapping/>
+  </p:clrMapOvr>
+</p:sld>
+</file>
+
+<file path=ppt/slides/slide13.xml><?xml version="1.0" encoding="utf-8"?>
+<p:sld xmlns:a="http://schemas.openxmlformats.org/drawingml/2006/main" xmlns:r="http://schemas.openxmlformats.org/officeDocument/2006/relationships" xmlns:p="http://schemas.openxmlformats.org/presentationml/2006/main">
+  <p:cSld>
+    <p:spTree>
+      <p:nvGrpSpPr>
+        <p:cNvPr id="1" name=""/>
+        <p:cNvGrpSpPr/>
+        <p:nvPr/>
+      </p:nvGrpSpPr>
+      <p:grpSpPr>
+        <a:xfrm>
+          <a:off x="0" y="0"/>
+          <a:ext cx="0" cy="0"/>
+          <a:chOff x="0" y="0"/>
+          <a:chExt cx="0" cy="0"/>
+        </a:xfrm>
+      </p:grpSpPr>
+    </p:spTree>
+    <p:extLst>
+      <p:ext uri="{BB962C8B-B14F-4D97-AF65-F5344CB8AC3E}">
+        <p14:creationId xmlns:p14="http://schemas.microsoft.com/office/powerpoint/2010/main" val="1673969188"/>
       </p:ext>
     </p:extLst>
   </p:cSld>
@@ -3544,14 +5747,6 @@
 <file path=ppt/slides/slide4.xml><?xml version="1.0" encoding="utf-8"?>
 <p:sld xmlns:a="http://schemas.openxmlformats.org/drawingml/2006/main" xmlns:r="http://schemas.openxmlformats.org/officeDocument/2006/relationships" xmlns:p="http://schemas.openxmlformats.org/presentationml/2006/main">
   <p:cSld>
-    <p:bg>
-      <p:bgPr>
-        <a:solidFill>
-          <a:schemeClr val="tx1"/>
-        </a:solidFill>
-        <a:effectLst/>
-      </p:bgPr>
-    </p:bg>
     <p:spTree>
       <p:nvGrpSpPr>
         <p:cNvPr id="1" name=""/>
@@ -4040,14 +6235,6 @@
 <file path=ppt/slides/slide5.xml><?xml version="1.0" encoding="utf-8"?>
 <p:sld xmlns:a="http://schemas.openxmlformats.org/drawingml/2006/main" xmlns:r="http://schemas.openxmlformats.org/officeDocument/2006/relationships" xmlns:p="http://schemas.openxmlformats.org/presentationml/2006/main">
   <p:cSld>
-    <p:bg>
-      <p:bgPr>
-        <a:solidFill>
-          <a:schemeClr val="tx1"/>
-        </a:solidFill>
-        <a:effectLst/>
-      </p:bgPr>
-    </p:bg>
     <p:spTree>
       <p:nvGrpSpPr>
         <p:cNvPr id="1" name=""/>
@@ -4438,6 +6625,2279 @@
     <p:extLst>
       <p:ext uri="{BB962C8B-B14F-4D97-AF65-F5344CB8AC3E}">
         <p14:creationId xmlns:p14="http://schemas.microsoft.com/office/powerpoint/2010/main" val="3691719163"/>
+      </p:ext>
+    </p:extLst>
+  </p:cSld>
+  <p:clrMapOvr>
+    <a:masterClrMapping/>
+  </p:clrMapOvr>
+</p:sld>
+</file>
+
+<file path=ppt/slides/slide7.xml><?xml version="1.0" encoding="utf-8"?>
+<p:sld xmlns:a="http://schemas.openxmlformats.org/drawingml/2006/main" xmlns:r="http://schemas.openxmlformats.org/officeDocument/2006/relationships" xmlns:p="http://schemas.openxmlformats.org/presentationml/2006/main">
+  <p:cSld>
+    <p:spTree>
+      <p:nvGrpSpPr>
+        <p:cNvPr id="1" name=""/>
+        <p:cNvGrpSpPr/>
+        <p:nvPr/>
+      </p:nvGrpSpPr>
+      <p:grpSpPr>
+        <a:xfrm>
+          <a:off x="0" y="0"/>
+          <a:ext cx="0" cy="0"/>
+          <a:chOff x="0" y="0"/>
+          <a:chExt cx="0" cy="0"/>
+        </a:xfrm>
+      </p:grpSpPr>
+      <p:pic>
+        <p:nvPicPr>
+          <p:cNvPr id="2" name="Picture 1" descr="coreVsExampleCommits.png"/>
+          <p:cNvPicPr>
+            <a:picLocks noChangeAspect="1"/>
+          </p:cNvPicPr>
+          <p:nvPr/>
+        </p:nvPicPr>
+        <p:blipFill>
+          <a:blip r:embed="rId2">
+            <a:extLst>
+              <a:ext uri="{28A0092B-C50C-407E-A947-70E740481C1C}">
+                <a14:useLocalDpi xmlns:a14="http://schemas.microsoft.com/office/drawing/2010/main" val="0"/>
+              </a:ext>
+            </a:extLst>
+          </a:blip>
+          <a:stretch>
+            <a:fillRect/>
+          </a:stretch>
+        </p:blipFill>
+        <p:spPr>
+          <a:xfrm>
+            <a:off x="0" y="965200"/>
+            <a:ext cx="9137904" cy="4919472"/>
+          </a:xfrm>
+          <a:prstGeom prst="rect">
+            <a:avLst/>
+          </a:prstGeom>
+        </p:spPr>
+      </p:pic>
+      <p:sp>
+        <p:nvSpPr>
+          <p:cNvPr id="5" name="TextBox 4"/>
+          <p:cNvSpPr txBox="1"/>
+          <p:nvPr/>
+        </p:nvSpPr>
+        <p:spPr>
+          <a:xfrm>
+            <a:off x="653473" y="1528795"/>
+            <a:ext cx="1553540" cy="461665"/>
+          </a:xfrm>
+          <a:prstGeom prst="rect">
+            <a:avLst/>
+          </a:prstGeom>
+          <a:noFill/>
+        </p:spPr>
+        <p:txBody>
+          <a:bodyPr wrap="square" rtlCol="0">
+            <a:spAutoFit/>
+          </a:bodyPr>
+          <a:lstStyle/>
+          <a:p>
+            <a:pPr algn="ctr"/>
+            <a:r>
+              <a:rPr lang="en-US" sz="1200" dirty="0" smtClean="0">
+                <a:solidFill>
+                  <a:schemeClr val="bg1"/>
+                </a:solidFill>
+                <a:latin typeface="Anime Ace 2.0 BB"/>
+                <a:cs typeface="Anime Ace 2.0 BB"/>
+              </a:rPr>
+              <a:t>Drupal </a:t>
+            </a:r>
+            <a:br>
+              <a:rPr lang="en-US" sz="1200" dirty="0" smtClean="0">
+                <a:solidFill>
+                  <a:schemeClr val="bg1"/>
+                </a:solidFill>
+                <a:latin typeface="Anime Ace 2.0 BB"/>
+                <a:cs typeface="Anime Ace 2.0 BB"/>
+              </a:rPr>
+            </a:br>
+            <a:r>
+              <a:rPr lang="en-US" sz="1200" dirty="0" smtClean="0">
+                <a:solidFill>
+                  <a:schemeClr val="bg1"/>
+                </a:solidFill>
+                <a:latin typeface="Anime Ace 2.0 BB"/>
+                <a:cs typeface="Anime Ace 2.0 BB"/>
+              </a:rPr>
+              <a:t>7.0-alpha-1</a:t>
+            </a:r>
+            <a:endParaRPr lang="en-US" sz="1200" dirty="0">
+              <a:solidFill>
+                <a:schemeClr val="bg1"/>
+              </a:solidFill>
+              <a:latin typeface="Anime Ace 2.0 BB"/>
+              <a:cs typeface="Anime Ace 2.0 BB"/>
+            </a:endParaRPr>
+          </a:p>
+        </p:txBody>
+      </p:sp>
+      <p:cxnSp>
+        <p:nvCxnSpPr>
+          <p:cNvPr id="9" name="Straight Arrow Connector 8"/>
+          <p:cNvCxnSpPr>
+            <a:stCxn id="5" idx="2"/>
+          </p:cNvCxnSpPr>
+          <p:nvPr/>
+        </p:nvCxnSpPr>
+        <p:spPr>
+          <a:xfrm flipH="1">
+            <a:off x="863078" y="1990460"/>
+            <a:ext cx="567165" cy="1326038"/>
+          </a:xfrm>
+          <a:prstGeom prst="straightConnector1">
+            <a:avLst/>
+          </a:prstGeom>
+          <a:ln>
+            <a:solidFill>
+              <a:srgbClr val="FFFFFF"/>
+            </a:solidFill>
+            <a:tailEnd type="arrow"/>
+          </a:ln>
+        </p:spPr>
+        <p:style>
+          <a:lnRef idx="2">
+            <a:schemeClr val="accent1"/>
+          </a:lnRef>
+          <a:fillRef idx="0">
+            <a:schemeClr val="accent1"/>
+          </a:fillRef>
+          <a:effectRef idx="1">
+            <a:schemeClr val="accent1"/>
+          </a:effectRef>
+          <a:fontRef idx="minor">
+            <a:schemeClr val="tx1"/>
+          </a:fontRef>
+        </p:style>
+      </p:cxnSp>
+      <p:sp>
+        <p:nvSpPr>
+          <p:cNvPr id="10" name="TextBox 9"/>
+          <p:cNvSpPr txBox="1"/>
+          <p:nvPr/>
+        </p:nvSpPr>
+        <p:spPr>
+          <a:xfrm>
+            <a:off x="1225081" y="2692173"/>
+            <a:ext cx="1553540" cy="461665"/>
+          </a:xfrm>
+          <a:prstGeom prst="rect">
+            <a:avLst/>
+          </a:prstGeom>
+          <a:noFill/>
+        </p:spPr>
+        <p:txBody>
+          <a:bodyPr wrap="square" rtlCol="0">
+            <a:spAutoFit/>
+          </a:bodyPr>
+          <a:lstStyle/>
+          <a:p>
+            <a:pPr algn="ctr"/>
+            <a:r>
+              <a:rPr lang="en-US" sz="1200" dirty="0" smtClean="0">
+                <a:solidFill>
+                  <a:schemeClr val="bg1"/>
+                </a:solidFill>
+                <a:latin typeface="Anime Ace 2.0 BB"/>
+                <a:cs typeface="Anime Ace 2.0 BB"/>
+              </a:rPr>
+              <a:t>Drupal </a:t>
+            </a:r>
+            <a:br>
+              <a:rPr lang="en-US" sz="1200" dirty="0" smtClean="0">
+                <a:solidFill>
+                  <a:schemeClr val="bg1"/>
+                </a:solidFill>
+                <a:latin typeface="Anime Ace 2.0 BB"/>
+                <a:cs typeface="Anime Ace 2.0 BB"/>
+              </a:rPr>
+            </a:br>
+            <a:r>
+              <a:rPr lang="en-US" sz="1200" dirty="0" smtClean="0">
+                <a:solidFill>
+                  <a:schemeClr val="bg1"/>
+                </a:solidFill>
+                <a:latin typeface="Anime Ace 2.0 BB"/>
+                <a:cs typeface="Anime Ace 2.0 BB"/>
+              </a:rPr>
+              <a:t>7.0-RC-1</a:t>
+            </a:r>
+            <a:endParaRPr lang="en-US" sz="1200" dirty="0">
+              <a:solidFill>
+                <a:schemeClr val="bg1"/>
+              </a:solidFill>
+              <a:latin typeface="Anime Ace 2.0 BB"/>
+              <a:cs typeface="Anime Ace 2.0 BB"/>
+            </a:endParaRPr>
+          </a:p>
+        </p:txBody>
+      </p:sp>
+      <p:cxnSp>
+        <p:nvCxnSpPr>
+          <p:cNvPr id="11" name="Straight Arrow Connector 10"/>
+          <p:cNvCxnSpPr>
+            <a:stCxn id="10" idx="2"/>
+          </p:cNvCxnSpPr>
+          <p:nvPr/>
+        </p:nvCxnSpPr>
+        <p:spPr>
+          <a:xfrm>
+            <a:off x="2001851" y="3153838"/>
+            <a:ext cx="82429" cy="884762"/>
+          </a:xfrm>
+          <a:prstGeom prst="straightConnector1">
+            <a:avLst/>
+          </a:prstGeom>
+          <a:ln>
+            <a:solidFill>
+              <a:srgbClr val="FFFFFF"/>
+            </a:solidFill>
+            <a:tailEnd type="arrow"/>
+          </a:ln>
+        </p:spPr>
+        <p:style>
+          <a:lnRef idx="2">
+            <a:schemeClr val="accent1"/>
+          </a:lnRef>
+          <a:fillRef idx="0">
+            <a:schemeClr val="accent1"/>
+          </a:fillRef>
+          <a:effectRef idx="1">
+            <a:schemeClr val="accent1"/>
+          </a:effectRef>
+          <a:fontRef idx="minor">
+            <a:schemeClr val="tx1"/>
+          </a:fontRef>
+        </p:style>
+      </p:cxnSp>
+      <p:sp>
+        <p:nvSpPr>
+          <p:cNvPr id="18" name="TextBox 17"/>
+          <p:cNvSpPr txBox="1"/>
+          <p:nvPr/>
+        </p:nvSpPr>
+        <p:spPr>
+          <a:xfrm>
+            <a:off x="2207013" y="2123999"/>
+            <a:ext cx="1553540" cy="646331"/>
+          </a:xfrm>
+          <a:prstGeom prst="rect">
+            <a:avLst/>
+          </a:prstGeom>
+          <a:noFill/>
+        </p:spPr>
+        <p:txBody>
+          <a:bodyPr wrap="square" rtlCol="0">
+            <a:spAutoFit/>
+          </a:bodyPr>
+          <a:lstStyle/>
+          <a:p>
+            <a:pPr algn="ctr"/>
+            <a:r>
+              <a:rPr lang="en-US" sz="1200" dirty="0" err="1" smtClean="0">
+                <a:solidFill>
+                  <a:schemeClr val="bg1"/>
+                </a:solidFill>
+                <a:latin typeface="Anime Ace 2.0 BB"/>
+                <a:cs typeface="Anime Ace 2.0 BB"/>
+              </a:rPr>
+              <a:t>Tablesort</a:t>
+            </a:r>
+            <a:r>
+              <a:rPr lang="en-US" sz="1200" dirty="0" smtClean="0">
+                <a:solidFill>
+                  <a:schemeClr val="bg1"/>
+                </a:solidFill>
+                <a:latin typeface="Anime Ace 2.0 BB"/>
+                <a:cs typeface="Anime Ace 2.0 BB"/>
+              </a:rPr>
+              <a:t> &amp; Pager Example</a:t>
+            </a:r>
+            <a:endParaRPr lang="en-US" sz="1200" dirty="0">
+              <a:solidFill>
+                <a:schemeClr val="bg1"/>
+              </a:solidFill>
+              <a:latin typeface="Anime Ace 2.0 BB"/>
+              <a:cs typeface="Anime Ace 2.0 BB"/>
+            </a:endParaRPr>
+          </a:p>
+        </p:txBody>
+      </p:sp>
+      <p:cxnSp>
+        <p:nvCxnSpPr>
+          <p:cNvPr id="19" name="Straight Arrow Connector 18"/>
+          <p:cNvCxnSpPr>
+            <a:stCxn id="18" idx="2"/>
+          </p:cNvCxnSpPr>
+          <p:nvPr/>
+        </p:nvCxnSpPr>
+        <p:spPr>
+          <a:xfrm>
+            <a:off x="2983783" y="2770330"/>
+            <a:ext cx="258923" cy="1125630"/>
+          </a:xfrm>
+          <a:prstGeom prst="straightConnector1">
+            <a:avLst/>
+          </a:prstGeom>
+          <a:ln>
+            <a:solidFill>
+              <a:srgbClr val="FFFFFF"/>
+            </a:solidFill>
+            <a:tailEnd type="arrow"/>
+          </a:ln>
+        </p:spPr>
+        <p:style>
+          <a:lnRef idx="2">
+            <a:schemeClr val="accent1"/>
+          </a:lnRef>
+          <a:fillRef idx="0">
+            <a:schemeClr val="accent1"/>
+          </a:fillRef>
+          <a:effectRef idx="1">
+            <a:schemeClr val="accent1"/>
+          </a:effectRef>
+          <a:fontRef idx="minor">
+            <a:schemeClr val="tx1"/>
+          </a:fontRef>
+        </p:style>
+      </p:cxnSp>
+      <p:sp>
+        <p:nvSpPr>
+          <p:cNvPr id="21" name="TextBox 20"/>
+          <p:cNvSpPr txBox="1"/>
+          <p:nvPr/>
+        </p:nvSpPr>
+        <p:spPr>
+          <a:xfrm>
+            <a:off x="4348934" y="1121321"/>
+            <a:ext cx="1553540" cy="461665"/>
+          </a:xfrm>
+          <a:prstGeom prst="rect">
+            <a:avLst/>
+          </a:prstGeom>
+          <a:noFill/>
+        </p:spPr>
+        <p:txBody>
+          <a:bodyPr wrap="square" rtlCol="0">
+            <a:spAutoFit/>
+          </a:bodyPr>
+          <a:lstStyle/>
+          <a:p>
+            <a:pPr algn="ctr"/>
+            <a:r>
+              <a:rPr lang="en-US" sz="1200" dirty="0" smtClean="0">
+                <a:solidFill>
+                  <a:schemeClr val="bg1"/>
+                </a:solidFill>
+                <a:latin typeface="Anime Ace 2.0 BB"/>
+                <a:cs typeface="Anime Ace 2.0 BB"/>
+              </a:rPr>
+              <a:t>Drupal </a:t>
+            </a:r>
+            <a:br>
+              <a:rPr lang="en-US" sz="1200" dirty="0" smtClean="0">
+                <a:solidFill>
+                  <a:schemeClr val="bg1"/>
+                </a:solidFill>
+                <a:latin typeface="Anime Ace 2.0 BB"/>
+                <a:cs typeface="Anime Ace 2.0 BB"/>
+              </a:rPr>
+            </a:br>
+            <a:r>
+              <a:rPr lang="en-US" sz="1200" dirty="0" smtClean="0">
+                <a:solidFill>
+                  <a:schemeClr val="bg1"/>
+                </a:solidFill>
+                <a:latin typeface="Anime Ace 2.0 BB"/>
+                <a:cs typeface="Anime Ace 2.0 BB"/>
+              </a:rPr>
+              <a:t>8.0-Alpha-1</a:t>
+            </a:r>
+            <a:endParaRPr lang="en-US" sz="1200" dirty="0">
+              <a:solidFill>
+                <a:schemeClr val="bg1"/>
+              </a:solidFill>
+              <a:latin typeface="Anime Ace 2.0 BB"/>
+              <a:cs typeface="Anime Ace 2.0 BB"/>
+            </a:endParaRPr>
+          </a:p>
+        </p:txBody>
+      </p:sp>
+      <p:cxnSp>
+        <p:nvCxnSpPr>
+          <p:cNvPr id="22" name="Straight Arrow Connector 21"/>
+          <p:cNvCxnSpPr>
+            <a:stCxn id="21" idx="2"/>
+          </p:cNvCxnSpPr>
+          <p:nvPr/>
+        </p:nvCxnSpPr>
+        <p:spPr>
+          <a:xfrm>
+            <a:off x="5125704" y="1582986"/>
+            <a:ext cx="878851" cy="217046"/>
+          </a:xfrm>
+          <a:prstGeom prst="straightConnector1">
+            <a:avLst/>
+          </a:prstGeom>
+          <a:ln>
+            <a:solidFill>
+              <a:srgbClr val="FFFFFF"/>
+            </a:solidFill>
+            <a:tailEnd type="arrow"/>
+          </a:ln>
+        </p:spPr>
+        <p:style>
+          <a:lnRef idx="2">
+            <a:schemeClr val="accent1"/>
+          </a:lnRef>
+          <a:fillRef idx="0">
+            <a:schemeClr val="accent1"/>
+          </a:fillRef>
+          <a:effectRef idx="1">
+            <a:schemeClr val="accent1"/>
+          </a:effectRef>
+          <a:fontRef idx="minor">
+            <a:schemeClr val="tx1"/>
+          </a:fontRef>
+        </p:style>
+      </p:cxnSp>
+      <p:sp>
+        <p:nvSpPr>
+          <p:cNvPr id="24" name="TextBox 23"/>
+          <p:cNvSpPr txBox="1"/>
+          <p:nvPr/>
+        </p:nvSpPr>
+        <p:spPr>
+          <a:xfrm>
+            <a:off x="6198388" y="2123999"/>
+            <a:ext cx="1553540" cy="461665"/>
+          </a:xfrm>
+          <a:prstGeom prst="rect">
+            <a:avLst/>
+          </a:prstGeom>
+          <a:noFill/>
+        </p:spPr>
+        <p:txBody>
+          <a:bodyPr wrap="square" rtlCol="0">
+            <a:spAutoFit/>
+          </a:bodyPr>
+          <a:lstStyle/>
+          <a:p>
+            <a:pPr algn="ctr"/>
+            <a:r>
+              <a:rPr lang="en-US" sz="1200" dirty="0" err="1" smtClean="0">
+                <a:solidFill>
+                  <a:schemeClr val="bg1"/>
+                </a:solidFill>
+                <a:latin typeface="Anime Ace 2.0 BB"/>
+                <a:cs typeface="Anime Ace 2.0 BB"/>
+              </a:rPr>
+              <a:t>Simpletest</a:t>
+            </a:r>
+            <a:r>
+              <a:rPr lang="en-US" sz="1200" dirty="0" smtClean="0">
+                <a:solidFill>
+                  <a:schemeClr val="bg1"/>
+                </a:solidFill>
+                <a:latin typeface="Anime Ace 2.0 BB"/>
+                <a:cs typeface="Anime Ace 2.0 BB"/>
+              </a:rPr>
+              <a:t> 8.x Example</a:t>
+            </a:r>
+            <a:endParaRPr lang="en-US" sz="1200" dirty="0">
+              <a:solidFill>
+                <a:schemeClr val="bg1"/>
+              </a:solidFill>
+              <a:latin typeface="Anime Ace 2.0 BB"/>
+              <a:cs typeface="Anime Ace 2.0 BB"/>
+            </a:endParaRPr>
+          </a:p>
+        </p:txBody>
+      </p:sp>
+      <p:cxnSp>
+        <p:nvCxnSpPr>
+          <p:cNvPr id="25" name="Straight Arrow Connector 24"/>
+          <p:cNvCxnSpPr>
+            <a:stCxn id="24" idx="2"/>
+          </p:cNvCxnSpPr>
+          <p:nvPr/>
+        </p:nvCxnSpPr>
+        <p:spPr>
+          <a:xfrm>
+            <a:off x="6975158" y="2585664"/>
+            <a:ext cx="72232" cy="614736"/>
+          </a:xfrm>
+          <a:prstGeom prst="straightConnector1">
+            <a:avLst/>
+          </a:prstGeom>
+          <a:ln>
+            <a:solidFill>
+              <a:srgbClr val="FFFFFF"/>
+            </a:solidFill>
+            <a:tailEnd type="arrow"/>
+          </a:ln>
+        </p:spPr>
+        <p:style>
+          <a:lnRef idx="2">
+            <a:schemeClr val="accent1"/>
+          </a:lnRef>
+          <a:fillRef idx="0">
+            <a:schemeClr val="accent1"/>
+          </a:fillRef>
+          <a:effectRef idx="1">
+            <a:schemeClr val="accent1"/>
+          </a:effectRef>
+          <a:fontRef idx="minor">
+            <a:schemeClr val="tx1"/>
+          </a:fontRef>
+        </p:style>
+      </p:cxnSp>
+    </p:spTree>
+    <p:extLst>
+      <p:ext uri="{BB962C8B-B14F-4D97-AF65-F5344CB8AC3E}">
+        <p14:creationId xmlns:p14="http://schemas.microsoft.com/office/powerpoint/2010/main" val="3503559353"/>
+      </p:ext>
+    </p:extLst>
+  </p:cSld>
+  <p:clrMapOvr>
+    <a:masterClrMapping/>
+  </p:clrMapOvr>
+</p:sld>
+</file>
+
+<file path=ppt/slides/slide8.xml><?xml version="1.0" encoding="utf-8"?>
+<p:sld xmlns:a="http://schemas.openxmlformats.org/drawingml/2006/main" xmlns:r="http://schemas.openxmlformats.org/officeDocument/2006/relationships" xmlns:p="http://schemas.openxmlformats.org/presentationml/2006/main">
+  <p:cSld>
+    <p:spTree>
+      <p:nvGrpSpPr>
+        <p:cNvPr id="1" name=""/>
+        <p:cNvGrpSpPr/>
+        <p:nvPr/>
+      </p:nvGrpSpPr>
+      <p:grpSpPr>
+        <a:xfrm>
+          <a:off x="0" y="0"/>
+          <a:ext cx="0" cy="0"/>
+          <a:chOff x="0" y="0"/>
+          <a:chExt cx="0" cy="0"/>
+        </a:xfrm>
+      </p:grpSpPr>
+      <p:cxnSp>
+        <p:nvCxnSpPr>
+          <p:cNvPr id="3" name="Straight Connector 2"/>
+          <p:cNvCxnSpPr/>
+          <p:nvPr/>
+        </p:nvCxnSpPr>
+        <p:spPr>
+          <a:xfrm>
+            <a:off x="1431911" y="1494253"/>
+            <a:ext cx="0" cy="3723181"/>
+          </a:xfrm>
+          <a:prstGeom prst="line">
+            <a:avLst/>
+          </a:prstGeom>
+        </p:spPr>
+        <p:style>
+          <a:lnRef idx="2">
+            <a:schemeClr val="accent1"/>
+          </a:lnRef>
+          <a:fillRef idx="0">
+            <a:schemeClr val="accent1"/>
+          </a:fillRef>
+          <a:effectRef idx="1">
+            <a:schemeClr val="accent1"/>
+          </a:effectRef>
+          <a:fontRef idx="minor">
+            <a:schemeClr val="tx1"/>
+          </a:fontRef>
+        </p:style>
+      </p:cxnSp>
+      <p:cxnSp>
+        <p:nvCxnSpPr>
+          <p:cNvPr id="5" name="Straight Arrow Connector 4"/>
+          <p:cNvCxnSpPr/>
+          <p:nvPr/>
+        </p:nvCxnSpPr>
+        <p:spPr>
+          <a:xfrm>
+            <a:off x="1431911" y="5217434"/>
+            <a:ext cx="6088737" cy="0"/>
+          </a:xfrm>
+          <a:prstGeom prst="straightConnector1">
+            <a:avLst/>
+          </a:prstGeom>
+          <a:ln>
+            <a:tailEnd type="arrow"/>
+          </a:ln>
+        </p:spPr>
+        <p:style>
+          <a:lnRef idx="2">
+            <a:schemeClr val="accent1"/>
+          </a:lnRef>
+          <a:fillRef idx="0">
+            <a:schemeClr val="accent1"/>
+          </a:fillRef>
+          <a:effectRef idx="1">
+            <a:schemeClr val="accent1"/>
+          </a:effectRef>
+          <a:fontRef idx="minor">
+            <a:schemeClr val="tx1"/>
+          </a:fontRef>
+        </p:style>
+      </p:cxnSp>
+      <p:sp>
+        <p:nvSpPr>
+          <p:cNvPr id="6" name="Freeform 5"/>
+          <p:cNvSpPr/>
+          <p:nvPr/>
+        </p:nvSpPr>
+        <p:spPr>
+          <a:xfrm>
+            <a:off x="1431911" y="3483451"/>
+            <a:ext cx="6972787" cy="1685879"/>
+          </a:xfrm>
+          <a:custGeom>
+            <a:avLst/>
+            <a:gdLst>
+              <a:gd name="connsiteX0" fmla="*/ 0 w 6972787"/>
+              <a:gd name="connsiteY0" fmla="*/ 115210 h 1685879"/>
+              <a:gd name="connsiteX1" fmla="*/ 224126 w 6972787"/>
+              <a:gd name="connsiteY1" fmla="*/ 239731 h 1685879"/>
+              <a:gd name="connsiteX2" fmla="*/ 796890 w 6972787"/>
+              <a:gd name="connsiteY2" fmla="*/ 1509846 h 1685879"/>
+              <a:gd name="connsiteX3" fmla="*/ 1282495 w 6972787"/>
+              <a:gd name="connsiteY3" fmla="*/ 3141 h 1685879"/>
+              <a:gd name="connsiteX4" fmla="*/ 1705843 w 6972787"/>
+              <a:gd name="connsiteY4" fmla="*/ 1098927 h 1685879"/>
+              <a:gd name="connsiteX5" fmla="*/ 2104288 w 6972787"/>
+              <a:gd name="connsiteY5" fmla="*/ 551034 h 1685879"/>
+              <a:gd name="connsiteX6" fmla="*/ 2465379 w 6972787"/>
+              <a:gd name="connsiteY6" fmla="*/ 1273256 h 1685879"/>
+              <a:gd name="connsiteX7" fmla="*/ 2714407 w 6972787"/>
+              <a:gd name="connsiteY7" fmla="*/ 937049 h 1685879"/>
+              <a:gd name="connsiteX8" fmla="*/ 3000789 w 6972787"/>
+              <a:gd name="connsiteY8" fmla="*/ 1534750 h 1685879"/>
+              <a:gd name="connsiteX9" fmla="*/ 3424137 w 6972787"/>
+              <a:gd name="connsiteY9" fmla="*/ 1559655 h 1685879"/>
+              <a:gd name="connsiteX10" fmla="*/ 3598456 w 6972787"/>
+              <a:gd name="connsiteY10" fmla="*/ 77853 h 1685879"/>
+              <a:gd name="connsiteX11" fmla="*/ 3971998 w 6972787"/>
+              <a:gd name="connsiteY11" fmla="*/ 1422681 h 1685879"/>
+              <a:gd name="connsiteX12" fmla="*/ 4221027 w 6972787"/>
+              <a:gd name="connsiteY12" fmla="*/ 650651 h 1685879"/>
+              <a:gd name="connsiteX13" fmla="*/ 4507409 w 6972787"/>
+              <a:gd name="connsiteY13" fmla="*/ 1460038 h 1685879"/>
+              <a:gd name="connsiteX14" fmla="*/ 5154882 w 6972787"/>
+              <a:gd name="connsiteY14" fmla="*/ 1597011 h 1685879"/>
+              <a:gd name="connsiteX15" fmla="*/ 5379007 w 6972787"/>
+              <a:gd name="connsiteY15" fmla="*/ 1210996 h 1685879"/>
+              <a:gd name="connsiteX16" fmla="*/ 5628035 w 6972787"/>
+              <a:gd name="connsiteY16" fmla="*/ 1547203 h 1685879"/>
+              <a:gd name="connsiteX17" fmla="*/ 5839709 w 6972787"/>
+              <a:gd name="connsiteY17" fmla="*/ 1210996 h 1685879"/>
+              <a:gd name="connsiteX18" fmla="*/ 6026480 w 6972787"/>
+              <a:gd name="connsiteY18" fmla="*/ 1522298 h 1685879"/>
+              <a:gd name="connsiteX19" fmla="*/ 6263057 w 6972787"/>
+              <a:gd name="connsiteY19" fmla="*/ 1235900 h 1685879"/>
+              <a:gd name="connsiteX20" fmla="*/ 6424925 w 6972787"/>
+              <a:gd name="connsiteY20" fmla="*/ 1547203 h 1685879"/>
+              <a:gd name="connsiteX21" fmla="*/ 6636599 w 6972787"/>
+              <a:gd name="connsiteY21" fmla="*/ 1223448 h 1685879"/>
+              <a:gd name="connsiteX22" fmla="*/ 6848273 w 6972787"/>
+              <a:gd name="connsiteY22" fmla="*/ 1559655 h 1685879"/>
+              <a:gd name="connsiteX23" fmla="*/ 6972787 w 6972787"/>
+              <a:gd name="connsiteY23" fmla="*/ 1534750 h 1685879"/>
+            </a:gdLst>
+            <a:ahLst/>
+            <a:cxnLst>
+              <a:cxn ang="0">
+                <a:pos x="connsiteX0" y="connsiteY0"/>
+              </a:cxn>
+              <a:cxn ang="0">
+                <a:pos x="connsiteX1" y="connsiteY1"/>
+              </a:cxn>
+              <a:cxn ang="0">
+                <a:pos x="connsiteX2" y="connsiteY2"/>
+              </a:cxn>
+              <a:cxn ang="0">
+                <a:pos x="connsiteX3" y="connsiteY3"/>
+              </a:cxn>
+              <a:cxn ang="0">
+                <a:pos x="connsiteX4" y="connsiteY4"/>
+              </a:cxn>
+              <a:cxn ang="0">
+                <a:pos x="connsiteX5" y="connsiteY5"/>
+              </a:cxn>
+              <a:cxn ang="0">
+                <a:pos x="connsiteX6" y="connsiteY6"/>
+              </a:cxn>
+              <a:cxn ang="0">
+                <a:pos x="connsiteX7" y="connsiteY7"/>
+              </a:cxn>
+              <a:cxn ang="0">
+                <a:pos x="connsiteX8" y="connsiteY8"/>
+              </a:cxn>
+              <a:cxn ang="0">
+                <a:pos x="connsiteX9" y="connsiteY9"/>
+              </a:cxn>
+              <a:cxn ang="0">
+                <a:pos x="connsiteX10" y="connsiteY10"/>
+              </a:cxn>
+              <a:cxn ang="0">
+                <a:pos x="connsiteX11" y="connsiteY11"/>
+              </a:cxn>
+              <a:cxn ang="0">
+                <a:pos x="connsiteX12" y="connsiteY12"/>
+              </a:cxn>
+              <a:cxn ang="0">
+                <a:pos x="connsiteX13" y="connsiteY13"/>
+              </a:cxn>
+              <a:cxn ang="0">
+                <a:pos x="connsiteX14" y="connsiteY14"/>
+              </a:cxn>
+              <a:cxn ang="0">
+                <a:pos x="connsiteX15" y="connsiteY15"/>
+              </a:cxn>
+              <a:cxn ang="0">
+                <a:pos x="connsiteX16" y="connsiteY16"/>
+              </a:cxn>
+              <a:cxn ang="0">
+                <a:pos x="connsiteX17" y="connsiteY17"/>
+              </a:cxn>
+              <a:cxn ang="0">
+                <a:pos x="connsiteX18" y="connsiteY18"/>
+              </a:cxn>
+              <a:cxn ang="0">
+                <a:pos x="connsiteX19" y="connsiteY19"/>
+              </a:cxn>
+              <a:cxn ang="0">
+                <a:pos x="connsiteX20" y="connsiteY20"/>
+              </a:cxn>
+              <a:cxn ang="0">
+                <a:pos x="connsiteX21" y="connsiteY21"/>
+              </a:cxn>
+              <a:cxn ang="0">
+                <a:pos x="connsiteX22" y="connsiteY22"/>
+              </a:cxn>
+              <a:cxn ang="0">
+                <a:pos x="connsiteX23" y="connsiteY23"/>
+              </a:cxn>
+            </a:cxnLst>
+            <a:rect l="l" t="t" r="r" b="b"/>
+            <a:pathLst>
+              <a:path w="6972787" h="1685879">
+                <a:moveTo>
+                  <a:pt x="0" y="115210"/>
+                </a:moveTo>
+                <a:cubicBezTo>
+                  <a:pt x="45655" y="61251"/>
+                  <a:pt x="91311" y="7292"/>
+                  <a:pt x="224126" y="239731"/>
+                </a:cubicBezTo>
+                <a:cubicBezTo>
+                  <a:pt x="356941" y="472170"/>
+                  <a:pt x="620495" y="1549278"/>
+                  <a:pt x="796890" y="1509846"/>
+                </a:cubicBezTo>
+                <a:cubicBezTo>
+                  <a:pt x="973285" y="1470414"/>
+                  <a:pt x="1131003" y="71627"/>
+                  <a:pt x="1282495" y="3141"/>
+                </a:cubicBezTo>
+                <a:cubicBezTo>
+                  <a:pt x="1433987" y="-65345"/>
+                  <a:pt x="1568878" y="1007612"/>
+                  <a:pt x="1705843" y="1098927"/>
+                </a:cubicBezTo>
+                <a:cubicBezTo>
+                  <a:pt x="1842808" y="1190242"/>
+                  <a:pt x="1977699" y="521979"/>
+                  <a:pt x="2104288" y="551034"/>
+                </a:cubicBezTo>
+                <a:cubicBezTo>
+                  <a:pt x="2230877" y="580089"/>
+                  <a:pt x="2363693" y="1208920"/>
+                  <a:pt x="2465379" y="1273256"/>
+                </a:cubicBezTo>
+                <a:cubicBezTo>
+                  <a:pt x="2567065" y="1337592"/>
+                  <a:pt x="2625172" y="893467"/>
+                  <a:pt x="2714407" y="937049"/>
+                </a:cubicBezTo>
+                <a:cubicBezTo>
+                  <a:pt x="2803642" y="980631"/>
+                  <a:pt x="2882501" y="1430982"/>
+                  <a:pt x="3000789" y="1534750"/>
+                </a:cubicBezTo>
+                <a:cubicBezTo>
+                  <a:pt x="3119077" y="1638518"/>
+                  <a:pt x="3324526" y="1802471"/>
+                  <a:pt x="3424137" y="1559655"/>
+                </a:cubicBezTo>
+                <a:cubicBezTo>
+                  <a:pt x="3523748" y="1316839"/>
+                  <a:pt x="3507146" y="100682"/>
+                  <a:pt x="3598456" y="77853"/>
+                </a:cubicBezTo>
+                <a:cubicBezTo>
+                  <a:pt x="3689766" y="55024"/>
+                  <a:pt x="3868236" y="1327215"/>
+                  <a:pt x="3971998" y="1422681"/>
+                </a:cubicBezTo>
+                <a:cubicBezTo>
+                  <a:pt x="4075760" y="1518147"/>
+                  <a:pt x="4131792" y="644425"/>
+                  <a:pt x="4221027" y="650651"/>
+                </a:cubicBezTo>
+                <a:cubicBezTo>
+                  <a:pt x="4310262" y="656877"/>
+                  <a:pt x="4351767" y="1302311"/>
+                  <a:pt x="4507409" y="1460038"/>
+                </a:cubicBezTo>
+                <a:cubicBezTo>
+                  <a:pt x="4663051" y="1617765"/>
+                  <a:pt x="5009616" y="1638518"/>
+                  <a:pt x="5154882" y="1597011"/>
+                </a:cubicBezTo>
+                <a:cubicBezTo>
+                  <a:pt x="5300148" y="1555504"/>
+                  <a:pt x="5300148" y="1219297"/>
+                  <a:pt x="5379007" y="1210996"/>
+                </a:cubicBezTo>
+                <a:cubicBezTo>
+                  <a:pt x="5457866" y="1202695"/>
+                  <a:pt x="5551251" y="1547203"/>
+                  <a:pt x="5628035" y="1547203"/>
+                </a:cubicBezTo>
+                <a:cubicBezTo>
+                  <a:pt x="5704819" y="1547203"/>
+                  <a:pt x="5773302" y="1215147"/>
+                  <a:pt x="5839709" y="1210996"/>
+                </a:cubicBezTo>
+                <a:cubicBezTo>
+                  <a:pt x="5906117" y="1206845"/>
+                  <a:pt x="5955922" y="1518147"/>
+                  <a:pt x="6026480" y="1522298"/>
+                </a:cubicBezTo>
+                <a:cubicBezTo>
+                  <a:pt x="6097038" y="1526449"/>
+                  <a:pt x="6196650" y="1231749"/>
+                  <a:pt x="6263057" y="1235900"/>
+                </a:cubicBezTo>
+                <a:cubicBezTo>
+                  <a:pt x="6329465" y="1240051"/>
+                  <a:pt x="6362668" y="1549278"/>
+                  <a:pt x="6424925" y="1547203"/>
+                </a:cubicBezTo>
+                <a:cubicBezTo>
+                  <a:pt x="6487182" y="1545128"/>
+                  <a:pt x="6566041" y="1221373"/>
+                  <a:pt x="6636599" y="1223448"/>
+                </a:cubicBezTo>
+                <a:cubicBezTo>
+                  <a:pt x="6707157" y="1225523"/>
+                  <a:pt x="6792242" y="1507771"/>
+                  <a:pt x="6848273" y="1559655"/>
+                </a:cubicBezTo>
+                <a:cubicBezTo>
+                  <a:pt x="6904304" y="1611539"/>
+                  <a:pt x="6972787" y="1534750"/>
+                  <a:pt x="6972787" y="1534750"/>
+                </a:cubicBezTo>
+              </a:path>
+            </a:pathLst>
+          </a:custGeom>
+        </p:spPr>
+        <p:style>
+          <a:lnRef idx="2">
+            <a:schemeClr val="accent1"/>
+          </a:lnRef>
+          <a:fillRef idx="0">
+            <a:schemeClr val="accent1"/>
+          </a:fillRef>
+          <a:effectRef idx="1">
+            <a:schemeClr val="accent1"/>
+          </a:effectRef>
+          <a:fontRef idx="minor">
+            <a:schemeClr val="tx1"/>
+          </a:fontRef>
+        </p:style>
+        <p:txBody>
+          <a:bodyPr rtlCol="0" anchor="ctr"/>
+          <a:lstStyle/>
+          <a:p>
+            <a:pPr algn="ctr"/>
+            <a:endParaRPr lang="en-US"/>
+          </a:p>
+        </p:txBody>
+      </p:sp>
+      <p:sp>
+        <p:nvSpPr>
+          <p:cNvPr id="8" name="TextBox 7"/>
+          <p:cNvSpPr txBox="1"/>
+          <p:nvPr/>
+        </p:nvSpPr>
+        <p:spPr>
+          <a:xfrm rot="5400000">
+            <a:off x="-484565" y="3201954"/>
+            <a:ext cx="3384712" cy="307777"/>
+          </a:xfrm>
+          <a:prstGeom prst="rect">
+            <a:avLst/>
+          </a:prstGeom>
+          <a:noFill/>
+        </p:spPr>
+        <p:txBody>
+          <a:bodyPr wrap="square" rtlCol="0">
+            <a:spAutoFit/>
+          </a:bodyPr>
+          <a:lstStyle/>
+          <a:p>
+            <a:pPr algn="ctr"/>
+            <a:r>
+              <a:rPr lang="en-US" sz="1400" dirty="0" smtClean="0">
+                <a:solidFill>
+                  <a:srgbClr val="7F7F7F"/>
+                </a:solidFill>
+                <a:latin typeface="Anime Ace 2.0 BB"/>
+                <a:cs typeface="Anime Ace 2.0 BB"/>
+              </a:rPr>
+              <a:t>Example Modules Commits      </a:t>
+            </a:r>
+            <a:endParaRPr lang="en-US" sz="1400" dirty="0">
+              <a:solidFill>
+                <a:srgbClr val="7F7F7F"/>
+              </a:solidFill>
+              <a:latin typeface="Anime Ace 2.0 BB"/>
+              <a:cs typeface="Anime Ace 2.0 BB"/>
+            </a:endParaRPr>
+          </a:p>
+        </p:txBody>
+      </p:sp>
+      <p:sp>
+        <p:nvSpPr>
+          <p:cNvPr id="9" name="TextBox 8"/>
+          <p:cNvSpPr txBox="1"/>
+          <p:nvPr/>
+        </p:nvSpPr>
+        <p:spPr>
+          <a:xfrm>
+            <a:off x="1431911" y="5267245"/>
+            <a:ext cx="6088737" cy="307777"/>
+          </a:xfrm>
+          <a:prstGeom prst="rect">
+            <a:avLst/>
+          </a:prstGeom>
+          <a:noFill/>
+        </p:spPr>
+        <p:txBody>
+          <a:bodyPr wrap="square" rtlCol="0">
+            <a:spAutoFit/>
+          </a:bodyPr>
+          <a:lstStyle/>
+          <a:p>
+            <a:pPr algn="ctr"/>
+            <a:r>
+              <a:rPr lang="en-US" sz="1400" dirty="0" smtClean="0">
+                <a:solidFill>
+                  <a:srgbClr val="7F7F7F"/>
+                </a:solidFill>
+                <a:latin typeface="Anime Ace 2.0 BB"/>
+                <a:cs typeface="Anime Ace 2.0 BB"/>
+              </a:rPr>
+              <a:t>Time</a:t>
+            </a:r>
+            <a:endParaRPr lang="en-US" sz="1400" dirty="0">
+              <a:solidFill>
+                <a:srgbClr val="7F7F7F"/>
+              </a:solidFill>
+              <a:latin typeface="Anime Ace 2.0 BB"/>
+              <a:cs typeface="Anime Ace 2.0 BB"/>
+            </a:endParaRPr>
+          </a:p>
+        </p:txBody>
+      </p:sp>
+      <p:sp>
+        <p:nvSpPr>
+          <p:cNvPr id="10" name="TextBox 9"/>
+          <p:cNvSpPr txBox="1"/>
+          <p:nvPr/>
+        </p:nvSpPr>
+        <p:spPr>
+          <a:xfrm>
+            <a:off x="1431911" y="1478986"/>
+            <a:ext cx="821793" cy="461665"/>
+          </a:xfrm>
+          <a:prstGeom prst="rect">
+            <a:avLst/>
+          </a:prstGeom>
+          <a:noFill/>
+        </p:spPr>
+        <p:txBody>
+          <a:bodyPr wrap="square" rtlCol="0">
+            <a:spAutoFit/>
+          </a:bodyPr>
+          <a:lstStyle/>
+          <a:p>
+            <a:pPr algn="ctr"/>
+            <a:r>
+              <a:rPr lang="en-US" sz="1200" dirty="0" smtClean="0">
+                <a:solidFill>
+                  <a:schemeClr val="bg1"/>
+                </a:solidFill>
+                <a:latin typeface="Anime Ace 2.0 BB"/>
+                <a:cs typeface="Anime Ace 2.0 BB"/>
+              </a:rPr>
+              <a:t>Initial work</a:t>
+            </a:r>
+            <a:endParaRPr lang="en-US" sz="1200" dirty="0">
+              <a:solidFill>
+                <a:schemeClr val="bg1"/>
+              </a:solidFill>
+              <a:latin typeface="Anime Ace 2.0 BB"/>
+              <a:cs typeface="Anime Ace 2.0 BB"/>
+            </a:endParaRPr>
+          </a:p>
+        </p:txBody>
+      </p:sp>
+      <p:cxnSp>
+        <p:nvCxnSpPr>
+          <p:cNvPr id="12" name="Straight Connector 11"/>
+          <p:cNvCxnSpPr/>
+          <p:nvPr/>
+        </p:nvCxnSpPr>
+        <p:spPr>
+          <a:xfrm>
+            <a:off x="2253704" y="1494253"/>
+            <a:ext cx="0" cy="3675077"/>
+          </a:xfrm>
+          <a:prstGeom prst="line">
+            <a:avLst/>
+          </a:prstGeom>
+          <a:ln>
+            <a:solidFill>
+              <a:schemeClr val="accent1">
+                <a:lumMod val="50000"/>
+              </a:schemeClr>
+            </a:solidFill>
+            <a:prstDash val="sysDash"/>
+          </a:ln>
+        </p:spPr>
+        <p:style>
+          <a:lnRef idx="2">
+            <a:schemeClr val="accent1"/>
+          </a:lnRef>
+          <a:fillRef idx="0">
+            <a:schemeClr val="accent1"/>
+          </a:fillRef>
+          <a:effectRef idx="1">
+            <a:schemeClr val="accent1"/>
+          </a:effectRef>
+          <a:fontRef idx="minor">
+            <a:schemeClr val="tx1"/>
+          </a:fontRef>
+        </p:style>
+      </p:cxnSp>
+      <p:sp>
+        <p:nvSpPr>
+          <p:cNvPr id="13" name="TextBox 12"/>
+          <p:cNvSpPr txBox="1"/>
+          <p:nvPr/>
+        </p:nvSpPr>
+        <p:spPr>
+          <a:xfrm>
+            <a:off x="2253704" y="1478986"/>
+            <a:ext cx="2297025" cy="461665"/>
+          </a:xfrm>
+          <a:prstGeom prst="rect">
+            <a:avLst/>
+          </a:prstGeom>
+          <a:noFill/>
+        </p:spPr>
+        <p:txBody>
+          <a:bodyPr wrap="square" rtlCol="0">
+            <a:spAutoFit/>
+          </a:bodyPr>
+          <a:lstStyle/>
+          <a:p>
+            <a:pPr algn="ctr"/>
+            <a:r>
+              <a:rPr lang="en-US" sz="1200" dirty="0" smtClean="0">
+                <a:solidFill>
+                  <a:schemeClr val="bg1"/>
+                </a:solidFill>
+                <a:latin typeface="Anime Ace 2.0 BB"/>
+                <a:cs typeface="Anime Ace 2.0 BB"/>
+              </a:rPr>
+              <a:t>Drupal 7</a:t>
+            </a:r>
+          </a:p>
+          <a:p>
+            <a:pPr algn="ctr"/>
+            <a:r>
+              <a:rPr lang="en-US" sz="1200" dirty="0" smtClean="0">
+                <a:solidFill>
+                  <a:schemeClr val="bg1"/>
+                </a:solidFill>
+                <a:latin typeface="Anime Ace 2.0 BB"/>
+                <a:cs typeface="Anime Ace 2.0 BB"/>
+              </a:rPr>
+              <a:t>Pre-release</a:t>
+            </a:r>
+            <a:endParaRPr lang="en-US" sz="1200" dirty="0">
+              <a:solidFill>
+                <a:schemeClr val="bg1"/>
+              </a:solidFill>
+              <a:latin typeface="Anime Ace 2.0 BB"/>
+              <a:cs typeface="Anime Ace 2.0 BB"/>
+            </a:endParaRPr>
+          </a:p>
+        </p:txBody>
+      </p:sp>
+      <p:cxnSp>
+        <p:nvCxnSpPr>
+          <p:cNvPr id="14" name="Straight Connector 13"/>
+          <p:cNvCxnSpPr/>
+          <p:nvPr/>
+        </p:nvCxnSpPr>
+        <p:spPr>
+          <a:xfrm>
+            <a:off x="4550729" y="1478986"/>
+            <a:ext cx="0" cy="3675077"/>
+          </a:xfrm>
+          <a:prstGeom prst="line">
+            <a:avLst/>
+          </a:prstGeom>
+          <a:ln>
+            <a:solidFill>
+              <a:schemeClr val="accent1">
+                <a:lumMod val="50000"/>
+              </a:schemeClr>
+            </a:solidFill>
+            <a:prstDash val="sysDash"/>
+          </a:ln>
+        </p:spPr>
+        <p:style>
+          <a:lnRef idx="2">
+            <a:schemeClr val="accent1"/>
+          </a:lnRef>
+          <a:fillRef idx="0">
+            <a:schemeClr val="accent1"/>
+          </a:fillRef>
+          <a:effectRef idx="1">
+            <a:schemeClr val="accent1"/>
+          </a:effectRef>
+          <a:fontRef idx="minor">
+            <a:schemeClr val="tx1"/>
+          </a:fontRef>
+        </p:style>
+      </p:cxnSp>
+      <p:sp>
+        <p:nvSpPr>
+          <p:cNvPr id="15" name="TextBox 14"/>
+          <p:cNvSpPr txBox="1"/>
+          <p:nvPr/>
+        </p:nvSpPr>
+        <p:spPr>
+          <a:xfrm>
+            <a:off x="4550729" y="1542357"/>
+            <a:ext cx="1721277" cy="461665"/>
+          </a:xfrm>
+          <a:prstGeom prst="rect">
+            <a:avLst/>
+          </a:prstGeom>
+          <a:noFill/>
+        </p:spPr>
+        <p:txBody>
+          <a:bodyPr wrap="square" rtlCol="0">
+            <a:spAutoFit/>
+          </a:bodyPr>
+          <a:lstStyle/>
+          <a:p>
+            <a:pPr algn="ctr"/>
+            <a:r>
+              <a:rPr lang="en-US" sz="1200" dirty="0" smtClean="0">
+                <a:solidFill>
+                  <a:schemeClr val="bg1"/>
+                </a:solidFill>
+                <a:latin typeface="Anime Ace 2.0 BB"/>
+                <a:cs typeface="Anime Ace 2.0 BB"/>
+              </a:rPr>
+              <a:t>Drupal 7</a:t>
+            </a:r>
+          </a:p>
+          <a:p>
+            <a:pPr algn="ctr"/>
+            <a:r>
+              <a:rPr lang="en-US" sz="1200" dirty="0" smtClean="0">
+                <a:solidFill>
+                  <a:schemeClr val="bg1"/>
+                </a:solidFill>
+                <a:latin typeface="Anime Ace 2.0 BB"/>
+                <a:cs typeface="Anime Ace 2.0 BB"/>
+              </a:rPr>
+              <a:t>Post-release</a:t>
+            </a:r>
+            <a:endParaRPr lang="en-US" sz="1200" dirty="0">
+              <a:solidFill>
+                <a:schemeClr val="bg1"/>
+              </a:solidFill>
+              <a:latin typeface="Anime Ace 2.0 BB"/>
+              <a:cs typeface="Anime Ace 2.0 BB"/>
+            </a:endParaRPr>
+          </a:p>
+        </p:txBody>
+      </p:sp>
+      <p:cxnSp>
+        <p:nvCxnSpPr>
+          <p:cNvPr id="16" name="Straight Connector 15"/>
+          <p:cNvCxnSpPr/>
+          <p:nvPr/>
+        </p:nvCxnSpPr>
+        <p:spPr>
+          <a:xfrm>
+            <a:off x="6272006" y="1542357"/>
+            <a:ext cx="0" cy="3675077"/>
+          </a:xfrm>
+          <a:prstGeom prst="line">
+            <a:avLst/>
+          </a:prstGeom>
+          <a:ln>
+            <a:solidFill>
+              <a:schemeClr val="accent1">
+                <a:lumMod val="50000"/>
+              </a:schemeClr>
+            </a:solidFill>
+            <a:prstDash val="sysDash"/>
+          </a:ln>
+        </p:spPr>
+        <p:style>
+          <a:lnRef idx="2">
+            <a:schemeClr val="accent1"/>
+          </a:lnRef>
+          <a:fillRef idx="0">
+            <a:schemeClr val="accent1"/>
+          </a:fillRef>
+          <a:effectRef idx="1">
+            <a:schemeClr val="accent1"/>
+          </a:effectRef>
+          <a:fontRef idx="minor">
+            <a:schemeClr val="tx1"/>
+          </a:fontRef>
+        </p:style>
+      </p:cxnSp>
+      <p:sp>
+        <p:nvSpPr>
+          <p:cNvPr id="17" name="TextBox 16"/>
+          <p:cNvSpPr txBox="1"/>
+          <p:nvPr/>
+        </p:nvSpPr>
+        <p:spPr>
+          <a:xfrm>
+            <a:off x="6272006" y="1542357"/>
+            <a:ext cx="1721277" cy="276999"/>
+          </a:xfrm>
+          <a:prstGeom prst="rect">
+            <a:avLst/>
+          </a:prstGeom>
+          <a:noFill/>
+        </p:spPr>
+        <p:txBody>
+          <a:bodyPr wrap="square" rtlCol="0">
+            <a:spAutoFit/>
+          </a:bodyPr>
+          <a:lstStyle/>
+          <a:p>
+            <a:pPr algn="ctr"/>
+            <a:r>
+              <a:rPr lang="en-US" sz="1200" dirty="0" smtClean="0">
+                <a:solidFill>
+                  <a:schemeClr val="bg1"/>
+                </a:solidFill>
+                <a:latin typeface="Anime Ace 2.0 BB"/>
+                <a:cs typeface="Anime Ace 2.0 BB"/>
+              </a:rPr>
+              <a:t>Drupal 8</a:t>
+            </a:r>
+            <a:endParaRPr lang="en-US" sz="1200" dirty="0">
+              <a:solidFill>
+                <a:schemeClr val="bg1"/>
+              </a:solidFill>
+              <a:latin typeface="Anime Ace 2.0 BB"/>
+              <a:cs typeface="Anime Ace 2.0 BB"/>
+            </a:endParaRPr>
+          </a:p>
+        </p:txBody>
+      </p:sp>
+      <p:sp>
+        <p:nvSpPr>
+          <p:cNvPr id="22" name="Rectangle 21"/>
+          <p:cNvSpPr/>
+          <p:nvPr/>
+        </p:nvSpPr>
+        <p:spPr>
+          <a:xfrm>
+            <a:off x="834244" y="1282567"/>
+            <a:ext cx="7570454" cy="4395596"/>
+          </a:xfrm>
+          <a:prstGeom prst="rect">
+            <a:avLst/>
+          </a:prstGeom>
+          <a:noFill/>
+          <a:ln>
+            <a:noFill/>
+          </a:ln>
+        </p:spPr>
+        <p:style>
+          <a:lnRef idx="1">
+            <a:schemeClr val="accent1"/>
+          </a:lnRef>
+          <a:fillRef idx="3">
+            <a:schemeClr val="accent1"/>
+          </a:fillRef>
+          <a:effectRef idx="2">
+            <a:schemeClr val="accent1"/>
+          </a:effectRef>
+          <a:fontRef idx="minor">
+            <a:schemeClr val="lt1"/>
+          </a:fontRef>
+        </p:style>
+        <p:txBody>
+          <a:bodyPr rtlCol="0" anchor="ctr"/>
+          <a:lstStyle/>
+          <a:p>
+            <a:pPr algn="ctr"/>
+            <a:endParaRPr lang="en-US"/>
+          </a:p>
+        </p:txBody>
+      </p:sp>
+    </p:spTree>
+    <p:extLst>
+      <p:ext uri="{BB962C8B-B14F-4D97-AF65-F5344CB8AC3E}">
+        <p14:creationId xmlns:p14="http://schemas.microsoft.com/office/powerpoint/2010/main" val="77193463"/>
+      </p:ext>
+    </p:extLst>
+  </p:cSld>
+  <p:clrMapOvr>
+    <a:masterClrMapping/>
+  </p:clrMapOvr>
+</p:sld>
+</file>
+
+<file path=ppt/slides/slide9.xml><?xml version="1.0" encoding="utf-8"?>
+<p:sld xmlns:a="http://schemas.openxmlformats.org/drawingml/2006/main" xmlns:r="http://schemas.openxmlformats.org/officeDocument/2006/relationships" xmlns:p="http://schemas.openxmlformats.org/presentationml/2006/main">
+  <p:cSld>
+    <p:spTree>
+      <p:nvGrpSpPr>
+        <p:cNvPr id="1" name=""/>
+        <p:cNvGrpSpPr/>
+        <p:nvPr/>
+      </p:nvGrpSpPr>
+      <p:grpSpPr>
+        <a:xfrm>
+          <a:off x="0" y="0"/>
+          <a:ext cx="0" cy="0"/>
+          <a:chOff x="0" y="0"/>
+          <a:chExt cx="0" cy="0"/>
+        </a:xfrm>
+      </p:grpSpPr>
+      <p:cxnSp>
+        <p:nvCxnSpPr>
+          <p:cNvPr id="3" name="Straight Connector 2"/>
+          <p:cNvCxnSpPr/>
+          <p:nvPr/>
+        </p:nvCxnSpPr>
+        <p:spPr>
+          <a:xfrm>
+            <a:off x="1431911" y="1494253"/>
+            <a:ext cx="0" cy="3723181"/>
+          </a:xfrm>
+          <a:prstGeom prst="line">
+            <a:avLst/>
+          </a:prstGeom>
+        </p:spPr>
+        <p:style>
+          <a:lnRef idx="2">
+            <a:schemeClr val="accent1"/>
+          </a:lnRef>
+          <a:fillRef idx="0">
+            <a:schemeClr val="accent1"/>
+          </a:fillRef>
+          <a:effectRef idx="1">
+            <a:schemeClr val="accent1"/>
+          </a:effectRef>
+          <a:fontRef idx="minor">
+            <a:schemeClr val="tx1"/>
+          </a:fontRef>
+        </p:style>
+      </p:cxnSp>
+      <p:cxnSp>
+        <p:nvCxnSpPr>
+          <p:cNvPr id="5" name="Straight Arrow Connector 4"/>
+          <p:cNvCxnSpPr/>
+          <p:nvPr/>
+        </p:nvCxnSpPr>
+        <p:spPr>
+          <a:xfrm>
+            <a:off x="1431911" y="5217434"/>
+            <a:ext cx="6088737" cy="0"/>
+          </a:xfrm>
+          <a:prstGeom prst="straightConnector1">
+            <a:avLst/>
+          </a:prstGeom>
+          <a:ln>
+            <a:tailEnd type="arrow"/>
+          </a:ln>
+        </p:spPr>
+        <p:style>
+          <a:lnRef idx="2">
+            <a:schemeClr val="accent1"/>
+          </a:lnRef>
+          <a:fillRef idx="0">
+            <a:schemeClr val="accent1"/>
+          </a:fillRef>
+          <a:effectRef idx="1">
+            <a:schemeClr val="accent1"/>
+          </a:effectRef>
+          <a:fontRef idx="minor">
+            <a:schemeClr val="tx1"/>
+          </a:fontRef>
+        </p:style>
+      </p:cxnSp>
+      <p:sp>
+        <p:nvSpPr>
+          <p:cNvPr id="6" name="Freeform 5"/>
+          <p:cNvSpPr/>
+          <p:nvPr/>
+        </p:nvSpPr>
+        <p:spPr>
+          <a:xfrm>
+            <a:off x="1431911" y="3483451"/>
+            <a:ext cx="6972787" cy="1685879"/>
+          </a:xfrm>
+          <a:custGeom>
+            <a:avLst/>
+            <a:gdLst>
+              <a:gd name="connsiteX0" fmla="*/ 0 w 6972787"/>
+              <a:gd name="connsiteY0" fmla="*/ 115210 h 1685879"/>
+              <a:gd name="connsiteX1" fmla="*/ 224126 w 6972787"/>
+              <a:gd name="connsiteY1" fmla="*/ 239731 h 1685879"/>
+              <a:gd name="connsiteX2" fmla="*/ 796890 w 6972787"/>
+              <a:gd name="connsiteY2" fmla="*/ 1509846 h 1685879"/>
+              <a:gd name="connsiteX3" fmla="*/ 1282495 w 6972787"/>
+              <a:gd name="connsiteY3" fmla="*/ 3141 h 1685879"/>
+              <a:gd name="connsiteX4" fmla="*/ 1705843 w 6972787"/>
+              <a:gd name="connsiteY4" fmla="*/ 1098927 h 1685879"/>
+              <a:gd name="connsiteX5" fmla="*/ 2104288 w 6972787"/>
+              <a:gd name="connsiteY5" fmla="*/ 551034 h 1685879"/>
+              <a:gd name="connsiteX6" fmla="*/ 2465379 w 6972787"/>
+              <a:gd name="connsiteY6" fmla="*/ 1273256 h 1685879"/>
+              <a:gd name="connsiteX7" fmla="*/ 2714407 w 6972787"/>
+              <a:gd name="connsiteY7" fmla="*/ 937049 h 1685879"/>
+              <a:gd name="connsiteX8" fmla="*/ 3000789 w 6972787"/>
+              <a:gd name="connsiteY8" fmla="*/ 1534750 h 1685879"/>
+              <a:gd name="connsiteX9" fmla="*/ 3424137 w 6972787"/>
+              <a:gd name="connsiteY9" fmla="*/ 1559655 h 1685879"/>
+              <a:gd name="connsiteX10" fmla="*/ 3598456 w 6972787"/>
+              <a:gd name="connsiteY10" fmla="*/ 77853 h 1685879"/>
+              <a:gd name="connsiteX11" fmla="*/ 3971998 w 6972787"/>
+              <a:gd name="connsiteY11" fmla="*/ 1422681 h 1685879"/>
+              <a:gd name="connsiteX12" fmla="*/ 4221027 w 6972787"/>
+              <a:gd name="connsiteY12" fmla="*/ 650651 h 1685879"/>
+              <a:gd name="connsiteX13" fmla="*/ 4507409 w 6972787"/>
+              <a:gd name="connsiteY13" fmla="*/ 1460038 h 1685879"/>
+              <a:gd name="connsiteX14" fmla="*/ 5154882 w 6972787"/>
+              <a:gd name="connsiteY14" fmla="*/ 1597011 h 1685879"/>
+              <a:gd name="connsiteX15" fmla="*/ 5379007 w 6972787"/>
+              <a:gd name="connsiteY15" fmla="*/ 1210996 h 1685879"/>
+              <a:gd name="connsiteX16" fmla="*/ 5628035 w 6972787"/>
+              <a:gd name="connsiteY16" fmla="*/ 1547203 h 1685879"/>
+              <a:gd name="connsiteX17" fmla="*/ 5839709 w 6972787"/>
+              <a:gd name="connsiteY17" fmla="*/ 1210996 h 1685879"/>
+              <a:gd name="connsiteX18" fmla="*/ 6026480 w 6972787"/>
+              <a:gd name="connsiteY18" fmla="*/ 1522298 h 1685879"/>
+              <a:gd name="connsiteX19" fmla="*/ 6263057 w 6972787"/>
+              <a:gd name="connsiteY19" fmla="*/ 1235900 h 1685879"/>
+              <a:gd name="connsiteX20" fmla="*/ 6424925 w 6972787"/>
+              <a:gd name="connsiteY20" fmla="*/ 1547203 h 1685879"/>
+              <a:gd name="connsiteX21" fmla="*/ 6636599 w 6972787"/>
+              <a:gd name="connsiteY21" fmla="*/ 1223448 h 1685879"/>
+              <a:gd name="connsiteX22" fmla="*/ 6848273 w 6972787"/>
+              <a:gd name="connsiteY22" fmla="*/ 1559655 h 1685879"/>
+              <a:gd name="connsiteX23" fmla="*/ 6972787 w 6972787"/>
+              <a:gd name="connsiteY23" fmla="*/ 1534750 h 1685879"/>
+            </a:gdLst>
+            <a:ahLst/>
+            <a:cxnLst>
+              <a:cxn ang="0">
+                <a:pos x="connsiteX0" y="connsiteY0"/>
+              </a:cxn>
+              <a:cxn ang="0">
+                <a:pos x="connsiteX1" y="connsiteY1"/>
+              </a:cxn>
+              <a:cxn ang="0">
+                <a:pos x="connsiteX2" y="connsiteY2"/>
+              </a:cxn>
+              <a:cxn ang="0">
+                <a:pos x="connsiteX3" y="connsiteY3"/>
+              </a:cxn>
+              <a:cxn ang="0">
+                <a:pos x="connsiteX4" y="connsiteY4"/>
+              </a:cxn>
+              <a:cxn ang="0">
+                <a:pos x="connsiteX5" y="connsiteY5"/>
+              </a:cxn>
+              <a:cxn ang="0">
+                <a:pos x="connsiteX6" y="connsiteY6"/>
+              </a:cxn>
+              <a:cxn ang="0">
+                <a:pos x="connsiteX7" y="connsiteY7"/>
+              </a:cxn>
+              <a:cxn ang="0">
+                <a:pos x="connsiteX8" y="connsiteY8"/>
+              </a:cxn>
+              <a:cxn ang="0">
+                <a:pos x="connsiteX9" y="connsiteY9"/>
+              </a:cxn>
+              <a:cxn ang="0">
+                <a:pos x="connsiteX10" y="connsiteY10"/>
+              </a:cxn>
+              <a:cxn ang="0">
+                <a:pos x="connsiteX11" y="connsiteY11"/>
+              </a:cxn>
+              <a:cxn ang="0">
+                <a:pos x="connsiteX12" y="connsiteY12"/>
+              </a:cxn>
+              <a:cxn ang="0">
+                <a:pos x="connsiteX13" y="connsiteY13"/>
+              </a:cxn>
+              <a:cxn ang="0">
+                <a:pos x="connsiteX14" y="connsiteY14"/>
+              </a:cxn>
+              <a:cxn ang="0">
+                <a:pos x="connsiteX15" y="connsiteY15"/>
+              </a:cxn>
+              <a:cxn ang="0">
+                <a:pos x="connsiteX16" y="connsiteY16"/>
+              </a:cxn>
+              <a:cxn ang="0">
+                <a:pos x="connsiteX17" y="connsiteY17"/>
+              </a:cxn>
+              <a:cxn ang="0">
+                <a:pos x="connsiteX18" y="connsiteY18"/>
+              </a:cxn>
+              <a:cxn ang="0">
+                <a:pos x="connsiteX19" y="connsiteY19"/>
+              </a:cxn>
+              <a:cxn ang="0">
+                <a:pos x="connsiteX20" y="connsiteY20"/>
+              </a:cxn>
+              <a:cxn ang="0">
+                <a:pos x="connsiteX21" y="connsiteY21"/>
+              </a:cxn>
+              <a:cxn ang="0">
+                <a:pos x="connsiteX22" y="connsiteY22"/>
+              </a:cxn>
+              <a:cxn ang="0">
+                <a:pos x="connsiteX23" y="connsiteY23"/>
+              </a:cxn>
+            </a:cxnLst>
+            <a:rect l="l" t="t" r="r" b="b"/>
+            <a:pathLst>
+              <a:path w="6972787" h="1685879">
+                <a:moveTo>
+                  <a:pt x="0" y="115210"/>
+                </a:moveTo>
+                <a:cubicBezTo>
+                  <a:pt x="45655" y="61251"/>
+                  <a:pt x="91311" y="7292"/>
+                  <a:pt x="224126" y="239731"/>
+                </a:cubicBezTo>
+                <a:cubicBezTo>
+                  <a:pt x="356941" y="472170"/>
+                  <a:pt x="620495" y="1549278"/>
+                  <a:pt x="796890" y="1509846"/>
+                </a:cubicBezTo>
+                <a:cubicBezTo>
+                  <a:pt x="973285" y="1470414"/>
+                  <a:pt x="1131003" y="71627"/>
+                  <a:pt x="1282495" y="3141"/>
+                </a:cubicBezTo>
+                <a:cubicBezTo>
+                  <a:pt x="1433987" y="-65345"/>
+                  <a:pt x="1568878" y="1007612"/>
+                  <a:pt x="1705843" y="1098927"/>
+                </a:cubicBezTo>
+                <a:cubicBezTo>
+                  <a:pt x="1842808" y="1190242"/>
+                  <a:pt x="1977699" y="521979"/>
+                  <a:pt x="2104288" y="551034"/>
+                </a:cubicBezTo>
+                <a:cubicBezTo>
+                  <a:pt x="2230877" y="580089"/>
+                  <a:pt x="2363693" y="1208920"/>
+                  <a:pt x="2465379" y="1273256"/>
+                </a:cubicBezTo>
+                <a:cubicBezTo>
+                  <a:pt x="2567065" y="1337592"/>
+                  <a:pt x="2625172" y="893467"/>
+                  <a:pt x="2714407" y="937049"/>
+                </a:cubicBezTo>
+                <a:cubicBezTo>
+                  <a:pt x="2803642" y="980631"/>
+                  <a:pt x="2882501" y="1430982"/>
+                  <a:pt x="3000789" y="1534750"/>
+                </a:cubicBezTo>
+                <a:cubicBezTo>
+                  <a:pt x="3119077" y="1638518"/>
+                  <a:pt x="3324526" y="1802471"/>
+                  <a:pt x="3424137" y="1559655"/>
+                </a:cubicBezTo>
+                <a:cubicBezTo>
+                  <a:pt x="3523748" y="1316839"/>
+                  <a:pt x="3507146" y="100682"/>
+                  <a:pt x="3598456" y="77853"/>
+                </a:cubicBezTo>
+                <a:cubicBezTo>
+                  <a:pt x="3689766" y="55024"/>
+                  <a:pt x="3868236" y="1327215"/>
+                  <a:pt x="3971998" y="1422681"/>
+                </a:cubicBezTo>
+                <a:cubicBezTo>
+                  <a:pt x="4075760" y="1518147"/>
+                  <a:pt x="4131792" y="644425"/>
+                  <a:pt x="4221027" y="650651"/>
+                </a:cubicBezTo>
+                <a:cubicBezTo>
+                  <a:pt x="4310262" y="656877"/>
+                  <a:pt x="4351767" y="1302311"/>
+                  <a:pt x="4507409" y="1460038"/>
+                </a:cubicBezTo>
+                <a:cubicBezTo>
+                  <a:pt x="4663051" y="1617765"/>
+                  <a:pt x="5009616" y="1638518"/>
+                  <a:pt x="5154882" y="1597011"/>
+                </a:cubicBezTo>
+                <a:cubicBezTo>
+                  <a:pt x="5300148" y="1555504"/>
+                  <a:pt x="5300148" y="1219297"/>
+                  <a:pt x="5379007" y="1210996"/>
+                </a:cubicBezTo>
+                <a:cubicBezTo>
+                  <a:pt x="5457866" y="1202695"/>
+                  <a:pt x="5551251" y="1547203"/>
+                  <a:pt x="5628035" y="1547203"/>
+                </a:cubicBezTo>
+                <a:cubicBezTo>
+                  <a:pt x="5704819" y="1547203"/>
+                  <a:pt x="5773302" y="1215147"/>
+                  <a:pt x="5839709" y="1210996"/>
+                </a:cubicBezTo>
+                <a:cubicBezTo>
+                  <a:pt x="5906117" y="1206845"/>
+                  <a:pt x="5955922" y="1518147"/>
+                  <a:pt x="6026480" y="1522298"/>
+                </a:cubicBezTo>
+                <a:cubicBezTo>
+                  <a:pt x="6097038" y="1526449"/>
+                  <a:pt x="6196650" y="1231749"/>
+                  <a:pt x="6263057" y="1235900"/>
+                </a:cubicBezTo>
+                <a:cubicBezTo>
+                  <a:pt x="6329465" y="1240051"/>
+                  <a:pt x="6362668" y="1549278"/>
+                  <a:pt x="6424925" y="1547203"/>
+                </a:cubicBezTo>
+                <a:cubicBezTo>
+                  <a:pt x="6487182" y="1545128"/>
+                  <a:pt x="6566041" y="1221373"/>
+                  <a:pt x="6636599" y="1223448"/>
+                </a:cubicBezTo>
+                <a:cubicBezTo>
+                  <a:pt x="6707157" y="1225523"/>
+                  <a:pt x="6792242" y="1507771"/>
+                  <a:pt x="6848273" y="1559655"/>
+                </a:cubicBezTo>
+                <a:cubicBezTo>
+                  <a:pt x="6904304" y="1611539"/>
+                  <a:pt x="6972787" y="1534750"/>
+                  <a:pt x="6972787" y="1534750"/>
+                </a:cubicBezTo>
+              </a:path>
+            </a:pathLst>
+          </a:custGeom>
+        </p:spPr>
+        <p:style>
+          <a:lnRef idx="2">
+            <a:schemeClr val="accent1"/>
+          </a:lnRef>
+          <a:fillRef idx="0">
+            <a:schemeClr val="accent1"/>
+          </a:fillRef>
+          <a:effectRef idx="1">
+            <a:schemeClr val="accent1"/>
+          </a:effectRef>
+          <a:fontRef idx="minor">
+            <a:schemeClr val="tx1"/>
+          </a:fontRef>
+        </p:style>
+        <p:txBody>
+          <a:bodyPr rtlCol="0" anchor="ctr"/>
+          <a:lstStyle/>
+          <a:p>
+            <a:pPr algn="ctr"/>
+            <a:endParaRPr lang="en-US"/>
+          </a:p>
+        </p:txBody>
+      </p:sp>
+      <p:sp>
+        <p:nvSpPr>
+          <p:cNvPr id="8" name="TextBox 7"/>
+          <p:cNvSpPr txBox="1"/>
+          <p:nvPr/>
+        </p:nvSpPr>
+        <p:spPr>
+          <a:xfrm rot="5400000">
+            <a:off x="-484565" y="3201954"/>
+            <a:ext cx="3384712" cy="307777"/>
+          </a:xfrm>
+          <a:prstGeom prst="rect">
+            <a:avLst/>
+          </a:prstGeom>
+          <a:noFill/>
+        </p:spPr>
+        <p:txBody>
+          <a:bodyPr wrap="square" rtlCol="0">
+            <a:spAutoFit/>
+          </a:bodyPr>
+          <a:lstStyle/>
+          <a:p>
+            <a:pPr algn="ctr"/>
+            <a:r>
+              <a:rPr lang="en-US" sz="1400" dirty="0" smtClean="0">
+                <a:solidFill>
+                  <a:srgbClr val="7F7F7F"/>
+                </a:solidFill>
+                <a:latin typeface="Anime Ace 2.0 BB"/>
+                <a:cs typeface="Anime Ace 2.0 BB"/>
+              </a:rPr>
+              <a:t>Example Modules Commits      </a:t>
+            </a:r>
+            <a:endParaRPr lang="en-US" sz="1400" dirty="0">
+              <a:solidFill>
+                <a:srgbClr val="7F7F7F"/>
+              </a:solidFill>
+              <a:latin typeface="Anime Ace 2.0 BB"/>
+              <a:cs typeface="Anime Ace 2.0 BB"/>
+            </a:endParaRPr>
+          </a:p>
+        </p:txBody>
+      </p:sp>
+      <p:sp>
+        <p:nvSpPr>
+          <p:cNvPr id="9" name="TextBox 8"/>
+          <p:cNvSpPr txBox="1"/>
+          <p:nvPr/>
+        </p:nvSpPr>
+        <p:spPr>
+          <a:xfrm>
+            <a:off x="1431911" y="5267245"/>
+            <a:ext cx="6088737" cy="307777"/>
+          </a:xfrm>
+          <a:prstGeom prst="rect">
+            <a:avLst/>
+          </a:prstGeom>
+          <a:noFill/>
+        </p:spPr>
+        <p:txBody>
+          <a:bodyPr wrap="square" rtlCol="0">
+            <a:spAutoFit/>
+          </a:bodyPr>
+          <a:lstStyle/>
+          <a:p>
+            <a:pPr algn="ctr"/>
+            <a:r>
+              <a:rPr lang="en-US" sz="1400" dirty="0" smtClean="0">
+                <a:solidFill>
+                  <a:srgbClr val="7F7F7F"/>
+                </a:solidFill>
+                <a:latin typeface="Anime Ace 2.0 BB"/>
+                <a:cs typeface="Anime Ace 2.0 BB"/>
+              </a:rPr>
+              <a:t>Time</a:t>
+            </a:r>
+            <a:endParaRPr lang="en-US" sz="1400" dirty="0">
+              <a:solidFill>
+                <a:srgbClr val="7F7F7F"/>
+              </a:solidFill>
+              <a:latin typeface="Anime Ace 2.0 BB"/>
+              <a:cs typeface="Anime Ace 2.0 BB"/>
+            </a:endParaRPr>
+          </a:p>
+        </p:txBody>
+      </p:sp>
+      <p:sp>
+        <p:nvSpPr>
+          <p:cNvPr id="10" name="TextBox 9"/>
+          <p:cNvSpPr txBox="1"/>
+          <p:nvPr/>
+        </p:nvSpPr>
+        <p:spPr>
+          <a:xfrm>
+            <a:off x="1431911" y="1478986"/>
+            <a:ext cx="821793" cy="461665"/>
+          </a:xfrm>
+          <a:prstGeom prst="rect">
+            <a:avLst/>
+          </a:prstGeom>
+          <a:noFill/>
+        </p:spPr>
+        <p:txBody>
+          <a:bodyPr wrap="square" rtlCol="0">
+            <a:spAutoFit/>
+          </a:bodyPr>
+          <a:lstStyle/>
+          <a:p>
+            <a:pPr algn="ctr"/>
+            <a:r>
+              <a:rPr lang="en-US" sz="1200" dirty="0" smtClean="0">
+                <a:solidFill>
+                  <a:schemeClr val="bg1"/>
+                </a:solidFill>
+                <a:latin typeface="Anime Ace 2.0 BB"/>
+                <a:cs typeface="Anime Ace 2.0 BB"/>
+              </a:rPr>
+              <a:t>Initial work</a:t>
+            </a:r>
+            <a:endParaRPr lang="en-US" sz="1200" dirty="0">
+              <a:solidFill>
+                <a:schemeClr val="bg1"/>
+              </a:solidFill>
+              <a:latin typeface="Anime Ace 2.0 BB"/>
+              <a:cs typeface="Anime Ace 2.0 BB"/>
+            </a:endParaRPr>
+          </a:p>
+        </p:txBody>
+      </p:sp>
+      <p:cxnSp>
+        <p:nvCxnSpPr>
+          <p:cNvPr id="12" name="Straight Connector 11"/>
+          <p:cNvCxnSpPr/>
+          <p:nvPr/>
+        </p:nvCxnSpPr>
+        <p:spPr>
+          <a:xfrm>
+            <a:off x="2253704" y="1494253"/>
+            <a:ext cx="0" cy="3675077"/>
+          </a:xfrm>
+          <a:prstGeom prst="line">
+            <a:avLst/>
+          </a:prstGeom>
+          <a:ln>
+            <a:solidFill>
+              <a:schemeClr val="accent1">
+                <a:lumMod val="50000"/>
+              </a:schemeClr>
+            </a:solidFill>
+            <a:prstDash val="sysDash"/>
+          </a:ln>
+        </p:spPr>
+        <p:style>
+          <a:lnRef idx="2">
+            <a:schemeClr val="accent1"/>
+          </a:lnRef>
+          <a:fillRef idx="0">
+            <a:schemeClr val="accent1"/>
+          </a:fillRef>
+          <a:effectRef idx="1">
+            <a:schemeClr val="accent1"/>
+          </a:effectRef>
+          <a:fontRef idx="minor">
+            <a:schemeClr val="tx1"/>
+          </a:fontRef>
+        </p:style>
+      </p:cxnSp>
+      <p:sp>
+        <p:nvSpPr>
+          <p:cNvPr id="13" name="TextBox 12"/>
+          <p:cNvSpPr txBox="1"/>
+          <p:nvPr/>
+        </p:nvSpPr>
+        <p:spPr>
+          <a:xfrm>
+            <a:off x="2253704" y="1478986"/>
+            <a:ext cx="2297025" cy="461665"/>
+          </a:xfrm>
+          <a:prstGeom prst="rect">
+            <a:avLst/>
+          </a:prstGeom>
+          <a:noFill/>
+        </p:spPr>
+        <p:txBody>
+          <a:bodyPr wrap="square" rtlCol="0">
+            <a:spAutoFit/>
+          </a:bodyPr>
+          <a:lstStyle/>
+          <a:p>
+            <a:pPr algn="ctr"/>
+            <a:r>
+              <a:rPr lang="en-US" sz="1200" dirty="0" smtClean="0">
+                <a:solidFill>
+                  <a:schemeClr val="bg1"/>
+                </a:solidFill>
+                <a:latin typeface="Anime Ace 2.0 BB"/>
+                <a:cs typeface="Anime Ace 2.0 BB"/>
+              </a:rPr>
+              <a:t>Drupal 7</a:t>
+            </a:r>
+          </a:p>
+          <a:p>
+            <a:pPr algn="ctr"/>
+            <a:r>
+              <a:rPr lang="en-US" sz="1200" dirty="0" smtClean="0">
+                <a:solidFill>
+                  <a:schemeClr val="bg1"/>
+                </a:solidFill>
+                <a:latin typeface="Anime Ace 2.0 BB"/>
+                <a:cs typeface="Anime Ace 2.0 BB"/>
+              </a:rPr>
+              <a:t>Pre-release</a:t>
+            </a:r>
+            <a:endParaRPr lang="en-US" sz="1200" dirty="0">
+              <a:solidFill>
+                <a:schemeClr val="bg1"/>
+              </a:solidFill>
+              <a:latin typeface="Anime Ace 2.0 BB"/>
+              <a:cs typeface="Anime Ace 2.0 BB"/>
+            </a:endParaRPr>
+          </a:p>
+        </p:txBody>
+      </p:sp>
+      <p:cxnSp>
+        <p:nvCxnSpPr>
+          <p:cNvPr id="14" name="Straight Connector 13"/>
+          <p:cNvCxnSpPr/>
+          <p:nvPr/>
+        </p:nvCxnSpPr>
+        <p:spPr>
+          <a:xfrm>
+            <a:off x="4550729" y="1478986"/>
+            <a:ext cx="0" cy="3675077"/>
+          </a:xfrm>
+          <a:prstGeom prst="line">
+            <a:avLst/>
+          </a:prstGeom>
+          <a:ln>
+            <a:solidFill>
+              <a:schemeClr val="accent1">
+                <a:lumMod val="50000"/>
+              </a:schemeClr>
+            </a:solidFill>
+            <a:prstDash val="sysDash"/>
+          </a:ln>
+        </p:spPr>
+        <p:style>
+          <a:lnRef idx="2">
+            <a:schemeClr val="accent1"/>
+          </a:lnRef>
+          <a:fillRef idx="0">
+            <a:schemeClr val="accent1"/>
+          </a:fillRef>
+          <a:effectRef idx="1">
+            <a:schemeClr val="accent1"/>
+          </a:effectRef>
+          <a:fontRef idx="minor">
+            <a:schemeClr val="tx1"/>
+          </a:fontRef>
+        </p:style>
+      </p:cxnSp>
+      <p:sp>
+        <p:nvSpPr>
+          <p:cNvPr id="15" name="TextBox 14"/>
+          <p:cNvSpPr txBox="1"/>
+          <p:nvPr/>
+        </p:nvSpPr>
+        <p:spPr>
+          <a:xfrm>
+            <a:off x="4550729" y="1542357"/>
+            <a:ext cx="1721277" cy="461665"/>
+          </a:xfrm>
+          <a:prstGeom prst="rect">
+            <a:avLst/>
+          </a:prstGeom>
+          <a:noFill/>
+        </p:spPr>
+        <p:txBody>
+          <a:bodyPr wrap="square" rtlCol="0">
+            <a:spAutoFit/>
+          </a:bodyPr>
+          <a:lstStyle/>
+          <a:p>
+            <a:pPr algn="ctr"/>
+            <a:r>
+              <a:rPr lang="en-US" sz="1200" dirty="0" smtClean="0">
+                <a:solidFill>
+                  <a:schemeClr val="bg1"/>
+                </a:solidFill>
+                <a:latin typeface="Anime Ace 2.0 BB"/>
+                <a:cs typeface="Anime Ace 2.0 BB"/>
+              </a:rPr>
+              <a:t>Drupal 7</a:t>
+            </a:r>
+          </a:p>
+          <a:p>
+            <a:pPr algn="ctr"/>
+            <a:r>
+              <a:rPr lang="en-US" sz="1200" dirty="0" smtClean="0">
+                <a:solidFill>
+                  <a:schemeClr val="bg1"/>
+                </a:solidFill>
+                <a:latin typeface="Anime Ace 2.0 BB"/>
+                <a:cs typeface="Anime Ace 2.0 BB"/>
+              </a:rPr>
+              <a:t>Post-release</a:t>
+            </a:r>
+            <a:endParaRPr lang="en-US" sz="1200" dirty="0">
+              <a:solidFill>
+                <a:schemeClr val="bg1"/>
+              </a:solidFill>
+              <a:latin typeface="Anime Ace 2.0 BB"/>
+              <a:cs typeface="Anime Ace 2.0 BB"/>
+            </a:endParaRPr>
+          </a:p>
+        </p:txBody>
+      </p:sp>
+      <p:cxnSp>
+        <p:nvCxnSpPr>
+          <p:cNvPr id="16" name="Straight Connector 15"/>
+          <p:cNvCxnSpPr/>
+          <p:nvPr/>
+        </p:nvCxnSpPr>
+        <p:spPr>
+          <a:xfrm>
+            <a:off x="6272006" y="1542357"/>
+            <a:ext cx="0" cy="3675077"/>
+          </a:xfrm>
+          <a:prstGeom prst="line">
+            <a:avLst/>
+          </a:prstGeom>
+          <a:ln>
+            <a:solidFill>
+              <a:schemeClr val="accent1">
+                <a:lumMod val="50000"/>
+              </a:schemeClr>
+            </a:solidFill>
+            <a:prstDash val="sysDash"/>
+          </a:ln>
+        </p:spPr>
+        <p:style>
+          <a:lnRef idx="2">
+            <a:schemeClr val="accent1"/>
+          </a:lnRef>
+          <a:fillRef idx="0">
+            <a:schemeClr val="accent1"/>
+          </a:fillRef>
+          <a:effectRef idx="1">
+            <a:schemeClr val="accent1"/>
+          </a:effectRef>
+          <a:fontRef idx="minor">
+            <a:schemeClr val="tx1"/>
+          </a:fontRef>
+        </p:style>
+      </p:cxnSp>
+      <p:sp>
+        <p:nvSpPr>
+          <p:cNvPr id="17" name="TextBox 16"/>
+          <p:cNvSpPr txBox="1"/>
+          <p:nvPr/>
+        </p:nvSpPr>
+        <p:spPr>
+          <a:xfrm>
+            <a:off x="6272006" y="1542357"/>
+            <a:ext cx="1721277" cy="276999"/>
+          </a:xfrm>
+          <a:prstGeom prst="rect">
+            <a:avLst/>
+          </a:prstGeom>
+          <a:noFill/>
+        </p:spPr>
+        <p:txBody>
+          <a:bodyPr wrap="square" rtlCol="0">
+            <a:spAutoFit/>
+          </a:bodyPr>
+          <a:lstStyle/>
+          <a:p>
+            <a:pPr algn="ctr"/>
+            <a:r>
+              <a:rPr lang="en-US" sz="1200" dirty="0" smtClean="0">
+                <a:solidFill>
+                  <a:schemeClr val="bg1"/>
+                </a:solidFill>
+                <a:latin typeface="Anime Ace 2.0 BB"/>
+                <a:cs typeface="Anime Ace 2.0 BB"/>
+              </a:rPr>
+              <a:t>Drupal 8</a:t>
+            </a:r>
+            <a:endParaRPr lang="en-US" sz="1200" dirty="0">
+              <a:solidFill>
+                <a:schemeClr val="bg1"/>
+              </a:solidFill>
+              <a:latin typeface="Anime Ace 2.0 BB"/>
+              <a:cs typeface="Anime Ace 2.0 BB"/>
+            </a:endParaRPr>
+          </a:p>
+        </p:txBody>
+      </p:sp>
+      <p:sp>
+        <p:nvSpPr>
+          <p:cNvPr id="22" name="Rectangle 21"/>
+          <p:cNvSpPr/>
+          <p:nvPr/>
+        </p:nvSpPr>
+        <p:spPr>
+          <a:xfrm>
+            <a:off x="834244" y="1282567"/>
+            <a:ext cx="7570454" cy="4395596"/>
+          </a:xfrm>
+          <a:prstGeom prst="rect">
+            <a:avLst/>
+          </a:prstGeom>
+          <a:noFill/>
+          <a:ln>
+            <a:noFill/>
+          </a:ln>
+        </p:spPr>
+        <p:style>
+          <a:lnRef idx="1">
+            <a:schemeClr val="accent1"/>
+          </a:lnRef>
+          <a:fillRef idx="3">
+            <a:schemeClr val="accent1"/>
+          </a:fillRef>
+          <a:effectRef idx="2">
+            <a:schemeClr val="accent1"/>
+          </a:effectRef>
+          <a:fontRef idx="minor">
+            <a:schemeClr val="lt1"/>
+          </a:fontRef>
+        </p:style>
+        <p:txBody>
+          <a:bodyPr rtlCol="0" anchor="ctr"/>
+          <a:lstStyle/>
+          <a:p>
+            <a:pPr algn="ctr"/>
+            <a:endParaRPr lang="en-US"/>
+          </a:p>
+        </p:txBody>
+      </p:sp>
+      <p:sp>
+        <p:nvSpPr>
+          <p:cNvPr id="20" name="Smiley Face 19"/>
+          <p:cNvSpPr/>
+          <p:nvPr/>
+        </p:nvSpPr>
+        <p:spPr>
+          <a:xfrm>
+            <a:off x="7470844" y="3810346"/>
+            <a:ext cx="647473" cy="647473"/>
+          </a:xfrm>
+          <a:prstGeom prst="smileyFace">
+            <a:avLst>
+              <a:gd name="adj" fmla="val -4653"/>
+            </a:avLst>
+          </a:prstGeom>
+          <a:noFill/>
+        </p:spPr>
+        <p:style>
+          <a:lnRef idx="3">
+            <a:schemeClr val="lt1"/>
+          </a:lnRef>
+          <a:fillRef idx="1">
+            <a:schemeClr val="dk1"/>
+          </a:fillRef>
+          <a:effectRef idx="1">
+            <a:schemeClr val="dk1"/>
+          </a:effectRef>
+          <a:fontRef idx="minor">
+            <a:schemeClr val="lt1"/>
+          </a:fontRef>
+        </p:style>
+        <p:txBody>
+          <a:bodyPr rtlCol="0" anchor="ctr"/>
+          <a:lstStyle/>
+          <a:p>
+            <a:pPr algn="ctr"/>
+            <a:endParaRPr lang="en-US"/>
+          </a:p>
+        </p:txBody>
+      </p:sp>
+      <p:sp>
+        <p:nvSpPr>
+          <p:cNvPr id="21" name="Oval Callout 20"/>
+          <p:cNvSpPr/>
+          <p:nvPr/>
+        </p:nvSpPr>
+        <p:spPr>
+          <a:xfrm>
+            <a:off x="6649052" y="2337089"/>
+            <a:ext cx="1693391" cy="1146362"/>
+          </a:xfrm>
+          <a:prstGeom prst="wedgeEllipseCallout">
+            <a:avLst>
+              <a:gd name="adj1" fmla="val 12990"/>
+              <a:gd name="adj2" fmla="val 66845"/>
+            </a:avLst>
+          </a:prstGeom>
+          <a:noFill/>
+        </p:spPr>
+        <p:style>
+          <a:lnRef idx="3">
+            <a:schemeClr val="lt1"/>
+          </a:lnRef>
+          <a:fillRef idx="1">
+            <a:schemeClr val="dk1"/>
+          </a:fillRef>
+          <a:effectRef idx="1">
+            <a:schemeClr val="dk1"/>
+          </a:effectRef>
+          <a:fontRef idx="minor">
+            <a:schemeClr val="lt1"/>
+          </a:fontRef>
+        </p:style>
+        <p:txBody>
+          <a:bodyPr rtlCol="0" anchor="ctr"/>
+          <a:lstStyle/>
+          <a:p>
+            <a:pPr algn="ctr"/>
+            <a:r>
+              <a:rPr lang="en-US" dirty="0" smtClean="0">
+                <a:latin typeface="Anime Ace 2.0 BB"/>
+                <a:cs typeface="Anime Ace 2.0 BB"/>
+              </a:rPr>
+              <a:t>Yikes!</a:t>
+            </a:r>
+            <a:endParaRPr lang="en-US" dirty="0">
+              <a:latin typeface="Anime Ace 2.0 BB"/>
+              <a:cs typeface="Anime Ace 2.0 BB"/>
+            </a:endParaRPr>
+          </a:p>
+        </p:txBody>
+      </p:sp>
+    </p:spTree>
+    <p:extLst>
+      <p:ext uri="{BB962C8B-B14F-4D97-AF65-F5344CB8AC3E}">
+        <p14:creationId xmlns:p14="http://schemas.microsoft.com/office/powerpoint/2010/main" val="2804606055"/>
       </p:ext>
     </p:extLst>
   </p:cSld>

</xml_diff>

<commit_message>
Added So what's the problem section.
</commit_message>
<xml_diff>
--- a/src/exampleModuleAintCore.pptx
+++ b/src/exampleModuleAintCore.pptx
@@ -19,6 +19,9 @@
     <p:sldId id="267" r:id="rId13"/>
     <p:sldId id="268" r:id="rId14"/>
     <p:sldId id="269" r:id="rId15"/>
+    <p:sldId id="270" r:id="rId16"/>
+    <p:sldId id="271" r:id="rId17"/>
+    <p:sldId id="272" r:id="rId18"/>
   </p:sldIdLst>
   <p:sldSz cx="9144000" cy="6858000" type="screen4x3"/>
   <p:notesSz cx="6858000" cy="9144000"/>
@@ -7668,6 +7671,3611 @@
 </p:sld>
 </file>
 
+<file path=ppt/slides/slide15.xml><?xml version="1.0" encoding="utf-8"?>
+<p:sld xmlns:a="http://schemas.openxmlformats.org/drawingml/2006/main" xmlns:r="http://schemas.openxmlformats.org/officeDocument/2006/relationships" xmlns:p="http://schemas.openxmlformats.org/presentationml/2006/main">
+  <p:cSld>
+    <p:spTree>
+      <p:nvGrpSpPr>
+        <p:cNvPr id="1" name=""/>
+        <p:cNvGrpSpPr/>
+        <p:nvPr/>
+      </p:nvGrpSpPr>
+      <p:grpSpPr>
+        <a:xfrm>
+          <a:off x="0" y="0"/>
+          <a:ext cx="0" cy="0"/>
+          <a:chOff x="0" y="0"/>
+          <a:chExt cx="0" cy="0"/>
+        </a:xfrm>
+      </p:grpSpPr>
+      <p:sp>
+        <p:nvSpPr>
+          <p:cNvPr id="3" name="Chord 3"/>
+          <p:cNvSpPr/>
+          <p:nvPr/>
+        </p:nvSpPr>
+        <p:spPr>
+          <a:xfrm>
+            <a:off x="3165112" y="4269902"/>
+            <a:ext cx="791321" cy="516772"/>
+          </a:xfrm>
+          <a:custGeom>
+            <a:avLst/>
+            <a:gdLst>
+              <a:gd name="connsiteX0" fmla="*/ 16608 w 2232278"/>
+              <a:gd name="connsiteY0" fmla="*/ 1307968 h 2232278"/>
+              <a:gd name="connsiteX1" fmla="*/ 589005 w 2232278"/>
+              <a:gd name="connsiteY1" fmla="*/ 132321 h 2232278"/>
+              <a:gd name="connsiteX2" fmla="*/ 1884880 w 2232278"/>
+              <a:gd name="connsiteY2" fmla="*/ 306939 h 2232278"/>
+              <a:gd name="connsiteX3" fmla="*/ 2125677 w 2232278"/>
+              <a:gd name="connsiteY3" fmla="*/ 1592163 h 2232278"/>
+              <a:gd name="connsiteX4" fmla="*/ 16608 w 2232278"/>
+              <a:gd name="connsiteY4" fmla="*/ 1307968 h 2232278"/>
+              <a:gd name="connsiteX0" fmla="*/ 16669 w 2232378"/>
+              <a:gd name="connsiteY0" fmla="*/ 1307991 h 1619407"/>
+              <a:gd name="connsiteX1" fmla="*/ 589066 w 2232378"/>
+              <a:gd name="connsiteY1" fmla="*/ 132344 h 1619407"/>
+              <a:gd name="connsiteX2" fmla="*/ 1884941 w 2232378"/>
+              <a:gd name="connsiteY2" fmla="*/ 306962 h 1619407"/>
+              <a:gd name="connsiteX3" fmla="*/ 2125738 w 2232378"/>
+              <a:gd name="connsiteY3" fmla="*/ 1592186 h 1619407"/>
+              <a:gd name="connsiteX4" fmla="*/ 16669 w 2232378"/>
+              <a:gd name="connsiteY4" fmla="*/ 1307991 h 1619407"/>
+              <a:gd name="connsiteX0" fmla="*/ 16669 w 2232378"/>
+              <a:gd name="connsiteY0" fmla="*/ 1307991 h 1698147"/>
+              <a:gd name="connsiteX1" fmla="*/ 589066 w 2232378"/>
+              <a:gd name="connsiteY1" fmla="*/ 132344 h 1698147"/>
+              <a:gd name="connsiteX2" fmla="*/ 1884941 w 2232378"/>
+              <a:gd name="connsiteY2" fmla="*/ 306962 h 1698147"/>
+              <a:gd name="connsiteX3" fmla="*/ 2125738 w 2232378"/>
+              <a:gd name="connsiteY3" fmla="*/ 1592186 h 1698147"/>
+              <a:gd name="connsiteX4" fmla="*/ 16669 w 2232378"/>
+              <a:gd name="connsiteY4" fmla="*/ 1307991 h 1698147"/>
+              <a:gd name="connsiteX0" fmla="*/ 16669 w 2232378"/>
+              <a:gd name="connsiteY0" fmla="*/ 1307991 h 1698147"/>
+              <a:gd name="connsiteX1" fmla="*/ 589066 w 2232378"/>
+              <a:gd name="connsiteY1" fmla="*/ 132344 h 1698147"/>
+              <a:gd name="connsiteX2" fmla="*/ 1884941 w 2232378"/>
+              <a:gd name="connsiteY2" fmla="*/ 306962 h 1698147"/>
+              <a:gd name="connsiteX3" fmla="*/ 2125738 w 2232378"/>
+              <a:gd name="connsiteY3" fmla="*/ 1592186 h 1698147"/>
+              <a:gd name="connsiteX4" fmla="*/ 16669 w 2232378"/>
+              <a:gd name="connsiteY4" fmla="*/ 1307991 h 1698147"/>
+              <a:gd name="connsiteX0" fmla="*/ 16669 w 2232378"/>
+              <a:gd name="connsiteY0" fmla="*/ 1175646 h 1565802"/>
+              <a:gd name="connsiteX1" fmla="*/ 589066 w 2232378"/>
+              <a:gd name="connsiteY1" fmla="*/ -1 h 1565802"/>
+              <a:gd name="connsiteX2" fmla="*/ 1884941 w 2232378"/>
+              <a:gd name="connsiteY2" fmla="*/ 174617 h 1565802"/>
+              <a:gd name="connsiteX3" fmla="*/ 2125738 w 2232378"/>
+              <a:gd name="connsiteY3" fmla="*/ 1459841 h 1565802"/>
+              <a:gd name="connsiteX4" fmla="*/ 16669 w 2232378"/>
+              <a:gd name="connsiteY4" fmla="*/ 1175646 h 1565802"/>
+              <a:gd name="connsiteX0" fmla="*/ 16669 w 2232378"/>
+              <a:gd name="connsiteY0" fmla="*/ 1175648 h 1565804"/>
+              <a:gd name="connsiteX1" fmla="*/ 589066 w 2232378"/>
+              <a:gd name="connsiteY1" fmla="*/ 1 h 1565804"/>
+              <a:gd name="connsiteX2" fmla="*/ 1884941 w 2232378"/>
+              <a:gd name="connsiteY2" fmla="*/ 174619 h 1565804"/>
+              <a:gd name="connsiteX3" fmla="*/ 2125738 w 2232378"/>
+              <a:gd name="connsiteY3" fmla="*/ 1459843 h 1565804"/>
+              <a:gd name="connsiteX4" fmla="*/ 16669 w 2232378"/>
+              <a:gd name="connsiteY4" fmla="*/ 1175648 h 1565804"/>
+              <a:gd name="connsiteX0" fmla="*/ 16669 w 2232378"/>
+              <a:gd name="connsiteY0" fmla="*/ 1175646 h 1565802"/>
+              <a:gd name="connsiteX1" fmla="*/ 589066 w 2232378"/>
+              <a:gd name="connsiteY1" fmla="*/ -1 h 1565802"/>
+              <a:gd name="connsiteX2" fmla="*/ 1884941 w 2232378"/>
+              <a:gd name="connsiteY2" fmla="*/ 174617 h 1565802"/>
+              <a:gd name="connsiteX3" fmla="*/ 2125738 w 2232378"/>
+              <a:gd name="connsiteY3" fmla="*/ 1459841 h 1565802"/>
+              <a:gd name="connsiteX4" fmla="*/ 16669 w 2232378"/>
+              <a:gd name="connsiteY4" fmla="*/ 1175646 h 1565802"/>
+            </a:gdLst>
+            <a:ahLst/>
+            <a:cxnLst>
+              <a:cxn ang="0">
+                <a:pos x="connsiteX0" y="connsiteY0"/>
+              </a:cxn>
+              <a:cxn ang="0">
+                <a:pos x="connsiteX1" y="connsiteY1"/>
+              </a:cxn>
+              <a:cxn ang="0">
+                <a:pos x="connsiteX2" y="connsiteY2"/>
+              </a:cxn>
+              <a:cxn ang="0">
+                <a:pos x="connsiteX3" y="connsiteY3"/>
+              </a:cxn>
+              <a:cxn ang="0">
+                <a:pos x="connsiteX4" y="connsiteY4"/>
+              </a:cxn>
+            </a:cxnLst>
+            <a:rect l="l" t="t" r="r" b="b"/>
+            <a:pathLst>
+              <a:path w="2232378" h="1565802">
+                <a:moveTo>
+                  <a:pt x="16669" y="1175646"/>
+                </a:moveTo>
+                <a:cubicBezTo>
+                  <a:pt x="-66084" y="701323"/>
+                  <a:pt x="164660" y="227398"/>
+                  <a:pt x="589066" y="-1"/>
+                </a:cubicBezTo>
+                <a:cubicBezTo>
+                  <a:pt x="1013471" y="543761"/>
+                  <a:pt x="1715366" y="47123"/>
+                  <a:pt x="1884941" y="174617"/>
+                </a:cubicBezTo>
+                <a:cubicBezTo>
+                  <a:pt x="2234019" y="506242"/>
+                  <a:pt x="2331089" y="1024340"/>
+                  <a:pt x="2125738" y="1459841"/>
+                </a:cubicBezTo>
+                <a:cubicBezTo>
+                  <a:pt x="1461202" y="1570351"/>
+                  <a:pt x="886471" y="1719347"/>
+                  <a:pt x="16669" y="1175646"/>
+                </a:cubicBezTo>
+                <a:close/>
+              </a:path>
+            </a:pathLst>
+          </a:custGeom>
+          <a:noFill/>
+          <a:ln w="38100" cmpd="sng">
+            <a:solidFill>
+              <a:srgbClr val="FFFF00"/>
+            </a:solidFill>
+          </a:ln>
+        </p:spPr>
+        <p:style>
+          <a:lnRef idx="1">
+            <a:schemeClr val="accent1"/>
+          </a:lnRef>
+          <a:fillRef idx="3">
+            <a:schemeClr val="accent1"/>
+          </a:fillRef>
+          <a:effectRef idx="2">
+            <a:schemeClr val="accent1"/>
+          </a:effectRef>
+          <a:fontRef idx="minor">
+            <a:schemeClr val="lt1"/>
+          </a:fontRef>
+        </p:style>
+        <p:txBody>
+          <a:bodyPr rtlCol="0" anchor="ctr"/>
+          <a:lstStyle/>
+          <a:p>
+            <a:pPr algn="ctr"/>
+            <a:endParaRPr lang="en-US"/>
+          </a:p>
+        </p:txBody>
+      </p:sp>
+      <p:sp>
+        <p:nvSpPr>
+          <p:cNvPr id="4" name="Oval 3"/>
+          <p:cNvSpPr/>
+          <p:nvPr/>
+        </p:nvSpPr>
+        <p:spPr>
+          <a:xfrm>
+            <a:off x="3338667" y="3772946"/>
+            <a:ext cx="510522" cy="496957"/>
+          </a:xfrm>
+          <a:prstGeom prst="ellipse">
+            <a:avLst/>
+          </a:prstGeom>
+          <a:noFill/>
+          <a:ln w="38100" cmpd="sng">
+            <a:solidFill>
+              <a:schemeClr val="bg1"/>
+            </a:solidFill>
+          </a:ln>
+        </p:spPr>
+        <p:style>
+          <a:lnRef idx="1">
+            <a:schemeClr val="accent1"/>
+          </a:lnRef>
+          <a:fillRef idx="3">
+            <a:schemeClr val="accent1"/>
+          </a:fillRef>
+          <a:effectRef idx="2">
+            <a:schemeClr val="accent1"/>
+          </a:effectRef>
+          <a:fontRef idx="minor">
+            <a:schemeClr val="lt1"/>
+          </a:fontRef>
+        </p:style>
+        <p:txBody>
+          <a:bodyPr rtlCol="0" anchor="ctr"/>
+          <a:lstStyle/>
+          <a:p>
+            <a:pPr algn="ctr"/>
+            <a:endParaRPr lang="en-US"/>
+          </a:p>
+        </p:txBody>
+      </p:sp>
+      <p:sp>
+        <p:nvSpPr>
+          <p:cNvPr id="8" name="Chord 3"/>
+          <p:cNvSpPr/>
+          <p:nvPr/>
+        </p:nvSpPr>
+        <p:spPr>
+          <a:xfrm>
+            <a:off x="4774691" y="4269903"/>
+            <a:ext cx="791321" cy="516772"/>
+          </a:xfrm>
+          <a:custGeom>
+            <a:avLst/>
+            <a:gdLst>
+              <a:gd name="connsiteX0" fmla="*/ 16608 w 2232278"/>
+              <a:gd name="connsiteY0" fmla="*/ 1307968 h 2232278"/>
+              <a:gd name="connsiteX1" fmla="*/ 589005 w 2232278"/>
+              <a:gd name="connsiteY1" fmla="*/ 132321 h 2232278"/>
+              <a:gd name="connsiteX2" fmla="*/ 1884880 w 2232278"/>
+              <a:gd name="connsiteY2" fmla="*/ 306939 h 2232278"/>
+              <a:gd name="connsiteX3" fmla="*/ 2125677 w 2232278"/>
+              <a:gd name="connsiteY3" fmla="*/ 1592163 h 2232278"/>
+              <a:gd name="connsiteX4" fmla="*/ 16608 w 2232278"/>
+              <a:gd name="connsiteY4" fmla="*/ 1307968 h 2232278"/>
+              <a:gd name="connsiteX0" fmla="*/ 16669 w 2232378"/>
+              <a:gd name="connsiteY0" fmla="*/ 1307991 h 1619407"/>
+              <a:gd name="connsiteX1" fmla="*/ 589066 w 2232378"/>
+              <a:gd name="connsiteY1" fmla="*/ 132344 h 1619407"/>
+              <a:gd name="connsiteX2" fmla="*/ 1884941 w 2232378"/>
+              <a:gd name="connsiteY2" fmla="*/ 306962 h 1619407"/>
+              <a:gd name="connsiteX3" fmla="*/ 2125738 w 2232378"/>
+              <a:gd name="connsiteY3" fmla="*/ 1592186 h 1619407"/>
+              <a:gd name="connsiteX4" fmla="*/ 16669 w 2232378"/>
+              <a:gd name="connsiteY4" fmla="*/ 1307991 h 1619407"/>
+              <a:gd name="connsiteX0" fmla="*/ 16669 w 2232378"/>
+              <a:gd name="connsiteY0" fmla="*/ 1307991 h 1698147"/>
+              <a:gd name="connsiteX1" fmla="*/ 589066 w 2232378"/>
+              <a:gd name="connsiteY1" fmla="*/ 132344 h 1698147"/>
+              <a:gd name="connsiteX2" fmla="*/ 1884941 w 2232378"/>
+              <a:gd name="connsiteY2" fmla="*/ 306962 h 1698147"/>
+              <a:gd name="connsiteX3" fmla="*/ 2125738 w 2232378"/>
+              <a:gd name="connsiteY3" fmla="*/ 1592186 h 1698147"/>
+              <a:gd name="connsiteX4" fmla="*/ 16669 w 2232378"/>
+              <a:gd name="connsiteY4" fmla="*/ 1307991 h 1698147"/>
+              <a:gd name="connsiteX0" fmla="*/ 16669 w 2232378"/>
+              <a:gd name="connsiteY0" fmla="*/ 1307991 h 1698147"/>
+              <a:gd name="connsiteX1" fmla="*/ 589066 w 2232378"/>
+              <a:gd name="connsiteY1" fmla="*/ 132344 h 1698147"/>
+              <a:gd name="connsiteX2" fmla="*/ 1884941 w 2232378"/>
+              <a:gd name="connsiteY2" fmla="*/ 306962 h 1698147"/>
+              <a:gd name="connsiteX3" fmla="*/ 2125738 w 2232378"/>
+              <a:gd name="connsiteY3" fmla="*/ 1592186 h 1698147"/>
+              <a:gd name="connsiteX4" fmla="*/ 16669 w 2232378"/>
+              <a:gd name="connsiteY4" fmla="*/ 1307991 h 1698147"/>
+              <a:gd name="connsiteX0" fmla="*/ 16669 w 2232378"/>
+              <a:gd name="connsiteY0" fmla="*/ 1175646 h 1565802"/>
+              <a:gd name="connsiteX1" fmla="*/ 589066 w 2232378"/>
+              <a:gd name="connsiteY1" fmla="*/ -1 h 1565802"/>
+              <a:gd name="connsiteX2" fmla="*/ 1884941 w 2232378"/>
+              <a:gd name="connsiteY2" fmla="*/ 174617 h 1565802"/>
+              <a:gd name="connsiteX3" fmla="*/ 2125738 w 2232378"/>
+              <a:gd name="connsiteY3" fmla="*/ 1459841 h 1565802"/>
+              <a:gd name="connsiteX4" fmla="*/ 16669 w 2232378"/>
+              <a:gd name="connsiteY4" fmla="*/ 1175646 h 1565802"/>
+              <a:gd name="connsiteX0" fmla="*/ 16669 w 2232378"/>
+              <a:gd name="connsiteY0" fmla="*/ 1175648 h 1565804"/>
+              <a:gd name="connsiteX1" fmla="*/ 589066 w 2232378"/>
+              <a:gd name="connsiteY1" fmla="*/ 1 h 1565804"/>
+              <a:gd name="connsiteX2" fmla="*/ 1884941 w 2232378"/>
+              <a:gd name="connsiteY2" fmla="*/ 174619 h 1565804"/>
+              <a:gd name="connsiteX3" fmla="*/ 2125738 w 2232378"/>
+              <a:gd name="connsiteY3" fmla="*/ 1459843 h 1565804"/>
+              <a:gd name="connsiteX4" fmla="*/ 16669 w 2232378"/>
+              <a:gd name="connsiteY4" fmla="*/ 1175648 h 1565804"/>
+              <a:gd name="connsiteX0" fmla="*/ 16669 w 2232378"/>
+              <a:gd name="connsiteY0" fmla="*/ 1175646 h 1565802"/>
+              <a:gd name="connsiteX1" fmla="*/ 589066 w 2232378"/>
+              <a:gd name="connsiteY1" fmla="*/ -1 h 1565802"/>
+              <a:gd name="connsiteX2" fmla="*/ 1884941 w 2232378"/>
+              <a:gd name="connsiteY2" fmla="*/ 174617 h 1565802"/>
+              <a:gd name="connsiteX3" fmla="*/ 2125738 w 2232378"/>
+              <a:gd name="connsiteY3" fmla="*/ 1459841 h 1565802"/>
+              <a:gd name="connsiteX4" fmla="*/ 16669 w 2232378"/>
+              <a:gd name="connsiteY4" fmla="*/ 1175646 h 1565802"/>
+            </a:gdLst>
+            <a:ahLst/>
+            <a:cxnLst>
+              <a:cxn ang="0">
+                <a:pos x="connsiteX0" y="connsiteY0"/>
+              </a:cxn>
+              <a:cxn ang="0">
+                <a:pos x="connsiteX1" y="connsiteY1"/>
+              </a:cxn>
+              <a:cxn ang="0">
+                <a:pos x="connsiteX2" y="connsiteY2"/>
+              </a:cxn>
+              <a:cxn ang="0">
+                <a:pos x="connsiteX3" y="connsiteY3"/>
+              </a:cxn>
+              <a:cxn ang="0">
+                <a:pos x="connsiteX4" y="connsiteY4"/>
+              </a:cxn>
+            </a:cxnLst>
+            <a:rect l="l" t="t" r="r" b="b"/>
+            <a:pathLst>
+              <a:path w="2232378" h="1565802">
+                <a:moveTo>
+                  <a:pt x="16669" y="1175646"/>
+                </a:moveTo>
+                <a:cubicBezTo>
+                  <a:pt x="-66084" y="701323"/>
+                  <a:pt x="164660" y="227398"/>
+                  <a:pt x="589066" y="-1"/>
+                </a:cubicBezTo>
+                <a:cubicBezTo>
+                  <a:pt x="1013471" y="543761"/>
+                  <a:pt x="1715366" y="47123"/>
+                  <a:pt x="1884941" y="174617"/>
+                </a:cubicBezTo>
+                <a:cubicBezTo>
+                  <a:pt x="2234019" y="506242"/>
+                  <a:pt x="2331089" y="1024340"/>
+                  <a:pt x="2125738" y="1459841"/>
+                </a:cubicBezTo>
+                <a:cubicBezTo>
+                  <a:pt x="1461202" y="1570351"/>
+                  <a:pt x="886471" y="1719347"/>
+                  <a:pt x="16669" y="1175646"/>
+                </a:cubicBezTo>
+                <a:close/>
+              </a:path>
+            </a:pathLst>
+          </a:custGeom>
+          <a:noFill/>
+          <a:ln w="38100" cmpd="sng">
+            <a:solidFill>
+              <a:srgbClr val="FF0000"/>
+            </a:solidFill>
+          </a:ln>
+        </p:spPr>
+        <p:style>
+          <a:lnRef idx="1">
+            <a:schemeClr val="accent1"/>
+          </a:lnRef>
+          <a:fillRef idx="3">
+            <a:schemeClr val="accent1"/>
+          </a:fillRef>
+          <a:effectRef idx="2">
+            <a:schemeClr val="accent1"/>
+          </a:effectRef>
+          <a:fontRef idx="minor">
+            <a:schemeClr val="lt1"/>
+          </a:fontRef>
+        </p:style>
+        <p:txBody>
+          <a:bodyPr rtlCol="0" anchor="ctr"/>
+          <a:lstStyle/>
+          <a:p>
+            <a:pPr algn="ctr"/>
+            <a:endParaRPr lang="en-US"/>
+          </a:p>
+        </p:txBody>
+      </p:sp>
+      <p:sp>
+        <p:nvSpPr>
+          <p:cNvPr id="9" name="Oval 8"/>
+          <p:cNvSpPr/>
+          <p:nvPr/>
+        </p:nvSpPr>
+        <p:spPr>
+          <a:xfrm>
+            <a:off x="4948246" y="3772947"/>
+            <a:ext cx="510522" cy="496957"/>
+          </a:xfrm>
+          <a:prstGeom prst="ellipse">
+            <a:avLst/>
+          </a:prstGeom>
+          <a:noFill/>
+          <a:ln w="38100" cmpd="sng">
+            <a:solidFill>
+              <a:schemeClr val="bg1"/>
+            </a:solidFill>
+          </a:ln>
+        </p:spPr>
+        <p:style>
+          <a:lnRef idx="1">
+            <a:schemeClr val="accent1"/>
+          </a:lnRef>
+          <a:fillRef idx="3">
+            <a:schemeClr val="accent1"/>
+          </a:fillRef>
+          <a:effectRef idx="2">
+            <a:schemeClr val="accent1"/>
+          </a:effectRef>
+          <a:fontRef idx="minor">
+            <a:schemeClr val="lt1"/>
+          </a:fontRef>
+        </p:style>
+        <p:txBody>
+          <a:bodyPr rtlCol="0" anchor="ctr"/>
+          <a:lstStyle/>
+          <a:p>
+            <a:pPr algn="ctr"/>
+            <a:endParaRPr lang="en-US"/>
+          </a:p>
+        </p:txBody>
+      </p:sp>
+      <p:sp>
+        <p:nvSpPr>
+          <p:cNvPr id="10" name="Oval 9"/>
+          <p:cNvSpPr/>
+          <p:nvPr/>
+        </p:nvSpPr>
+        <p:spPr>
+          <a:xfrm>
+            <a:off x="5079248" y="3941040"/>
+            <a:ext cx="41172" cy="93570"/>
+          </a:xfrm>
+          <a:prstGeom prst="ellipse">
+            <a:avLst/>
+          </a:prstGeom>
+          <a:solidFill>
+            <a:srgbClr val="FFFFFF"/>
+          </a:solidFill>
+          <a:ln>
+            <a:noFill/>
+          </a:ln>
+        </p:spPr>
+        <p:style>
+          <a:lnRef idx="1">
+            <a:schemeClr val="accent1"/>
+          </a:lnRef>
+          <a:fillRef idx="3">
+            <a:schemeClr val="accent1"/>
+          </a:fillRef>
+          <a:effectRef idx="2">
+            <a:schemeClr val="accent1"/>
+          </a:effectRef>
+          <a:fontRef idx="minor">
+            <a:schemeClr val="lt1"/>
+          </a:fontRef>
+        </p:style>
+        <p:txBody>
+          <a:bodyPr rtlCol="0" anchor="ctr"/>
+          <a:lstStyle/>
+          <a:p>
+            <a:pPr algn="ctr"/>
+            <a:endParaRPr lang="en-US"/>
+          </a:p>
+        </p:txBody>
+      </p:sp>
+      <p:sp>
+        <p:nvSpPr>
+          <p:cNvPr id="11" name="Oval 10"/>
+          <p:cNvSpPr/>
+          <p:nvPr/>
+        </p:nvSpPr>
+        <p:spPr>
+          <a:xfrm>
+            <a:off x="5218335" y="3941040"/>
+            <a:ext cx="41172" cy="93570"/>
+          </a:xfrm>
+          <a:prstGeom prst="ellipse">
+            <a:avLst/>
+          </a:prstGeom>
+          <a:solidFill>
+            <a:srgbClr val="FFFFFF"/>
+          </a:solidFill>
+          <a:ln>
+            <a:noFill/>
+          </a:ln>
+        </p:spPr>
+        <p:style>
+          <a:lnRef idx="1">
+            <a:schemeClr val="accent1"/>
+          </a:lnRef>
+          <a:fillRef idx="3">
+            <a:schemeClr val="accent1"/>
+          </a:fillRef>
+          <a:effectRef idx="2">
+            <a:schemeClr val="accent1"/>
+          </a:effectRef>
+          <a:fontRef idx="minor">
+            <a:schemeClr val="lt1"/>
+          </a:fontRef>
+        </p:style>
+        <p:txBody>
+          <a:bodyPr rtlCol="0" anchor="ctr"/>
+          <a:lstStyle/>
+          <a:p>
+            <a:pPr algn="ctr"/>
+            <a:endParaRPr lang="en-US"/>
+          </a:p>
+        </p:txBody>
+      </p:sp>
+      <p:cxnSp>
+        <p:nvCxnSpPr>
+          <p:cNvPr id="14" name="Straight Connector 13"/>
+          <p:cNvCxnSpPr/>
+          <p:nvPr/>
+        </p:nvCxnSpPr>
+        <p:spPr>
+          <a:xfrm flipH="1">
+            <a:off x="3622764" y="4436991"/>
+            <a:ext cx="113970" cy="236096"/>
+          </a:xfrm>
+          <a:prstGeom prst="line">
+            <a:avLst/>
+          </a:prstGeom>
+          <a:ln>
+            <a:solidFill>
+              <a:schemeClr val="bg1"/>
+            </a:solidFill>
+          </a:ln>
+        </p:spPr>
+        <p:style>
+          <a:lnRef idx="2">
+            <a:schemeClr val="accent1"/>
+          </a:lnRef>
+          <a:fillRef idx="0">
+            <a:schemeClr val="accent1"/>
+          </a:fillRef>
+          <a:effectRef idx="1">
+            <a:schemeClr val="accent1"/>
+          </a:effectRef>
+          <a:fontRef idx="minor">
+            <a:schemeClr val="tx1"/>
+          </a:fontRef>
+        </p:style>
+      </p:cxnSp>
+      <p:cxnSp>
+        <p:nvCxnSpPr>
+          <p:cNvPr id="16" name="Straight Connector 15"/>
+          <p:cNvCxnSpPr/>
+          <p:nvPr/>
+        </p:nvCxnSpPr>
+        <p:spPr>
+          <a:xfrm>
+            <a:off x="3736734" y="4436991"/>
+            <a:ext cx="38430" cy="170966"/>
+          </a:xfrm>
+          <a:prstGeom prst="line">
+            <a:avLst/>
+          </a:prstGeom>
+          <a:ln>
+            <a:solidFill>
+              <a:schemeClr val="bg1"/>
+            </a:solidFill>
+          </a:ln>
+        </p:spPr>
+        <p:style>
+          <a:lnRef idx="2">
+            <a:schemeClr val="accent1"/>
+          </a:lnRef>
+          <a:fillRef idx="0">
+            <a:schemeClr val="accent1"/>
+          </a:fillRef>
+          <a:effectRef idx="1">
+            <a:schemeClr val="accent1"/>
+          </a:effectRef>
+          <a:fontRef idx="minor">
+            <a:schemeClr val="tx1"/>
+          </a:fontRef>
+        </p:style>
+      </p:cxnSp>
+      <p:cxnSp>
+        <p:nvCxnSpPr>
+          <p:cNvPr id="19" name="Straight Connector 18"/>
+          <p:cNvCxnSpPr/>
+          <p:nvPr/>
+        </p:nvCxnSpPr>
+        <p:spPr>
+          <a:xfrm flipH="1">
+            <a:off x="5251367" y="4436991"/>
+            <a:ext cx="113970" cy="236096"/>
+          </a:xfrm>
+          <a:prstGeom prst="line">
+            <a:avLst/>
+          </a:prstGeom>
+          <a:ln>
+            <a:solidFill>
+              <a:schemeClr val="bg1"/>
+            </a:solidFill>
+          </a:ln>
+        </p:spPr>
+        <p:style>
+          <a:lnRef idx="2">
+            <a:schemeClr val="accent1"/>
+          </a:lnRef>
+          <a:fillRef idx="0">
+            <a:schemeClr val="accent1"/>
+          </a:fillRef>
+          <a:effectRef idx="1">
+            <a:schemeClr val="accent1"/>
+          </a:effectRef>
+          <a:fontRef idx="minor">
+            <a:schemeClr val="tx1"/>
+          </a:fontRef>
+        </p:style>
+      </p:cxnSp>
+      <p:cxnSp>
+        <p:nvCxnSpPr>
+          <p:cNvPr id="20" name="Straight Connector 19"/>
+          <p:cNvCxnSpPr/>
+          <p:nvPr/>
+        </p:nvCxnSpPr>
+        <p:spPr>
+          <a:xfrm>
+            <a:off x="5365337" y="4436991"/>
+            <a:ext cx="38430" cy="170966"/>
+          </a:xfrm>
+          <a:prstGeom prst="line">
+            <a:avLst/>
+          </a:prstGeom>
+          <a:ln>
+            <a:solidFill>
+              <a:schemeClr val="bg1"/>
+            </a:solidFill>
+          </a:ln>
+        </p:spPr>
+        <p:style>
+          <a:lnRef idx="2">
+            <a:schemeClr val="accent1"/>
+          </a:lnRef>
+          <a:fillRef idx="0">
+            <a:schemeClr val="accent1"/>
+          </a:fillRef>
+          <a:effectRef idx="1">
+            <a:schemeClr val="accent1"/>
+          </a:effectRef>
+          <a:fontRef idx="minor">
+            <a:schemeClr val="tx1"/>
+          </a:fontRef>
+        </p:style>
+      </p:cxnSp>
+      <p:sp>
+        <p:nvSpPr>
+          <p:cNvPr id="22" name="Freeform 21"/>
+          <p:cNvSpPr/>
+          <p:nvPr/>
+        </p:nvSpPr>
+        <p:spPr>
+          <a:xfrm>
+            <a:off x="3341722" y="3863892"/>
+            <a:ext cx="516595" cy="216154"/>
+          </a:xfrm>
+          <a:custGeom>
+            <a:avLst/>
+            <a:gdLst>
+              <a:gd name="connsiteX0" fmla="*/ 26906 w 555660"/>
+              <a:gd name="connsiteY0" fmla="*/ 0 h 205711"/>
+              <a:gd name="connsiteX1" fmla="*/ 113005 w 555660"/>
+              <a:gd name="connsiteY1" fmla="*/ 86103 h 205711"/>
+              <a:gd name="connsiteX2" fmla="*/ 495070 w 555660"/>
+              <a:gd name="connsiteY2" fmla="*/ 53814 h 205711"/>
+              <a:gd name="connsiteX3" fmla="*/ 516595 w 555660"/>
+              <a:gd name="connsiteY3" fmla="*/ 166825 h 205711"/>
+              <a:gd name="connsiteX4" fmla="*/ 118387 w 555660"/>
+              <a:gd name="connsiteY4" fmla="*/ 204495 h 205711"/>
+              <a:gd name="connsiteX5" fmla="*/ 0 w 555660"/>
+              <a:gd name="connsiteY5" fmla="*/ 129155 h 205711"/>
+              <a:gd name="connsiteX0" fmla="*/ 26906 w 555660"/>
+              <a:gd name="connsiteY0" fmla="*/ 0 h 205711"/>
+              <a:gd name="connsiteX1" fmla="*/ 113005 w 555660"/>
+              <a:gd name="connsiteY1" fmla="*/ 86103 h 205711"/>
+              <a:gd name="connsiteX2" fmla="*/ 495070 w 555660"/>
+              <a:gd name="connsiteY2" fmla="*/ 53814 h 205711"/>
+              <a:gd name="connsiteX3" fmla="*/ 516595 w 555660"/>
+              <a:gd name="connsiteY3" fmla="*/ 166825 h 205711"/>
+              <a:gd name="connsiteX4" fmla="*/ 118387 w 555660"/>
+              <a:gd name="connsiteY4" fmla="*/ 204495 h 205711"/>
+              <a:gd name="connsiteX5" fmla="*/ 0 w 555660"/>
+              <a:gd name="connsiteY5" fmla="*/ 129155 h 205711"/>
+              <a:gd name="connsiteX6" fmla="*/ 26906 w 555660"/>
+              <a:gd name="connsiteY6" fmla="*/ 0 h 205711"/>
+              <a:gd name="connsiteX0" fmla="*/ 26906 w 516595"/>
+              <a:gd name="connsiteY0" fmla="*/ 0 h 205711"/>
+              <a:gd name="connsiteX1" fmla="*/ 113005 w 516595"/>
+              <a:gd name="connsiteY1" fmla="*/ 86103 h 205711"/>
+              <a:gd name="connsiteX2" fmla="*/ 495070 w 516595"/>
+              <a:gd name="connsiteY2" fmla="*/ 53814 h 205711"/>
+              <a:gd name="connsiteX3" fmla="*/ 516595 w 516595"/>
+              <a:gd name="connsiteY3" fmla="*/ 166825 h 205711"/>
+              <a:gd name="connsiteX4" fmla="*/ 118387 w 516595"/>
+              <a:gd name="connsiteY4" fmla="*/ 204495 h 205711"/>
+              <a:gd name="connsiteX5" fmla="*/ 0 w 516595"/>
+              <a:gd name="connsiteY5" fmla="*/ 129155 h 205711"/>
+              <a:gd name="connsiteX6" fmla="*/ 26906 w 516595"/>
+              <a:gd name="connsiteY6" fmla="*/ 0 h 205711"/>
+              <a:gd name="connsiteX0" fmla="*/ 26906 w 539079"/>
+              <a:gd name="connsiteY0" fmla="*/ 0 h 216154"/>
+              <a:gd name="connsiteX1" fmla="*/ 113005 w 539079"/>
+              <a:gd name="connsiteY1" fmla="*/ 86103 h 216154"/>
+              <a:gd name="connsiteX2" fmla="*/ 495070 w 539079"/>
+              <a:gd name="connsiteY2" fmla="*/ 53814 h 216154"/>
+              <a:gd name="connsiteX3" fmla="*/ 516595 w 539079"/>
+              <a:gd name="connsiteY3" fmla="*/ 166825 h 216154"/>
+              <a:gd name="connsiteX4" fmla="*/ 145293 w 539079"/>
+              <a:gd name="connsiteY4" fmla="*/ 215258 h 216154"/>
+              <a:gd name="connsiteX5" fmla="*/ 0 w 539079"/>
+              <a:gd name="connsiteY5" fmla="*/ 129155 h 216154"/>
+              <a:gd name="connsiteX6" fmla="*/ 26906 w 539079"/>
+              <a:gd name="connsiteY6" fmla="*/ 0 h 216154"/>
+              <a:gd name="connsiteX0" fmla="*/ 26906 w 551280"/>
+              <a:gd name="connsiteY0" fmla="*/ 0 h 216154"/>
+              <a:gd name="connsiteX1" fmla="*/ 161436 w 551280"/>
+              <a:gd name="connsiteY1" fmla="*/ 86103 h 216154"/>
+              <a:gd name="connsiteX2" fmla="*/ 495070 w 551280"/>
+              <a:gd name="connsiteY2" fmla="*/ 53814 h 216154"/>
+              <a:gd name="connsiteX3" fmla="*/ 516595 w 551280"/>
+              <a:gd name="connsiteY3" fmla="*/ 166825 h 216154"/>
+              <a:gd name="connsiteX4" fmla="*/ 145293 w 551280"/>
+              <a:gd name="connsiteY4" fmla="*/ 215258 h 216154"/>
+              <a:gd name="connsiteX5" fmla="*/ 0 w 551280"/>
+              <a:gd name="connsiteY5" fmla="*/ 129155 h 216154"/>
+              <a:gd name="connsiteX6" fmla="*/ 26906 w 551280"/>
+              <a:gd name="connsiteY6" fmla="*/ 0 h 216154"/>
+              <a:gd name="connsiteX0" fmla="*/ 26906 w 516595"/>
+              <a:gd name="connsiteY0" fmla="*/ 0 h 216154"/>
+              <a:gd name="connsiteX1" fmla="*/ 161436 w 516595"/>
+              <a:gd name="connsiteY1" fmla="*/ 86103 h 216154"/>
+              <a:gd name="connsiteX2" fmla="*/ 495070 w 516595"/>
+              <a:gd name="connsiteY2" fmla="*/ 53814 h 216154"/>
+              <a:gd name="connsiteX3" fmla="*/ 516595 w 516595"/>
+              <a:gd name="connsiteY3" fmla="*/ 166825 h 216154"/>
+              <a:gd name="connsiteX4" fmla="*/ 145293 w 516595"/>
+              <a:gd name="connsiteY4" fmla="*/ 215258 h 216154"/>
+              <a:gd name="connsiteX5" fmla="*/ 0 w 516595"/>
+              <a:gd name="connsiteY5" fmla="*/ 129155 h 216154"/>
+              <a:gd name="connsiteX6" fmla="*/ 26906 w 516595"/>
+              <a:gd name="connsiteY6" fmla="*/ 0 h 216154"/>
+            </a:gdLst>
+            <a:ahLst/>
+            <a:cxnLst>
+              <a:cxn ang="0">
+                <a:pos x="connsiteX0" y="connsiteY0"/>
+              </a:cxn>
+              <a:cxn ang="0">
+                <a:pos x="connsiteX1" y="connsiteY1"/>
+              </a:cxn>
+              <a:cxn ang="0">
+                <a:pos x="connsiteX2" y="connsiteY2"/>
+              </a:cxn>
+              <a:cxn ang="0">
+                <a:pos x="connsiteX3" y="connsiteY3"/>
+              </a:cxn>
+              <a:cxn ang="0">
+                <a:pos x="connsiteX4" y="connsiteY4"/>
+              </a:cxn>
+              <a:cxn ang="0">
+                <a:pos x="connsiteX5" y="connsiteY5"/>
+              </a:cxn>
+              <a:cxn ang="0">
+                <a:pos x="connsiteX6" y="connsiteY6"/>
+              </a:cxn>
+            </a:cxnLst>
+            <a:rect l="l" t="t" r="r" b="b"/>
+            <a:pathLst>
+              <a:path w="516595" h="216154">
+                <a:moveTo>
+                  <a:pt x="26906" y="0"/>
+                </a:moveTo>
+                <a:cubicBezTo>
+                  <a:pt x="30942" y="38567"/>
+                  <a:pt x="83409" y="77134"/>
+                  <a:pt x="161436" y="86103"/>
+                </a:cubicBezTo>
+                <a:cubicBezTo>
+                  <a:pt x="239463" y="95072"/>
+                  <a:pt x="435877" y="40360"/>
+                  <a:pt x="495070" y="53814"/>
+                </a:cubicBezTo>
+                <a:lnTo>
+                  <a:pt x="516595" y="166825"/>
+                </a:lnTo>
+                <a:cubicBezTo>
+                  <a:pt x="458299" y="193732"/>
+                  <a:pt x="231392" y="221536"/>
+                  <a:pt x="145293" y="215258"/>
+                </a:cubicBezTo>
+                <a:cubicBezTo>
+                  <a:pt x="59194" y="208980"/>
+                  <a:pt x="0" y="129155"/>
+                  <a:pt x="0" y="129155"/>
+                </a:cubicBezTo>
+                <a:lnTo>
+                  <a:pt x="26906" y="0"/>
+                </a:lnTo>
+                <a:close/>
+              </a:path>
+            </a:pathLst>
+          </a:custGeom>
+          <a:ln>
+            <a:solidFill>
+              <a:srgbClr val="FFFFFF"/>
+            </a:solidFill>
+          </a:ln>
+        </p:spPr>
+        <p:style>
+          <a:lnRef idx="2">
+            <a:schemeClr val="accent1"/>
+          </a:lnRef>
+          <a:fillRef idx="0">
+            <a:schemeClr val="accent1"/>
+          </a:fillRef>
+          <a:effectRef idx="1">
+            <a:schemeClr val="accent1"/>
+          </a:effectRef>
+          <a:fontRef idx="minor">
+            <a:schemeClr val="tx1"/>
+          </a:fontRef>
+        </p:style>
+        <p:txBody>
+          <a:bodyPr rtlCol="0" anchor="ctr"/>
+          <a:lstStyle/>
+          <a:p>
+            <a:pPr algn="ctr"/>
+            <a:endParaRPr lang="en-US"/>
+          </a:p>
+        </p:txBody>
+      </p:sp>
+      <p:cxnSp>
+        <p:nvCxnSpPr>
+          <p:cNvPr id="31" name="Straight Connector 30"/>
+          <p:cNvCxnSpPr/>
+          <p:nvPr/>
+        </p:nvCxnSpPr>
+        <p:spPr>
+          <a:xfrm>
+            <a:off x="3411679" y="3923088"/>
+            <a:ext cx="0" cy="123771"/>
+          </a:xfrm>
+          <a:prstGeom prst="line">
+            <a:avLst/>
+          </a:prstGeom>
+          <a:ln>
+            <a:solidFill>
+              <a:srgbClr val="FFFFFF"/>
+            </a:solidFill>
+          </a:ln>
+        </p:spPr>
+        <p:style>
+          <a:lnRef idx="2">
+            <a:schemeClr val="accent1"/>
+          </a:lnRef>
+          <a:fillRef idx="0">
+            <a:schemeClr val="accent1"/>
+          </a:fillRef>
+          <a:effectRef idx="1">
+            <a:schemeClr val="accent1"/>
+          </a:effectRef>
+          <a:fontRef idx="minor">
+            <a:schemeClr val="tx1"/>
+          </a:fontRef>
+        </p:style>
+      </p:cxnSp>
+      <p:cxnSp>
+        <p:nvCxnSpPr>
+          <p:cNvPr id="32" name="Straight Connector 31"/>
+          <p:cNvCxnSpPr/>
+          <p:nvPr/>
+        </p:nvCxnSpPr>
+        <p:spPr>
+          <a:xfrm>
+            <a:off x="3461836" y="3956275"/>
+            <a:ext cx="0" cy="123771"/>
+          </a:xfrm>
+          <a:prstGeom prst="line">
+            <a:avLst/>
+          </a:prstGeom>
+          <a:ln>
+            <a:solidFill>
+              <a:srgbClr val="FFFFFF"/>
+            </a:solidFill>
+          </a:ln>
+        </p:spPr>
+        <p:style>
+          <a:lnRef idx="2">
+            <a:schemeClr val="accent1"/>
+          </a:lnRef>
+          <a:fillRef idx="0">
+            <a:schemeClr val="accent1"/>
+          </a:fillRef>
+          <a:effectRef idx="1">
+            <a:schemeClr val="accent1"/>
+          </a:effectRef>
+          <a:fontRef idx="minor">
+            <a:schemeClr val="tx1"/>
+          </a:fontRef>
+        </p:style>
+      </p:cxnSp>
+      <p:cxnSp>
+        <p:nvCxnSpPr>
+          <p:cNvPr id="33" name="Straight Connector 32"/>
+          <p:cNvCxnSpPr/>
+          <p:nvPr/>
+        </p:nvCxnSpPr>
+        <p:spPr>
+          <a:xfrm>
+            <a:off x="3515649" y="3956275"/>
+            <a:ext cx="0" cy="123771"/>
+          </a:xfrm>
+          <a:prstGeom prst="line">
+            <a:avLst/>
+          </a:prstGeom>
+          <a:ln>
+            <a:solidFill>
+              <a:srgbClr val="FFFFFF"/>
+            </a:solidFill>
+          </a:ln>
+        </p:spPr>
+        <p:style>
+          <a:lnRef idx="2">
+            <a:schemeClr val="accent1"/>
+          </a:lnRef>
+          <a:fillRef idx="0">
+            <a:schemeClr val="accent1"/>
+          </a:fillRef>
+          <a:effectRef idx="1">
+            <a:schemeClr val="accent1"/>
+          </a:effectRef>
+          <a:fontRef idx="minor">
+            <a:schemeClr val="tx1"/>
+          </a:fontRef>
+        </p:style>
+      </p:cxnSp>
+      <p:cxnSp>
+        <p:nvCxnSpPr>
+          <p:cNvPr id="34" name="Straight Connector 33"/>
+          <p:cNvCxnSpPr/>
+          <p:nvPr/>
+        </p:nvCxnSpPr>
+        <p:spPr>
+          <a:xfrm>
+            <a:off x="3564079" y="3956275"/>
+            <a:ext cx="0" cy="123771"/>
+          </a:xfrm>
+          <a:prstGeom prst="line">
+            <a:avLst/>
+          </a:prstGeom>
+          <a:ln>
+            <a:solidFill>
+              <a:srgbClr val="FFFFFF"/>
+            </a:solidFill>
+          </a:ln>
+        </p:spPr>
+        <p:style>
+          <a:lnRef idx="2">
+            <a:schemeClr val="accent1"/>
+          </a:lnRef>
+          <a:fillRef idx="0">
+            <a:schemeClr val="accent1"/>
+          </a:fillRef>
+          <a:effectRef idx="1">
+            <a:schemeClr val="accent1"/>
+          </a:effectRef>
+          <a:fontRef idx="minor">
+            <a:schemeClr val="tx1"/>
+          </a:fontRef>
+        </p:style>
+      </p:cxnSp>
+      <p:cxnSp>
+        <p:nvCxnSpPr>
+          <p:cNvPr id="35" name="Straight Connector 34"/>
+          <p:cNvCxnSpPr/>
+          <p:nvPr/>
+        </p:nvCxnSpPr>
+        <p:spPr>
+          <a:xfrm>
+            <a:off x="3622764" y="3949993"/>
+            <a:ext cx="0" cy="123771"/>
+          </a:xfrm>
+          <a:prstGeom prst="line">
+            <a:avLst/>
+          </a:prstGeom>
+          <a:ln>
+            <a:solidFill>
+              <a:srgbClr val="FFFFFF"/>
+            </a:solidFill>
+          </a:ln>
+        </p:spPr>
+        <p:style>
+          <a:lnRef idx="2">
+            <a:schemeClr val="accent1"/>
+          </a:lnRef>
+          <a:fillRef idx="0">
+            <a:schemeClr val="accent1"/>
+          </a:fillRef>
+          <a:effectRef idx="1">
+            <a:schemeClr val="accent1"/>
+          </a:effectRef>
+          <a:fontRef idx="minor">
+            <a:schemeClr val="tx1"/>
+          </a:fontRef>
+        </p:style>
+      </p:cxnSp>
+      <p:cxnSp>
+        <p:nvCxnSpPr>
+          <p:cNvPr id="36" name="Straight Connector 35"/>
+          <p:cNvCxnSpPr/>
+          <p:nvPr/>
+        </p:nvCxnSpPr>
+        <p:spPr>
+          <a:xfrm>
+            <a:off x="3682465" y="3933850"/>
+            <a:ext cx="0" cy="123771"/>
+          </a:xfrm>
+          <a:prstGeom prst="line">
+            <a:avLst/>
+          </a:prstGeom>
+          <a:ln>
+            <a:solidFill>
+              <a:srgbClr val="FFFFFF"/>
+            </a:solidFill>
+          </a:ln>
+        </p:spPr>
+        <p:style>
+          <a:lnRef idx="2">
+            <a:schemeClr val="accent1"/>
+          </a:lnRef>
+          <a:fillRef idx="0">
+            <a:schemeClr val="accent1"/>
+          </a:fillRef>
+          <a:effectRef idx="1">
+            <a:schemeClr val="accent1"/>
+          </a:effectRef>
+          <a:fontRef idx="minor">
+            <a:schemeClr val="tx1"/>
+          </a:fontRef>
+        </p:style>
+      </p:cxnSp>
+      <p:cxnSp>
+        <p:nvCxnSpPr>
+          <p:cNvPr id="38" name="Straight Connector 37"/>
+          <p:cNvCxnSpPr/>
+          <p:nvPr/>
+        </p:nvCxnSpPr>
+        <p:spPr>
+          <a:xfrm>
+            <a:off x="3736734" y="3926982"/>
+            <a:ext cx="0" cy="123771"/>
+          </a:xfrm>
+          <a:prstGeom prst="line">
+            <a:avLst/>
+          </a:prstGeom>
+          <a:ln>
+            <a:solidFill>
+              <a:srgbClr val="FFFFFF"/>
+            </a:solidFill>
+          </a:ln>
+        </p:spPr>
+        <p:style>
+          <a:lnRef idx="2">
+            <a:schemeClr val="accent1"/>
+          </a:lnRef>
+          <a:fillRef idx="0">
+            <a:schemeClr val="accent1"/>
+          </a:fillRef>
+          <a:effectRef idx="1">
+            <a:schemeClr val="accent1"/>
+          </a:effectRef>
+          <a:fontRef idx="minor">
+            <a:schemeClr val="tx1"/>
+          </a:fontRef>
+        </p:style>
+      </p:cxnSp>
+      <p:sp>
+        <p:nvSpPr>
+          <p:cNvPr id="39" name="Rectangle 38"/>
+          <p:cNvSpPr/>
+          <p:nvPr/>
+        </p:nvSpPr>
+        <p:spPr>
+          <a:xfrm>
+            <a:off x="643370" y="1545818"/>
+            <a:ext cx="7695373" cy="3601338"/>
+          </a:xfrm>
+          <a:prstGeom prst="rect">
+            <a:avLst/>
+          </a:prstGeom>
+          <a:noFill/>
+          <a:ln>
+            <a:noFill/>
+          </a:ln>
+        </p:spPr>
+        <p:style>
+          <a:lnRef idx="1">
+            <a:schemeClr val="accent1"/>
+          </a:lnRef>
+          <a:fillRef idx="3">
+            <a:schemeClr val="accent1"/>
+          </a:fillRef>
+          <a:effectRef idx="2">
+            <a:schemeClr val="accent1"/>
+          </a:effectRef>
+          <a:fontRef idx="minor">
+            <a:schemeClr val="lt1"/>
+          </a:fontRef>
+        </p:style>
+        <p:txBody>
+          <a:bodyPr rtlCol="0" anchor="ctr"/>
+          <a:lstStyle/>
+          <a:p>
+            <a:pPr algn="ctr"/>
+            <a:endParaRPr lang="en-US"/>
+          </a:p>
+        </p:txBody>
+      </p:sp>
+    </p:spTree>
+    <p:extLst>
+      <p:ext uri="{BB962C8B-B14F-4D97-AF65-F5344CB8AC3E}">
+        <p14:creationId xmlns:p14="http://schemas.microsoft.com/office/powerpoint/2010/main" val="90940953"/>
+      </p:ext>
+    </p:extLst>
+  </p:cSld>
+  <p:clrMapOvr>
+    <a:masterClrMapping/>
+  </p:clrMapOvr>
+</p:sld>
+</file>
+
+<file path=ppt/slides/slide16.xml><?xml version="1.0" encoding="utf-8"?>
+<p:sld xmlns:a="http://schemas.openxmlformats.org/drawingml/2006/main" xmlns:r="http://schemas.openxmlformats.org/officeDocument/2006/relationships" xmlns:p="http://schemas.openxmlformats.org/presentationml/2006/main">
+  <p:cSld>
+    <p:spTree>
+      <p:nvGrpSpPr>
+        <p:cNvPr id="1" name=""/>
+        <p:cNvGrpSpPr/>
+        <p:nvPr/>
+      </p:nvGrpSpPr>
+      <p:grpSpPr>
+        <a:xfrm>
+          <a:off x="0" y="0"/>
+          <a:ext cx="0" cy="0"/>
+          <a:chOff x="0" y="0"/>
+          <a:chExt cx="0" cy="0"/>
+        </a:xfrm>
+      </p:grpSpPr>
+      <p:sp>
+        <p:nvSpPr>
+          <p:cNvPr id="3" name="Chord 3"/>
+          <p:cNvSpPr/>
+          <p:nvPr/>
+        </p:nvSpPr>
+        <p:spPr>
+          <a:xfrm>
+            <a:off x="3165112" y="4269902"/>
+            <a:ext cx="791321" cy="516772"/>
+          </a:xfrm>
+          <a:custGeom>
+            <a:avLst/>
+            <a:gdLst>
+              <a:gd name="connsiteX0" fmla="*/ 16608 w 2232278"/>
+              <a:gd name="connsiteY0" fmla="*/ 1307968 h 2232278"/>
+              <a:gd name="connsiteX1" fmla="*/ 589005 w 2232278"/>
+              <a:gd name="connsiteY1" fmla="*/ 132321 h 2232278"/>
+              <a:gd name="connsiteX2" fmla="*/ 1884880 w 2232278"/>
+              <a:gd name="connsiteY2" fmla="*/ 306939 h 2232278"/>
+              <a:gd name="connsiteX3" fmla="*/ 2125677 w 2232278"/>
+              <a:gd name="connsiteY3" fmla="*/ 1592163 h 2232278"/>
+              <a:gd name="connsiteX4" fmla="*/ 16608 w 2232278"/>
+              <a:gd name="connsiteY4" fmla="*/ 1307968 h 2232278"/>
+              <a:gd name="connsiteX0" fmla="*/ 16669 w 2232378"/>
+              <a:gd name="connsiteY0" fmla="*/ 1307991 h 1619407"/>
+              <a:gd name="connsiteX1" fmla="*/ 589066 w 2232378"/>
+              <a:gd name="connsiteY1" fmla="*/ 132344 h 1619407"/>
+              <a:gd name="connsiteX2" fmla="*/ 1884941 w 2232378"/>
+              <a:gd name="connsiteY2" fmla="*/ 306962 h 1619407"/>
+              <a:gd name="connsiteX3" fmla="*/ 2125738 w 2232378"/>
+              <a:gd name="connsiteY3" fmla="*/ 1592186 h 1619407"/>
+              <a:gd name="connsiteX4" fmla="*/ 16669 w 2232378"/>
+              <a:gd name="connsiteY4" fmla="*/ 1307991 h 1619407"/>
+              <a:gd name="connsiteX0" fmla="*/ 16669 w 2232378"/>
+              <a:gd name="connsiteY0" fmla="*/ 1307991 h 1698147"/>
+              <a:gd name="connsiteX1" fmla="*/ 589066 w 2232378"/>
+              <a:gd name="connsiteY1" fmla="*/ 132344 h 1698147"/>
+              <a:gd name="connsiteX2" fmla="*/ 1884941 w 2232378"/>
+              <a:gd name="connsiteY2" fmla="*/ 306962 h 1698147"/>
+              <a:gd name="connsiteX3" fmla="*/ 2125738 w 2232378"/>
+              <a:gd name="connsiteY3" fmla="*/ 1592186 h 1698147"/>
+              <a:gd name="connsiteX4" fmla="*/ 16669 w 2232378"/>
+              <a:gd name="connsiteY4" fmla="*/ 1307991 h 1698147"/>
+              <a:gd name="connsiteX0" fmla="*/ 16669 w 2232378"/>
+              <a:gd name="connsiteY0" fmla="*/ 1307991 h 1698147"/>
+              <a:gd name="connsiteX1" fmla="*/ 589066 w 2232378"/>
+              <a:gd name="connsiteY1" fmla="*/ 132344 h 1698147"/>
+              <a:gd name="connsiteX2" fmla="*/ 1884941 w 2232378"/>
+              <a:gd name="connsiteY2" fmla="*/ 306962 h 1698147"/>
+              <a:gd name="connsiteX3" fmla="*/ 2125738 w 2232378"/>
+              <a:gd name="connsiteY3" fmla="*/ 1592186 h 1698147"/>
+              <a:gd name="connsiteX4" fmla="*/ 16669 w 2232378"/>
+              <a:gd name="connsiteY4" fmla="*/ 1307991 h 1698147"/>
+              <a:gd name="connsiteX0" fmla="*/ 16669 w 2232378"/>
+              <a:gd name="connsiteY0" fmla="*/ 1175646 h 1565802"/>
+              <a:gd name="connsiteX1" fmla="*/ 589066 w 2232378"/>
+              <a:gd name="connsiteY1" fmla="*/ -1 h 1565802"/>
+              <a:gd name="connsiteX2" fmla="*/ 1884941 w 2232378"/>
+              <a:gd name="connsiteY2" fmla="*/ 174617 h 1565802"/>
+              <a:gd name="connsiteX3" fmla="*/ 2125738 w 2232378"/>
+              <a:gd name="connsiteY3" fmla="*/ 1459841 h 1565802"/>
+              <a:gd name="connsiteX4" fmla="*/ 16669 w 2232378"/>
+              <a:gd name="connsiteY4" fmla="*/ 1175646 h 1565802"/>
+              <a:gd name="connsiteX0" fmla="*/ 16669 w 2232378"/>
+              <a:gd name="connsiteY0" fmla="*/ 1175648 h 1565804"/>
+              <a:gd name="connsiteX1" fmla="*/ 589066 w 2232378"/>
+              <a:gd name="connsiteY1" fmla="*/ 1 h 1565804"/>
+              <a:gd name="connsiteX2" fmla="*/ 1884941 w 2232378"/>
+              <a:gd name="connsiteY2" fmla="*/ 174619 h 1565804"/>
+              <a:gd name="connsiteX3" fmla="*/ 2125738 w 2232378"/>
+              <a:gd name="connsiteY3" fmla="*/ 1459843 h 1565804"/>
+              <a:gd name="connsiteX4" fmla="*/ 16669 w 2232378"/>
+              <a:gd name="connsiteY4" fmla="*/ 1175648 h 1565804"/>
+              <a:gd name="connsiteX0" fmla="*/ 16669 w 2232378"/>
+              <a:gd name="connsiteY0" fmla="*/ 1175646 h 1565802"/>
+              <a:gd name="connsiteX1" fmla="*/ 589066 w 2232378"/>
+              <a:gd name="connsiteY1" fmla="*/ -1 h 1565802"/>
+              <a:gd name="connsiteX2" fmla="*/ 1884941 w 2232378"/>
+              <a:gd name="connsiteY2" fmla="*/ 174617 h 1565802"/>
+              <a:gd name="connsiteX3" fmla="*/ 2125738 w 2232378"/>
+              <a:gd name="connsiteY3" fmla="*/ 1459841 h 1565802"/>
+              <a:gd name="connsiteX4" fmla="*/ 16669 w 2232378"/>
+              <a:gd name="connsiteY4" fmla="*/ 1175646 h 1565802"/>
+            </a:gdLst>
+            <a:ahLst/>
+            <a:cxnLst>
+              <a:cxn ang="0">
+                <a:pos x="connsiteX0" y="connsiteY0"/>
+              </a:cxn>
+              <a:cxn ang="0">
+                <a:pos x="connsiteX1" y="connsiteY1"/>
+              </a:cxn>
+              <a:cxn ang="0">
+                <a:pos x="connsiteX2" y="connsiteY2"/>
+              </a:cxn>
+              <a:cxn ang="0">
+                <a:pos x="connsiteX3" y="connsiteY3"/>
+              </a:cxn>
+              <a:cxn ang="0">
+                <a:pos x="connsiteX4" y="connsiteY4"/>
+              </a:cxn>
+            </a:cxnLst>
+            <a:rect l="l" t="t" r="r" b="b"/>
+            <a:pathLst>
+              <a:path w="2232378" h="1565802">
+                <a:moveTo>
+                  <a:pt x="16669" y="1175646"/>
+                </a:moveTo>
+                <a:cubicBezTo>
+                  <a:pt x="-66084" y="701323"/>
+                  <a:pt x="164660" y="227398"/>
+                  <a:pt x="589066" y="-1"/>
+                </a:cubicBezTo>
+                <a:cubicBezTo>
+                  <a:pt x="1013471" y="543761"/>
+                  <a:pt x="1715366" y="47123"/>
+                  <a:pt x="1884941" y="174617"/>
+                </a:cubicBezTo>
+                <a:cubicBezTo>
+                  <a:pt x="2234019" y="506242"/>
+                  <a:pt x="2331089" y="1024340"/>
+                  <a:pt x="2125738" y="1459841"/>
+                </a:cubicBezTo>
+                <a:cubicBezTo>
+                  <a:pt x="1461202" y="1570351"/>
+                  <a:pt x="886471" y="1719347"/>
+                  <a:pt x="16669" y="1175646"/>
+                </a:cubicBezTo>
+                <a:close/>
+              </a:path>
+            </a:pathLst>
+          </a:custGeom>
+          <a:noFill/>
+          <a:ln w="38100" cmpd="sng">
+            <a:solidFill>
+              <a:srgbClr val="FFFF00"/>
+            </a:solidFill>
+          </a:ln>
+        </p:spPr>
+        <p:style>
+          <a:lnRef idx="1">
+            <a:schemeClr val="accent1"/>
+          </a:lnRef>
+          <a:fillRef idx="3">
+            <a:schemeClr val="accent1"/>
+          </a:fillRef>
+          <a:effectRef idx="2">
+            <a:schemeClr val="accent1"/>
+          </a:effectRef>
+          <a:fontRef idx="minor">
+            <a:schemeClr val="lt1"/>
+          </a:fontRef>
+        </p:style>
+        <p:txBody>
+          <a:bodyPr rtlCol="0" anchor="ctr"/>
+          <a:lstStyle/>
+          <a:p>
+            <a:pPr algn="ctr"/>
+            <a:endParaRPr lang="en-US"/>
+          </a:p>
+        </p:txBody>
+      </p:sp>
+      <p:sp>
+        <p:nvSpPr>
+          <p:cNvPr id="4" name="Oval 3"/>
+          <p:cNvSpPr/>
+          <p:nvPr/>
+        </p:nvSpPr>
+        <p:spPr>
+          <a:xfrm>
+            <a:off x="3338667" y="3772946"/>
+            <a:ext cx="510522" cy="496957"/>
+          </a:xfrm>
+          <a:prstGeom prst="ellipse">
+            <a:avLst/>
+          </a:prstGeom>
+          <a:noFill/>
+          <a:ln w="38100" cmpd="sng">
+            <a:solidFill>
+              <a:schemeClr val="bg1"/>
+            </a:solidFill>
+          </a:ln>
+        </p:spPr>
+        <p:style>
+          <a:lnRef idx="1">
+            <a:schemeClr val="accent1"/>
+          </a:lnRef>
+          <a:fillRef idx="3">
+            <a:schemeClr val="accent1"/>
+          </a:fillRef>
+          <a:effectRef idx="2">
+            <a:schemeClr val="accent1"/>
+          </a:effectRef>
+          <a:fontRef idx="minor">
+            <a:schemeClr val="lt1"/>
+          </a:fontRef>
+        </p:style>
+        <p:txBody>
+          <a:bodyPr rtlCol="0" anchor="ctr"/>
+          <a:lstStyle/>
+          <a:p>
+            <a:pPr algn="ctr"/>
+            <a:endParaRPr lang="en-US"/>
+          </a:p>
+        </p:txBody>
+      </p:sp>
+      <p:sp>
+        <p:nvSpPr>
+          <p:cNvPr id="8" name="Chord 3"/>
+          <p:cNvSpPr/>
+          <p:nvPr/>
+        </p:nvSpPr>
+        <p:spPr>
+          <a:xfrm>
+            <a:off x="4774691" y="4269903"/>
+            <a:ext cx="791321" cy="516772"/>
+          </a:xfrm>
+          <a:custGeom>
+            <a:avLst/>
+            <a:gdLst>
+              <a:gd name="connsiteX0" fmla="*/ 16608 w 2232278"/>
+              <a:gd name="connsiteY0" fmla="*/ 1307968 h 2232278"/>
+              <a:gd name="connsiteX1" fmla="*/ 589005 w 2232278"/>
+              <a:gd name="connsiteY1" fmla="*/ 132321 h 2232278"/>
+              <a:gd name="connsiteX2" fmla="*/ 1884880 w 2232278"/>
+              <a:gd name="connsiteY2" fmla="*/ 306939 h 2232278"/>
+              <a:gd name="connsiteX3" fmla="*/ 2125677 w 2232278"/>
+              <a:gd name="connsiteY3" fmla="*/ 1592163 h 2232278"/>
+              <a:gd name="connsiteX4" fmla="*/ 16608 w 2232278"/>
+              <a:gd name="connsiteY4" fmla="*/ 1307968 h 2232278"/>
+              <a:gd name="connsiteX0" fmla="*/ 16669 w 2232378"/>
+              <a:gd name="connsiteY0" fmla="*/ 1307991 h 1619407"/>
+              <a:gd name="connsiteX1" fmla="*/ 589066 w 2232378"/>
+              <a:gd name="connsiteY1" fmla="*/ 132344 h 1619407"/>
+              <a:gd name="connsiteX2" fmla="*/ 1884941 w 2232378"/>
+              <a:gd name="connsiteY2" fmla="*/ 306962 h 1619407"/>
+              <a:gd name="connsiteX3" fmla="*/ 2125738 w 2232378"/>
+              <a:gd name="connsiteY3" fmla="*/ 1592186 h 1619407"/>
+              <a:gd name="connsiteX4" fmla="*/ 16669 w 2232378"/>
+              <a:gd name="connsiteY4" fmla="*/ 1307991 h 1619407"/>
+              <a:gd name="connsiteX0" fmla="*/ 16669 w 2232378"/>
+              <a:gd name="connsiteY0" fmla="*/ 1307991 h 1698147"/>
+              <a:gd name="connsiteX1" fmla="*/ 589066 w 2232378"/>
+              <a:gd name="connsiteY1" fmla="*/ 132344 h 1698147"/>
+              <a:gd name="connsiteX2" fmla="*/ 1884941 w 2232378"/>
+              <a:gd name="connsiteY2" fmla="*/ 306962 h 1698147"/>
+              <a:gd name="connsiteX3" fmla="*/ 2125738 w 2232378"/>
+              <a:gd name="connsiteY3" fmla="*/ 1592186 h 1698147"/>
+              <a:gd name="connsiteX4" fmla="*/ 16669 w 2232378"/>
+              <a:gd name="connsiteY4" fmla="*/ 1307991 h 1698147"/>
+              <a:gd name="connsiteX0" fmla="*/ 16669 w 2232378"/>
+              <a:gd name="connsiteY0" fmla="*/ 1307991 h 1698147"/>
+              <a:gd name="connsiteX1" fmla="*/ 589066 w 2232378"/>
+              <a:gd name="connsiteY1" fmla="*/ 132344 h 1698147"/>
+              <a:gd name="connsiteX2" fmla="*/ 1884941 w 2232378"/>
+              <a:gd name="connsiteY2" fmla="*/ 306962 h 1698147"/>
+              <a:gd name="connsiteX3" fmla="*/ 2125738 w 2232378"/>
+              <a:gd name="connsiteY3" fmla="*/ 1592186 h 1698147"/>
+              <a:gd name="connsiteX4" fmla="*/ 16669 w 2232378"/>
+              <a:gd name="connsiteY4" fmla="*/ 1307991 h 1698147"/>
+              <a:gd name="connsiteX0" fmla="*/ 16669 w 2232378"/>
+              <a:gd name="connsiteY0" fmla="*/ 1175646 h 1565802"/>
+              <a:gd name="connsiteX1" fmla="*/ 589066 w 2232378"/>
+              <a:gd name="connsiteY1" fmla="*/ -1 h 1565802"/>
+              <a:gd name="connsiteX2" fmla="*/ 1884941 w 2232378"/>
+              <a:gd name="connsiteY2" fmla="*/ 174617 h 1565802"/>
+              <a:gd name="connsiteX3" fmla="*/ 2125738 w 2232378"/>
+              <a:gd name="connsiteY3" fmla="*/ 1459841 h 1565802"/>
+              <a:gd name="connsiteX4" fmla="*/ 16669 w 2232378"/>
+              <a:gd name="connsiteY4" fmla="*/ 1175646 h 1565802"/>
+              <a:gd name="connsiteX0" fmla="*/ 16669 w 2232378"/>
+              <a:gd name="connsiteY0" fmla="*/ 1175648 h 1565804"/>
+              <a:gd name="connsiteX1" fmla="*/ 589066 w 2232378"/>
+              <a:gd name="connsiteY1" fmla="*/ 1 h 1565804"/>
+              <a:gd name="connsiteX2" fmla="*/ 1884941 w 2232378"/>
+              <a:gd name="connsiteY2" fmla="*/ 174619 h 1565804"/>
+              <a:gd name="connsiteX3" fmla="*/ 2125738 w 2232378"/>
+              <a:gd name="connsiteY3" fmla="*/ 1459843 h 1565804"/>
+              <a:gd name="connsiteX4" fmla="*/ 16669 w 2232378"/>
+              <a:gd name="connsiteY4" fmla="*/ 1175648 h 1565804"/>
+              <a:gd name="connsiteX0" fmla="*/ 16669 w 2232378"/>
+              <a:gd name="connsiteY0" fmla="*/ 1175646 h 1565802"/>
+              <a:gd name="connsiteX1" fmla="*/ 589066 w 2232378"/>
+              <a:gd name="connsiteY1" fmla="*/ -1 h 1565802"/>
+              <a:gd name="connsiteX2" fmla="*/ 1884941 w 2232378"/>
+              <a:gd name="connsiteY2" fmla="*/ 174617 h 1565802"/>
+              <a:gd name="connsiteX3" fmla="*/ 2125738 w 2232378"/>
+              <a:gd name="connsiteY3" fmla="*/ 1459841 h 1565802"/>
+              <a:gd name="connsiteX4" fmla="*/ 16669 w 2232378"/>
+              <a:gd name="connsiteY4" fmla="*/ 1175646 h 1565802"/>
+            </a:gdLst>
+            <a:ahLst/>
+            <a:cxnLst>
+              <a:cxn ang="0">
+                <a:pos x="connsiteX0" y="connsiteY0"/>
+              </a:cxn>
+              <a:cxn ang="0">
+                <a:pos x="connsiteX1" y="connsiteY1"/>
+              </a:cxn>
+              <a:cxn ang="0">
+                <a:pos x="connsiteX2" y="connsiteY2"/>
+              </a:cxn>
+              <a:cxn ang="0">
+                <a:pos x="connsiteX3" y="connsiteY3"/>
+              </a:cxn>
+              <a:cxn ang="0">
+                <a:pos x="connsiteX4" y="connsiteY4"/>
+              </a:cxn>
+            </a:cxnLst>
+            <a:rect l="l" t="t" r="r" b="b"/>
+            <a:pathLst>
+              <a:path w="2232378" h="1565802">
+                <a:moveTo>
+                  <a:pt x="16669" y="1175646"/>
+                </a:moveTo>
+                <a:cubicBezTo>
+                  <a:pt x="-66084" y="701323"/>
+                  <a:pt x="164660" y="227398"/>
+                  <a:pt x="589066" y="-1"/>
+                </a:cubicBezTo>
+                <a:cubicBezTo>
+                  <a:pt x="1013471" y="543761"/>
+                  <a:pt x="1715366" y="47123"/>
+                  <a:pt x="1884941" y="174617"/>
+                </a:cubicBezTo>
+                <a:cubicBezTo>
+                  <a:pt x="2234019" y="506242"/>
+                  <a:pt x="2331089" y="1024340"/>
+                  <a:pt x="2125738" y="1459841"/>
+                </a:cubicBezTo>
+                <a:cubicBezTo>
+                  <a:pt x="1461202" y="1570351"/>
+                  <a:pt x="886471" y="1719347"/>
+                  <a:pt x="16669" y="1175646"/>
+                </a:cubicBezTo>
+                <a:close/>
+              </a:path>
+            </a:pathLst>
+          </a:custGeom>
+          <a:noFill/>
+          <a:ln w="38100" cmpd="sng">
+            <a:solidFill>
+              <a:srgbClr val="FF0000"/>
+            </a:solidFill>
+          </a:ln>
+        </p:spPr>
+        <p:style>
+          <a:lnRef idx="1">
+            <a:schemeClr val="accent1"/>
+          </a:lnRef>
+          <a:fillRef idx="3">
+            <a:schemeClr val="accent1"/>
+          </a:fillRef>
+          <a:effectRef idx="2">
+            <a:schemeClr val="accent1"/>
+          </a:effectRef>
+          <a:fontRef idx="minor">
+            <a:schemeClr val="lt1"/>
+          </a:fontRef>
+        </p:style>
+        <p:txBody>
+          <a:bodyPr rtlCol="0" anchor="ctr"/>
+          <a:lstStyle/>
+          <a:p>
+            <a:pPr algn="ctr"/>
+            <a:endParaRPr lang="en-US"/>
+          </a:p>
+        </p:txBody>
+      </p:sp>
+      <p:sp>
+        <p:nvSpPr>
+          <p:cNvPr id="9" name="Oval 8"/>
+          <p:cNvSpPr/>
+          <p:nvPr/>
+        </p:nvSpPr>
+        <p:spPr>
+          <a:xfrm>
+            <a:off x="4948246" y="3772947"/>
+            <a:ext cx="510522" cy="496957"/>
+          </a:xfrm>
+          <a:prstGeom prst="ellipse">
+            <a:avLst/>
+          </a:prstGeom>
+          <a:noFill/>
+          <a:ln w="38100" cmpd="sng">
+            <a:solidFill>
+              <a:schemeClr val="bg1"/>
+            </a:solidFill>
+          </a:ln>
+        </p:spPr>
+        <p:style>
+          <a:lnRef idx="1">
+            <a:schemeClr val="accent1"/>
+          </a:lnRef>
+          <a:fillRef idx="3">
+            <a:schemeClr val="accent1"/>
+          </a:fillRef>
+          <a:effectRef idx="2">
+            <a:schemeClr val="accent1"/>
+          </a:effectRef>
+          <a:fontRef idx="minor">
+            <a:schemeClr val="lt1"/>
+          </a:fontRef>
+        </p:style>
+        <p:txBody>
+          <a:bodyPr rtlCol="0" anchor="ctr"/>
+          <a:lstStyle/>
+          <a:p>
+            <a:pPr algn="ctr"/>
+            <a:endParaRPr lang="en-US"/>
+          </a:p>
+        </p:txBody>
+      </p:sp>
+      <p:sp>
+        <p:nvSpPr>
+          <p:cNvPr id="10" name="Oval 9"/>
+          <p:cNvSpPr/>
+          <p:nvPr/>
+        </p:nvSpPr>
+        <p:spPr>
+          <a:xfrm>
+            <a:off x="5079248" y="3941040"/>
+            <a:ext cx="41172" cy="93570"/>
+          </a:xfrm>
+          <a:prstGeom prst="ellipse">
+            <a:avLst/>
+          </a:prstGeom>
+          <a:solidFill>
+            <a:srgbClr val="FFFFFF"/>
+          </a:solidFill>
+          <a:ln>
+            <a:noFill/>
+          </a:ln>
+        </p:spPr>
+        <p:style>
+          <a:lnRef idx="1">
+            <a:schemeClr val="accent1"/>
+          </a:lnRef>
+          <a:fillRef idx="3">
+            <a:schemeClr val="accent1"/>
+          </a:fillRef>
+          <a:effectRef idx="2">
+            <a:schemeClr val="accent1"/>
+          </a:effectRef>
+          <a:fontRef idx="minor">
+            <a:schemeClr val="lt1"/>
+          </a:fontRef>
+        </p:style>
+        <p:txBody>
+          <a:bodyPr rtlCol="0" anchor="ctr"/>
+          <a:lstStyle/>
+          <a:p>
+            <a:pPr algn="ctr"/>
+            <a:endParaRPr lang="en-US"/>
+          </a:p>
+        </p:txBody>
+      </p:sp>
+      <p:sp>
+        <p:nvSpPr>
+          <p:cNvPr id="11" name="Oval 10"/>
+          <p:cNvSpPr/>
+          <p:nvPr/>
+        </p:nvSpPr>
+        <p:spPr>
+          <a:xfrm>
+            <a:off x="5218335" y="3941040"/>
+            <a:ext cx="41172" cy="93570"/>
+          </a:xfrm>
+          <a:prstGeom prst="ellipse">
+            <a:avLst/>
+          </a:prstGeom>
+          <a:solidFill>
+            <a:srgbClr val="FFFFFF"/>
+          </a:solidFill>
+          <a:ln>
+            <a:noFill/>
+          </a:ln>
+        </p:spPr>
+        <p:style>
+          <a:lnRef idx="1">
+            <a:schemeClr val="accent1"/>
+          </a:lnRef>
+          <a:fillRef idx="3">
+            <a:schemeClr val="accent1"/>
+          </a:fillRef>
+          <a:effectRef idx="2">
+            <a:schemeClr val="accent1"/>
+          </a:effectRef>
+          <a:fontRef idx="minor">
+            <a:schemeClr val="lt1"/>
+          </a:fontRef>
+        </p:style>
+        <p:txBody>
+          <a:bodyPr rtlCol="0" anchor="ctr"/>
+          <a:lstStyle/>
+          <a:p>
+            <a:pPr algn="ctr"/>
+            <a:endParaRPr lang="en-US"/>
+          </a:p>
+        </p:txBody>
+      </p:sp>
+      <p:cxnSp>
+        <p:nvCxnSpPr>
+          <p:cNvPr id="14" name="Straight Connector 13"/>
+          <p:cNvCxnSpPr/>
+          <p:nvPr/>
+        </p:nvCxnSpPr>
+        <p:spPr>
+          <a:xfrm flipH="1">
+            <a:off x="3622764" y="4436991"/>
+            <a:ext cx="113970" cy="236096"/>
+          </a:xfrm>
+          <a:prstGeom prst="line">
+            <a:avLst/>
+          </a:prstGeom>
+          <a:ln>
+            <a:solidFill>
+              <a:schemeClr val="bg1"/>
+            </a:solidFill>
+          </a:ln>
+        </p:spPr>
+        <p:style>
+          <a:lnRef idx="2">
+            <a:schemeClr val="accent1"/>
+          </a:lnRef>
+          <a:fillRef idx="0">
+            <a:schemeClr val="accent1"/>
+          </a:fillRef>
+          <a:effectRef idx="1">
+            <a:schemeClr val="accent1"/>
+          </a:effectRef>
+          <a:fontRef idx="minor">
+            <a:schemeClr val="tx1"/>
+          </a:fontRef>
+        </p:style>
+      </p:cxnSp>
+      <p:cxnSp>
+        <p:nvCxnSpPr>
+          <p:cNvPr id="16" name="Straight Connector 15"/>
+          <p:cNvCxnSpPr/>
+          <p:nvPr/>
+        </p:nvCxnSpPr>
+        <p:spPr>
+          <a:xfrm>
+            <a:off x="3736734" y="4436991"/>
+            <a:ext cx="38430" cy="170966"/>
+          </a:xfrm>
+          <a:prstGeom prst="line">
+            <a:avLst/>
+          </a:prstGeom>
+          <a:ln>
+            <a:solidFill>
+              <a:schemeClr val="bg1"/>
+            </a:solidFill>
+          </a:ln>
+        </p:spPr>
+        <p:style>
+          <a:lnRef idx="2">
+            <a:schemeClr val="accent1"/>
+          </a:lnRef>
+          <a:fillRef idx="0">
+            <a:schemeClr val="accent1"/>
+          </a:fillRef>
+          <a:effectRef idx="1">
+            <a:schemeClr val="accent1"/>
+          </a:effectRef>
+          <a:fontRef idx="minor">
+            <a:schemeClr val="tx1"/>
+          </a:fontRef>
+        </p:style>
+      </p:cxnSp>
+      <p:cxnSp>
+        <p:nvCxnSpPr>
+          <p:cNvPr id="19" name="Straight Connector 18"/>
+          <p:cNvCxnSpPr/>
+          <p:nvPr/>
+        </p:nvCxnSpPr>
+        <p:spPr>
+          <a:xfrm flipH="1">
+            <a:off x="5251367" y="4436991"/>
+            <a:ext cx="113970" cy="236096"/>
+          </a:xfrm>
+          <a:prstGeom prst="line">
+            <a:avLst/>
+          </a:prstGeom>
+          <a:ln>
+            <a:solidFill>
+              <a:schemeClr val="bg1"/>
+            </a:solidFill>
+          </a:ln>
+        </p:spPr>
+        <p:style>
+          <a:lnRef idx="2">
+            <a:schemeClr val="accent1"/>
+          </a:lnRef>
+          <a:fillRef idx="0">
+            <a:schemeClr val="accent1"/>
+          </a:fillRef>
+          <a:effectRef idx="1">
+            <a:schemeClr val="accent1"/>
+          </a:effectRef>
+          <a:fontRef idx="minor">
+            <a:schemeClr val="tx1"/>
+          </a:fontRef>
+        </p:style>
+      </p:cxnSp>
+      <p:cxnSp>
+        <p:nvCxnSpPr>
+          <p:cNvPr id="20" name="Straight Connector 19"/>
+          <p:cNvCxnSpPr/>
+          <p:nvPr/>
+        </p:nvCxnSpPr>
+        <p:spPr>
+          <a:xfrm>
+            <a:off x="5365337" y="4436991"/>
+            <a:ext cx="38430" cy="170966"/>
+          </a:xfrm>
+          <a:prstGeom prst="line">
+            <a:avLst/>
+          </a:prstGeom>
+          <a:ln>
+            <a:solidFill>
+              <a:schemeClr val="bg1"/>
+            </a:solidFill>
+          </a:ln>
+        </p:spPr>
+        <p:style>
+          <a:lnRef idx="2">
+            <a:schemeClr val="accent1"/>
+          </a:lnRef>
+          <a:fillRef idx="0">
+            <a:schemeClr val="accent1"/>
+          </a:fillRef>
+          <a:effectRef idx="1">
+            <a:schemeClr val="accent1"/>
+          </a:effectRef>
+          <a:fontRef idx="minor">
+            <a:schemeClr val="tx1"/>
+          </a:fontRef>
+        </p:style>
+      </p:cxnSp>
+      <p:sp>
+        <p:nvSpPr>
+          <p:cNvPr id="21" name="Oval Callout 20"/>
+          <p:cNvSpPr/>
+          <p:nvPr/>
+        </p:nvSpPr>
+        <p:spPr>
+          <a:xfrm>
+            <a:off x="905727" y="1788598"/>
+            <a:ext cx="2259385" cy="1649813"/>
+          </a:xfrm>
+          <a:prstGeom prst="wedgeEllipseCallout">
+            <a:avLst>
+              <a:gd name="adj1" fmla="val 52202"/>
+              <a:gd name="adj2" fmla="val 65033"/>
+            </a:avLst>
+          </a:prstGeom>
+          <a:noFill/>
+        </p:spPr>
+        <p:style>
+          <a:lnRef idx="3">
+            <a:schemeClr val="lt1"/>
+          </a:lnRef>
+          <a:fillRef idx="1">
+            <a:schemeClr val="dk1"/>
+          </a:fillRef>
+          <a:effectRef idx="1">
+            <a:schemeClr val="dk1"/>
+          </a:effectRef>
+          <a:fontRef idx="minor">
+            <a:schemeClr val="lt1"/>
+          </a:fontRef>
+        </p:style>
+        <p:txBody>
+          <a:bodyPr lIns="0" tIns="0" rIns="0" bIns="0" rtlCol="0" anchor="ctr"/>
+          <a:lstStyle/>
+          <a:p>
+            <a:pPr algn="ctr"/>
+            <a:r>
+              <a:rPr lang="en-US" dirty="0" smtClean="0">
+                <a:latin typeface="Anime Ace 2.0 BB"/>
+                <a:cs typeface="Anime Ace 2.0 BB"/>
+              </a:rPr>
+              <a:t>If you can’t port, then rewrite!</a:t>
+            </a:r>
+            <a:endParaRPr lang="en-US" dirty="0">
+              <a:latin typeface="Anime Ace 2.0 BB"/>
+              <a:cs typeface="Anime Ace 2.0 BB"/>
+            </a:endParaRPr>
+          </a:p>
+        </p:txBody>
+      </p:sp>
+      <p:sp>
+        <p:nvSpPr>
+          <p:cNvPr id="22" name="Freeform 21"/>
+          <p:cNvSpPr/>
+          <p:nvPr/>
+        </p:nvSpPr>
+        <p:spPr>
+          <a:xfrm>
+            <a:off x="3341722" y="3863892"/>
+            <a:ext cx="516595" cy="216154"/>
+          </a:xfrm>
+          <a:custGeom>
+            <a:avLst/>
+            <a:gdLst>
+              <a:gd name="connsiteX0" fmla="*/ 26906 w 555660"/>
+              <a:gd name="connsiteY0" fmla="*/ 0 h 205711"/>
+              <a:gd name="connsiteX1" fmla="*/ 113005 w 555660"/>
+              <a:gd name="connsiteY1" fmla="*/ 86103 h 205711"/>
+              <a:gd name="connsiteX2" fmla="*/ 495070 w 555660"/>
+              <a:gd name="connsiteY2" fmla="*/ 53814 h 205711"/>
+              <a:gd name="connsiteX3" fmla="*/ 516595 w 555660"/>
+              <a:gd name="connsiteY3" fmla="*/ 166825 h 205711"/>
+              <a:gd name="connsiteX4" fmla="*/ 118387 w 555660"/>
+              <a:gd name="connsiteY4" fmla="*/ 204495 h 205711"/>
+              <a:gd name="connsiteX5" fmla="*/ 0 w 555660"/>
+              <a:gd name="connsiteY5" fmla="*/ 129155 h 205711"/>
+              <a:gd name="connsiteX0" fmla="*/ 26906 w 555660"/>
+              <a:gd name="connsiteY0" fmla="*/ 0 h 205711"/>
+              <a:gd name="connsiteX1" fmla="*/ 113005 w 555660"/>
+              <a:gd name="connsiteY1" fmla="*/ 86103 h 205711"/>
+              <a:gd name="connsiteX2" fmla="*/ 495070 w 555660"/>
+              <a:gd name="connsiteY2" fmla="*/ 53814 h 205711"/>
+              <a:gd name="connsiteX3" fmla="*/ 516595 w 555660"/>
+              <a:gd name="connsiteY3" fmla="*/ 166825 h 205711"/>
+              <a:gd name="connsiteX4" fmla="*/ 118387 w 555660"/>
+              <a:gd name="connsiteY4" fmla="*/ 204495 h 205711"/>
+              <a:gd name="connsiteX5" fmla="*/ 0 w 555660"/>
+              <a:gd name="connsiteY5" fmla="*/ 129155 h 205711"/>
+              <a:gd name="connsiteX6" fmla="*/ 26906 w 555660"/>
+              <a:gd name="connsiteY6" fmla="*/ 0 h 205711"/>
+              <a:gd name="connsiteX0" fmla="*/ 26906 w 516595"/>
+              <a:gd name="connsiteY0" fmla="*/ 0 h 205711"/>
+              <a:gd name="connsiteX1" fmla="*/ 113005 w 516595"/>
+              <a:gd name="connsiteY1" fmla="*/ 86103 h 205711"/>
+              <a:gd name="connsiteX2" fmla="*/ 495070 w 516595"/>
+              <a:gd name="connsiteY2" fmla="*/ 53814 h 205711"/>
+              <a:gd name="connsiteX3" fmla="*/ 516595 w 516595"/>
+              <a:gd name="connsiteY3" fmla="*/ 166825 h 205711"/>
+              <a:gd name="connsiteX4" fmla="*/ 118387 w 516595"/>
+              <a:gd name="connsiteY4" fmla="*/ 204495 h 205711"/>
+              <a:gd name="connsiteX5" fmla="*/ 0 w 516595"/>
+              <a:gd name="connsiteY5" fmla="*/ 129155 h 205711"/>
+              <a:gd name="connsiteX6" fmla="*/ 26906 w 516595"/>
+              <a:gd name="connsiteY6" fmla="*/ 0 h 205711"/>
+              <a:gd name="connsiteX0" fmla="*/ 26906 w 539079"/>
+              <a:gd name="connsiteY0" fmla="*/ 0 h 216154"/>
+              <a:gd name="connsiteX1" fmla="*/ 113005 w 539079"/>
+              <a:gd name="connsiteY1" fmla="*/ 86103 h 216154"/>
+              <a:gd name="connsiteX2" fmla="*/ 495070 w 539079"/>
+              <a:gd name="connsiteY2" fmla="*/ 53814 h 216154"/>
+              <a:gd name="connsiteX3" fmla="*/ 516595 w 539079"/>
+              <a:gd name="connsiteY3" fmla="*/ 166825 h 216154"/>
+              <a:gd name="connsiteX4" fmla="*/ 145293 w 539079"/>
+              <a:gd name="connsiteY4" fmla="*/ 215258 h 216154"/>
+              <a:gd name="connsiteX5" fmla="*/ 0 w 539079"/>
+              <a:gd name="connsiteY5" fmla="*/ 129155 h 216154"/>
+              <a:gd name="connsiteX6" fmla="*/ 26906 w 539079"/>
+              <a:gd name="connsiteY6" fmla="*/ 0 h 216154"/>
+              <a:gd name="connsiteX0" fmla="*/ 26906 w 551280"/>
+              <a:gd name="connsiteY0" fmla="*/ 0 h 216154"/>
+              <a:gd name="connsiteX1" fmla="*/ 161436 w 551280"/>
+              <a:gd name="connsiteY1" fmla="*/ 86103 h 216154"/>
+              <a:gd name="connsiteX2" fmla="*/ 495070 w 551280"/>
+              <a:gd name="connsiteY2" fmla="*/ 53814 h 216154"/>
+              <a:gd name="connsiteX3" fmla="*/ 516595 w 551280"/>
+              <a:gd name="connsiteY3" fmla="*/ 166825 h 216154"/>
+              <a:gd name="connsiteX4" fmla="*/ 145293 w 551280"/>
+              <a:gd name="connsiteY4" fmla="*/ 215258 h 216154"/>
+              <a:gd name="connsiteX5" fmla="*/ 0 w 551280"/>
+              <a:gd name="connsiteY5" fmla="*/ 129155 h 216154"/>
+              <a:gd name="connsiteX6" fmla="*/ 26906 w 551280"/>
+              <a:gd name="connsiteY6" fmla="*/ 0 h 216154"/>
+              <a:gd name="connsiteX0" fmla="*/ 26906 w 516595"/>
+              <a:gd name="connsiteY0" fmla="*/ 0 h 216154"/>
+              <a:gd name="connsiteX1" fmla="*/ 161436 w 516595"/>
+              <a:gd name="connsiteY1" fmla="*/ 86103 h 216154"/>
+              <a:gd name="connsiteX2" fmla="*/ 495070 w 516595"/>
+              <a:gd name="connsiteY2" fmla="*/ 53814 h 216154"/>
+              <a:gd name="connsiteX3" fmla="*/ 516595 w 516595"/>
+              <a:gd name="connsiteY3" fmla="*/ 166825 h 216154"/>
+              <a:gd name="connsiteX4" fmla="*/ 145293 w 516595"/>
+              <a:gd name="connsiteY4" fmla="*/ 215258 h 216154"/>
+              <a:gd name="connsiteX5" fmla="*/ 0 w 516595"/>
+              <a:gd name="connsiteY5" fmla="*/ 129155 h 216154"/>
+              <a:gd name="connsiteX6" fmla="*/ 26906 w 516595"/>
+              <a:gd name="connsiteY6" fmla="*/ 0 h 216154"/>
+            </a:gdLst>
+            <a:ahLst/>
+            <a:cxnLst>
+              <a:cxn ang="0">
+                <a:pos x="connsiteX0" y="connsiteY0"/>
+              </a:cxn>
+              <a:cxn ang="0">
+                <a:pos x="connsiteX1" y="connsiteY1"/>
+              </a:cxn>
+              <a:cxn ang="0">
+                <a:pos x="connsiteX2" y="connsiteY2"/>
+              </a:cxn>
+              <a:cxn ang="0">
+                <a:pos x="connsiteX3" y="connsiteY3"/>
+              </a:cxn>
+              <a:cxn ang="0">
+                <a:pos x="connsiteX4" y="connsiteY4"/>
+              </a:cxn>
+              <a:cxn ang="0">
+                <a:pos x="connsiteX5" y="connsiteY5"/>
+              </a:cxn>
+              <a:cxn ang="0">
+                <a:pos x="connsiteX6" y="connsiteY6"/>
+              </a:cxn>
+            </a:cxnLst>
+            <a:rect l="l" t="t" r="r" b="b"/>
+            <a:pathLst>
+              <a:path w="516595" h="216154">
+                <a:moveTo>
+                  <a:pt x="26906" y="0"/>
+                </a:moveTo>
+                <a:cubicBezTo>
+                  <a:pt x="30942" y="38567"/>
+                  <a:pt x="83409" y="77134"/>
+                  <a:pt x="161436" y="86103"/>
+                </a:cubicBezTo>
+                <a:cubicBezTo>
+                  <a:pt x="239463" y="95072"/>
+                  <a:pt x="435877" y="40360"/>
+                  <a:pt x="495070" y="53814"/>
+                </a:cubicBezTo>
+                <a:lnTo>
+                  <a:pt x="516595" y="166825"/>
+                </a:lnTo>
+                <a:cubicBezTo>
+                  <a:pt x="458299" y="193732"/>
+                  <a:pt x="231392" y="221536"/>
+                  <a:pt x="145293" y="215258"/>
+                </a:cubicBezTo>
+                <a:cubicBezTo>
+                  <a:pt x="59194" y="208980"/>
+                  <a:pt x="0" y="129155"/>
+                  <a:pt x="0" y="129155"/>
+                </a:cubicBezTo>
+                <a:lnTo>
+                  <a:pt x="26906" y="0"/>
+                </a:lnTo>
+                <a:close/>
+              </a:path>
+            </a:pathLst>
+          </a:custGeom>
+          <a:ln>
+            <a:solidFill>
+              <a:srgbClr val="FFFFFF"/>
+            </a:solidFill>
+          </a:ln>
+        </p:spPr>
+        <p:style>
+          <a:lnRef idx="2">
+            <a:schemeClr val="accent1"/>
+          </a:lnRef>
+          <a:fillRef idx="0">
+            <a:schemeClr val="accent1"/>
+          </a:fillRef>
+          <a:effectRef idx="1">
+            <a:schemeClr val="accent1"/>
+          </a:effectRef>
+          <a:fontRef idx="minor">
+            <a:schemeClr val="tx1"/>
+          </a:fontRef>
+        </p:style>
+        <p:txBody>
+          <a:bodyPr rtlCol="0" anchor="ctr"/>
+          <a:lstStyle/>
+          <a:p>
+            <a:pPr algn="ctr"/>
+            <a:endParaRPr lang="en-US"/>
+          </a:p>
+        </p:txBody>
+      </p:sp>
+      <p:cxnSp>
+        <p:nvCxnSpPr>
+          <p:cNvPr id="31" name="Straight Connector 30"/>
+          <p:cNvCxnSpPr/>
+          <p:nvPr/>
+        </p:nvCxnSpPr>
+        <p:spPr>
+          <a:xfrm>
+            <a:off x="3411679" y="3923088"/>
+            <a:ext cx="0" cy="123771"/>
+          </a:xfrm>
+          <a:prstGeom prst="line">
+            <a:avLst/>
+          </a:prstGeom>
+          <a:ln>
+            <a:solidFill>
+              <a:srgbClr val="FFFFFF"/>
+            </a:solidFill>
+          </a:ln>
+        </p:spPr>
+        <p:style>
+          <a:lnRef idx="2">
+            <a:schemeClr val="accent1"/>
+          </a:lnRef>
+          <a:fillRef idx="0">
+            <a:schemeClr val="accent1"/>
+          </a:fillRef>
+          <a:effectRef idx="1">
+            <a:schemeClr val="accent1"/>
+          </a:effectRef>
+          <a:fontRef idx="minor">
+            <a:schemeClr val="tx1"/>
+          </a:fontRef>
+        </p:style>
+      </p:cxnSp>
+      <p:cxnSp>
+        <p:nvCxnSpPr>
+          <p:cNvPr id="32" name="Straight Connector 31"/>
+          <p:cNvCxnSpPr/>
+          <p:nvPr/>
+        </p:nvCxnSpPr>
+        <p:spPr>
+          <a:xfrm>
+            <a:off x="3461836" y="3956275"/>
+            <a:ext cx="0" cy="123771"/>
+          </a:xfrm>
+          <a:prstGeom prst="line">
+            <a:avLst/>
+          </a:prstGeom>
+          <a:ln>
+            <a:solidFill>
+              <a:srgbClr val="FFFFFF"/>
+            </a:solidFill>
+          </a:ln>
+        </p:spPr>
+        <p:style>
+          <a:lnRef idx="2">
+            <a:schemeClr val="accent1"/>
+          </a:lnRef>
+          <a:fillRef idx="0">
+            <a:schemeClr val="accent1"/>
+          </a:fillRef>
+          <a:effectRef idx="1">
+            <a:schemeClr val="accent1"/>
+          </a:effectRef>
+          <a:fontRef idx="minor">
+            <a:schemeClr val="tx1"/>
+          </a:fontRef>
+        </p:style>
+      </p:cxnSp>
+      <p:cxnSp>
+        <p:nvCxnSpPr>
+          <p:cNvPr id="33" name="Straight Connector 32"/>
+          <p:cNvCxnSpPr/>
+          <p:nvPr/>
+        </p:nvCxnSpPr>
+        <p:spPr>
+          <a:xfrm>
+            <a:off x="3515649" y="3956275"/>
+            <a:ext cx="0" cy="123771"/>
+          </a:xfrm>
+          <a:prstGeom prst="line">
+            <a:avLst/>
+          </a:prstGeom>
+          <a:ln>
+            <a:solidFill>
+              <a:srgbClr val="FFFFFF"/>
+            </a:solidFill>
+          </a:ln>
+        </p:spPr>
+        <p:style>
+          <a:lnRef idx="2">
+            <a:schemeClr val="accent1"/>
+          </a:lnRef>
+          <a:fillRef idx="0">
+            <a:schemeClr val="accent1"/>
+          </a:fillRef>
+          <a:effectRef idx="1">
+            <a:schemeClr val="accent1"/>
+          </a:effectRef>
+          <a:fontRef idx="minor">
+            <a:schemeClr val="tx1"/>
+          </a:fontRef>
+        </p:style>
+      </p:cxnSp>
+      <p:cxnSp>
+        <p:nvCxnSpPr>
+          <p:cNvPr id="34" name="Straight Connector 33"/>
+          <p:cNvCxnSpPr/>
+          <p:nvPr/>
+        </p:nvCxnSpPr>
+        <p:spPr>
+          <a:xfrm>
+            <a:off x="3564079" y="3956275"/>
+            <a:ext cx="0" cy="123771"/>
+          </a:xfrm>
+          <a:prstGeom prst="line">
+            <a:avLst/>
+          </a:prstGeom>
+          <a:ln>
+            <a:solidFill>
+              <a:srgbClr val="FFFFFF"/>
+            </a:solidFill>
+          </a:ln>
+        </p:spPr>
+        <p:style>
+          <a:lnRef idx="2">
+            <a:schemeClr val="accent1"/>
+          </a:lnRef>
+          <a:fillRef idx="0">
+            <a:schemeClr val="accent1"/>
+          </a:fillRef>
+          <a:effectRef idx="1">
+            <a:schemeClr val="accent1"/>
+          </a:effectRef>
+          <a:fontRef idx="minor">
+            <a:schemeClr val="tx1"/>
+          </a:fontRef>
+        </p:style>
+      </p:cxnSp>
+      <p:cxnSp>
+        <p:nvCxnSpPr>
+          <p:cNvPr id="35" name="Straight Connector 34"/>
+          <p:cNvCxnSpPr/>
+          <p:nvPr/>
+        </p:nvCxnSpPr>
+        <p:spPr>
+          <a:xfrm>
+            <a:off x="3622764" y="3949993"/>
+            <a:ext cx="0" cy="123771"/>
+          </a:xfrm>
+          <a:prstGeom prst="line">
+            <a:avLst/>
+          </a:prstGeom>
+          <a:ln>
+            <a:solidFill>
+              <a:srgbClr val="FFFFFF"/>
+            </a:solidFill>
+          </a:ln>
+        </p:spPr>
+        <p:style>
+          <a:lnRef idx="2">
+            <a:schemeClr val="accent1"/>
+          </a:lnRef>
+          <a:fillRef idx="0">
+            <a:schemeClr val="accent1"/>
+          </a:fillRef>
+          <a:effectRef idx="1">
+            <a:schemeClr val="accent1"/>
+          </a:effectRef>
+          <a:fontRef idx="minor">
+            <a:schemeClr val="tx1"/>
+          </a:fontRef>
+        </p:style>
+      </p:cxnSp>
+      <p:cxnSp>
+        <p:nvCxnSpPr>
+          <p:cNvPr id="36" name="Straight Connector 35"/>
+          <p:cNvCxnSpPr/>
+          <p:nvPr/>
+        </p:nvCxnSpPr>
+        <p:spPr>
+          <a:xfrm>
+            <a:off x="3682465" y="3933850"/>
+            <a:ext cx="0" cy="123771"/>
+          </a:xfrm>
+          <a:prstGeom prst="line">
+            <a:avLst/>
+          </a:prstGeom>
+          <a:ln>
+            <a:solidFill>
+              <a:srgbClr val="FFFFFF"/>
+            </a:solidFill>
+          </a:ln>
+        </p:spPr>
+        <p:style>
+          <a:lnRef idx="2">
+            <a:schemeClr val="accent1"/>
+          </a:lnRef>
+          <a:fillRef idx="0">
+            <a:schemeClr val="accent1"/>
+          </a:fillRef>
+          <a:effectRef idx="1">
+            <a:schemeClr val="accent1"/>
+          </a:effectRef>
+          <a:fontRef idx="minor">
+            <a:schemeClr val="tx1"/>
+          </a:fontRef>
+        </p:style>
+      </p:cxnSp>
+      <p:cxnSp>
+        <p:nvCxnSpPr>
+          <p:cNvPr id="38" name="Straight Connector 37"/>
+          <p:cNvCxnSpPr/>
+          <p:nvPr/>
+        </p:nvCxnSpPr>
+        <p:spPr>
+          <a:xfrm>
+            <a:off x="3736734" y="3926982"/>
+            <a:ext cx="0" cy="123771"/>
+          </a:xfrm>
+          <a:prstGeom prst="line">
+            <a:avLst/>
+          </a:prstGeom>
+          <a:ln>
+            <a:solidFill>
+              <a:srgbClr val="FFFFFF"/>
+            </a:solidFill>
+          </a:ln>
+        </p:spPr>
+        <p:style>
+          <a:lnRef idx="2">
+            <a:schemeClr val="accent1"/>
+          </a:lnRef>
+          <a:fillRef idx="0">
+            <a:schemeClr val="accent1"/>
+          </a:fillRef>
+          <a:effectRef idx="1">
+            <a:schemeClr val="accent1"/>
+          </a:effectRef>
+          <a:fontRef idx="minor">
+            <a:schemeClr val="tx1"/>
+          </a:fontRef>
+        </p:style>
+      </p:cxnSp>
+      <p:sp>
+        <p:nvSpPr>
+          <p:cNvPr id="23" name="Rectangle 22"/>
+          <p:cNvSpPr/>
+          <p:nvPr/>
+        </p:nvSpPr>
+        <p:spPr>
+          <a:xfrm>
+            <a:off x="643370" y="1545818"/>
+            <a:ext cx="7695373" cy="3601338"/>
+          </a:xfrm>
+          <a:prstGeom prst="rect">
+            <a:avLst/>
+          </a:prstGeom>
+          <a:noFill/>
+          <a:ln>
+            <a:noFill/>
+          </a:ln>
+        </p:spPr>
+        <p:style>
+          <a:lnRef idx="1">
+            <a:schemeClr val="accent1"/>
+          </a:lnRef>
+          <a:fillRef idx="3">
+            <a:schemeClr val="accent1"/>
+          </a:fillRef>
+          <a:effectRef idx="2">
+            <a:schemeClr val="accent1"/>
+          </a:effectRef>
+          <a:fontRef idx="minor">
+            <a:schemeClr val="lt1"/>
+          </a:fontRef>
+        </p:style>
+        <p:txBody>
+          <a:bodyPr rtlCol="0" anchor="ctr"/>
+          <a:lstStyle/>
+          <a:p>
+            <a:pPr algn="ctr"/>
+            <a:endParaRPr lang="en-US"/>
+          </a:p>
+        </p:txBody>
+      </p:sp>
+    </p:spTree>
+    <p:extLst>
+      <p:ext uri="{BB962C8B-B14F-4D97-AF65-F5344CB8AC3E}">
+        <p14:creationId xmlns:p14="http://schemas.microsoft.com/office/powerpoint/2010/main" val="1937957458"/>
+      </p:ext>
+    </p:extLst>
+  </p:cSld>
+  <p:clrMapOvr>
+    <a:masterClrMapping/>
+  </p:clrMapOvr>
+</p:sld>
+</file>
+
+<file path=ppt/slides/slide17.xml><?xml version="1.0" encoding="utf-8"?>
+<p:sld xmlns:a="http://schemas.openxmlformats.org/drawingml/2006/main" xmlns:r="http://schemas.openxmlformats.org/officeDocument/2006/relationships" xmlns:p="http://schemas.openxmlformats.org/presentationml/2006/main">
+  <p:cSld>
+    <p:spTree>
+      <p:nvGrpSpPr>
+        <p:cNvPr id="1" name=""/>
+        <p:cNvGrpSpPr/>
+        <p:nvPr/>
+      </p:nvGrpSpPr>
+      <p:grpSpPr>
+        <a:xfrm>
+          <a:off x="0" y="0"/>
+          <a:ext cx="0" cy="0"/>
+          <a:chOff x="0" y="0"/>
+          <a:chExt cx="0" cy="0"/>
+        </a:xfrm>
+      </p:grpSpPr>
+      <p:sp>
+        <p:nvSpPr>
+          <p:cNvPr id="3" name="Chord 3"/>
+          <p:cNvSpPr/>
+          <p:nvPr/>
+        </p:nvSpPr>
+        <p:spPr>
+          <a:xfrm>
+            <a:off x="3165112" y="4269902"/>
+            <a:ext cx="791321" cy="516772"/>
+          </a:xfrm>
+          <a:custGeom>
+            <a:avLst/>
+            <a:gdLst>
+              <a:gd name="connsiteX0" fmla="*/ 16608 w 2232278"/>
+              <a:gd name="connsiteY0" fmla="*/ 1307968 h 2232278"/>
+              <a:gd name="connsiteX1" fmla="*/ 589005 w 2232278"/>
+              <a:gd name="connsiteY1" fmla="*/ 132321 h 2232278"/>
+              <a:gd name="connsiteX2" fmla="*/ 1884880 w 2232278"/>
+              <a:gd name="connsiteY2" fmla="*/ 306939 h 2232278"/>
+              <a:gd name="connsiteX3" fmla="*/ 2125677 w 2232278"/>
+              <a:gd name="connsiteY3" fmla="*/ 1592163 h 2232278"/>
+              <a:gd name="connsiteX4" fmla="*/ 16608 w 2232278"/>
+              <a:gd name="connsiteY4" fmla="*/ 1307968 h 2232278"/>
+              <a:gd name="connsiteX0" fmla="*/ 16669 w 2232378"/>
+              <a:gd name="connsiteY0" fmla="*/ 1307991 h 1619407"/>
+              <a:gd name="connsiteX1" fmla="*/ 589066 w 2232378"/>
+              <a:gd name="connsiteY1" fmla="*/ 132344 h 1619407"/>
+              <a:gd name="connsiteX2" fmla="*/ 1884941 w 2232378"/>
+              <a:gd name="connsiteY2" fmla="*/ 306962 h 1619407"/>
+              <a:gd name="connsiteX3" fmla="*/ 2125738 w 2232378"/>
+              <a:gd name="connsiteY3" fmla="*/ 1592186 h 1619407"/>
+              <a:gd name="connsiteX4" fmla="*/ 16669 w 2232378"/>
+              <a:gd name="connsiteY4" fmla="*/ 1307991 h 1619407"/>
+              <a:gd name="connsiteX0" fmla="*/ 16669 w 2232378"/>
+              <a:gd name="connsiteY0" fmla="*/ 1307991 h 1698147"/>
+              <a:gd name="connsiteX1" fmla="*/ 589066 w 2232378"/>
+              <a:gd name="connsiteY1" fmla="*/ 132344 h 1698147"/>
+              <a:gd name="connsiteX2" fmla="*/ 1884941 w 2232378"/>
+              <a:gd name="connsiteY2" fmla="*/ 306962 h 1698147"/>
+              <a:gd name="connsiteX3" fmla="*/ 2125738 w 2232378"/>
+              <a:gd name="connsiteY3" fmla="*/ 1592186 h 1698147"/>
+              <a:gd name="connsiteX4" fmla="*/ 16669 w 2232378"/>
+              <a:gd name="connsiteY4" fmla="*/ 1307991 h 1698147"/>
+              <a:gd name="connsiteX0" fmla="*/ 16669 w 2232378"/>
+              <a:gd name="connsiteY0" fmla="*/ 1307991 h 1698147"/>
+              <a:gd name="connsiteX1" fmla="*/ 589066 w 2232378"/>
+              <a:gd name="connsiteY1" fmla="*/ 132344 h 1698147"/>
+              <a:gd name="connsiteX2" fmla="*/ 1884941 w 2232378"/>
+              <a:gd name="connsiteY2" fmla="*/ 306962 h 1698147"/>
+              <a:gd name="connsiteX3" fmla="*/ 2125738 w 2232378"/>
+              <a:gd name="connsiteY3" fmla="*/ 1592186 h 1698147"/>
+              <a:gd name="connsiteX4" fmla="*/ 16669 w 2232378"/>
+              <a:gd name="connsiteY4" fmla="*/ 1307991 h 1698147"/>
+              <a:gd name="connsiteX0" fmla="*/ 16669 w 2232378"/>
+              <a:gd name="connsiteY0" fmla="*/ 1175646 h 1565802"/>
+              <a:gd name="connsiteX1" fmla="*/ 589066 w 2232378"/>
+              <a:gd name="connsiteY1" fmla="*/ -1 h 1565802"/>
+              <a:gd name="connsiteX2" fmla="*/ 1884941 w 2232378"/>
+              <a:gd name="connsiteY2" fmla="*/ 174617 h 1565802"/>
+              <a:gd name="connsiteX3" fmla="*/ 2125738 w 2232378"/>
+              <a:gd name="connsiteY3" fmla="*/ 1459841 h 1565802"/>
+              <a:gd name="connsiteX4" fmla="*/ 16669 w 2232378"/>
+              <a:gd name="connsiteY4" fmla="*/ 1175646 h 1565802"/>
+              <a:gd name="connsiteX0" fmla="*/ 16669 w 2232378"/>
+              <a:gd name="connsiteY0" fmla="*/ 1175648 h 1565804"/>
+              <a:gd name="connsiteX1" fmla="*/ 589066 w 2232378"/>
+              <a:gd name="connsiteY1" fmla="*/ 1 h 1565804"/>
+              <a:gd name="connsiteX2" fmla="*/ 1884941 w 2232378"/>
+              <a:gd name="connsiteY2" fmla="*/ 174619 h 1565804"/>
+              <a:gd name="connsiteX3" fmla="*/ 2125738 w 2232378"/>
+              <a:gd name="connsiteY3" fmla="*/ 1459843 h 1565804"/>
+              <a:gd name="connsiteX4" fmla="*/ 16669 w 2232378"/>
+              <a:gd name="connsiteY4" fmla="*/ 1175648 h 1565804"/>
+              <a:gd name="connsiteX0" fmla="*/ 16669 w 2232378"/>
+              <a:gd name="connsiteY0" fmla="*/ 1175646 h 1565802"/>
+              <a:gd name="connsiteX1" fmla="*/ 589066 w 2232378"/>
+              <a:gd name="connsiteY1" fmla="*/ -1 h 1565802"/>
+              <a:gd name="connsiteX2" fmla="*/ 1884941 w 2232378"/>
+              <a:gd name="connsiteY2" fmla="*/ 174617 h 1565802"/>
+              <a:gd name="connsiteX3" fmla="*/ 2125738 w 2232378"/>
+              <a:gd name="connsiteY3" fmla="*/ 1459841 h 1565802"/>
+              <a:gd name="connsiteX4" fmla="*/ 16669 w 2232378"/>
+              <a:gd name="connsiteY4" fmla="*/ 1175646 h 1565802"/>
+            </a:gdLst>
+            <a:ahLst/>
+            <a:cxnLst>
+              <a:cxn ang="0">
+                <a:pos x="connsiteX0" y="connsiteY0"/>
+              </a:cxn>
+              <a:cxn ang="0">
+                <a:pos x="connsiteX1" y="connsiteY1"/>
+              </a:cxn>
+              <a:cxn ang="0">
+                <a:pos x="connsiteX2" y="connsiteY2"/>
+              </a:cxn>
+              <a:cxn ang="0">
+                <a:pos x="connsiteX3" y="connsiteY3"/>
+              </a:cxn>
+              <a:cxn ang="0">
+                <a:pos x="connsiteX4" y="connsiteY4"/>
+              </a:cxn>
+            </a:cxnLst>
+            <a:rect l="l" t="t" r="r" b="b"/>
+            <a:pathLst>
+              <a:path w="2232378" h="1565802">
+                <a:moveTo>
+                  <a:pt x="16669" y="1175646"/>
+                </a:moveTo>
+                <a:cubicBezTo>
+                  <a:pt x="-66084" y="701323"/>
+                  <a:pt x="164660" y="227398"/>
+                  <a:pt x="589066" y="-1"/>
+                </a:cubicBezTo>
+                <a:cubicBezTo>
+                  <a:pt x="1013471" y="543761"/>
+                  <a:pt x="1715366" y="47123"/>
+                  <a:pt x="1884941" y="174617"/>
+                </a:cubicBezTo>
+                <a:cubicBezTo>
+                  <a:pt x="2234019" y="506242"/>
+                  <a:pt x="2331089" y="1024340"/>
+                  <a:pt x="2125738" y="1459841"/>
+                </a:cubicBezTo>
+                <a:cubicBezTo>
+                  <a:pt x="1461202" y="1570351"/>
+                  <a:pt x="886471" y="1719347"/>
+                  <a:pt x="16669" y="1175646"/>
+                </a:cubicBezTo>
+                <a:close/>
+              </a:path>
+            </a:pathLst>
+          </a:custGeom>
+          <a:noFill/>
+          <a:ln w="38100" cmpd="sng">
+            <a:solidFill>
+              <a:srgbClr val="FFFF00"/>
+            </a:solidFill>
+          </a:ln>
+        </p:spPr>
+        <p:style>
+          <a:lnRef idx="1">
+            <a:schemeClr val="accent1"/>
+          </a:lnRef>
+          <a:fillRef idx="3">
+            <a:schemeClr val="accent1"/>
+          </a:fillRef>
+          <a:effectRef idx="2">
+            <a:schemeClr val="accent1"/>
+          </a:effectRef>
+          <a:fontRef idx="minor">
+            <a:schemeClr val="lt1"/>
+          </a:fontRef>
+        </p:style>
+        <p:txBody>
+          <a:bodyPr rtlCol="0" anchor="ctr"/>
+          <a:lstStyle/>
+          <a:p>
+            <a:pPr algn="ctr"/>
+            <a:endParaRPr lang="en-US"/>
+          </a:p>
+        </p:txBody>
+      </p:sp>
+      <p:sp>
+        <p:nvSpPr>
+          <p:cNvPr id="4" name="Oval 3"/>
+          <p:cNvSpPr/>
+          <p:nvPr/>
+        </p:nvSpPr>
+        <p:spPr>
+          <a:xfrm>
+            <a:off x="3338667" y="3772946"/>
+            <a:ext cx="510522" cy="496957"/>
+          </a:xfrm>
+          <a:prstGeom prst="ellipse">
+            <a:avLst/>
+          </a:prstGeom>
+          <a:noFill/>
+          <a:ln w="38100" cmpd="sng">
+            <a:solidFill>
+              <a:schemeClr val="bg1"/>
+            </a:solidFill>
+          </a:ln>
+        </p:spPr>
+        <p:style>
+          <a:lnRef idx="1">
+            <a:schemeClr val="accent1"/>
+          </a:lnRef>
+          <a:fillRef idx="3">
+            <a:schemeClr val="accent1"/>
+          </a:fillRef>
+          <a:effectRef idx="2">
+            <a:schemeClr val="accent1"/>
+          </a:effectRef>
+          <a:fontRef idx="minor">
+            <a:schemeClr val="lt1"/>
+          </a:fontRef>
+        </p:style>
+        <p:txBody>
+          <a:bodyPr rtlCol="0" anchor="ctr"/>
+          <a:lstStyle/>
+          <a:p>
+            <a:pPr algn="ctr"/>
+            <a:endParaRPr lang="en-US"/>
+          </a:p>
+        </p:txBody>
+      </p:sp>
+      <p:sp>
+        <p:nvSpPr>
+          <p:cNvPr id="8" name="Chord 3"/>
+          <p:cNvSpPr/>
+          <p:nvPr/>
+        </p:nvSpPr>
+        <p:spPr>
+          <a:xfrm>
+            <a:off x="4774691" y="4269903"/>
+            <a:ext cx="791321" cy="516772"/>
+          </a:xfrm>
+          <a:custGeom>
+            <a:avLst/>
+            <a:gdLst>
+              <a:gd name="connsiteX0" fmla="*/ 16608 w 2232278"/>
+              <a:gd name="connsiteY0" fmla="*/ 1307968 h 2232278"/>
+              <a:gd name="connsiteX1" fmla="*/ 589005 w 2232278"/>
+              <a:gd name="connsiteY1" fmla="*/ 132321 h 2232278"/>
+              <a:gd name="connsiteX2" fmla="*/ 1884880 w 2232278"/>
+              <a:gd name="connsiteY2" fmla="*/ 306939 h 2232278"/>
+              <a:gd name="connsiteX3" fmla="*/ 2125677 w 2232278"/>
+              <a:gd name="connsiteY3" fmla="*/ 1592163 h 2232278"/>
+              <a:gd name="connsiteX4" fmla="*/ 16608 w 2232278"/>
+              <a:gd name="connsiteY4" fmla="*/ 1307968 h 2232278"/>
+              <a:gd name="connsiteX0" fmla="*/ 16669 w 2232378"/>
+              <a:gd name="connsiteY0" fmla="*/ 1307991 h 1619407"/>
+              <a:gd name="connsiteX1" fmla="*/ 589066 w 2232378"/>
+              <a:gd name="connsiteY1" fmla="*/ 132344 h 1619407"/>
+              <a:gd name="connsiteX2" fmla="*/ 1884941 w 2232378"/>
+              <a:gd name="connsiteY2" fmla="*/ 306962 h 1619407"/>
+              <a:gd name="connsiteX3" fmla="*/ 2125738 w 2232378"/>
+              <a:gd name="connsiteY3" fmla="*/ 1592186 h 1619407"/>
+              <a:gd name="connsiteX4" fmla="*/ 16669 w 2232378"/>
+              <a:gd name="connsiteY4" fmla="*/ 1307991 h 1619407"/>
+              <a:gd name="connsiteX0" fmla="*/ 16669 w 2232378"/>
+              <a:gd name="connsiteY0" fmla="*/ 1307991 h 1698147"/>
+              <a:gd name="connsiteX1" fmla="*/ 589066 w 2232378"/>
+              <a:gd name="connsiteY1" fmla="*/ 132344 h 1698147"/>
+              <a:gd name="connsiteX2" fmla="*/ 1884941 w 2232378"/>
+              <a:gd name="connsiteY2" fmla="*/ 306962 h 1698147"/>
+              <a:gd name="connsiteX3" fmla="*/ 2125738 w 2232378"/>
+              <a:gd name="connsiteY3" fmla="*/ 1592186 h 1698147"/>
+              <a:gd name="connsiteX4" fmla="*/ 16669 w 2232378"/>
+              <a:gd name="connsiteY4" fmla="*/ 1307991 h 1698147"/>
+              <a:gd name="connsiteX0" fmla="*/ 16669 w 2232378"/>
+              <a:gd name="connsiteY0" fmla="*/ 1307991 h 1698147"/>
+              <a:gd name="connsiteX1" fmla="*/ 589066 w 2232378"/>
+              <a:gd name="connsiteY1" fmla="*/ 132344 h 1698147"/>
+              <a:gd name="connsiteX2" fmla="*/ 1884941 w 2232378"/>
+              <a:gd name="connsiteY2" fmla="*/ 306962 h 1698147"/>
+              <a:gd name="connsiteX3" fmla="*/ 2125738 w 2232378"/>
+              <a:gd name="connsiteY3" fmla="*/ 1592186 h 1698147"/>
+              <a:gd name="connsiteX4" fmla="*/ 16669 w 2232378"/>
+              <a:gd name="connsiteY4" fmla="*/ 1307991 h 1698147"/>
+              <a:gd name="connsiteX0" fmla="*/ 16669 w 2232378"/>
+              <a:gd name="connsiteY0" fmla="*/ 1175646 h 1565802"/>
+              <a:gd name="connsiteX1" fmla="*/ 589066 w 2232378"/>
+              <a:gd name="connsiteY1" fmla="*/ -1 h 1565802"/>
+              <a:gd name="connsiteX2" fmla="*/ 1884941 w 2232378"/>
+              <a:gd name="connsiteY2" fmla="*/ 174617 h 1565802"/>
+              <a:gd name="connsiteX3" fmla="*/ 2125738 w 2232378"/>
+              <a:gd name="connsiteY3" fmla="*/ 1459841 h 1565802"/>
+              <a:gd name="connsiteX4" fmla="*/ 16669 w 2232378"/>
+              <a:gd name="connsiteY4" fmla="*/ 1175646 h 1565802"/>
+              <a:gd name="connsiteX0" fmla="*/ 16669 w 2232378"/>
+              <a:gd name="connsiteY0" fmla="*/ 1175648 h 1565804"/>
+              <a:gd name="connsiteX1" fmla="*/ 589066 w 2232378"/>
+              <a:gd name="connsiteY1" fmla="*/ 1 h 1565804"/>
+              <a:gd name="connsiteX2" fmla="*/ 1884941 w 2232378"/>
+              <a:gd name="connsiteY2" fmla="*/ 174619 h 1565804"/>
+              <a:gd name="connsiteX3" fmla="*/ 2125738 w 2232378"/>
+              <a:gd name="connsiteY3" fmla="*/ 1459843 h 1565804"/>
+              <a:gd name="connsiteX4" fmla="*/ 16669 w 2232378"/>
+              <a:gd name="connsiteY4" fmla="*/ 1175648 h 1565804"/>
+              <a:gd name="connsiteX0" fmla="*/ 16669 w 2232378"/>
+              <a:gd name="connsiteY0" fmla="*/ 1175646 h 1565802"/>
+              <a:gd name="connsiteX1" fmla="*/ 589066 w 2232378"/>
+              <a:gd name="connsiteY1" fmla="*/ -1 h 1565802"/>
+              <a:gd name="connsiteX2" fmla="*/ 1884941 w 2232378"/>
+              <a:gd name="connsiteY2" fmla="*/ 174617 h 1565802"/>
+              <a:gd name="connsiteX3" fmla="*/ 2125738 w 2232378"/>
+              <a:gd name="connsiteY3" fmla="*/ 1459841 h 1565802"/>
+              <a:gd name="connsiteX4" fmla="*/ 16669 w 2232378"/>
+              <a:gd name="connsiteY4" fmla="*/ 1175646 h 1565802"/>
+            </a:gdLst>
+            <a:ahLst/>
+            <a:cxnLst>
+              <a:cxn ang="0">
+                <a:pos x="connsiteX0" y="connsiteY0"/>
+              </a:cxn>
+              <a:cxn ang="0">
+                <a:pos x="connsiteX1" y="connsiteY1"/>
+              </a:cxn>
+              <a:cxn ang="0">
+                <a:pos x="connsiteX2" y="connsiteY2"/>
+              </a:cxn>
+              <a:cxn ang="0">
+                <a:pos x="connsiteX3" y="connsiteY3"/>
+              </a:cxn>
+              <a:cxn ang="0">
+                <a:pos x="connsiteX4" y="connsiteY4"/>
+              </a:cxn>
+            </a:cxnLst>
+            <a:rect l="l" t="t" r="r" b="b"/>
+            <a:pathLst>
+              <a:path w="2232378" h="1565802">
+                <a:moveTo>
+                  <a:pt x="16669" y="1175646"/>
+                </a:moveTo>
+                <a:cubicBezTo>
+                  <a:pt x="-66084" y="701323"/>
+                  <a:pt x="164660" y="227398"/>
+                  <a:pt x="589066" y="-1"/>
+                </a:cubicBezTo>
+                <a:cubicBezTo>
+                  <a:pt x="1013471" y="543761"/>
+                  <a:pt x="1715366" y="47123"/>
+                  <a:pt x="1884941" y="174617"/>
+                </a:cubicBezTo>
+                <a:cubicBezTo>
+                  <a:pt x="2234019" y="506242"/>
+                  <a:pt x="2331089" y="1024340"/>
+                  <a:pt x="2125738" y="1459841"/>
+                </a:cubicBezTo>
+                <a:cubicBezTo>
+                  <a:pt x="1461202" y="1570351"/>
+                  <a:pt x="886471" y="1719347"/>
+                  <a:pt x="16669" y="1175646"/>
+                </a:cubicBezTo>
+                <a:close/>
+              </a:path>
+            </a:pathLst>
+          </a:custGeom>
+          <a:noFill/>
+          <a:ln w="38100" cmpd="sng">
+            <a:solidFill>
+              <a:srgbClr val="FF0000"/>
+            </a:solidFill>
+          </a:ln>
+        </p:spPr>
+        <p:style>
+          <a:lnRef idx="1">
+            <a:schemeClr val="accent1"/>
+          </a:lnRef>
+          <a:fillRef idx="3">
+            <a:schemeClr val="accent1"/>
+          </a:fillRef>
+          <a:effectRef idx="2">
+            <a:schemeClr val="accent1"/>
+          </a:effectRef>
+          <a:fontRef idx="minor">
+            <a:schemeClr val="lt1"/>
+          </a:fontRef>
+        </p:style>
+        <p:txBody>
+          <a:bodyPr rtlCol="0" anchor="ctr"/>
+          <a:lstStyle/>
+          <a:p>
+            <a:pPr algn="ctr"/>
+            <a:endParaRPr lang="en-US"/>
+          </a:p>
+        </p:txBody>
+      </p:sp>
+      <p:sp>
+        <p:nvSpPr>
+          <p:cNvPr id="9" name="Oval 8"/>
+          <p:cNvSpPr/>
+          <p:nvPr/>
+        </p:nvSpPr>
+        <p:spPr>
+          <a:xfrm>
+            <a:off x="4948246" y="3772947"/>
+            <a:ext cx="510522" cy="496957"/>
+          </a:xfrm>
+          <a:prstGeom prst="ellipse">
+            <a:avLst/>
+          </a:prstGeom>
+          <a:noFill/>
+          <a:ln w="38100" cmpd="sng">
+            <a:solidFill>
+              <a:schemeClr val="bg1"/>
+            </a:solidFill>
+          </a:ln>
+        </p:spPr>
+        <p:style>
+          <a:lnRef idx="1">
+            <a:schemeClr val="accent1"/>
+          </a:lnRef>
+          <a:fillRef idx="3">
+            <a:schemeClr val="accent1"/>
+          </a:fillRef>
+          <a:effectRef idx="2">
+            <a:schemeClr val="accent1"/>
+          </a:effectRef>
+          <a:fontRef idx="minor">
+            <a:schemeClr val="lt1"/>
+          </a:fontRef>
+        </p:style>
+        <p:txBody>
+          <a:bodyPr rtlCol="0" anchor="ctr"/>
+          <a:lstStyle/>
+          <a:p>
+            <a:pPr algn="ctr"/>
+            <a:endParaRPr lang="en-US"/>
+          </a:p>
+        </p:txBody>
+      </p:sp>
+      <p:sp>
+        <p:nvSpPr>
+          <p:cNvPr id="10" name="Oval 9"/>
+          <p:cNvSpPr/>
+          <p:nvPr/>
+        </p:nvSpPr>
+        <p:spPr>
+          <a:xfrm>
+            <a:off x="5079248" y="3941040"/>
+            <a:ext cx="41172" cy="93570"/>
+          </a:xfrm>
+          <a:prstGeom prst="ellipse">
+            <a:avLst/>
+          </a:prstGeom>
+          <a:solidFill>
+            <a:srgbClr val="FFFFFF"/>
+          </a:solidFill>
+          <a:ln>
+            <a:noFill/>
+          </a:ln>
+        </p:spPr>
+        <p:style>
+          <a:lnRef idx="1">
+            <a:schemeClr val="accent1"/>
+          </a:lnRef>
+          <a:fillRef idx="3">
+            <a:schemeClr val="accent1"/>
+          </a:fillRef>
+          <a:effectRef idx="2">
+            <a:schemeClr val="accent1"/>
+          </a:effectRef>
+          <a:fontRef idx="minor">
+            <a:schemeClr val="lt1"/>
+          </a:fontRef>
+        </p:style>
+        <p:txBody>
+          <a:bodyPr rtlCol="0" anchor="ctr"/>
+          <a:lstStyle/>
+          <a:p>
+            <a:pPr algn="ctr"/>
+            <a:endParaRPr lang="en-US"/>
+          </a:p>
+        </p:txBody>
+      </p:sp>
+      <p:sp>
+        <p:nvSpPr>
+          <p:cNvPr id="11" name="Oval 10"/>
+          <p:cNvSpPr/>
+          <p:nvPr/>
+        </p:nvSpPr>
+        <p:spPr>
+          <a:xfrm>
+            <a:off x="5218335" y="3941040"/>
+            <a:ext cx="41172" cy="93570"/>
+          </a:xfrm>
+          <a:prstGeom prst="ellipse">
+            <a:avLst/>
+          </a:prstGeom>
+          <a:solidFill>
+            <a:srgbClr val="FFFFFF"/>
+          </a:solidFill>
+          <a:ln>
+            <a:noFill/>
+          </a:ln>
+        </p:spPr>
+        <p:style>
+          <a:lnRef idx="1">
+            <a:schemeClr val="accent1"/>
+          </a:lnRef>
+          <a:fillRef idx="3">
+            <a:schemeClr val="accent1"/>
+          </a:fillRef>
+          <a:effectRef idx="2">
+            <a:schemeClr val="accent1"/>
+          </a:effectRef>
+          <a:fontRef idx="minor">
+            <a:schemeClr val="lt1"/>
+          </a:fontRef>
+        </p:style>
+        <p:txBody>
+          <a:bodyPr rtlCol="0" anchor="ctr"/>
+          <a:lstStyle/>
+          <a:p>
+            <a:pPr algn="ctr"/>
+            <a:endParaRPr lang="en-US"/>
+          </a:p>
+        </p:txBody>
+      </p:sp>
+      <p:sp>
+        <p:nvSpPr>
+          <p:cNvPr id="12" name="Oval Callout 11"/>
+          <p:cNvSpPr/>
+          <p:nvPr/>
+        </p:nvSpPr>
+        <p:spPr>
+          <a:xfrm>
+            <a:off x="5778020" y="1788598"/>
+            <a:ext cx="2259385" cy="1649813"/>
+          </a:xfrm>
+          <a:prstGeom prst="wedgeEllipseCallout">
+            <a:avLst>
+              <a:gd name="adj1" fmla="val -60213"/>
+              <a:gd name="adj2" fmla="val 64540"/>
+            </a:avLst>
+          </a:prstGeom>
+          <a:noFill/>
+        </p:spPr>
+        <p:style>
+          <a:lnRef idx="3">
+            <a:schemeClr val="lt1"/>
+          </a:lnRef>
+          <a:fillRef idx="1">
+            <a:schemeClr val="dk1"/>
+          </a:fillRef>
+          <a:effectRef idx="1">
+            <a:schemeClr val="dk1"/>
+          </a:effectRef>
+          <a:fontRef idx="minor">
+            <a:schemeClr val="lt1"/>
+          </a:fontRef>
+        </p:style>
+        <p:txBody>
+          <a:bodyPr lIns="0" tIns="0" rIns="0" bIns="0" rtlCol="0" anchor="ctr"/>
+          <a:lstStyle/>
+          <a:p>
+            <a:pPr algn="ctr"/>
+            <a:r>
+              <a:rPr lang="en-US" dirty="0" smtClean="0">
+                <a:latin typeface="Anime Ace 2.0 BB"/>
+                <a:cs typeface="Anime Ace 2.0 BB"/>
+              </a:rPr>
+              <a:t>I canna do it, the core’s too </a:t>
+            </a:r>
+            <a:r>
+              <a:rPr lang="en-US" dirty="0" err="1" smtClean="0">
+                <a:latin typeface="Anime Ace 2.0 BB"/>
+                <a:cs typeface="Anime Ace 2.0 BB"/>
+              </a:rPr>
+              <a:t>diffn’t</a:t>
+            </a:r>
+            <a:r>
+              <a:rPr lang="en-US" dirty="0" smtClean="0">
+                <a:latin typeface="Anime Ace 2.0 BB"/>
+                <a:cs typeface="Anime Ace 2.0 BB"/>
+              </a:rPr>
+              <a:t>!</a:t>
+            </a:r>
+            <a:endParaRPr lang="en-US" dirty="0">
+              <a:latin typeface="Anime Ace 2.0 BB"/>
+              <a:cs typeface="Anime Ace 2.0 BB"/>
+            </a:endParaRPr>
+          </a:p>
+        </p:txBody>
+      </p:sp>
+      <p:cxnSp>
+        <p:nvCxnSpPr>
+          <p:cNvPr id="14" name="Straight Connector 13"/>
+          <p:cNvCxnSpPr/>
+          <p:nvPr/>
+        </p:nvCxnSpPr>
+        <p:spPr>
+          <a:xfrm flipH="1">
+            <a:off x="3622764" y="4436991"/>
+            <a:ext cx="113970" cy="236096"/>
+          </a:xfrm>
+          <a:prstGeom prst="line">
+            <a:avLst/>
+          </a:prstGeom>
+          <a:ln>
+            <a:solidFill>
+              <a:schemeClr val="bg1"/>
+            </a:solidFill>
+          </a:ln>
+        </p:spPr>
+        <p:style>
+          <a:lnRef idx="2">
+            <a:schemeClr val="accent1"/>
+          </a:lnRef>
+          <a:fillRef idx="0">
+            <a:schemeClr val="accent1"/>
+          </a:fillRef>
+          <a:effectRef idx="1">
+            <a:schemeClr val="accent1"/>
+          </a:effectRef>
+          <a:fontRef idx="minor">
+            <a:schemeClr val="tx1"/>
+          </a:fontRef>
+        </p:style>
+      </p:cxnSp>
+      <p:cxnSp>
+        <p:nvCxnSpPr>
+          <p:cNvPr id="16" name="Straight Connector 15"/>
+          <p:cNvCxnSpPr/>
+          <p:nvPr/>
+        </p:nvCxnSpPr>
+        <p:spPr>
+          <a:xfrm>
+            <a:off x="3736734" y="4436991"/>
+            <a:ext cx="38430" cy="170966"/>
+          </a:xfrm>
+          <a:prstGeom prst="line">
+            <a:avLst/>
+          </a:prstGeom>
+          <a:ln>
+            <a:solidFill>
+              <a:schemeClr val="bg1"/>
+            </a:solidFill>
+          </a:ln>
+        </p:spPr>
+        <p:style>
+          <a:lnRef idx="2">
+            <a:schemeClr val="accent1"/>
+          </a:lnRef>
+          <a:fillRef idx="0">
+            <a:schemeClr val="accent1"/>
+          </a:fillRef>
+          <a:effectRef idx="1">
+            <a:schemeClr val="accent1"/>
+          </a:effectRef>
+          <a:fontRef idx="minor">
+            <a:schemeClr val="tx1"/>
+          </a:fontRef>
+        </p:style>
+      </p:cxnSp>
+      <p:cxnSp>
+        <p:nvCxnSpPr>
+          <p:cNvPr id="19" name="Straight Connector 18"/>
+          <p:cNvCxnSpPr/>
+          <p:nvPr/>
+        </p:nvCxnSpPr>
+        <p:spPr>
+          <a:xfrm flipH="1">
+            <a:off x="5251367" y="4436991"/>
+            <a:ext cx="113970" cy="236096"/>
+          </a:xfrm>
+          <a:prstGeom prst="line">
+            <a:avLst/>
+          </a:prstGeom>
+          <a:ln>
+            <a:solidFill>
+              <a:schemeClr val="bg1"/>
+            </a:solidFill>
+          </a:ln>
+        </p:spPr>
+        <p:style>
+          <a:lnRef idx="2">
+            <a:schemeClr val="accent1"/>
+          </a:lnRef>
+          <a:fillRef idx="0">
+            <a:schemeClr val="accent1"/>
+          </a:fillRef>
+          <a:effectRef idx="1">
+            <a:schemeClr val="accent1"/>
+          </a:effectRef>
+          <a:fontRef idx="minor">
+            <a:schemeClr val="tx1"/>
+          </a:fontRef>
+        </p:style>
+      </p:cxnSp>
+      <p:cxnSp>
+        <p:nvCxnSpPr>
+          <p:cNvPr id="20" name="Straight Connector 19"/>
+          <p:cNvCxnSpPr/>
+          <p:nvPr/>
+        </p:nvCxnSpPr>
+        <p:spPr>
+          <a:xfrm>
+            <a:off x="5365337" y="4436991"/>
+            <a:ext cx="38430" cy="170966"/>
+          </a:xfrm>
+          <a:prstGeom prst="line">
+            <a:avLst/>
+          </a:prstGeom>
+          <a:ln>
+            <a:solidFill>
+              <a:schemeClr val="bg1"/>
+            </a:solidFill>
+          </a:ln>
+        </p:spPr>
+        <p:style>
+          <a:lnRef idx="2">
+            <a:schemeClr val="accent1"/>
+          </a:lnRef>
+          <a:fillRef idx="0">
+            <a:schemeClr val="accent1"/>
+          </a:fillRef>
+          <a:effectRef idx="1">
+            <a:schemeClr val="accent1"/>
+          </a:effectRef>
+          <a:fontRef idx="minor">
+            <a:schemeClr val="tx1"/>
+          </a:fontRef>
+        </p:style>
+      </p:cxnSp>
+      <p:sp>
+        <p:nvSpPr>
+          <p:cNvPr id="21" name="Oval Callout 20"/>
+          <p:cNvSpPr/>
+          <p:nvPr/>
+        </p:nvSpPr>
+        <p:spPr>
+          <a:xfrm>
+            <a:off x="905727" y="1788598"/>
+            <a:ext cx="2259385" cy="1649813"/>
+          </a:xfrm>
+          <a:prstGeom prst="wedgeEllipseCallout">
+            <a:avLst>
+              <a:gd name="adj1" fmla="val 52202"/>
+              <a:gd name="adj2" fmla="val 65033"/>
+            </a:avLst>
+          </a:prstGeom>
+          <a:noFill/>
+        </p:spPr>
+        <p:style>
+          <a:lnRef idx="3">
+            <a:schemeClr val="lt1"/>
+          </a:lnRef>
+          <a:fillRef idx="1">
+            <a:schemeClr val="dk1"/>
+          </a:fillRef>
+          <a:effectRef idx="1">
+            <a:schemeClr val="dk1"/>
+          </a:effectRef>
+          <a:fontRef idx="minor">
+            <a:schemeClr val="lt1"/>
+          </a:fontRef>
+        </p:style>
+        <p:txBody>
+          <a:bodyPr lIns="0" tIns="0" rIns="0" bIns="0" rtlCol="0" anchor="ctr"/>
+          <a:lstStyle/>
+          <a:p>
+            <a:pPr algn="ctr"/>
+            <a:r>
+              <a:rPr lang="en-US" dirty="0" smtClean="0">
+                <a:latin typeface="Anime Ace 2.0 BB"/>
+                <a:cs typeface="Anime Ace 2.0 BB"/>
+              </a:rPr>
+              <a:t>If you can’t port, then rewrite!</a:t>
+            </a:r>
+            <a:endParaRPr lang="en-US" dirty="0">
+              <a:latin typeface="Anime Ace 2.0 BB"/>
+              <a:cs typeface="Anime Ace 2.0 BB"/>
+            </a:endParaRPr>
+          </a:p>
+        </p:txBody>
+      </p:sp>
+      <p:sp>
+        <p:nvSpPr>
+          <p:cNvPr id="22" name="Freeform 21"/>
+          <p:cNvSpPr/>
+          <p:nvPr/>
+        </p:nvSpPr>
+        <p:spPr>
+          <a:xfrm>
+            <a:off x="3341722" y="3863892"/>
+            <a:ext cx="516595" cy="216154"/>
+          </a:xfrm>
+          <a:custGeom>
+            <a:avLst/>
+            <a:gdLst>
+              <a:gd name="connsiteX0" fmla="*/ 26906 w 555660"/>
+              <a:gd name="connsiteY0" fmla="*/ 0 h 205711"/>
+              <a:gd name="connsiteX1" fmla="*/ 113005 w 555660"/>
+              <a:gd name="connsiteY1" fmla="*/ 86103 h 205711"/>
+              <a:gd name="connsiteX2" fmla="*/ 495070 w 555660"/>
+              <a:gd name="connsiteY2" fmla="*/ 53814 h 205711"/>
+              <a:gd name="connsiteX3" fmla="*/ 516595 w 555660"/>
+              <a:gd name="connsiteY3" fmla="*/ 166825 h 205711"/>
+              <a:gd name="connsiteX4" fmla="*/ 118387 w 555660"/>
+              <a:gd name="connsiteY4" fmla="*/ 204495 h 205711"/>
+              <a:gd name="connsiteX5" fmla="*/ 0 w 555660"/>
+              <a:gd name="connsiteY5" fmla="*/ 129155 h 205711"/>
+              <a:gd name="connsiteX0" fmla="*/ 26906 w 555660"/>
+              <a:gd name="connsiteY0" fmla="*/ 0 h 205711"/>
+              <a:gd name="connsiteX1" fmla="*/ 113005 w 555660"/>
+              <a:gd name="connsiteY1" fmla="*/ 86103 h 205711"/>
+              <a:gd name="connsiteX2" fmla="*/ 495070 w 555660"/>
+              <a:gd name="connsiteY2" fmla="*/ 53814 h 205711"/>
+              <a:gd name="connsiteX3" fmla="*/ 516595 w 555660"/>
+              <a:gd name="connsiteY3" fmla="*/ 166825 h 205711"/>
+              <a:gd name="connsiteX4" fmla="*/ 118387 w 555660"/>
+              <a:gd name="connsiteY4" fmla="*/ 204495 h 205711"/>
+              <a:gd name="connsiteX5" fmla="*/ 0 w 555660"/>
+              <a:gd name="connsiteY5" fmla="*/ 129155 h 205711"/>
+              <a:gd name="connsiteX6" fmla="*/ 26906 w 555660"/>
+              <a:gd name="connsiteY6" fmla="*/ 0 h 205711"/>
+              <a:gd name="connsiteX0" fmla="*/ 26906 w 516595"/>
+              <a:gd name="connsiteY0" fmla="*/ 0 h 205711"/>
+              <a:gd name="connsiteX1" fmla="*/ 113005 w 516595"/>
+              <a:gd name="connsiteY1" fmla="*/ 86103 h 205711"/>
+              <a:gd name="connsiteX2" fmla="*/ 495070 w 516595"/>
+              <a:gd name="connsiteY2" fmla="*/ 53814 h 205711"/>
+              <a:gd name="connsiteX3" fmla="*/ 516595 w 516595"/>
+              <a:gd name="connsiteY3" fmla="*/ 166825 h 205711"/>
+              <a:gd name="connsiteX4" fmla="*/ 118387 w 516595"/>
+              <a:gd name="connsiteY4" fmla="*/ 204495 h 205711"/>
+              <a:gd name="connsiteX5" fmla="*/ 0 w 516595"/>
+              <a:gd name="connsiteY5" fmla="*/ 129155 h 205711"/>
+              <a:gd name="connsiteX6" fmla="*/ 26906 w 516595"/>
+              <a:gd name="connsiteY6" fmla="*/ 0 h 205711"/>
+              <a:gd name="connsiteX0" fmla="*/ 26906 w 539079"/>
+              <a:gd name="connsiteY0" fmla="*/ 0 h 216154"/>
+              <a:gd name="connsiteX1" fmla="*/ 113005 w 539079"/>
+              <a:gd name="connsiteY1" fmla="*/ 86103 h 216154"/>
+              <a:gd name="connsiteX2" fmla="*/ 495070 w 539079"/>
+              <a:gd name="connsiteY2" fmla="*/ 53814 h 216154"/>
+              <a:gd name="connsiteX3" fmla="*/ 516595 w 539079"/>
+              <a:gd name="connsiteY3" fmla="*/ 166825 h 216154"/>
+              <a:gd name="connsiteX4" fmla="*/ 145293 w 539079"/>
+              <a:gd name="connsiteY4" fmla="*/ 215258 h 216154"/>
+              <a:gd name="connsiteX5" fmla="*/ 0 w 539079"/>
+              <a:gd name="connsiteY5" fmla="*/ 129155 h 216154"/>
+              <a:gd name="connsiteX6" fmla="*/ 26906 w 539079"/>
+              <a:gd name="connsiteY6" fmla="*/ 0 h 216154"/>
+              <a:gd name="connsiteX0" fmla="*/ 26906 w 551280"/>
+              <a:gd name="connsiteY0" fmla="*/ 0 h 216154"/>
+              <a:gd name="connsiteX1" fmla="*/ 161436 w 551280"/>
+              <a:gd name="connsiteY1" fmla="*/ 86103 h 216154"/>
+              <a:gd name="connsiteX2" fmla="*/ 495070 w 551280"/>
+              <a:gd name="connsiteY2" fmla="*/ 53814 h 216154"/>
+              <a:gd name="connsiteX3" fmla="*/ 516595 w 551280"/>
+              <a:gd name="connsiteY3" fmla="*/ 166825 h 216154"/>
+              <a:gd name="connsiteX4" fmla="*/ 145293 w 551280"/>
+              <a:gd name="connsiteY4" fmla="*/ 215258 h 216154"/>
+              <a:gd name="connsiteX5" fmla="*/ 0 w 551280"/>
+              <a:gd name="connsiteY5" fmla="*/ 129155 h 216154"/>
+              <a:gd name="connsiteX6" fmla="*/ 26906 w 551280"/>
+              <a:gd name="connsiteY6" fmla="*/ 0 h 216154"/>
+              <a:gd name="connsiteX0" fmla="*/ 26906 w 516595"/>
+              <a:gd name="connsiteY0" fmla="*/ 0 h 216154"/>
+              <a:gd name="connsiteX1" fmla="*/ 161436 w 516595"/>
+              <a:gd name="connsiteY1" fmla="*/ 86103 h 216154"/>
+              <a:gd name="connsiteX2" fmla="*/ 495070 w 516595"/>
+              <a:gd name="connsiteY2" fmla="*/ 53814 h 216154"/>
+              <a:gd name="connsiteX3" fmla="*/ 516595 w 516595"/>
+              <a:gd name="connsiteY3" fmla="*/ 166825 h 216154"/>
+              <a:gd name="connsiteX4" fmla="*/ 145293 w 516595"/>
+              <a:gd name="connsiteY4" fmla="*/ 215258 h 216154"/>
+              <a:gd name="connsiteX5" fmla="*/ 0 w 516595"/>
+              <a:gd name="connsiteY5" fmla="*/ 129155 h 216154"/>
+              <a:gd name="connsiteX6" fmla="*/ 26906 w 516595"/>
+              <a:gd name="connsiteY6" fmla="*/ 0 h 216154"/>
+            </a:gdLst>
+            <a:ahLst/>
+            <a:cxnLst>
+              <a:cxn ang="0">
+                <a:pos x="connsiteX0" y="connsiteY0"/>
+              </a:cxn>
+              <a:cxn ang="0">
+                <a:pos x="connsiteX1" y="connsiteY1"/>
+              </a:cxn>
+              <a:cxn ang="0">
+                <a:pos x="connsiteX2" y="connsiteY2"/>
+              </a:cxn>
+              <a:cxn ang="0">
+                <a:pos x="connsiteX3" y="connsiteY3"/>
+              </a:cxn>
+              <a:cxn ang="0">
+                <a:pos x="connsiteX4" y="connsiteY4"/>
+              </a:cxn>
+              <a:cxn ang="0">
+                <a:pos x="connsiteX5" y="connsiteY5"/>
+              </a:cxn>
+              <a:cxn ang="0">
+                <a:pos x="connsiteX6" y="connsiteY6"/>
+              </a:cxn>
+            </a:cxnLst>
+            <a:rect l="l" t="t" r="r" b="b"/>
+            <a:pathLst>
+              <a:path w="516595" h="216154">
+                <a:moveTo>
+                  <a:pt x="26906" y="0"/>
+                </a:moveTo>
+                <a:cubicBezTo>
+                  <a:pt x="30942" y="38567"/>
+                  <a:pt x="83409" y="77134"/>
+                  <a:pt x="161436" y="86103"/>
+                </a:cubicBezTo>
+                <a:cubicBezTo>
+                  <a:pt x="239463" y="95072"/>
+                  <a:pt x="435877" y="40360"/>
+                  <a:pt x="495070" y="53814"/>
+                </a:cubicBezTo>
+                <a:lnTo>
+                  <a:pt x="516595" y="166825"/>
+                </a:lnTo>
+                <a:cubicBezTo>
+                  <a:pt x="458299" y="193732"/>
+                  <a:pt x="231392" y="221536"/>
+                  <a:pt x="145293" y="215258"/>
+                </a:cubicBezTo>
+                <a:cubicBezTo>
+                  <a:pt x="59194" y="208980"/>
+                  <a:pt x="0" y="129155"/>
+                  <a:pt x="0" y="129155"/>
+                </a:cubicBezTo>
+                <a:lnTo>
+                  <a:pt x="26906" y="0"/>
+                </a:lnTo>
+                <a:close/>
+              </a:path>
+            </a:pathLst>
+          </a:custGeom>
+          <a:ln>
+            <a:solidFill>
+              <a:srgbClr val="FFFFFF"/>
+            </a:solidFill>
+          </a:ln>
+        </p:spPr>
+        <p:style>
+          <a:lnRef idx="2">
+            <a:schemeClr val="accent1"/>
+          </a:lnRef>
+          <a:fillRef idx="0">
+            <a:schemeClr val="accent1"/>
+          </a:fillRef>
+          <a:effectRef idx="1">
+            <a:schemeClr val="accent1"/>
+          </a:effectRef>
+          <a:fontRef idx="minor">
+            <a:schemeClr val="tx1"/>
+          </a:fontRef>
+        </p:style>
+        <p:txBody>
+          <a:bodyPr rtlCol="0" anchor="ctr"/>
+          <a:lstStyle/>
+          <a:p>
+            <a:pPr algn="ctr"/>
+            <a:endParaRPr lang="en-US"/>
+          </a:p>
+        </p:txBody>
+      </p:sp>
+      <p:cxnSp>
+        <p:nvCxnSpPr>
+          <p:cNvPr id="31" name="Straight Connector 30"/>
+          <p:cNvCxnSpPr/>
+          <p:nvPr/>
+        </p:nvCxnSpPr>
+        <p:spPr>
+          <a:xfrm>
+            <a:off x="3411679" y="3923088"/>
+            <a:ext cx="0" cy="123771"/>
+          </a:xfrm>
+          <a:prstGeom prst="line">
+            <a:avLst/>
+          </a:prstGeom>
+          <a:ln>
+            <a:solidFill>
+              <a:srgbClr val="FFFFFF"/>
+            </a:solidFill>
+          </a:ln>
+        </p:spPr>
+        <p:style>
+          <a:lnRef idx="2">
+            <a:schemeClr val="accent1"/>
+          </a:lnRef>
+          <a:fillRef idx="0">
+            <a:schemeClr val="accent1"/>
+          </a:fillRef>
+          <a:effectRef idx="1">
+            <a:schemeClr val="accent1"/>
+          </a:effectRef>
+          <a:fontRef idx="minor">
+            <a:schemeClr val="tx1"/>
+          </a:fontRef>
+        </p:style>
+      </p:cxnSp>
+      <p:cxnSp>
+        <p:nvCxnSpPr>
+          <p:cNvPr id="32" name="Straight Connector 31"/>
+          <p:cNvCxnSpPr/>
+          <p:nvPr/>
+        </p:nvCxnSpPr>
+        <p:spPr>
+          <a:xfrm>
+            <a:off x="3461836" y="3956275"/>
+            <a:ext cx="0" cy="123771"/>
+          </a:xfrm>
+          <a:prstGeom prst="line">
+            <a:avLst/>
+          </a:prstGeom>
+          <a:ln>
+            <a:solidFill>
+              <a:srgbClr val="FFFFFF"/>
+            </a:solidFill>
+          </a:ln>
+        </p:spPr>
+        <p:style>
+          <a:lnRef idx="2">
+            <a:schemeClr val="accent1"/>
+          </a:lnRef>
+          <a:fillRef idx="0">
+            <a:schemeClr val="accent1"/>
+          </a:fillRef>
+          <a:effectRef idx="1">
+            <a:schemeClr val="accent1"/>
+          </a:effectRef>
+          <a:fontRef idx="minor">
+            <a:schemeClr val="tx1"/>
+          </a:fontRef>
+        </p:style>
+      </p:cxnSp>
+      <p:cxnSp>
+        <p:nvCxnSpPr>
+          <p:cNvPr id="33" name="Straight Connector 32"/>
+          <p:cNvCxnSpPr/>
+          <p:nvPr/>
+        </p:nvCxnSpPr>
+        <p:spPr>
+          <a:xfrm>
+            <a:off x="3515649" y="3956275"/>
+            <a:ext cx="0" cy="123771"/>
+          </a:xfrm>
+          <a:prstGeom prst="line">
+            <a:avLst/>
+          </a:prstGeom>
+          <a:ln>
+            <a:solidFill>
+              <a:srgbClr val="FFFFFF"/>
+            </a:solidFill>
+          </a:ln>
+        </p:spPr>
+        <p:style>
+          <a:lnRef idx="2">
+            <a:schemeClr val="accent1"/>
+          </a:lnRef>
+          <a:fillRef idx="0">
+            <a:schemeClr val="accent1"/>
+          </a:fillRef>
+          <a:effectRef idx="1">
+            <a:schemeClr val="accent1"/>
+          </a:effectRef>
+          <a:fontRef idx="minor">
+            <a:schemeClr val="tx1"/>
+          </a:fontRef>
+        </p:style>
+      </p:cxnSp>
+      <p:cxnSp>
+        <p:nvCxnSpPr>
+          <p:cNvPr id="34" name="Straight Connector 33"/>
+          <p:cNvCxnSpPr/>
+          <p:nvPr/>
+        </p:nvCxnSpPr>
+        <p:spPr>
+          <a:xfrm>
+            <a:off x="3564079" y="3956275"/>
+            <a:ext cx="0" cy="123771"/>
+          </a:xfrm>
+          <a:prstGeom prst="line">
+            <a:avLst/>
+          </a:prstGeom>
+          <a:ln>
+            <a:solidFill>
+              <a:srgbClr val="FFFFFF"/>
+            </a:solidFill>
+          </a:ln>
+        </p:spPr>
+        <p:style>
+          <a:lnRef idx="2">
+            <a:schemeClr val="accent1"/>
+          </a:lnRef>
+          <a:fillRef idx="0">
+            <a:schemeClr val="accent1"/>
+          </a:fillRef>
+          <a:effectRef idx="1">
+            <a:schemeClr val="accent1"/>
+          </a:effectRef>
+          <a:fontRef idx="minor">
+            <a:schemeClr val="tx1"/>
+          </a:fontRef>
+        </p:style>
+      </p:cxnSp>
+      <p:cxnSp>
+        <p:nvCxnSpPr>
+          <p:cNvPr id="35" name="Straight Connector 34"/>
+          <p:cNvCxnSpPr/>
+          <p:nvPr/>
+        </p:nvCxnSpPr>
+        <p:spPr>
+          <a:xfrm>
+            <a:off x="3622764" y="3949993"/>
+            <a:ext cx="0" cy="123771"/>
+          </a:xfrm>
+          <a:prstGeom prst="line">
+            <a:avLst/>
+          </a:prstGeom>
+          <a:ln>
+            <a:solidFill>
+              <a:srgbClr val="FFFFFF"/>
+            </a:solidFill>
+          </a:ln>
+        </p:spPr>
+        <p:style>
+          <a:lnRef idx="2">
+            <a:schemeClr val="accent1"/>
+          </a:lnRef>
+          <a:fillRef idx="0">
+            <a:schemeClr val="accent1"/>
+          </a:fillRef>
+          <a:effectRef idx="1">
+            <a:schemeClr val="accent1"/>
+          </a:effectRef>
+          <a:fontRef idx="minor">
+            <a:schemeClr val="tx1"/>
+          </a:fontRef>
+        </p:style>
+      </p:cxnSp>
+      <p:cxnSp>
+        <p:nvCxnSpPr>
+          <p:cNvPr id="36" name="Straight Connector 35"/>
+          <p:cNvCxnSpPr/>
+          <p:nvPr/>
+        </p:nvCxnSpPr>
+        <p:spPr>
+          <a:xfrm>
+            <a:off x="3682465" y="3933850"/>
+            <a:ext cx="0" cy="123771"/>
+          </a:xfrm>
+          <a:prstGeom prst="line">
+            <a:avLst/>
+          </a:prstGeom>
+          <a:ln>
+            <a:solidFill>
+              <a:srgbClr val="FFFFFF"/>
+            </a:solidFill>
+          </a:ln>
+        </p:spPr>
+        <p:style>
+          <a:lnRef idx="2">
+            <a:schemeClr val="accent1"/>
+          </a:lnRef>
+          <a:fillRef idx="0">
+            <a:schemeClr val="accent1"/>
+          </a:fillRef>
+          <a:effectRef idx="1">
+            <a:schemeClr val="accent1"/>
+          </a:effectRef>
+          <a:fontRef idx="minor">
+            <a:schemeClr val="tx1"/>
+          </a:fontRef>
+        </p:style>
+      </p:cxnSp>
+      <p:cxnSp>
+        <p:nvCxnSpPr>
+          <p:cNvPr id="38" name="Straight Connector 37"/>
+          <p:cNvCxnSpPr/>
+          <p:nvPr/>
+        </p:nvCxnSpPr>
+        <p:spPr>
+          <a:xfrm>
+            <a:off x="3736734" y="3926982"/>
+            <a:ext cx="0" cy="123771"/>
+          </a:xfrm>
+          <a:prstGeom prst="line">
+            <a:avLst/>
+          </a:prstGeom>
+          <a:ln>
+            <a:solidFill>
+              <a:srgbClr val="FFFFFF"/>
+            </a:solidFill>
+          </a:ln>
+        </p:spPr>
+        <p:style>
+          <a:lnRef idx="2">
+            <a:schemeClr val="accent1"/>
+          </a:lnRef>
+          <a:fillRef idx="0">
+            <a:schemeClr val="accent1"/>
+          </a:fillRef>
+          <a:effectRef idx="1">
+            <a:schemeClr val="accent1"/>
+          </a:effectRef>
+          <a:fontRef idx="minor">
+            <a:schemeClr val="tx1"/>
+          </a:fontRef>
+        </p:style>
+      </p:cxnSp>
+      <p:sp>
+        <p:nvSpPr>
+          <p:cNvPr id="2" name="Rectangle 1"/>
+          <p:cNvSpPr/>
+          <p:nvPr/>
+        </p:nvSpPr>
+        <p:spPr>
+          <a:xfrm>
+            <a:off x="643370" y="1545818"/>
+            <a:ext cx="7695373" cy="3601338"/>
+          </a:xfrm>
+          <a:prstGeom prst="rect">
+            <a:avLst/>
+          </a:prstGeom>
+          <a:noFill/>
+          <a:ln>
+            <a:noFill/>
+          </a:ln>
+        </p:spPr>
+        <p:style>
+          <a:lnRef idx="1">
+            <a:schemeClr val="accent1"/>
+          </a:lnRef>
+          <a:fillRef idx="3">
+            <a:schemeClr val="accent1"/>
+          </a:fillRef>
+          <a:effectRef idx="2">
+            <a:schemeClr val="accent1"/>
+          </a:effectRef>
+          <a:fontRef idx="minor">
+            <a:schemeClr val="lt1"/>
+          </a:fontRef>
+        </p:style>
+        <p:txBody>
+          <a:bodyPr rtlCol="0" anchor="ctr"/>
+          <a:lstStyle/>
+          <a:p>
+            <a:pPr algn="ctr"/>
+            <a:endParaRPr lang="en-US"/>
+          </a:p>
+        </p:txBody>
+      </p:sp>
+    </p:spTree>
+    <p:extLst>
+      <p:ext uri="{BB962C8B-B14F-4D97-AF65-F5344CB8AC3E}">
+        <p14:creationId xmlns:p14="http://schemas.microsoft.com/office/powerpoint/2010/main" val="1114110274"/>
+      </p:ext>
+    </p:extLst>
+  </p:cSld>
+  <p:clrMapOvr>
+    <a:masterClrMapping/>
+  </p:clrMapOvr>
+</p:sld>
+</file>
+
 <file path=ppt/slides/slide2.xml><?xml version="1.0" encoding="utf-8"?>
 <p:sld xmlns:a="http://schemas.openxmlformats.org/drawingml/2006/main" xmlns:r="http://schemas.openxmlformats.org/officeDocument/2006/relationships" xmlns:p="http://schemas.openxmlformats.org/presentationml/2006/main">
   <p:cSld>

</xml_diff>

<commit_message>
Added example install slides.
</commit_message>
<xml_diff>
--- a/src/exampleModuleAintCore.pptx
+++ b/src/exampleModuleAintCore.pptx
@@ -34,6 +34,7 @@
     <p:sldId id="283" r:id="rId28"/>
     <p:sldId id="284" r:id="rId29"/>
     <p:sldId id="285" r:id="rId30"/>
+    <p:sldId id="286" r:id="rId31"/>
   </p:sldIdLst>
   <p:sldSz cx="9144000" cy="6858000" type="screen4x3"/>
   <p:notesSz cx="6858000" cy="9144000"/>
@@ -12243,13 +12244,6 @@
               </a:rPr>
               <a:t>Time to understand</a:t>
             </a:r>
-            <a:endParaRPr lang="en-US" sz="1400" dirty="0">
-              <a:solidFill>
-                <a:srgbClr val="7F7F7F"/>
-              </a:solidFill>
-              <a:latin typeface="Anime Ace 2.0 BB"/>
-              <a:cs typeface="Anime Ace 2.0 BB"/>
-            </a:endParaRPr>
           </a:p>
         </p:txBody>
       </p:sp>
@@ -13523,13 +13517,6 @@
               </a:rPr>
               <a:t>Time to understand</a:t>
             </a:r>
-            <a:endParaRPr lang="en-US" sz="1400" dirty="0">
-              <a:solidFill>
-                <a:srgbClr val="7F7F7F"/>
-              </a:solidFill>
-              <a:latin typeface="Anime Ace 2.0 BB"/>
-              <a:cs typeface="Anime Ace 2.0 BB"/>
-            </a:endParaRPr>
           </a:p>
         </p:txBody>
       </p:sp>
@@ -23342,6 +23329,3532 @@
 </p:sld>
 </file>
 
+<file path=ppt/slides/slide30.xml><?xml version="1.0" encoding="utf-8"?>
+<p:sld xmlns:a="http://schemas.openxmlformats.org/drawingml/2006/main" xmlns:r="http://schemas.openxmlformats.org/officeDocument/2006/relationships" xmlns:p="http://schemas.openxmlformats.org/presentationml/2006/main">
+  <p:cSld>
+    <p:spTree>
+      <p:nvGrpSpPr>
+        <p:cNvPr id="1" name=""/>
+        <p:cNvGrpSpPr/>
+        <p:nvPr/>
+      </p:nvGrpSpPr>
+      <p:grpSpPr>
+        <a:xfrm>
+          <a:off x="0" y="0"/>
+          <a:ext cx="0" cy="0"/>
+          <a:chOff x="0" y="0"/>
+          <a:chExt cx="0" cy="0"/>
+        </a:xfrm>
+      </p:grpSpPr>
+      <p:grpSp>
+        <p:nvGrpSpPr>
+          <p:cNvPr id="2" name="Group 1"/>
+          <p:cNvGrpSpPr>
+            <a:grpSpLocks noChangeAspect="1"/>
+          </p:cNvGrpSpPr>
+          <p:nvPr/>
+        </p:nvGrpSpPr>
+        <p:grpSpPr>
+          <a:xfrm>
+            <a:off x="727703" y="230982"/>
+            <a:ext cx="874553" cy="1170541"/>
+            <a:chOff x="5381882" y="2873060"/>
+            <a:chExt cx="1361186" cy="1821873"/>
+          </a:xfrm>
+        </p:grpSpPr>
+        <p:sp>
+          <p:nvSpPr>
+            <p:cNvPr id="3" name="Chord 3"/>
+            <p:cNvSpPr/>
+            <p:nvPr/>
+          </p:nvSpPr>
+          <p:spPr>
+            <a:xfrm>
+              <a:off x="5381882" y="3890610"/>
+              <a:ext cx="1231640" cy="804323"/>
+            </a:xfrm>
+            <a:custGeom>
+              <a:avLst/>
+              <a:gdLst>
+                <a:gd name="connsiteX0" fmla="*/ 16608 w 2232278"/>
+                <a:gd name="connsiteY0" fmla="*/ 1307968 h 2232278"/>
+                <a:gd name="connsiteX1" fmla="*/ 589005 w 2232278"/>
+                <a:gd name="connsiteY1" fmla="*/ 132321 h 2232278"/>
+                <a:gd name="connsiteX2" fmla="*/ 1884880 w 2232278"/>
+                <a:gd name="connsiteY2" fmla="*/ 306939 h 2232278"/>
+                <a:gd name="connsiteX3" fmla="*/ 2125677 w 2232278"/>
+                <a:gd name="connsiteY3" fmla="*/ 1592163 h 2232278"/>
+                <a:gd name="connsiteX4" fmla="*/ 16608 w 2232278"/>
+                <a:gd name="connsiteY4" fmla="*/ 1307968 h 2232278"/>
+                <a:gd name="connsiteX0" fmla="*/ 16669 w 2232378"/>
+                <a:gd name="connsiteY0" fmla="*/ 1307991 h 1619407"/>
+                <a:gd name="connsiteX1" fmla="*/ 589066 w 2232378"/>
+                <a:gd name="connsiteY1" fmla="*/ 132344 h 1619407"/>
+                <a:gd name="connsiteX2" fmla="*/ 1884941 w 2232378"/>
+                <a:gd name="connsiteY2" fmla="*/ 306962 h 1619407"/>
+                <a:gd name="connsiteX3" fmla="*/ 2125738 w 2232378"/>
+                <a:gd name="connsiteY3" fmla="*/ 1592186 h 1619407"/>
+                <a:gd name="connsiteX4" fmla="*/ 16669 w 2232378"/>
+                <a:gd name="connsiteY4" fmla="*/ 1307991 h 1619407"/>
+                <a:gd name="connsiteX0" fmla="*/ 16669 w 2232378"/>
+                <a:gd name="connsiteY0" fmla="*/ 1307991 h 1698147"/>
+                <a:gd name="connsiteX1" fmla="*/ 589066 w 2232378"/>
+                <a:gd name="connsiteY1" fmla="*/ 132344 h 1698147"/>
+                <a:gd name="connsiteX2" fmla="*/ 1884941 w 2232378"/>
+                <a:gd name="connsiteY2" fmla="*/ 306962 h 1698147"/>
+                <a:gd name="connsiteX3" fmla="*/ 2125738 w 2232378"/>
+                <a:gd name="connsiteY3" fmla="*/ 1592186 h 1698147"/>
+                <a:gd name="connsiteX4" fmla="*/ 16669 w 2232378"/>
+                <a:gd name="connsiteY4" fmla="*/ 1307991 h 1698147"/>
+                <a:gd name="connsiteX0" fmla="*/ 16669 w 2232378"/>
+                <a:gd name="connsiteY0" fmla="*/ 1307991 h 1698147"/>
+                <a:gd name="connsiteX1" fmla="*/ 589066 w 2232378"/>
+                <a:gd name="connsiteY1" fmla="*/ 132344 h 1698147"/>
+                <a:gd name="connsiteX2" fmla="*/ 1884941 w 2232378"/>
+                <a:gd name="connsiteY2" fmla="*/ 306962 h 1698147"/>
+                <a:gd name="connsiteX3" fmla="*/ 2125738 w 2232378"/>
+                <a:gd name="connsiteY3" fmla="*/ 1592186 h 1698147"/>
+                <a:gd name="connsiteX4" fmla="*/ 16669 w 2232378"/>
+                <a:gd name="connsiteY4" fmla="*/ 1307991 h 1698147"/>
+                <a:gd name="connsiteX0" fmla="*/ 16669 w 2232378"/>
+                <a:gd name="connsiteY0" fmla="*/ 1175646 h 1565802"/>
+                <a:gd name="connsiteX1" fmla="*/ 589066 w 2232378"/>
+                <a:gd name="connsiteY1" fmla="*/ -1 h 1565802"/>
+                <a:gd name="connsiteX2" fmla="*/ 1884941 w 2232378"/>
+                <a:gd name="connsiteY2" fmla="*/ 174617 h 1565802"/>
+                <a:gd name="connsiteX3" fmla="*/ 2125738 w 2232378"/>
+                <a:gd name="connsiteY3" fmla="*/ 1459841 h 1565802"/>
+                <a:gd name="connsiteX4" fmla="*/ 16669 w 2232378"/>
+                <a:gd name="connsiteY4" fmla="*/ 1175646 h 1565802"/>
+                <a:gd name="connsiteX0" fmla="*/ 16669 w 2232378"/>
+                <a:gd name="connsiteY0" fmla="*/ 1175648 h 1565804"/>
+                <a:gd name="connsiteX1" fmla="*/ 589066 w 2232378"/>
+                <a:gd name="connsiteY1" fmla="*/ 1 h 1565804"/>
+                <a:gd name="connsiteX2" fmla="*/ 1884941 w 2232378"/>
+                <a:gd name="connsiteY2" fmla="*/ 174619 h 1565804"/>
+                <a:gd name="connsiteX3" fmla="*/ 2125738 w 2232378"/>
+                <a:gd name="connsiteY3" fmla="*/ 1459843 h 1565804"/>
+                <a:gd name="connsiteX4" fmla="*/ 16669 w 2232378"/>
+                <a:gd name="connsiteY4" fmla="*/ 1175648 h 1565804"/>
+                <a:gd name="connsiteX0" fmla="*/ 16669 w 2232378"/>
+                <a:gd name="connsiteY0" fmla="*/ 1175646 h 1565802"/>
+                <a:gd name="connsiteX1" fmla="*/ 589066 w 2232378"/>
+                <a:gd name="connsiteY1" fmla="*/ -1 h 1565802"/>
+                <a:gd name="connsiteX2" fmla="*/ 1884941 w 2232378"/>
+                <a:gd name="connsiteY2" fmla="*/ 174617 h 1565802"/>
+                <a:gd name="connsiteX3" fmla="*/ 2125738 w 2232378"/>
+                <a:gd name="connsiteY3" fmla="*/ 1459841 h 1565802"/>
+                <a:gd name="connsiteX4" fmla="*/ 16669 w 2232378"/>
+                <a:gd name="connsiteY4" fmla="*/ 1175646 h 1565802"/>
+              </a:gdLst>
+              <a:ahLst/>
+              <a:cxnLst>
+                <a:cxn ang="0">
+                  <a:pos x="connsiteX0" y="connsiteY0"/>
+                </a:cxn>
+                <a:cxn ang="0">
+                  <a:pos x="connsiteX1" y="connsiteY1"/>
+                </a:cxn>
+                <a:cxn ang="0">
+                  <a:pos x="connsiteX2" y="connsiteY2"/>
+                </a:cxn>
+                <a:cxn ang="0">
+                  <a:pos x="connsiteX3" y="connsiteY3"/>
+                </a:cxn>
+                <a:cxn ang="0">
+                  <a:pos x="connsiteX4" y="connsiteY4"/>
+                </a:cxn>
+              </a:cxnLst>
+              <a:rect l="l" t="t" r="r" b="b"/>
+              <a:pathLst>
+                <a:path w="2232378" h="1565802">
+                  <a:moveTo>
+                    <a:pt x="16669" y="1175646"/>
+                  </a:moveTo>
+                  <a:cubicBezTo>
+                    <a:pt x="-66084" y="701323"/>
+                    <a:pt x="164660" y="227398"/>
+                    <a:pt x="589066" y="-1"/>
+                  </a:cubicBezTo>
+                  <a:cubicBezTo>
+                    <a:pt x="1013471" y="543761"/>
+                    <a:pt x="1715366" y="47123"/>
+                    <a:pt x="1884941" y="174617"/>
+                  </a:cubicBezTo>
+                  <a:cubicBezTo>
+                    <a:pt x="2234019" y="506242"/>
+                    <a:pt x="2331089" y="1024340"/>
+                    <a:pt x="2125738" y="1459841"/>
+                  </a:cubicBezTo>
+                  <a:cubicBezTo>
+                    <a:pt x="1461202" y="1570351"/>
+                    <a:pt x="886471" y="1719347"/>
+                    <a:pt x="16669" y="1175646"/>
+                  </a:cubicBezTo>
+                  <a:close/>
+                </a:path>
+              </a:pathLst>
+            </a:custGeom>
+            <a:noFill/>
+            <a:ln w="38100" cmpd="sng">
+              <a:solidFill>
+                <a:schemeClr val="bg1"/>
+              </a:solidFill>
+            </a:ln>
+          </p:spPr>
+          <p:style>
+            <a:lnRef idx="1">
+              <a:schemeClr val="accent1"/>
+            </a:lnRef>
+            <a:fillRef idx="3">
+              <a:schemeClr val="accent1"/>
+            </a:fillRef>
+            <a:effectRef idx="2">
+              <a:schemeClr val="accent1"/>
+            </a:effectRef>
+            <a:fontRef idx="minor">
+              <a:schemeClr val="lt1"/>
+            </a:fontRef>
+          </p:style>
+          <p:txBody>
+            <a:bodyPr rtlCol="0" anchor="ctr"/>
+            <a:lstStyle/>
+            <a:p>
+              <a:pPr algn="ctr"/>
+              <a:endParaRPr lang="en-US"/>
+            </a:p>
+          </p:txBody>
+        </p:sp>
+        <p:sp>
+          <p:nvSpPr>
+            <p:cNvPr id="4" name="Oval 3"/>
+            <p:cNvSpPr/>
+            <p:nvPr/>
+          </p:nvSpPr>
+          <p:spPr>
+            <a:xfrm>
+              <a:off x="5652009" y="3117129"/>
+              <a:ext cx="794595" cy="773482"/>
+            </a:xfrm>
+            <a:prstGeom prst="ellipse">
+              <a:avLst/>
+            </a:prstGeom>
+            <a:noFill/>
+            <a:ln w="38100" cmpd="sng">
+              <a:solidFill>
+                <a:schemeClr val="bg1"/>
+              </a:solidFill>
+            </a:ln>
+          </p:spPr>
+          <p:style>
+            <a:lnRef idx="1">
+              <a:schemeClr val="accent1"/>
+            </a:lnRef>
+            <a:fillRef idx="3">
+              <a:schemeClr val="accent1"/>
+            </a:fillRef>
+            <a:effectRef idx="2">
+              <a:schemeClr val="accent1"/>
+            </a:effectRef>
+            <a:fontRef idx="minor">
+              <a:schemeClr val="lt1"/>
+            </a:fontRef>
+          </p:style>
+          <p:txBody>
+            <a:bodyPr rtlCol="0" anchor="ctr"/>
+            <a:lstStyle/>
+            <a:p>
+              <a:pPr algn="ctr"/>
+              <a:endParaRPr lang="en-US"/>
+            </a:p>
+          </p:txBody>
+        </p:sp>
+        <p:sp>
+          <p:nvSpPr>
+            <p:cNvPr id="5" name="Oval 4"/>
+            <p:cNvSpPr/>
+            <p:nvPr/>
+          </p:nvSpPr>
+          <p:spPr>
+            <a:xfrm>
+              <a:off x="5855905" y="3378756"/>
+              <a:ext cx="64081" cy="145636"/>
+            </a:xfrm>
+            <a:prstGeom prst="ellipse">
+              <a:avLst/>
+            </a:prstGeom>
+            <a:solidFill>
+              <a:srgbClr val="FFFFFF"/>
+            </a:solidFill>
+            <a:ln>
+              <a:noFill/>
+            </a:ln>
+          </p:spPr>
+          <p:style>
+            <a:lnRef idx="1">
+              <a:schemeClr val="accent1"/>
+            </a:lnRef>
+            <a:fillRef idx="3">
+              <a:schemeClr val="accent1"/>
+            </a:fillRef>
+            <a:effectRef idx="2">
+              <a:schemeClr val="accent1"/>
+            </a:effectRef>
+            <a:fontRef idx="minor">
+              <a:schemeClr val="lt1"/>
+            </a:fontRef>
+          </p:style>
+          <p:txBody>
+            <a:bodyPr rtlCol="0" anchor="ctr"/>
+            <a:lstStyle/>
+            <a:p>
+              <a:pPr algn="ctr"/>
+              <a:endParaRPr lang="en-US"/>
+            </a:p>
+          </p:txBody>
+        </p:sp>
+        <p:sp>
+          <p:nvSpPr>
+            <p:cNvPr id="6" name="Oval 5"/>
+            <p:cNvSpPr/>
+            <p:nvPr/>
+          </p:nvSpPr>
+          <p:spPr>
+            <a:xfrm>
+              <a:off x="6072386" y="3378756"/>
+              <a:ext cx="64081" cy="145636"/>
+            </a:xfrm>
+            <a:prstGeom prst="ellipse">
+              <a:avLst/>
+            </a:prstGeom>
+            <a:solidFill>
+              <a:srgbClr val="FFFFFF"/>
+            </a:solidFill>
+            <a:ln>
+              <a:noFill/>
+            </a:ln>
+          </p:spPr>
+          <p:style>
+            <a:lnRef idx="1">
+              <a:schemeClr val="accent1"/>
+            </a:lnRef>
+            <a:fillRef idx="3">
+              <a:schemeClr val="accent1"/>
+            </a:fillRef>
+            <a:effectRef idx="2">
+              <a:schemeClr val="accent1"/>
+            </a:effectRef>
+            <a:fontRef idx="minor">
+              <a:schemeClr val="lt1"/>
+            </a:fontRef>
+          </p:style>
+          <p:txBody>
+            <a:bodyPr rtlCol="0" anchor="ctr"/>
+            <a:lstStyle/>
+            <a:p>
+              <a:pPr algn="ctr"/>
+              <a:endParaRPr lang="en-US"/>
+            </a:p>
+          </p:txBody>
+        </p:sp>
+        <p:sp>
+          <p:nvSpPr>
+            <p:cNvPr id="7" name="Freeform 6"/>
+            <p:cNvSpPr/>
+            <p:nvPr/>
+          </p:nvSpPr>
+          <p:spPr>
+            <a:xfrm>
+              <a:off x="5392189" y="2873060"/>
+              <a:ext cx="1350879" cy="1151124"/>
+            </a:xfrm>
+            <a:custGeom>
+              <a:avLst/>
+              <a:gdLst>
+                <a:gd name="connsiteX0" fmla="*/ 224482 w 1242397"/>
+                <a:gd name="connsiteY0" fmla="*/ 837621 h 1084970"/>
+                <a:gd name="connsiteX1" fmla="*/ 34217 w 1242397"/>
+                <a:gd name="connsiteY1" fmla="*/ 637839 h 1084970"/>
+                <a:gd name="connsiteX2" fmla="*/ 148376 w 1242397"/>
+                <a:gd name="connsiteY2" fmla="*/ 476110 h 1084970"/>
+                <a:gd name="connsiteX3" fmla="*/ 921 w 1242397"/>
+                <a:gd name="connsiteY3" fmla="*/ 309625 h 1084970"/>
+                <a:gd name="connsiteX4" fmla="*/ 233995 w 1242397"/>
+                <a:gd name="connsiteY4" fmla="*/ 276328 h 1084970"/>
+                <a:gd name="connsiteX5" fmla="*/ 124593 w 1242397"/>
+                <a:gd name="connsiteY5" fmla="*/ 90816 h 1084970"/>
+                <a:gd name="connsiteX6" fmla="*/ 371937 w 1242397"/>
+                <a:gd name="connsiteY6" fmla="*/ 152653 h 1084970"/>
+                <a:gd name="connsiteX7" fmla="*/ 390963 w 1242397"/>
+                <a:gd name="connsiteY7" fmla="*/ 5195 h 1084970"/>
+                <a:gd name="connsiteX8" fmla="*/ 533662 w 1242397"/>
+                <a:gd name="connsiteY8" fmla="*/ 100330 h 1084970"/>
+                <a:gd name="connsiteX9" fmla="*/ 609768 w 1242397"/>
+                <a:gd name="connsiteY9" fmla="*/ 5195 h 1084970"/>
+                <a:gd name="connsiteX10" fmla="*/ 681117 w 1242397"/>
+                <a:gd name="connsiteY10" fmla="*/ 95573 h 1084970"/>
+                <a:gd name="connsiteX11" fmla="*/ 814302 w 1242397"/>
+                <a:gd name="connsiteY11" fmla="*/ 438 h 1084970"/>
+                <a:gd name="connsiteX12" fmla="*/ 823815 w 1242397"/>
+                <a:gd name="connsiteY12" fmla="*/ 143140 h 1084970"/>
+                <a:gd name="connsiteX13" fmla="*/ 971270 w 1242397"/>
+                <a:gd name="connsiteY13" fmla="*/ 124113 h 1084970"/>
+                <a:gd name="connsiteX14" fmla="*/ 937974 w 1242397"/>
+                <a:gd name="connsiteY14" fmla="*/ 243031 h 1084970"/>
+                <a:gd name="connsiteX15" fmla="*/ 1109212 w 1242397"/>
+                <a:gd name="connsiteY15" fmla="*/ 295355 h 1084970"/>
+                <a:gd name="connsiteX16" fmla="*/ 1071159 w 1242397"/>
+                <a:gd name="connsiteY16" fmla="*/ 466597 h 1084970"/>
+                <a:gd name="connsiteX17" fmla="*/ 1194831 w 1242397"/>
+                <a:gd name="connsiteY17" fmla="*/ 637839 h 1084970"/>
+                <a:gd name="connsiteX18" fmla="*/ 1056889 w 1242397"/>
+                <a:gd name="connsiteY18" fmla="*/ 804324 h 1084970"/>
+                <a:gd name="connsiteX19" fmla="*/ 1204345 w 1242397"/>
+                <a:gd name="connsiteY19" fmla="*/ 918485 h 1084970"/>
+                <a:gd name="connsiteX20" fmla="*/ 1137752 w 1242397"/>
+                <a:gd name="connsiteY20" fmla="*/ 994593 h 1084970"/>
+                <a:gd name="connsiteX21" fmla="*/ 1242397 w 1242397"/>
+                <a:gd name="connsiteY21" fmla="*/ 1084970 h 1084970"/>
+                <a:gd name="connsiteX22" fmla="*/ 1242397 w 1242397"/>
+                <a:gd name="connsiteY22" fmla="*/ 1084970 h 1084970"/>
+              </a:gdLst>
+              <a:ahLst/>
+              <a:cxnLst>
+                <a:cxn ang="0">
+                  <a:pos x="connsiteX0" y="connsiteY0"/>
+                </a:cxn>
+                <a:cxn ang="0">
+                  <a:pos x="connsiteX1" y="connsiteY1"/>
+                </a:cxn>
+                <a:cxn ang="0">
+                  <a:pos x="connsiteX2" y="connsiteY2"/>
+                </a:cxn>
+                <a:cxn ang="0">
+                  <a:pos x="connsiteX3" y="connsiteY3"/>
+                </a:cxn>
+                <a:cxn ang="0">
+                  <a:pos x="connsiteX4" y="connsiteY4"/>
+                </a:cxn>
+                <a:cxn ang="0">
+                  <a:pos x="connsiteX5" y="connsiteY5"/>
+                </a:cxn>
+                <a:cxn ang="0">
+                  <a:pos x="connsiteX6" y="connsiteY6"/>
+                </a:cxn>
+                <a:cxn ang="0">
+                  <a:pos x="connsiteX7" y="connsiteY7"/>
+                </a:cxn>
+                <a:cxn ang="0">
+                  <a:pos x="connsiteX8" y="connsiteY8"/>
+                </a:cxn>
+                <a:cxn ang="0">
+                  <a:pos x="connsiteX9" y="connsiteY9"/>
+                </a:cxn>
+                <a:cxn ang="0">
+                  <a:pos x="connsiteX10" y="connsiteY10"/>
+                </a:cxn>
+                <a:cxn ang="0">
+                  <a:pos x="connsiteX11" y="connsiteY11"/>
+                </a:cxn>
+                <a:cxn ang="0">
+                  <a:pos x="connsiteX12" y="connsiteY12"/>
+                </a:cxn>
+                <a:cxn ang="0">
+                  <a:pos x="connsiteX13" y="connsiteY13"/>
+                </a:cxn>
+                <a:cxn ang="0">
+                  <a:pos x="connsiteX14" y="connsiteY14"/>
+                </a:cxn>
+                <a:cxn ang="0">
+                  <a:pos x="connsiteX15" y="connsiteY15"/>
+                </a:cxn>
+                <a:cxn ang="0">
+                  <a:pos x="connsiteX16" y="connsiteY16"/>
+                </a:cxn>
+                <a:cxn ang="0">
+                  <a:pos x="connsiteX17" y="connsiteY17"/>
+                </a:cxn>
+                <a:cxn ang="0">
+                  <a:pos x="connsiteX18" y="connsiteY18"/>
+                </a:cxn>
+                <a:cxn ang="0">
+                  <a:pos x="connsiteX19" y="connsiteY19"/>
+                </a:cxn>
+                <a:cxn ang="0">
+                  <a:pos x="connsiteX20" y="connsiteY20"/>
+                </a:cxn>
+                <a:cxn ang="0">
+                  <a:pos x="connsiteX21" y="connsiteY21"/>
+                </a:cxn>
+                <a:cxn ang="0">
+                  <a:pos x="connsiteX22" y="connsiteY22"/>
+                </a:cxn>
+              </a:cxnLst>
+              <a:rect l="l" t="t" r="r" b="b"/>
+              <a:pathLst>
+                <a:path w="1242397" h="1084970">
+                  <a:moveTo>
+                    <a:pt x="224482" y="837621"/>
+                  </a:moveTo>
+                  <a:cubicBezTo>
+                    <a:pt x="135691" y="767856"/>
+                    <a:pt x="46901" y="698091"/>
+                    <a:pt x="34217" y="637839"/>
+                  </a:cubicBezTo>
+                  <a:cubicBezTo>
+                    <a:pt x="21533" y="577587"/>
+                    <a:pt x="153925" y="530812"/>
+                    <a:pt x="148376" y="476110"/>
+                  </a:cubicBezTo>
+                  <a:cubicBezTo>
+                    <a:pt x="142827" y="421408"/>
+                    <a:pt x="-13349" y="342922"/>
+                    <a:pt x="921" y="309625"/>
+                  </a:cubicBezTo>
+                  <a:cubicBezTo>
+                    <a:pt x="15191" y="276328"/>
+                    <a:pt x="213383" y="312796"/>
+                    <a:pt x="233995" y="276328"/>
+                  </a:cubicBezTo>
+                  <a:cubicBezTo>
+                    <a:pt x="254607" y="239860"/>
+                    <a:pt x="101603" y="111428"/>
+                    <a:pt x="124593" y="90816"/>
+                  </a:cubicBezTo>
+                  <a:cubicBezTo>
+                    <a:pt x="147583" y="70203"/>
+                    <a:pt x="327542" y="166923"/>
+                    <a:pt x="371937" y="152653"/>
+                  </a:cubicBezTo>
+                  <a:cubicBezTo>
+                    <a:pt x="416332" y="138383"/>
+                    <a:pt x="364009" y="13915"/>
+                    <a:pt x="390963" y="5195"/>
+                  </a:cubicBezTo>
+                  <a:cubicBezTo>
+                    <a:pt x="417917" y="-3525"/>
+                    <a:pt x="497195" y="100330"/>
+                    <a:pt x="533662" y="100330"/>
+                  </a:cubicBezTo>
+                  <a:cubicBezTo>
+                    <a:pt x="570129" y="100330"/>
+                    <a:pt x="585192" y="5988"/>
+                    <a:pt x="609768" y="5195"/>
+                  </a:cubicBezTo>
+                  <a:cubicBezTo>
+                    <a:pt x="634344" y="4402"/>
+                    <a:pt x="647028" y="96366"/>
+                    <a:pt x="681117" y="95573"/>
+                  </a:cubicBezTo>
+                  <a:cubicBezTo>
+                    <a:pt x="715206" y="94780"/>
+                    <a:pt x="790519" y="-7490"/>
+                    <a:pt x="814302" y="438"/>
+                  </a:cubicBezTo>
+                  <a:cubicBezTo>
+                    <a:pt x="838085" y="8366"/>
+                    <a:pt x="797654" y="122528"/>
+                    <a:pt x="823815" y="143140"/>
+                  </a:cubicBezTo>
+                  <a:cubicBezTo>
+                    <a:pt x="849976" y="163752"/>
+                    <a:pt x="952244" y="107465"/>
+                    <a:pt x="971270" y="124113"/>
+                  </a:cubicBezTo>
+                  <a:cubicBezTo>
+                    <a:pt x="990296" y="140761"/>
+                    <a:pt x="914984" y="214491"/>
+                    <a:pt x="937974" y="243031"/>
+                  </a:cubicBezTo>
+                  <a:cubicBezTo>
+                    <a:pt x="960964" y="271571"/>
+                    <a:pt x="1087015" y="258094"/>
+                    <a:pt x="1109212" y="295355"/>
+                  </a:cubicBezTo>
+                  <a:cubicBezTo>
+                    <a:pt x="1131409" y="332616"/>
+                    <a:pt x="1056889" y="409516"/>
+                    <a:pt x="1071159" y="466597"/>
+                  </a:cubicBezTo>
+                  <a:cubicBezTo>
+                    <a:pt x="1085429" y="523678"/>
+                    <a:pt x="1197209" y="581551"/>
+                    <a:pt x="1194831" y="637839"/>
+                  </a:cubicBezTo>
+                  <a:cubicBezTo>
+                    <a:pt x="1192453" y="694127"/>
+                    <a:pt x="1055303" y="757550"/>
+                    <a:pt x="1056889" y="804324"/>
+                  </a:cubicBezTo>
+                  <a:cubicBezTo>
+                    <a:pt x="1058475" y="851098"/>
+                    <a:pt x="1190868" y="886774"/>
+                    <a:pt x="1204345" y="918485"/>
+                  </a:cubicBezTo>
+                  <a:cubicBezTo>
+                    <a:pt x="1217822" y="950197"/>
+                    <a:pt x="1131410" y="966846"/>
+                    <a:pt x="1137752" y="994593"/>
+                  </a:cubicBezTo>
+                  <a:cubicBezTo>
+                    <a:pt x="1144094" y="1022341"/>
+                    <a:pt x="1242397" y="1084970"/>
+                    <a:pt x="1242397" y="1084970"/>
+                  </a:cubicBezTo>
+                  <a:lnTo>
+                    <a:pt x="1242397" y="1084970"/>
+                  </a:lnTo>
+                </a:path>
+              </a:pathLst>
+            </a:custGeom>
+            <a:ln>
+              <a:solidFill>
+                <a:srgbClr val="FFFFFF"/>
+              </a:solidFill>
+            </a:ln>
+          </p:spPr>
+          <p:style>
+            <a:lnRef idx="2">
+              <a:schemeClr val="accent1"/>
+            </a:lnRef>
+            <a:fillRef idx="0">
+              <a:schemeClr val="accent1"/>
+            </a:fillRef>
+            <a:effectRef idx="1">
+              <a:schemeClr val="accent1"/>
+            </a:effectRef>
+            <a:fontRef idx="minor">
+              <a:schemeClr val="tx1"/>
+            </a:fontRef>
+          </p:style>
+          <p:txBody>
+            <a:bodyPr rtlCol="0" anchor="ctr"/>
+            <a:lstStyle/>
+            <a:p>
+              <a:pPr algn="ctr"/>
+              <a:endParaRPr lang="en-US"/>
+            </a:p>
+          </p:txBody>
+        </p:sp>
+      </p:grpSp>
+      <p:grpSp>
+        <p:nvGrpSpPr>
+          <p:cNvPr id="33" name="Group 32"/>
+          <p:cNvGrpSpPr/>
+          <p:nvPr/>
+        </p:nvGrpSpPr>
+        <p:grpSpPr>
+          <a:xfrm>
+            <a:off x="3568179" y="91697"/>
+            <a:ext cx="1590529" cy="1393176"/>
+            <a:chOff x="3568179" y="301290"/>
+            <a:chExt cx="1590529" cy="1393176"/>
+          </a:xfrm>
+        </p:grpSpPr>
+        <p:sp>
+          <p:nvSpPr>
+            <p:cNvPr id="11" name="Rectangle 10"/>
+            <p:cNvSpPr/>
+            <p:nvPr/>
+          </p:nvSpPr>
+          <p:spPr>
+            <a:xfrm>
+              <a:off x="3568179" y="301290"/>
+              <a:ext cx="1590529" cy="1393176"/>
+            </a:xfrm>
+            <a:prstGeom prst="rect">
+              <a:avLst/>
+            </a:prstGeom>
+            <a:noFill/>
+            <a:ln>
+              <a:solidFill>
+                <a:srgbClr val="FFFFFF"/>
+              </a:solidFill>
+            </a:ln>
+          </p:spPr>
+          <p:style>
+            <a:lnRef idx="2">
+              <a:schemeClr val="dk1"/>
+            </a:lnRef>
+            <a:fillRef idx="1">
+              <a:schemeClr val="lt1"/>
+            </a:fillRef>
+            <a:effectRef idx="0">
+              <a:schemeClr val="dk1"/>
+            </a:effectRef>
+            <a:fontRef idx="minor">
+              <a:schemeClr val="dk1"/>
+            </a:fontRef>
+          </p:style>
+          <p:txBody>
+            <a:bodyPr rtlCol="0" anchor="ctr"/>
+            <a:lstStyle/>
+            <a:p>
+              <a:pPr algn="ctr"/>
+              <a:endParaRPr lang="en-US"/>
+            </a:p>
+          </p:txBody>
+        </p:sp>
+        <p:sp>
+          <p:nvSpPr>
+            <p:cNvPr id="12" name="Rectangle 11"/>
+            <p:cNvSpPr/>
+            <p:nvPr/>
+          </p:nvSpPr>
+          <p:spPr>
+            <a:xfrm>
+              <a:off x="3642157" y="592732"/>
+              <a:ext cx="1442573" cy="1027759"/>
+            </a:xfrm>
+            <a:prstGeom prst="rect">
+              <a:avLst/>
+            </a:prstGeom>
+            <a:noFill/>
+            <a:ln>
+              <a:solidFill>
+                <a:srgbClr val="FFFFFF"/>
+              </a:solidFill>
+            </a:ln>
+          </p:spPr>
+          <p:style>
+            <a:lnRef idx="2">
+              <a:schemeClr val="dk1"/>
+            </a:lnRef>
+            <a:fillRef idx="1">
+              <a:schemeClr val="lt1"/>
+            </a:fillRef>
+            <a:effectRef idx="0">
+              <a:schemeClr val="dk1"/>
+            </a:effectRef>
+            <a:fontRef idx="minor">
+              <a:schemeClr val="dk1"/>
+            </a:fontRef>
+          </p:style>
+          <p:txBody>
+            <a:bodyPr rtlCol="0" anchor="ctr"/>
+            <a:lstStyle/>
+            <a:p>
+              <a:pPr algn="ctr"/>
+              <a:endParaRPr lang="en-US"/>
+            </a:p>
+          </p:txBody>
+        </p:sp>
+        <p:sp>
+          <p:nvSpPr>
+            <p:cNvPr id="13" name="Chevron 12"/>
+            <p:cNvSpPr/>
+            <p:nvPr/>
+          </p:nvSpPr>
+          <p:spPr>
+            <a:xfrm flipH="1">
+              <a:off x="3691475" y="383139"/>
+              <a:ext cx="111532" cy="139559"/>
+            </a:xfrm>
+            <a:prstGeom prst="chevron">
+              <a:avLst/>
+            </a:prstGeom>
+            <a:noFill/>
+            <a:ln>
+              <a:solidFill>
+                <a:srgbClr val="FFFFFF"/>
+              </a:solidFill>
+            </a:ln>
+          </p:spPr>
+          <p:style>
+            <a:lnRef idx="2">
+              <a:schemeClr val="dk1"/>
+            </a:lnRef>
+            <a:fillRef idx="1">
+              <a:schemeClr val="lt1"/>
+            </a:fillRef>
+            <a:effectRef idx="0">
+              <a:schemeClr val="dk1"/>
+            </a:effectRef>
+            <a:fontRef idx="minor">
+              <a:schemeClr val="dk1"/>
+            </a:fontRef>
+          </p:style>
+          <p:txBody>
+            <a:bodyPr rtlCol="0" anchor="ctr"/>
+            <a:lstStyle/>
+            <a:p>
+              <a:pPr algn="ctr"/>
+              <a:endParaRPr lang="en-US">
+                <a:solidFill>
+                  <a:schemeClr val="tx1"/>
+                </a:solidFill>
+              </a:endParaRPr>
+            </a:p>
+          </p:txBody>
+        </p:sp>
+        <p:sp>
+          <p:nvSpPr>
+            <p:cNvPr id="14" name="Chevron 13"/>
+            <p:cNvSpPr/>
+            <p:nvPr/>
+          </p:nvSpPr>
+          <p:spPr>
+            <a:xfrm>
+              <a:off x="3864251" y="382054"/>
+              <a:ext cx="111532" cy="139559"/>
+            </a:xfrm>
+            <a:prstGeom prst="chevron">
+              <a:avLst/>
+            </a:prstGeom>
+            <a:noFill/>
+            <a:ln>
+              <a:solidFill>
+                <a:srgbClr val="FFFFFF"/>
+              </a:solidFill>
+            </a:ln>
+          </p:spPr>
+          <p:style>
+            <a:lnRef idx="2">
+              <a:schemeClr val="dk1"/>
+            </a:lnRef>
+            <a:fillRef idx="1">
+              <a:schemeClr val="lt1"/>
+            </a:fillRef>
+            <a:effectRef idx="0">
+              <a:schemeClr val="dk1"/>
+            </a:effectRef>
+            <a:fontRef idx="minor">
+              <a:schemeClr val="dk1"/>
+            </a:fontRef>
+          </p:style>
+          <p:txBody>
+            <a:bodyPr rtlCol="0" anchor="ctr"/>
+            <a:lstStyle/>
+            <a:p>
+              <a:pPr algn="ctr"/>
+              <a:endParaRPr lang="en-US">
+                <a:solidFill>
+                  <a:schemeClr val="tx1"/>
+                </a:solidFill>
+              </a:endParaRPr>
+            </a:p>
+          </p:txBody>
+        </p:sp>
+        <p:sp>
+          <p:nvSpPr>
+            <p:cNvPr id="15" name="Octagon 14"/>
+            <p:cNvSpPr/>
+            <p:nvPr/>
+          </p:nvSpPr>
+          <p:spPr>
+            <a:xfrm>
+              <a:off x="4042101" y="375262"/>
+              <a:ext cx="157069" cy="157069"/>
+            </a:xfrm>
+            <a:prstGeom prst="octagon">
+              <a:avLst/>
+            </a:prstGeom>
+            <a:noFill/>
+            <a:ln>
+              <a:solidFill>
+                <a:srgbClr val="FFFFFF"/>
+              </a:solidFill>
+            </a:ln>
+          </p:spPr>
+          <p:style>
+            <a:lnRef idx="2">
+              <a:schemeClr val="dk1"/>
+            </a:lnRef>
+            <a:fillRef idx="1">
+              <a:schemeClr val="lt1"/>
+            </a:fillRef>
+            <a:effectRef idx="0">
+              <a:schemeClr val="dk1"/>
+            </a:effectRef>
+            <a:fontRef idx="minor">
+              <a:schemeClr val="dk1"/>
+            </a:fontRef>
+          </p:style>
+          <p:txBody>
+            <a:bodyPr rtlCol="0" anchor="ctr"/>
+            <a:lstStyle/>
+            <a:p>
+              <a:pPr algn="ctr"/>
+              <a:endParaRPr lang="en-US"/>
+            </a:p>
+          </p:txBody>
+        </p:sp>
+      </p:grpSp>
+      <p:sp>
+        <p:nvSpPr>
+          <p:cNvPr id="16" name="TextBox 15"/>
+          <p:cNvSpPr txBox="1"/>
+          <p:nvPr/>
+        </p:nvSpPr>
+        <p:spPr>
+          <a:xfrm>
+            <a:off x="3187851" y="1505010"/>
+            <a:ext cx="2341548" cy="338554"/>
+          </a:xfrm>
+          <a:prstGeom prst="rect">
+            <a:avLst/>
+          </a:prstGeom>
+          <a:noFill/>
+        </p:spPr>
+        <p:txBody>
+          <a:bodyPr wrap="square" rtlCol="0">
+            <a:spAutoFit/>
+          </a:bodyPr>
+          <a:lstStyle/>
+          <a:p>
+            <a:pPr algn="ctr"/>
+            <a:r>
+              <a:rPr lang="en-US" sz="1600" dirty="0" err="1" smtClean="0">
+                <a:solidFill>
+                  <a:srgbClr val="FFFFFF"/>
+                </a:solidFill>
+                <a:latin typeface="Anime Ace 2.0 BB"/>
+                <a:cs typeface="Anime Ace 2.0 BB"/>
+              </a:rPr>
+              <a:t>Drupal.org</a:t>
+            </a:r>
+            <a:endParaRPr lang="en-US" sz="1600" dirty="0">
+              <a:solidFill>
+                <a:srgbClr val="FFFFFF"/>
+              </a:solidFill>
+              <a:latin typeface="Anime Ace 2.0 BB"/>
+              <a:cs typeface="Anime Ace 2.0 BB"/>
+            </a:endParaRPr>
+          </a:p>
+        </p:txBody>
+      </p:sp>
+      <p:sp>
+        <p:nvSpPr>
+          <p:cNvPr id="17" name="TextBox 16"/>
+          <p:cNvSpPr txBox="1"/>
+          <p:nvPr/>
+        </p:nvSpPr>
+        <p:spPr>
+          <a:xfrm>
+            <a:off x="41745" y="1523688"/>
+            <a:ext cx="2341548" cy="338554"/>
+          </a:xfrm>
+          <a:prstGeom prst="rect">
+            <a:avLst/>
+          </a:prstGeom>
+          <a:noFill/>
+        </p:spPr>
+        <p:txBody>
+          <a:bodyPr wrap="square" rtlCol="0">
+            <a:spAutoFit/>
+          </a:bodyPr>
+          <a:lstStyle/>
+          <a:p>
+            <a:pPr algn="ctr"/>
+            <a:r>
+              <a:rPr lang="en-US" sz="1600" dirty="0" smtClean="0">
+                <a:solidFill>
+                  <a:srgbClr val="FFFFFF"/>
+                </a:solidFill>
+                <a:latin typeface="Anime Ace 2.0 BB"/>
+                <a:cs typeface="Anime Ace 2.0 BB"/>
+              </a:rPr>
+              <a:t>New Developer</a:t>
+            </a:r>
+            <a:endParaRPr lang="en-US" sz="1600" dirty="0">
+              <a:solidFill>
+                <a:srgbClr val="FFFFFF"/>
+              </a:solidFill>
+              <a:latin typeface="Anime Ace 2.0 BB"/>
+              <a:cs typeface="Anime Ace 2.0 BB"/>
+            </a:endParaRPr>
+          </a:p>
+        </p:txBody>
+      </p:sp>
+      <p:pic>
+        <p:nvPicPr>
+          <p:cNvPr id="19" name="Picture 18"/>
+          <p:cNvPicPr>
+            <a:picLocks noChangeAspect="1"/>
+          </p:cNvPicPr>
+          <p:nvPr/>
+        </p:nvPicPr>
+        <p:blipFill>
+          <a:blip r:embed="rId2"/>
+          <a:stretch>
+            <a:fillRect/>
+          </a:stretch>
+        </p:blipFill>
+        <p:spPr>
+          <a:xfrm>
+            <a:off x="7084031" y="91697"/>
+            <a:ext cx="1259738" cy="1425718"/>
+          </a:xfrm>
+          <a:prstGeom prst="rect">
+            <a:avLst/>
+          </a:prstGeom>
+        </p:spPr>
+      </p:pic>
+      <p:sp>
+        <p:nvSpPr>
+          <p:cNvPr id="21" name="TextBox 20"/>
+          <p:cNvSpPr txBox="1"/>
+          <p:nvPr/>
+        </p:nvSpPr>
+        <p:spPr>
+          <a:xfrm>
+            <a:off x="6545968" y="1505010"/>
+            <a:ext cx="2341548" cy="338554"/>
+          </a:xfrm>
+          <a:prstGeom prst="rect">
+            <a:avLst/>
+          </a:prstGeom>
+          <a:noFill/>
+        </p:spPr>
+        <p:txBody>
+          <a:bodyPr wrap="square" rtlCol="0">
+            <a:spAutoFit/>
+          </a:bodyPr>
+          <a:lstStyle/>
+          <a:p>
+            <a:pPr algn="ctr"/>
+            <a:r>
+              <a:rPr lang="en-US" sz="1600" dirty="0" smtClean="0">
+                <a:solidFill>
+                  <a:srgbClr val="FFFFFF"/>
+                </a:solidFill>
+                <a:latin typeface="Anime Ace 2.0 BB"/>
+                <a:cs typeface="Anime Ace 2.0 BB"/>
+              </a:rPr>
+              <a:t>Download link</a:t>
+            </a:r>
+            <a:endParaRPr lang="en-US" sz="1600" dirty="0">
+              <a:solidFill>
+                <a:srgbClr val="FFFFFF"/>
+              </a:solidFill>
+              <a:latin typeface="Anime Ace 2.0 BB"/>
+              <a:cs typeface="Anime Ace 2.0 BB"/>
+            </a:endParaRPr>
+          </a:p>
+        </p:txBody>
+      </p:sp>
+      <p:grpSp>
+        <p:nvGrpSpPr>
+          <p:cNvPr id="28" name="Group 27"/>
+          <p:cNvGrpSpPr>
+            <a:grpSpLocks noChangeAspect="1"/>
+          </p:cNvGrpSpPr>
+          <p:nvPr/>
+        </p:nvGrpSpPr>
+        <p:grpSpPr>
+          <a:xfrm>
+            <a:off x="985388" y="2145478"/>
+            <a:ext cx="852783" cy="1559938"/>
+            <a:chOff x="3803007" y="2465798"/>
+            <a:chExt cx="1091877" cy="1997296"/>
+          </a:xfrm>
+        </p:grpSpPr>
+        <p:sp>
+          <p:nvSpPr>
+            <p:cNvPr id="23" name="Rectangle 22"/>
+            <p:cNvSpPr/>
+            <p:nvPr/>
+          </p:nvSpPr>
+          <p:spPr>
+            <a:xfrm>
+              <a:off x="3803007" y="2823338"/>
+              <a:ext cx="1091877" cy="1639756"/>
+            </a:xfrm>
+            <a:prstGeom prst="rect">
+              <a:avLst/>
+            </a:prstGeom>
+            <a:noFill/>
+            <a:ln w="38100" cmpd="sng">
+              <a:solidFill>
+                <a:srgbClr val="FFFFFF"/>
+              </a:solidFill>
+            </a:ln>
+          </p:spPr>
+          <p:style>
+            <a:lnRef idx="1">
+              <a:schemeClr val="accent1"/>
+            </a:lnRef>
+            <a:fillRef idx="3">
+              <a:schemeClr val="accent1"/>
+            </a:fillRef>
+            <a:effectRef idx="2">
+              <a:schemeClr val="accent1"/>
+            </a:effectRef>
+            <a:fontRef idx="minor">
+              <a:schemeClr val="lt1"/>
+            </a:fontRef>
+          </p:style>
+          <p:txBody>
+            <a:bodyPr rtlCol="0" anchor="ctr"/>
+            <a:lstStyle/>
+            <a:p>
+              <a:pPr algn="ctr"/>
+              <a:endParaRPr lang="en-US"/>
+            </a:p>
+          </p:txBody>
+        </p:sp>
+        <p:sp>
+          <p:nvSpPr>
+            <p:cNvPr id="24" name="Trapezoid 23"/>
+            <p:cNvSpPr/>
+            <p:nvPr/>
+          </p:nvSpPr>
+          <p:spPr>
+            <a:xfrm>
+              <a:off x="3803007" y="2465798"/>
+              <a:ext cx="1091877" cy="357540"/>
+            </a:xfrm>
+            <a:prstGeom prst="trapezoid">
+              <a:avLst/>
+            </a:prstGeom>
+            <a:noFill/>
+            <a:ln w="38100" cmpd="sng">
+              <a:solidFill>
+                <a:srgbClr val="FFFFFF"/>
+              </a:solidFill>
+            </a:ln>
+          </p:spPr>
+          <p:style>
+            <a:lnRef idx="1">
+              <a:schemeClr val="accent1"/>
+            </a:lnRef>
+            <a:fillRef idx="3">
+              <a:schemeClr val="accent1"/>
+            </a:fillRef>
+            <a:effectRef idx="2">
+              <a:schemeClr val="accent1"/>
+            </a:effectRef>
+            <a:fontRef idx="minor">
+              <a:schemeClr val="lt1"/>
+            </a:fontRef>
+          </p:style>
+          <p:txBody>
+            <a:bodyPr rtlCol="0" anchor="ctr"/>
+            <a:lstStyle/>
+            <a:p>
+              <a:pPr algn="ctr"/>
+              <a:endParaRPr lang="en-US"/>
+            </a:p>
+          </p:txBody>
+        </p:sp>
+        <p:sp>
+          <p:nvSpPr>
+            <p:cNvPr id="25" name="Rectangle 24"/>
+            <p:cNvSpPr/>
+            <p:nvPr/>
+          </p:nvSpPr>
+          <p:spPr>
+            <a:xfrm>
+              <a:off x="3969538" y="2971286"/>
+              <a:ext cx="758815" cy="258909"/>
+            </a:xfrm>
+            <a:prstGeom prst="rect">
+              <a:avLst/>
+            </a:prstGeom>
+            <a:noFill/>
+            <a:ln w="38100" cmpd="sng">
+              <a:solidFill>
+                <a:srgbClr val="FFFFFF"/>
+              </a:solidFill>
+            </a:ln>
+          </p:spPr>
+          <p:style>
+            <a:lnRef idx="1">
+              <a:schemeClr val="accent1"/>
+            </a:lnRef>
+            <a:fillRef idx="3">
+              <a:schemeClr val="accent1"/>
+            </a:fillRef>
+            <a:effectRef idx="2">
+              <a:schemeClr val="accent1"/>
+            </a:effectRef>
+            <a:fontRef idx="minor">
+              <a:schemeClr val="lt1"/>
+            </a:fontRef>
+          </p:style>
+          <p:txBody>
+            <a:bodyPr rtlCol="0" anchor="ctr"/>
+            <a:lstStyle/>
+            <a:p>
+              <a:pPr algn="ctr"/>
+              <a:endParaRPr lang="en-US"/>
+            </a:p>
+          </p:txBody>
+        </p:sp>
+        <p:sp>
+          <p:nvSpPr>
+            <p:cNvPr id="26" name="Rectangle 25"/>
+            <p:cNvSpPr/>
+            <p:nvPr/>
+          </p:nvSpPr>
+          <p:spPr>
+            <a:xfrm>
+              <a:off x="3969538" y="3374718"/>
+              <a:ext cx="758815" cy="258909"/>
+            </a:xfrm>
+            <a:prstGeom prst="rect">
+              <a:avLst/>
+            </a:prstGeom>
+            <a:noFill/>
+            <a:ln w="38100" cmpd="sng">
+              <a:solidFill>
+                <a:srgbClr val="FFFFFF"/>
+              </a:solidFill>
+            </a:ln>
+          </p:spPr>
+          <p:style>
+            <a:lnRef idx="1">
+              <a:schemeClr val="accent1"/>
+            </a:lnRef>
+            <a:fillRef idx="3">
+              <a:schemeClr val="accent1"/>
+            </a:fillRef>
+            <a:effectRef idx="2">
+              <a:schemeClr val="accent1"/>
+            </a:effectRef>
+            <a:fontRef idx="minor">
+              <a:schemeClr val="lt1"/>
+            </a:fontRef>
+          </p:style>
+          <p:txBody>
+            <a:bodyPr rtlCol="0" anchor="ctr"/>
+            <a:lstStyle/>
+            <a:p>
+              <a:pPr algn="ctr"/>
+              <a:endParaRPr lang="en-US"/>
+            </a:p>
+          </p:txBody>
+        </p:sp>
+        <p:sp>
+          <p:nvSpPr>
+            <p:cNvPr id="27" name="Oval 26"/>
+            <p:cNvSpPr/>
+            <p:nvPr/>
+          </p:nvSpPr>
+          <p:spPr>
+            <a:xfrm>
+              <a:off x="4266177" y="3908289"/>
+              <a:ext cx="165537" cy="165537"/>
+            </a:xfrm>
+            <a:prstGeom prst="ellipse">
+              <a:avLst/>
+            </a:prstGeom>
+            <a:noFill/>
+            <a:ln w="38100" cmpd="sng">
+              <a:solidFill>
+                <a:srgbClr val="FFFFFF"/>
+              </a:solidFill>
+            </a:ln>
+          </p:spPr>
+          <p:style>
+            <a:lnRef idx="1">
+              <a:schemeClr val="accent1"/>
+            </a:lnRef>
+            <a:fillRef idx="3">
+              <a:schemeClr val="accent1"/>
+            </a:fillRef>
+            <a:effectRef idx="2">
+              <a:schemeClr val="accent1"/>
+            </a:effectRef>
+            <a:fontRef idx="minor">
+              <a:schemeClr val="lt1"/>
+            </a:fontRef>
+          </p:style>
+          <p:txBody>
+            <a:bodyPr rtlCol="0" anchor="ctr"/>
+            <a:lstStyle/>
+            <a:p>
+              <a:pPr algn="ctr"/>
+              <a:endParaRPr lang="en-US"/>
+            </a:p>
+          </p:txBody>
+        </p:sp>
+      </p:grpSp>
+      <p:sp>
+        <p:nvSpPr>
+          <p:cNvPr id="29" name="TextBox 28"/>
+          <p:cNvSpPr txBox="1"/>
+          <p:nvPr/>
+        </p:nvSpPr>
+        <p:spPr>
+          <a:xfrm>
+            <a:off x="194145" y="3834561"/>
+            <a:ext cx="2341548" cy="584776"/>
+          </a:xfrm>
+          <a:prstGeom prst="rect">
+            <a:avLst/>
+          </a:prstGeom>
+          <a:noFill/>
+        </p:spPr>
+        <p:txBody>
+          <a:bodyPr wrap="square" rtlCol="0">
+            <a:spAutoFit/>
+          </a:bodyPr>
+          <a:lstStyle/>
+          <a:p>
+            <a:pPr algn="ctr"/>
+            <a:r>
+              <a:rPr lang="en-US" sz="1600" dirty="0" smtClean="0">
+                <a:solidFill>
+                  <a:srgbClr val="FFFFFF"/>
+                </a:solidFill>
+                <a:latin typeface="Anime Ace 2.0 BB"/>
+                <a:cs typeface="Anime Ace 2.0 BB"/>
+              </a:rPr>
+              <a:t>Install on Web server</a:t>
+            </a:r>
+            <a:endParaRPr lang="en-US" sz="1600" dirty="0">
+              <a:solidFill>
+                <a:srgbClr val="FFFFFF"/>
+              </a:solidFill>
+              <a:latin typeface="Anime Ace 2.0 BB"/>
+              <a:cs typeface="Anime Ace 2.0 BB"/>
+            </a:endParaRPr>
+          </a:p>
+        </p:txBody>
+      </p:sp>
+      <p:grpSp>
+        <p:nvGrpSpPr>
+          <p:cNvPr id="34" name="Group 33"/>
+          <p:cNvGrpSpPr/>
+          <p:nvPr/>
+        </p:nvGrpSpPr>
+        <p:grpSpPr>
+          <a:xfrm>
+            <a:off x="6926296" y="2424726"/>
+            <a:ext cx="1590529" cy="1393176"/>
+            <a:chOff x="3568179" y="301290"/>
+            <a:chExt cx="1590529" cy="1393176"/>
+          </a:xfrm>
+        </p:grpSpPr>
+        <p:sp>
+          <p:nvSpPr>
+            <p:cNvPr id="35" name="Rectangle 34"/>
+            <p:cNvSpPr/>
+            <p:nvPr/>
+          </p:nvSpPr>
+          <p:spPr>
+            <a:xfrm>
+              <a:off x="3568179" y="301290"/>
+              <a:ext cx="1590529" cy="1393176"/>
+            </a:xfrm>
+            <a:prstGeom prst="rect">
+              <a:avLst/>
+            </a:prstGeom>
+            <a:noFill/>
+            <a:ln>
+              <a:solidFill>
+                <a:srgbClr val="FFFFFF"/>
+              </a:solidFill>
+            </a:ln>
+          </p:spPr>
+          <p:style>
+            <a:lnRef idx="2">
+              <a:schemeClr val="dk1"/>
+            </a:lnRef>
+            <a:fillRef idx="1">
+              <a:schemeClr val="lt1"/>
+            </a:fillRef>
+            <a:effectRef idx="0">
+              <a:schemeClr val="dk1"/>
+            </a:effectRef>
+            <a:fontRef idx="minor">
+              <a:schemeClr val="dk1"/>
+            </a:fontRef>
+          </p:style>
+          <p:txBody>
+            <a:bodyPr rtlCol="0" anchor="ctr"/>
+            <a:lstStyle/>
+            <a:p>
+              <a:pPr algn="ctr"/>
+              <a:endParaRPr lang="en-US"/>
+            </a:p>
+          </p:txBody>
+        </p:sp>
+        <p:sp>
+          <p:nvSpPr>
+            <p:cNvPr id="36" name="Rectangle 35"/>
+            <p:cNvSpPr/>
+            <p:nvPr/>
+          </p:nvSpPr>
+          <p:spPr>
+            <a:xfrm>
+              <a:off x="3642157" y="592732"/>
+              <a:ext cx="1442573" cy="1027759"/>
+            </a:xfrm>
+            <a:prstGeom prst="rect">
+              <a:avLst/>
+            </a:prstGeom>
+            <a:noFill/>
+            <a:ln>
+              <a:solidFill>
+                <a:srgbClr val="FFFFFF"/>
+              </a:solidFill>
+            </a:ln>
+          </p:spPr>
+          <p:style>
+            <a:lnRef idx="2">
+              <a:schemeClr val="dk1"/>
+            </a:lnRef>
+            <a:fillRef idx="1">
+              <a:schemeClr val="lt1"/>
+            </a:fillRef>
+            <a:effectRef idx="0">
+              <a:schemeClr val="dk1"/>
+            </a:effectRef>
+            <a:fontRef idx="minor">
+              <a:schemeClr val="dk1"/>
+            </a:fontRef>
+          </p:style>
+          <p:txBody>
+            <a:bodyPr rtlCol="0" anchor="ctr"/>
+            <a:lstStyle/>
+            <a:p>
+              <a:pPr algn="ctr"/>
+              <a:endParaRPr lang="en-US"/>
+            </a:p>
+          </p:txBody>
+        </p:sp>
+        <p:sp>
+          <p:nvSpPr>
+            <p:cNvPr id="37" name="Chevron 36"/>
+            <p:cNvSpPr/>
+            <p:nvPr/>
+          </p:nvSpPr>
+          <p:spPr>
+            <a:xfrm flipH="1">
+              <a:off x="3691475" y="383139"/>
+              <a:ext cx="111532" cy="139559"/>
+            </a:xfrm>
+            <a:prstGeom prst="chevron">
+              <a:avLst/>
+            </a:prstGeom>
+            <a:noFill/>
+            <a:ln>
+              <a:solidFill>
+                <a:srgbClr val="FFFFFF"/>
+              </a:solidFill>
+            </a:ln>
+          </p:spPr>
+          <p:style>
+            <a:lnRef idx="2">
+              <a:schemeClr val="dk1"/>
+            </a:lnRef>
+            <a:fillRef idx="1">
+              <a:schemeClr val="lt1"/>
+            </a:fillRef>
+            <a:effectRef idx="0">
+              <a:schemeClr val="dk1"/>
+            </a:effectRef>
+            <a:fontRef idx="minor">
+              <a:schemeClr val="dk1"/>
+            </a:fontRef>
+          </p:style>
+          <p:txBody>
+            <a:bodyPr rtlCol="0" anchor="ctr"/>
+            <a:lstStyle/>
+            <a:p>
+              <a:pPr algn="ctr"/>
+              <a:endParaRPr lang="en-US">
+                <a:solidFill>
+                  <a:schemeClr val="tx1"/>
+                </a:solidFill>
+              </a:endParaRPr>
+            </a:p>
+          </p:txBody>
+        </p:sp>
+        <p:sp>
+          <p:nvSpPr>
+            <p:cNvPr id="38" name="Chevron 37"/>
+            <p:cNvSpPr/>
+            <p:nvPr/>
+          </p:nvSpPr>
+          <p:spPr>
+            <a:xfrm>
+              <a:off x="3864251" y="382054"/>
+              <a:ext cx="111532" cy="139559"/>
+            </a:xfrm>
+            <a:prstGeom prst="chevron">
+              <a:avLst/>
+            </a:prstGeom>
+            <a:noFill/>
+            <a:ln>
+              <a:solidFill>
+                <a:srgbClr val="FFFFFF"/>
+              </a:solidFill>
+            </a:ln>
+          </p:spPr>
+          <p:style>
+            <a:lnRef idx="2">
+              <a:schemeClr val="dk1"/>
+            </a:lnRef>
+            <a:fillRef idx="1">
+              <a:schemeClr val="lt1"/>
+            </a:fillRef>
+            <a:effectRef idx="0">
+              <a:schemeClr val="dk1"/>
+            </a:effectRef>
+            <a:fontRef idx="minor">
+              <a:schemeClr val="dk1"/>
+            </a:fontRef>
+          </p:style>
+          <p:txBody>
+            <a:bodyPr rtlCol="0" anchor="ctr"/>
+            <a:lstStyle/>
+            <a:p>
+              <a:pPr algn="ctr"/>
+              <a:endParaRPr lang="en-US">
+                <a:solidFill>
+                  <a:schemeClr val="tx1"/>
+                </a:solidFill>
+              </a:endParaRPr>
+            </a:p>
+          </p:txBody>
+        </p:sp>
+        <p:sp>
+          <p:nvSpPr>
+            <p:cNvPr id="39" name="Octagon 38"/>
+            <p:cNvSpPr/>
+            <p:nvPr/>
+          </p:nvSpPr>
+          <p:spPr>
+            <a:xfrm>
+              <a:off x="4042101" y="375262"/>
+              <a:ext cx="157069" cy="157069"/>
+            </a:xfrm>
+            <a:prstGeom prst="octagon">
+              <a:avLst/>
+            </a:prstGeom>
+            <a:noFill/>
+            <a:ln>
+              <a:solidFill>
+                <a:srgbClr val="FFFFFF"/>
+              </a:solidFill>
+            </a:ln>
+          </p:spPr>
+          <p:style>
+            <a:lnRef idx="2">
+              <a:schemeClr val="dk1"/>
+            </a:lnRef>
+            <a:fillRef idx="1">
+              <a:schemeClr val="lt1"/>
+            </a:fillRef>
+            <a:effectRef idx="0">
+              <a:schemeClr val="dk1"/>
+            </a:effectRef>
+            <a:fontRef idx="minor">
+              <a:schemeClr val="dk1"/>
+            </a:fontRef>
+          </p:style>
+          <p:txBody>
+            <a:bodyPr rtlCol="0" anchor="ctr"/>
+            <a:lstStyle/>
+            <a:p>
+              <a:pPr algn="ctr"/>
+              <a:endParaRPr lang="en-US"/>
+            </a:p>
+          </p:txBody>
+        </p:sp>
+      </p:grpSp>
+      <p:sp>
+        <p:nvSpPr>
+          <p:cNvPr id="40" name="TextBox 39"/>
+          <p:cNvSpPr txBox="1"/>
+          <p:nvPr/>
+        </p:nvSpPr>
+        <p:spPr>
+          <a:xfrm>
+            <a:off x="6545968" y="3838039"/>
+            <a:ext cx="2341548" cy="584776"/>
+          </a:xfrm>
+          <a:prstGeom prst="rect">
+            <a:avLst/>
+          </a:prstGeom>
+          <a:noFill/>
+        </p:spPr>
+        <p:txBody>
+          <a:bodyPr wrap="square" rtlCol="0">
+            <a:spAutoFit/>
+          </a:bodyPr>
+          <a:lstStyle/>
+          <a:p>
+            <a:pPr algn="ctr"/>
+            <a:r>
+              <a:rPr lang="en-US" sz="1600" dirty="0" smtClean="0">
+                <a:solidFill>
+                  <a:srgbClr val="FFFFFF"/>
+                </a:solidFill>
+                <a:latin typeface="Anime Ace 2.0 BB"/>
+                <a:cs typeface="Anime Ace 2.0 BB"/>
+              </a:rPr>
+              <a:t>Search for examples</a:t>
+            </a:r>
+            <a:endParaRPr lang="en-US" sz="1600" dirty="0">
+              <a:solidFill>
+                <a:srgbClr val="FFFFFF"/>
+              </a:solidFill>
+              <a:latin typeface="Anime Ace 2.0 BB"/>
+              <a:cs typeface="Anime Ace 2.0 BB"/>
+            </a:endParaRPr>
+          </a:p>
+        </p:txBody>
+      </p:sp>
+      <p:cxnSp>
+        <p:nvCxnSpPr>
+          <p:cNvPr id="42" name="Straight Arrow Connector 41"/>
+          <p:cNvCxnSpPr/>
+          <p:nvPr/>
+        </p:nvCxnSpPr>
+        <p:spPr>
+          <a:xfrm>
+            <a:off x="2009738" y="884752"/>
+            <a:ext cx="1178113" cy="0"/>
+          </a:xfrm>
+          <a:prstGeom prst="straightConnector1">
+            <a:avLst/>
+          </a:prstGeom>
+          <a:ln w="38100" cmpd="sng">
+            <a:solidFill>
+              <a:schemeClr val="tx1">
+                <a:lumMod val="50000"/>
+                <a:lumOff val="50000"/>
+              </a:schemeClr>
+            </a:solidFill>
+            <a:tailEnd type="arrow"/>
+          </a:ln>
+        </p:spPr>
+        <p:style>
+          <a:lnRef idx="2">
+            <a:schemeClr val="accent1"/>
+          </a:lnRef>
+          <a:fillRef idx="0">
+            <a:schemeClr val="accent1"/>
+          </a:fillRef>
+          <a:effectRef idx="1">
+            <a:schemeClr val="accent1"/>
+          </a:effectRef>
+          <a:fontRef idx="minor">
+            <a:schemeClr val="tx1"/>
+          </a:fontRef>
+        </p:style>
+      </p:cxnSp>
+      <p:cxnSp>
+        <p:nvCxnSpPr>
+          <p:cNvPr id="44" name="Straight Arrow Connector 43"/>
+          <p:cNvCxnSpPr/>
+          <p:nvPr/>
+        </p:nvCxnSpPr>
+        <p:spPr>
+          <a:xfrm>
+            <a:off x="5529399" y="884752"/>
+            <a:ext cx="1178113" cy="0"/>
+          </a:xfrm>
+          <a:prstGeom prst="straightConnector1">
+            <a:avLst/>
+          </a:prstGeom>
+          <a:ln w="38100" cmpd="sng">
+            <a:solidFill>
+              <a:schemeClr val="tx1">
+                <a:lumMod val="50000"/>
+                <a:lumOff val="50000"/>
+              </a:schemeClr>
+            </a:solidFill>
+            <a:tailEnd type="arrow"/>
+          </a:ln>
+        </p:spPr>
+        <p:style>
+          <a:lnRef idx="2">
+            <a:schemeClr val="accent1"/>
+          </a:lnRef>
+          <a:fillRef idx="0">
+            <a:schemeClr val="accent1"/>
+          </a:fillRef>
+          <a:effectRef idx="1">
+            <a:schemeClr val="accent1"/>
+          </a:effectRef>
+          <a:fontRef idx="minor">
+            <a:schemeClr val="tx1"/>
+          </a:fontRef>
+        </p:style>
+      </p:cxnSp>
+      <p:cxnSp>
+        <p:nvCxnSpPr>
+          <p:cNvPr id="45" name="Straight Arrow Connector 44"/>
+          <p:cNvCxnSpPr>
+            <a:stCxn id="21" idx="1"/>
+          </p:cNvCxnSpPr>
+          <p:nvPr/>
+        </p:nvCxnSpPr>
+        <p:spPr>
+          <a:xfrm flipH="1">
+            <a:off x="2009738" y="1674287"/>
+            <a:ext cx="4536230" cy="923891"/>
+          </a:xfrm>
+          <a:prstGeom prst="straightConnector1">
+            <a:avLst/>
+          </a:prstGeom>
+          <a:ln w="38100" cmpd="sng">
+            <a:solidFill>
+              <a:schemeClr val="tx1">
+                <a:lumMod val="50000"/>
+                <a:lumOff val="50000"/>
+              </a:schemeClr>
+            </a:solidFill>
+            <a:tailEnd type="arrow"/>
+          </a:ln>
+        </p:spPr>
+        <p:style>
+          <a:lnRef idx="2">
+            <a:schemeClr val="accent1"/>
+          </a:lnRef>
+          <a:fillRef idx="0">
+            <a:schemeClr val="accent1"/>
+          </a:fillRef>
+          <a:effectRef idx="1">
+            <a:schemeClr val="accent1"/>
+          </a:effectRef>
+          <a:fontRef idx="minor">
+            <a:schemeClr val="tx1"/>
+          </a:fontRef>
+        </p:style>
+      </p:cxnSp>
+      <p:cxnSp>
+        <p:nvCxnSpPr>
+          <p:cNvPr id="48" name="Straight Arrow Connector 47"/>
+          <p:cNvCxnSpPr/>
+          <p:nvPr/>
+        </p:nvCxnSpPr>
+        <p:spPr>
+          <a:xfrm>
+            <a:off x="2009738" y="3034440"/>
+            <a:ext cx="1178113" cy="0"/>
+          </a:xfrm>
+          <a:prstGeom prst="straightConnector1">
+            <a:avLst/>
+          </a:prstGeom>
+          <a:ln w="38100" cmpd="sng">
+            <a:solidFill>
+              <a:schemeClr val="tx1">
+                <a:lumMod val="50000"/>
+                <a:lumOff val="50000"/>
+              </a:schemeClr>
+            </a:solidFill>
+            <a:tailEnd type="arrow"/>
+          </a:ln>
+        </p:spPr>
+        <p:style>
+          <a:lnRef idx="2">
+            <a:schemeClr val="accent1"/>
+          </a:lnRef>
+          <a:fillRef idx="0">
+            <a:schemeClr val="accent1"/>
+          </a:fillRef>
+          <a:effectRef idx="1">
+            <a:schemeClr val="accent1"/>
+          </a:effectRef>
+          <a:fontRef idx="minor">
+            <a:schemeClr val="tx1"/>
+          </a:fontRef>
+        </p:style>
+      </p:cxnSp>
+      <p:grpSp>
+        <p:nvGrpSpPr>
+          <p:cNvPr id="49" name="Group 48"/>
+          <p:cNvGrpSpPr>
+            <a:grpSpLocks noChangeAspect="1"/>
+          </p:cNvGrpSpPr>
+          <p:nvPr/>
+        </p:nvGrpSpPr>
+        <p:grpSpPr>
+          <a:xfrm>
+            <a:off x="3975783" y="2573386"/>
+            <a:ext cx="874553" cy="1170541"/>
+            <a:chOff x="5381882" y="2873060"/>
+            <a:chExt cx="1361186" cy="1821873"/>
+          </a:xfrm>
+        </p:grpSpPr>
+        <p:sp>
+          <p:nvSpPr>
+            <p:cNvPr id="50" name="Chord 3"/>
+            <p:cNvSpPr/>
+            <p:nvPr/>
+          </p:nvSpPr>
+          <p:spPr>
+            <a:xfrm>
+              <a:off x="5381882" y="3890610"/>
+              <a:ext cx="1231640" cy="804323"/>
+            </a:xfrm>
+            <a:custGeom>
+              <a:avLst/>
+              <a:gdLst>
+                <a:gd name="connsiteX0" fmla="*/ 16608 w 2232278"/>
+                <a:gd name="connsiteY0" fmla="*/ 1307968 h 2232278"/>
+                <a:gd name="connsiteX1" fmla="*/ 589005 w 2232278"/>
+                <a:gd name="connsiteY1" fmla="*/ 132321 h 2232278"/>
+                <a:gd name="connsiteX2" fmla="*/ 1884880 w 2232278"/>
+                <a:gd name="connsiteY2" fmla="*/ 306939 h 2232278"/>
+                <a:gd name="connsiteX3" fmla="*/ 2125677 w 2232278"/>
+                <a:gd name="connsiteY3" fmla="*/ 1592163 h 2232278"/>
+                <a:gd name="connsiteX4" fmla="*/ 16608 w 2232278"/>
+                <a:gd name="connsiteY4" fmla="*/ 1307968 h 2232278"/>
+                <a:gd name="connsiteX0" fmla="*/ 16669 w 2232378"/>
+                <a:gd name="connsiteY0" fmla="*/ 1307991 h 1619407"/>
+                <a:gd name="connsiteX1" fmla="*/ 589066 w 2232378"/>
+                <a:gd name="connsiteY1" fmla="*/ 132344 h 1619407"/>
+                <a:gd name="connsiteX2" fmla="*/ 1884941 w 2232378"/>
+                <a:gd name="connsiteY2" fmla="*/ 306962 h 1619407"/>
+                <a:gd name="connsiteX3" fmla="*/ 2125738 w 2232378"/>
+                <a:gd name="connsiteY3" fmla="*/ 1592186 h 1619407"/>
+                <a:gd name="connsiteX4" fmla="*/ 16669 w 2232378"/>
+                <a:gd name="connsiteY4" fmla="*/ 1307991 h 1619407"/>
+                <a:gd name="connsiteX0" fmla="*/ 16669 w 2232378"/>
+                <a:gd name="connsiteY0" fmla="*/ 1307991 h 1698147"/>
+                <a:gd name="connsiteX1" fmla="*/ 589066 w 2232378"/>
+                <a:gd name="connsiteY1" fmla="*/ 132344 h 1698147"/>
+                <a:gd name="connsiteX2" fmla="*/ 1884941 w 2232378"/>
+                <a:gd name="connsiteY2" fmla="*/ 306962 h 1698147"/>
+                <a:gd name="connsiteX3" fmla="*/ 2125738 w 2232378"/>
+                <a:gd name="connsiteY3" fmla="*/ 1592186 h 1698147"/>
+                <a:gd name="connsiteX4" fmla="*/ 16669 w 2232378"/>
+                <a:gd name="connsiteY4" fmla="*/ 1307991 h 1698147"/>
+                <a:gd name="connsiteX0" fmla="*/ 16669 w 2232378"/>
+                <a:gd name="connsiteY0" fmla="*/ 1307991 h 1698147"/>
+                <a:gd name="connsiteX1" fmla="*/ 589066 w 2232378"/>
+                <a:gd name="connsiteY1" fmla="*/ 132344 h 1698147"/>
+                <a:gd name="connsiteX2" fmla="*/ 1884941 w 2232378"/>
+                <a:gd name="connsiteY2" fmla="*/ 306962 h 1698147"/>
+                <a:gd name="connsiteX3" fmla="*/ 2125738 w 2232378"/>
+                <a:gd name="connsiteY3" fmla="*/ 1592186 h 1698147"/>
+                <a:gd name="connsiteX4" fmla="*/ 16669 w 2232378"/>
+                <a:gd name="connsiteY4" fmla="*/ 1307991 h 1698147"/>
+                <a:gd name="connsiteX0" fmla="*/ 16669 w 2232378"/>
+                <a:gd name="connsiteY0" fmla="*/ 1175646 h 1565802"/>
+                <a:gd name="connsiteX1" fmla="*/ 589066 w 2232378"/>
+                <a:gd name="connsiteY1" fmla="*/ -1 h 1565802"/>
+                <a:gd name="connsiteX2" fmla="*/ 1884941 w 2232378"/>
+                <a:gd name="connsiteY2" fmla="*/ 174617 h 1565802"/>
+                <a:gd name="connsiteX3" fmla="*/ 2125738 w 2232378"/>
+                <a:gd name="connsiteY3" fmla="*/ 1459841 h 1565802"/>
+                <a:gd name="connsiteX4" fmla="*/ 16669 w 2232378"/>
+                <a:gd name="connsiteY4" fmla="*/ 1175646 h 1565802"/>
+                <a:gd name="connsiteX0" fmla="*/ 16669 w 2232378"/>
+                <a:gd name="connsiteY0" fmla="*/ 1175648 h 1565804"/>
+                <a:gd name="connsiteX1" fmla="*/ 589066 w 2232378"/>
+                <a:gd name="connsiteY1" fmla="*/ 1 h 1565804"/>
+                <a:gd name="connsiteX2" fmla="*/ 1884941 w 2232378"/>
+                <a:gd name="connsiteY2" fmla="*/ 174619 h 1565804"/>
+                <a:gd name="connsiteX3" fmla="*/ 2125738 w 2232378"/>
+                <a:gd name="connsiteY3" fmla="*/ 1459843 h 1565804"/>
+                <a:gd name="connsiteX4" fmla="*/ 16669 w 2232378"/>
+                <a:gd name="connsiteY4" fmla="*/ 1175648 h 1565804"/>
+                <a:gd name="connsiteX0" fmla="*/ 16669 w 2232378"/>
+                <a:gd name="connsiteY0" fmla="*/ 1175646 h 1565802"/>
+                <a:gd name="connsiteX1" fmla="*/ 589066 w 2232378"/>
+                <a:gd name="connsiteY1" fmla="*/ -1 h 1565802"/>
+                <a:gd name="connsiteX2" fmla="*/ 1884941 w 2232378"/>
+                <a:gd name="connsiteY2" fmla="*/ 174617 h 1565802"/>
+                <a:gd name="connsiteX3" fmla="*/ 2125738 w 2232378"/>
+                <a:gd name="connsiteY3" fmla="*/ 1459841 h 1565802"/>
+                <a:gd name="connsiteX4" fmla="*/ 16669 w 2232378"/>
+                <a:gd name="connsiteY4" fmla="*/ 1175646 h 1565802"/>
+              </a:gdLst>
+              <a:ahLst/>
+              <a:cxnLst>
+                <a:cxn ang="0">
+                  <a:pos x="connsiteX0" y="connsiteY0"/>
+                </a:cxn>
+                <a:cxn ang="0">
+                  <a:pos x="connsiteX1" y="connsiteY1"/>
+                </a:cxn>
+                <a:cxn ang="0">
+                  <a:pos x="connsiteX2" y="connsiteY2"/>
+                </a:cxn>
+                <a:cxn ang="0">
+                  <a:pos x="connsiteX3" y="connsiteY3"/>
+                </a:cxn>
+                <a:cxn ang="0">
+                  <a:pos x="connsiteX4" y="connsiteY4"/>
+                </a:cxn>
+              </a:cxnLst>
+              <a:rect l="l" t="t" r="r" b="b"/>
+              <a:pathLst>
+                <a:path w="2232378" h="1565802">
+                  <a:moveTo>
+                    <a:pt x="16669" y="1175646"/>
+                  </a:moveTo>
+                  <a:cubicBezTo>
+                    <a:pt x="-66084" y="701323"/>
+                    <a:pt x="164660" y="227398"/>
+                    <a:pt x="589066" y="-1"/>
+                  </a:cubicBezTo>
+                  <a:cubicBezTo>
+                    <a:pt x="1013471" y="543761"/>
+                    <a:pt x="1715366" y="47123"/>
+                    <a:pt x="1884941" y="174617"/>
+                  </a:cubicBezTo>
+                  <a:cubicBezTo>
+                    <a:pt x="2234019" y="506242"/>
+                    <a:pt x="2331089" y="1024340"/>
+                    <a:pt x="2125738" y="1459841"/>
+                  </a:cubicBezTo>
+                  <a:cubicBezTo>
+                    <a:pt x="1461202" y="1570351"/>
+                    <a:pt x="886471" y="1719347"/>
+                    <a:pt x="16669" y="1175646"/>
+                  </a:cubicBezTo>
+                  <a:close/>
+                </a:path>
+              </a:pathLst>
+            </a:custGeom>
+            <a:noFill/>
+            <a:ln w="38100" cmpd="sng">
+              <a:solidFill>
+                <a:schemeClr val="bg1"/>
+              </a:solidFill>
+            </a:ln>
+          </p:spPr>
+          <p:style>
+            <a:lnRef idx="1">
+              <a:schemeClr val="accent1"/>
+            </a:lnRef>
+            <a:fillRef idx="3">
+              <a:schemeClr val="accent1"/>
+            </a:fillRef>
+            <a:effectRef idx="2">
+              <a:schemeClr val="accent1"/>
+            </a:effectRef>
+            <a:fontRef idx="minor">
+              <a:schemeClr val="lt1"/>
+            </a:fontRef>
+          </p:style>
+          <p:txBody>
+            <a:bodyPr rtlCol="0" anchor="ctr"/>
+            <a:lstStyle/>
+            <a:p>
+              <a:pPr algn="ctr"/>
+              <a:endParaRPr lang="en-US"/>
+            </a:p>
+          </p:txBody>
+        </p:sp>
+        <p:sp>
+          <p:nvSpPr>
+            <p:cNvPr id="51" name="Oval 50"/>
+            <p:cNvSpPr/>
+            <p:nvPr/>
+          </p:nvSpPr>
+          <p:spPr>
+            <a:xfrm>
+              <a:off x="5652009" y="3117129"/>
+              <a:ext cx="794595" cy="773482"/>
+            </a:xfrm>
+            <a:prstGeom prst="ellipse">
+              <a:avLst/>
+            </a:prstGeom>
+            <a:noFill/>
+            <a:ln w="38100" cmpd="sng">
+              <a:solidFill>
+                <a:schemeClr val="bg1"/>
+              </a:solidFill>
+            </a:ln>
+          </p:spPr>
+          <p:style>
+            <a:lnRef idx="1">
+              <a:schemeClr val="accent1"/>
+            </a:lnRef>
+            <a:fillRef idx="3">
+              <a:schemeClr val="accent1"/>
+            </a:fillRef>
+            <a:effectRef idx="2">
+              <a:schemeClr val="accent1"/>
+            </a:effectRef>
+            <a:fontRef idx="minor">
+              <a:schemeClr val="lt1"/>
+            </a:fontRef>
+          </p:style>
+          <p:txBody>
+            <a:bodyPr rtlCol="0" anchor="ctr"/>
+            <a:lstStyle/>
+            <a:p>
+              <a:pPr algn="ctr"/>
+              <a:endParaRPr lang="en-US"/>
+            </a:p>
+          </p:txBody>
+        </p:sp>
+        <p:sp>
+          <p:nvSpPr>
+            <p:cNvPr id="52" name="Oval 51"/>
+            <p:cNvSpPr/>
+            <p:nvPr/>
+          </p:nvSpPr>
+          <p:spPr>
+            <a:xfrm rot="16200000">
+              <a:off x="5881266" y="3412101"/>
+              <a:ext cx="71159" cy="86021"/>
+            </a:xfrm>
+            <a:prstGeom prst="ellipse">
+              <a:avLst/>
+            </a:prstGeom>
+            <a:solidFill>
+              <a:srgbClr val="FFFFFF"/>
+            </a:solidFill>
+            <a:ln>
+              <a:noFill/>
+            </a:ln>
+          </p:spPr>
+          <p:style>
+            <a:lnRef idx="1">
+              <a:schemeClr val="accent1"/>
+            </a:lnRef>
+            <a:fillRef idx="3">
+              <a:schemeClr val="accent1"/>
+            </a:fillRef>
+            <a:effectRef idx="2">
+              <a:schemeClr val="accent1"/>
+            </a:effectRef>
+            <a:fontRef idx="minor">
+              <a:schemeClr val="lt1"/>
+            </a:fontRef>
+          </p:style>
+          <p:txBody>
+            <a:bodyPr rtlCol="0" anchor="ctr"/>
+            <a:lstStyle/>
+            <a:p>
+              <a:pPr algn="ctr"/>
+              <a:endParaRPr lang="en-US"/>
+            </a:p>
+          </p:txBody>
+        </p:sp>
+        <p:sp>
+          <p:nvSpPr>
+            <p:cNvPr id="53" name="Oval 52"/>
+            <p:cNvSpPr/>
+            <p:nvPr/>
+          </p:nvSpPr>
+          <p:spPr>
+            <a:xfrm>
+              <a:off x="6072386" y="3378756"/>
+              <a:ext cx="64081" cy="145636"/>
+            </a:xfrm>
+            <a:prstGeom prst="ellipse">
+              <a:avLst/>
+            </a:prstGeom>
+            <a:solidFill>
+              <a:srgbClr val="FFFFFF"/>
+            </a:solidFill>
+            <a:ln>
+              <a:noFill/>
+            </a:ln>
+          </p:spPr>
+          <p:style>
+            <a:lnRef idx="1">
+              <a:schemeClr val="accent1"/>
+            </a:lnRef>
+            <a:fillRef idx="3">
+              <a:schemeClr val="accent1"/>
+            </a:fillRef>
+            <a:effectRef idx="2">
+              <a:schemeClr val="accent1"/>
+            </a:effectRef>
+            <a:fontRef idx="minor">
+              <a:schemeClr val="lt1"/>
+            </a:fontRef>
+          </p:style>
+          <p:txBody>
+            <a:bodyPr rtlCol="0" anchor="ctr"/>
+            <a:lstStyle/>
+            <a:p>
+              <a:pPr algn="ctr"/>
+              <a:endParaRPr lang="en-US"/>
+            </a:p>
+          </p:txBody>
+        </p:sp>
+        <p:sp>
+          <p:nvSpPr>
+            <p:cNvPr id="54" name="Freeform 53"/>
+            <p:cNvSpPr/>
+            <p:nvPr/>
+          </p:nvSpPr>
+          <p:spPr>
+            <a:xfrm>
+              <a:off x="5392189" y="2873060"/>
+              <a:ext cx="1350879" cy="1151124"/>
+            </a:xfrm>
+            <a:custGeom>
+              <a:avLst/>
+              <a:gdLst>
+                <a:gd name="connsiteX0" fmla="*/ 224482 w 1242397"/>
+                <a:gd name="connsiteY0" fmla="*/ 837621 h 1084970"/>
+                <a:gd name="connsiteX1" fmla="*/ 34217 w 1242397"/>
+                <a:gd name="connsiteY1" fmla="*/ 637839 h 1084970"/>
+                <a:gd name="connsiteX2" fmla="*/ 148376 w 1242397"/>
+                <a:gd name="connsiteY2" fmla="*/ 476110 h 1084970"/>
+                <a:gd name="connsiteX3" fmla="*/ 921 w 1242397"/>
+                <a:gd name="connsiteY3" fmla="*/ 309625 h 1084970"/>
+                <a:gd name="connsiteX4" fmla="*/ 233995 w 1242397"/>
+                <a:gd name="connsiteY4" fmla="*/ 276328 h 1084970"/>
+                <a:gd name="connsiteX5" fmla="*/ 124593 w 1242397"/>
+                <a:gd name="connsiteY5" fmla="*/ 90816 h 1084970"/>
+                <a:gd name="connsiteX6" fmla="*/ 371937 w 1242397"/>
+                <a:gd name="connsiteY6" fmla="*/ 152653 h 1084970"/>
+                <a:gd name="connsiteX7" fmla="*/ 390963 w 1242397"/>
+                <a:gd name="connsiteY7" fmla="*/ 5195 h 1084970"/>
+                <a:gd name="connsiteX8" fmla="*/ 533662 w 1242397"/>
+                <a:gd name="connsiteY8" fmla="*/ 100330 h 1084970"/>
+                <a:gd name="connsiteX9" fmla="*/ 609768 w 1242397"/>
+                <a:gd name="connsiteY9" fmla="*/ 5195 h 1084970"/>
+                <a:gd name="connsiteX10" fmla="*/ 681117 w 1242397"/>
+                <a:gd name="connsiteY10" fmla="*/ 95573 h 1084970"/>
+                <a:gd name="connsiteX11" fmla="*/ 814302 w 1242397"/>
+                <a:gd name="connsiteY11" fmla="*/ 438 h 1084970"/>
+                <a:gd name="connsiteX12" fmla="*/ 823815 w 1242397"/>
+                <a:gd name="connsiteY12" fmla="*/ 143140 h 1084970"/>
+                <a:gd name="connsiteX13" fmla="*/ 971270 w 1242397"/>
+                <a:gd name="connsiteY13" fmla="*/ 124113 h 1084970"/>
+                <a:gd name="connsiteX14" fmla="*/ 937974 w 1242397"/>
+                <a:gd name="connsiteY14" fmla="*/ 243031 h 1084970"/>
+                <a:gd name="connsiteX15" fmla="*/ 1109212 w 1242397"/>
+                <a:gd name="connsiteY15" fmla="*/ 295355 h 1084970"/>
+                <a:gd name="connsiteX16" fmla="*/ 1071159 w 1242397"/>
+                <a:gd name="connsiteY16" fmla="*/ 466597 h 1084970"/>
+                <a:gd name="connsiteX17" fmla="*/ 1194831 w 1242397"/>
+                <a:gd name="connsiteY17" fmla="*/ 637839 h 1084970"/>
+                <a:gd name="connsiteX18" fmla="*/ 1056889 w 1242397"/>
+                <a:gd name="connsiteY18" fmla="*/ 804324 h 1084970"/>
+                <a:gd name="connsiteX19" fmla="*/ 1204345 w 1242397"/>
+                <a:gd name="connsiteY19" fmla="*/ 918485 h 1084970"/>
+                <a:gd name="connsiteX20" fmla="*/ 1137752 w 1242397"/>
+                <a:gd name="connsiteY20" fmla="*/ 994593 h 1084970"/>
+                <a:gd name="connsiteX21" fmla="*/ 1242397 w 1242397"/>
+                <a:gd name="connsiteY21" fmla="*/ 1084970 h 1084970"/>
+                <a:gd name="connsiteX22" fmla="*/ 1242397 w 1242397"/>
+                <a:gd name="connsiteY22" fmla="*/ 1084970 h 1084970"/>
+              </a:gdLst>
+              <a:ahLst/>
+              <a:cxnLst>
+                <a:cxn ang="0">
+                  <a:pos x="connsiteX0" y="connsiteY0"/>
+                </a:cxn>
+                <a:cxn ang="0">
+                  <a:pos x="connsiteX1" y="connsiteY1"/>
+                </a:cxn>
+                <a:cxn ang="0">
+                  <a:pos x="connsiteX2" y="connsiteY2"/>
+                </a:cxn>
+                <a:cxn ang="0">
+                  <a:pos x="connsiteX3" y="connsiteY3"/>
+                </a:cxn>
+                <a:cxn ang="0">
+                  <a:pos x="connsiteX4" y="connsiteY4"/>
+                </a:cxn>
+                <a:cxn ang="0">
+                  <a:pos x="connsiteX5" y="connsiteY5"/>
+                </a:cxn>
+                <a:cxn ang="0">
+                  <a:pos x="connsiteX6" y="connsiteY6"/>
+                </a:cxn>
+                <a:cxn ang="0">
+                  <a:pos x="connsiteX7" y="connsiteY7"/>
+                </a:cxn>
+                <a:cxn ang="0">
+                  <a:pos x="connsiteX8" y="connsiteY8"/>
+                </a:cxn>
+                <a:cxn ang="0">
+                  <a:pos x="connsiteX9" y="connsiteY9"/>
+                </a:cxn>
+                <a:cxn ang="0">
+                  <a:pos x="connsiteX10" y="connsiteY10"/>
+                </a:cxn>
+                <a:cxn ang="0">
+                  <a:pos x="connsiteX11" y="connsiteY11"/>
+                </a:cxn>
+                <a:cxn ang="0">
+                  <a:pos x="connsiteX12" y="connsiteY12"/>
+                </a:cxn>
+                <a:cxn ang="0">
+                  <a:pos x="connsiteX13" y="connsiteY13"/>
+                </a:cxn>
+                <a:cxn ang="0">
+                  <a:pos x="connsiteX14" y="connsiteY14"/>
+                </a:cxn>
+                <a:cxn ang="0">
+                  <a:pos x="connsiteX15" y="connsiteY15"/>
+                </a:cxn>
+                <a:cxn ang="0">
+                  <a:pos x="connsiteX16" y="connsiteY16"/>
+                </a:cxn>
+                <a:cxn ang="0">
+                  <a:pos x="connsiteX17" y="connsiteY17"/>
+                </a:cxn>
+                <a:cxn ang="0">
+                  <a:pos x="connsiteX18" y="connsiteY18"/>
+                </a:cxn>
+                <a:cxn ang="0">
+                  <a:pos x="connsiteX19" y="connsiteY19"/>
+                </a:cxn>
+                <a:cxn ang="0">
+                  <a:pos x="connsiteX20" y="connsiteY20"/>
+                </a:cxn>
+                <a:cxn ang="0">
+                  <a:pos x="connsiteX21" y="connsiteY21"/>
+                </a:cxn>
+                <a:cxn ang="0">
+                  <a:pos x="connsiteX22" y="connsiteY22"/>
+                </a:cxn>
+              </a:cxnLst>
+              <a:rect l="l" t="t" r="r" b="b"/>
+              <a:pathLst>
+                <a:path w="1242397" h="1084970">
+                  <a:moveTo>
+                    <a:pt x="224482" y="837621"/>
+                  </a:moveTo>
+                  <a:cubicBezTo>
+                    <a:pt x="135691" y="767856"/>
+                    <a:pt x="46901" y="698091"/>
+                    <a:pt x="34217" y="637839"/>
+                  </a:cubicBezTo>
+                  <a:cubicBezTo>
+                    <a:pt x="21533" y="577587"/>
+                    <a:pt x="153925" y="530812"/>
+                    <a:pt x="148376" y="476110"/>
+                  </a:cubicBezTo>
+                  <a:cubicBezTo>
+                    <a:pt x="142827" y="421408"/>
+                    <a:pt x="-13349" y="342922"/>
+                    <a:pt x="921" y="309625"/>
+                  </a:cubicBezTo>
+                  <a:cubicBezTo>
+                    <a:pt x="15191" y="276328"/>
+                    <a:pt x="213383" y="312796"/>
+                    <a:pt x="233995" y="276328"/>
+                  </a:cubicBezTo>
+                  <a:cubicBezTo>
+                    <a:pt x="254607" y="239860"/>
+                    <a:pt x="101603" y="111428"/>
+                    <a:pt x="124593" y="90816"/>
+                  </a:cubicBezTo>
+                  <a:cubicBezTo>
+                    <a:pt x="147583" y="70203"/>
+                    <a:pt x="327542" y="166923"/>
+                    <a:pt x="371937" y="152653"/>
+                  </a:cubicBezTo>
+                  <a:cubicBezTo>
+                    <a:pt x="416332" y="138383"/>
+                    <a:pt x="364009" y="13915"/>
+                    <a:pt x="390963" y="5195"/>
+                  </a:cubicBezTo>
+                  <a:cubicBezTo>
+                    <a:pt x="417917" y="-3525"/>
+                    <a:pt x="497195" y="100330"/>
+                    <a:pt x="533662" y="100330"/>
+                  </a:cubicBezTo>
+                  <a:cubicBezTo>
+                    <a:pt x="570129" y="100330"/>
+                    <a:pt x="585192" y="5988"/>
+                    <a:pt x="609768" y="5195"/>
+                  </a:cubicBezTo>
+                  <a:cubicBezTo>
+                    <a:pt x="634344" y="4402"/>
+                    <a:pt x="647028" y="96366"/>
+                    <a:pt x="681117" y="95573"/>
+                  </a:cubicBezTo>
+                  <a:cubicBezTo>
+                    <a:pt x="715206" y="94780"/>
+                    <a:pt x="790519" y="-7490"/>
+                    <a:pt x="814302" y="438"/>
+                  </a:cubicBezTo>
+                  <a:cubicBezTo>
+                    <a:pt x="838085" y="8366"/>
+                    <a:pt x="797654" y="122528"/>
+                    <a:pt x="823815" y="143140"/>
+                  </a:cubicBezTo>
+                  <a:cubicBezTo>
+                    <a:pt x="849976" y="163752"/>
+                    <a:pt x="952244" y="107465"/>
+                    <a:pt x="971270" y="124113"/>
+                  </a:cubicBezTo>
+                  <a:cubicBezTo>
+                    <a:pt x="990296" y="140761"/>
+                    <a:pt x="914984" y="214491"/>
+                    <a:pt x="937974" y="243031"/>
+                  </a:cubicBezTo>
+                  <a:cubicBezTo>
+                    <a:pt x="960964" y="271571"/>
+                    <a:pt x="1087015" y="258094"/>
+                    <a:pt x="1109212" y="295355"/>
+                  </a:cubicBezTo>
+                  <a:cubicBezTo>
+                    <a:pt x="1131409" y="332616"/>
+                    <a:pt x="1056889" y="409516"/>
+                    <a:pt x="1071159" y="466597"/>
+                  </a:cubicBezTo>
+                  <a:cubicBezTo>
+                    <a:pt x="1085429" y="523678"/>
+                    <a:pt x="1197209" y="581551"/>
+                    <a:pt x="1194831" y="637839"/>
+                  </a:cubicBezTo>
+                  <a:cubicBezTo>
+                    <a:pt x="1192453" y="694127"/>
+                    <a:pt x="1055303" y="757550"/>
+                    <a:pt x="1056889" y="804324"/>
+                  </a:cubicBezTo>
+                  <a:cubicBezTo>
+                    <a:pt x="1058475" y="851098"/>
+                    <a:pt x="1190868" y="886774"/>
+                    <a:pt x="1204345" y="918485"/>
+                  </a:cubicBezTo>
+                  <a:cubicBezTo>
+                    <a:pt x="1217822" y="950197"/>
+                    <a:pt x="1131410" y="966846"/>
+                    <a:pt x="1137752" y="994593"/>
+                  </a:cubicBezTo>
+                  <a:cubicBezTo>
+                    <a:pt x="1144094" y="1022341"/>
+                    <a:pt x="1242397" y="1084970"/>
+                    <a:pt x="1242397" y="1084970"/>
+                  </a:cubicBezTo>
+                  <a:lnTo>
+                    <a:pt x="1242397" y="1084970"/>
+                  </a:lnTo>
+                </a:path>
+              </a:pathLst>
+            </a:custGeom>
+            <a:ln>
+              <a:solidFill>
+                <a:srgbClr val="FFFFFF"/>
+              </a:solidFill>
+            </a:ln>
+          </p:spPr>
+          <p:style>
+            <a:lnRef idx="2">
+              <a:schemeClr val="accent1"/>
+            </a:lnRef>
+            <a:fillRef idx="0">
+              <a:schemeClr val="accent1"/>
+            </a:fillRef>
+            <a:effectRef idx="1">
+              <a:schemeClr val="accent1"/>
+            </a:effectRef>
+            <a:fontRef idx="minor">
+              <a:schemeClr val="tx1"/>
+            </a:fontRef>
+          </p:style>
+          <p:txBody>
+            <a:bodyPr rtlCol="0" anchor="ctr"/>
+            <a:lstStyle/>
+            <a:p>
+              <a:pPr algn="ctr"/>
+              <a:endParaRPr lang="en-US"/>
+            </a:p>
+          </p:txBody>
+        </p:sp>
+      </p:grpSp>
+      <p:sp>
+        <p:nvSpPr>
+          <p:cNvPr id="55" name="TextBox 54"/>
+          <p:cNvSpPr txBox="1"/>
+          <p:nvPr/>
+        </p:nvSpPr>
+        <p:spPr>
+          <a:xfrm>
+            <a:off x="3289825" y="3866092"/>
+            <a:ext cx="2341548" cy="584776"/>
+          </a:xfrm>
+          <a:prstGeom prst="rect">
+            <a:avLst/>
+          </a:prstGeom>
+          <a:noFill/>
+        </p:spPr>
+        <p:txBody>
+          <a:bodyPr wrap="square" rtlCol="0">
+            <a:spAutoFit/>
+          </a:bodyPr>
+          <a:lstStyle/>
+          <a:p>
+            <a:pPr algn="ctr"/>
+            <a:r>
+              <a:rPr lang="en-US" sz="1600" dirty="0" smtClean="0">
+                <a:solidFill>
+                  <a:srgbClr val="FFFFFF"/>
+                </a:solidFill>
+                <a:latin typeface="Anime Ace 2.0 BB"/>
+                <a:cs typeface="Anime Ace 2.0 BB"/>
+              </a:rPr>
+              <a:t>Find no examples</a:t>
+            </a:r>
+            <a:endParaRPr lang="en-US" sz="1600" dirty="0">
+              <a:solidFill>
+                <a:srgbClr val="FFFFFF"/>
+              </a:solidFill>
+              <a:latin typeface="Anime Ace 2.0 BB"/>
+              <a:cs typeface="Anime Ace 2.0 BB"/>
+            </a:endParaRPr>
+          </a:p>
+        </p:txBody>
+      </p:sp>
+      <p:sp>
+        <p:nvSpPr>
+          <p:cNvPr id="56" name="Arc 55"/>
+          <p:cNvSpPr/>
+          <p:nvPr/>
+        </p:nvSpPr>
+        <p:spPr>
+          <a:xfrm>
+            <a:off x="4329578" y="2835648"/>
+            <a:ext cx="188415" cy="114843"/>
+          </a:xfrm>
+          <a:prstGeom prst="arc">
+            <a:avLst/>
+          </a:prstGeom>
+          <a:ln>
+            <a:solidFill>
+              <a:srgbClr val="FFFFFF"/>
+            </a:solidFill>
+          </a:ln>
+        </p:spPr>
+        <p:style>
+          <a:lnRef idx="2">
+            <a:schemeClr val="accent1"/>
+          </a:lnRef>
+          <a:fillRef idx="0">
+            <a:schemeClr val="accent1"/>
+          </a:fillRef>
+          <a:effectRef idx="1">
+            <a:schemeClr val="accent1"/>
+          </a:effectRef>
+          <a:fontRef idx="minor">
+            <a:schemeClr val="tx1"/>
+          </a:fontRef>
+        </p:style>
+        <p:txBody>
+          <a:bodyPr rtlCol="0" anchor="ctr"/>
+          <a:lstStyle/>
+          <a:p>
+            <a:pPr algn="ctr"/>
+            <a:endParaRPr lang="en-US"/>
+          </a:p>
+        </p:txBody>
+      </p:sp>
+      <p:cxnSp>
+        <p:nvCxnSpPr>
+          <p:cNvPr id="57" name="Straight Arrow Connector 56"/>
+          <p:cNvCxnSpPr/>
+          <p:nvPr/>
+        </p:nvCxnSpPr>
+        <p:spPr>
+          <a:xfrm>
+            <a:off x="5529399" y="3048249"/>
+            <a:ext cx="1178113" cy="0"/>
+          </a:xfrm>
+          <a:prstGeom prst="straightConnector1">
+            <a:avLst/>
+          </a:prstGeom>
+          <a:ln w="38100" cmpd="sng">
+            <a:solidFill>
+              <a:schemeClr val="tx1">
+                <a:lumMod val="50000"/>
+                <a:lumOff val="50000"/>
+              </a:schemeClr>
+            </a:solidFill>
+            <a:tailEnd type="arrow"/>
+          </a:ln>
+        </p:spPr>
+        <p:style>
+          <a:lnRef idx="2">
+            <a:schemeClr val="accent1"/>
+          </a:lnRef>
+          <a:fillRef idx="0">
+            <a:schemeClr val="accent1"/>
+          </a:fillRef>
+          <a:effectRef idx="1">
+            <a:schemeClr val="accent1"/>
+          </a:effectRef>
+          <a:fontRef idx="minor">
+            <a:schemeClr val="tx1"/>
+          </a:fontRef>
+        </p:style>
+      </p:cxnSp>
+      <p:sp>
+        <p:nvSpPr>
+          <p:cNvPr id="58" name="TextBox 57"/>
+          <p:cNvSpPr txBox="1"/>
+          <p:nvPr/>
+        </p:nvSpPr>
+        <p:spPr>
+          <a:xfrm>
+            <a:off x="3727312" y="2525184"/>
+            <a:ext cx="422026" cy="338554"/>
+          </a:xfrm>
+          <a:prstGeom prst="rect">
+            <a:avLst/>
+          </a:prstGeom>
+          <a:noFill/>
+        </p:spPr>
+        <p:txBody>
+          <a:bodyPr wrap="square" rtlCol="0">
+            <a:spAutoFit/>
+          </a:bodyPr>
+          <a:lstStyle/>
+          <a:p>
+            <a:pPr algn="ctr"/>
+            <a:r>
+              <a:rPr lang="en-US" sz="1600" dirty="0" smtClean="0">
+                <a:solidFill>
+                  <a:srgbClr val="FFFFFF"/>
+                </a:solidFill>
+                <a:latin typeface="Anime Ace 2.0 BB"/>
+                <a:cs typeface="Anime Ace 2.0 BB"/>
+              </a:rPr>
+              <a:t>?</a:t>
+            </a:r>
+            <a:endParaRPr lang="en-US" sz="1600" dirty="0">
+              <a:solidFill>
+                <a:srgbClr val="FFFFFF"/>
+              </a:solidFill>
+              <a:latin typeface="Anime Ace 2.0 BB"/>
+              <a:cs typeface="Anime Ace 2.0 BB"/>
+            </a:endParaRPr>
+          </a:p>
+        </p:txBody>
+      </p:sp>
+      <p:grpSp>
+        <p:nvGrpSpPr>
+          <p:cNvPr id="67" name="Group 66"/>
+          <p:cNvGrpSpPr>
+            <a:grpSpLocks noChangeAspect="1"/>
+          </p:cNvGrpSpPr>
+          <p:nvPr/>
+        </p:nvGrpSpPr>
+        <p:grpSpPr>
+          <a:xfrm>
+            <a:off x="3973426" y="4996625"/>
+            <a:ext cx="874553" cy="1170541"/>
+            <a:chOff x="5381882" y="2873060"/>
+            <a:chExt cx="1361186" cy="1821873"/>
+          </a:xfrm>
+        </p:grpSpPr>
+        <p:sp>
+          <p:nvSpPr>
+            <p:cNvPr id="68" name="Chord 3"/>
+            <p:cNvSpPr/>
+            <p:nvPr/>
+          </p:nvSpPr>
+          <p:spPr>
+            <a:xfrm>
+              <a:off x="5381882" y="3890610"/>
+              <a:ext cx="1231640" cy="804323"/>
+            </a:xfrm>
+            <a:custGeom>
+              <a:avLst/>
+              <a:gdLst>
+                <a:gd name="connsiteX0" fmla="*/ 16608 w 2232278"/>
+                <a:gd name="connsiteY0" fmla="*/ 1307968 h 2232278"/>
+                <a:gd name="connsiteX1" fmla="*/ 589005 w 2232278"/>
+                <a:gd name="connsiteY1" fmla="*/ 132321 h 2232278"/>
+                <a:gd name="connsiteX2" fmla="*/ 1884880 w 2232278"/>
+                <a:gd name="connsiteY2" fmla="*/ 306939 h 2232278"/>
+                <a:gd name="connsiteX3" fmla="*/ 2125677 w 2232278"/>
+                <a:gd name="connsiteY3" fmla="*/ 1592163 h 2232278"/>
+                <a:gd name="connsiteX4" fmla="*/ 16608 w 2232278"/>
+                <a:gd name="connsiteY4" fmla="*/ 1307968 h 2232278"/>
+                <a:gd name="connsiteX0" fmla="*/ 16669 w 2232378"/>
+                <a:gd name="connsiteY0" fmla="*/ 1307991 h 1619407"/>
+                <a:gd name="connsiteX1" fmla="*/ 589066 w 2232378"/>
+                <a:gd name="connsiteY1" fmla="*/ 132344 h 1619407"/>
+                <a:gd name="connsiteX2" fmla="*/ 1884941 w 2232378"/>
+                <a:gd name="connsiteY2" fmla="*/ 306962 h 1619407"/>
+                <a:gd name="connsiteX3" fmla="*/ 2125738 w 2232378"/>
+                <a:gd name="connsiteY3" fmla="*/ 1592186 h 1619407"/>
+                <a:gd name="connsiteX4" fmla="*/ 16669 w 2232378"/>
+                <a:gd name="connsiteY4" fmla="*/ 1307991 h 1619407"/>
+                <a:gd name="connsiteX0" fmla="*/ 16669 w 2232378"/>
+                <a:gd name="connsiteY0" fmla="*/ 1307991 h 1698147"/>
+                <a:gd name="connsiteX1" fmla="*/ 589066 w 2232378"/>
+                <a:gd name="connsiteY1" fmla="*/ 132344 h 1698147"/>
+                <a:gd name="connsiteX2" fmla="*/ 1884941 w 2232378"/>
+                <a:gd name="connsiteY2" fmla="*/ 306962 h 1698147"/>
+                <a:gd name="connsiteX3" fmla="*/ 2125738 w 2232378"/>
+                <a:gd name="connsiteY3" fmla="*/ 1592186 h 1698147"/>
+                <a:gd name="connsiteX4" fmla="*/ 16669 w 2232378"/>
+                <a:gd name="connsiteY4" fmla="*/ 1307991 h 1698147"/>
+                <a:gd name="connsiteX0" fmla="*/ 16669 w 2232378"/>
+                <a:gd name="connsiteY0" fmla="*/ 1307991 h 1698147"/>
+                <a:gd name="connsiteX1" fmla="*/ 589066 w 2232378"/>
+                <a:gd name="connsiteY1" fmla="*/ 132344 h 1698147"/>
+                <a:gd name="connsiteX2" fmla="*/ 1884941 w 2232378"/>
+                <a:gd name="connsiteY2" fmla="*/ 306962 h 1698147"/>
+                <a:gd name="connsiteX3" fmla="*/ 2125738 w 2232378"/>
+                <a:gd name="connsiteY3" fmla="*/ 1592186 h 1698147"/>
+                <a:gd name="connsiteX4" fmla="*/ 16669 w 2232378"/>
+                <a:gd name="connsiteY4" fmla="*/ 1307991 h 1698147"/>
+                <a:gd name="connsiteX0" fmla="*/ 16669 w 2232378"/>
+                <a:gd name="connsiteY0" fmla="*/ 1175646 h 1565802"/>
+                <a:gd name="connsiteX1" fmla="*/ 589066 w 2232378"/>
+                <a:gd name="connsiteY1" fmla="*/ -1 h 1565802"/>
+                <a:gd name="connsiteX2" fmla="*/ 1884941 w 2232378"/>
+                <a:gd name="connsiteY2" fmla="*/ 174617 h 1565802"/>
+                <a:gd name="connsiteX3" fmla="*/ 2125738 w 2232378"/>
+                <a:gd name="connsiteY3" fmla="*/ 1459841 h 1565802"/>
+                <a:gd name="connsiteX4" fmla="*/ 16669 w 2232378"/>
+                <a:gd name="connsiteY4" fmla="*/ 1175646 h 1565802"/>
+                <a:gd name="connsiteX0" fmla="*/ 16669 w 2232378"/>
+                <a:gd name="connsiteY0" fmla="*/ 1175648 h 1565804"/>
+                <a:gd name="connsiteX1" fmla="*/ 589066 w 2232378"/>
+                <a:gd name="connsiteY1" fmla="*/ 1 h 1565804"/>
+                <a:gd name="connsiteX2" fmla="*/ 1884941 w 2232378"/>
+                <a:gd name="connsiteY2" fmla="*/ 174619 h 1565804"/>
+                <a:gd name="connsiteX3" fmla="*/ 2125738 w 2232378"/>
+                <a:gd name="connsiteY3" fmla="*/ 1459843 h 1565804"/>
+                <a:gd name="connsiteX4" fmla="*/ 16669 w 2232378"/>
+                <a:gd name="connsiteY4" fmla="*/ 1175648 h 1565804"/>
+                <a:gd name="connsiteX0" fmla="*/ 16669 w 2232378"/>
+                <a:gd name="connsiteY0" fmla="*/ 1175646 h 1565802"/>
+                <a:gd name="connsiteX1" fmla="*/ 589066 w 2232378"/>
+                <a:gd name="connsiteY1" fmla="*/ -1 h 1565802"/>
+                <a:gd name="connsiteX2" fmla="*/ 1884941 w 2232378"/>
+                <a:gd name="connsiteY2" fmla="*/ 174617 h 1565802"/>
+                <a:gd name="connsiteX3" fmla="*/ 2125738 w 2232378"/>
+                <a:gd name="connsiteY3" fmla="*/ 1459841 h 1565802"/>
+                <a:gd name="connsiteX4" fmla="*/ 16669 w 2232378"/>
+                <a:gd name="connsiteY4" fmla="*/ 1175646 h 1565802"/>
+              </a:gdLst>
+              <a:ahLst/>
+              <a:cxnLst>
+                <a:cxn ang="0">
+                  <a:pos x="connsiteX0" y="connsiteY0"/>
+                </a:cxn>
+                <a:cxn ang="0">
+                  <a:pos x="connsiteX1" y="connsiteY1"/>
+                </a:cxn>
+                <a:cxn ang="0">
+                  <a:pos x="connsiteX2" y="connsiteY2"/>
+                </a:cxn>
+                <a:cxn ang="0">
+                  <a:pos x="connsiteX3" y="connsiteY3"/>
+                </a:cxn>
+                <a:cxn ang="0">
+                  <a:pos x="connsiteX4" y="connsiteY4"/>
+                </a:cxn>
+              </a:cxnLst>
+              <a:rect l="l" t="t" r="r" b="b"/>
+              <a:pathLst>
+                <a:path w="2232378" h="1565802">
+                  <a:moveTo>
+                    <a:pt x="16669" y="1175646"/>
+                  </a:moveTo>
+                  <a:cubicBezTo>
+                    <a:pt x="-66084" y="701323"/>
+                    <a:pt x="164660" y="227398"/>
+                    <a:pt x="589066" y="-1"/>
+                  </a:cubicBezTo>
+                  <a:cubicBezTo>
+                    <a:pt x="1013471" y="543761"/>
+                    <a:pt x="1715366" y="47123"/>
+                    <a:pt x="1884941" y="174617"/>
+                  </a:cubicBezTo>
+                  <a:cubicBezTo>
+                    <a:pt x="2234019" y="506242"/>
+                    <a:pt x="2331089" y="1024340"/>
+                    <a:pt x="2125738" y="1459841"/>
+                  </a:cubicBezTo>
+                  <a:cubicBezTo>
+                    <a:pt x="1461202" y="1570351"/>
+                    <a:pt x="886471" y="1719347"/>
+                    <a:pt x="16669" y="1175646"/>
+                  </a:cubicBezTo>
+                  <a:close/>
+                </a:path>
+              </a:pathLst>
+            </a:custGeom>
+            <a:noFill/>
+            <a:ln w="38100" cmpd="sng">
+              <a:solidFill>
+                <a:schemeClr val="bg1"/>
+              </a:solidFill>
+            </a:ln>
+          </p:spPr>
+          <p:style>
+            <a:lnRef idx="1">
+              <a:schemeClr val="accent1"/>
+            </a:lnRef>
+            <a:fillRef idx="3">
+              <a:schemeClr val="accent1"/>
+            </a:fillRef>
+            <a:effectRef idx="2">
+              <a:schemeClr val="accent1"/>
+            </a:effectRef>
+            <a:fontRef idx="minor">
+              <a:schemeClr val="lt1"/>
+            </a:fontRef>
+          </p:style>
+          <p:txBody>
+            <a:bodyPr rtlCol="0" anchor="ctr"/>
+            <a:lstStyle/>
+            <a:p>
+              <a:pPr algn="ctr"/>
+              <a:endParaRPr lang="en-US"/>
+            </a:p>
+          </p:txBody>
+        </p:sp>
+        <p:sp>
+          <p:nvSpPr>
+            <p:cNvPr id="69" name="Oval 68"/>
+            <p:cNvSpPr/>
+            <p:nvPr/>
+          </p:nvSpPr>
+          <p:spPr>
+            <a:xfrm>
+              <a:off x="5652009" y="3117129"/>
+              <a:ext cx="794595" cy="773482"/>
+            </a:xfrm>
+            <a:prstGeom prst="ellipse">
+              <a:avLst/>
+            </a:prstGeom>
+            <a:noFill/>
+            <a:ln w="38100" cmpd="sng">
+              <a:solidFill>
+                <a:schemeClr val="bg1"/>
+              </a:solidFill>
+            </a:ln>
+          </p:spPr>
+          <p:style>
+            <a:lnRef idx="1">
+              <a:schemeClr val="accent1"/>
+            </a:lnRef>
+            <a:fillRef idx="3">
+              <a:schemeClr val="accent1"/>
+            </a:fillRef>
+            <a:effectRef idx="2">
+              <a:schemeClr val="accent1"/>
+            </a:effectRef>
+            <a:fontRef idx="minor">
+              <a:schemeClr val="lt1"/>
+            </a:fontRef>
+          </p:style>
+          <p:txBody>
+            <a:bodyPr rtlCol="0" anchor="ctr"/>
+            <a:lstStyle/>
+            <a:p>
+              <a:pPr algn="ctr"/>
+              <a:endParaRPr lang="en-US"/>
+            </a:p>
+          </p:txBody>
+        </p:sp>
+        <p:sp>
+          <p:nvSpPr>
+            <p:cNvPr id="72" name="Freeform 71"/>
+            <p:cNvSpPr/>
+            <p:nvPr/>
+          </p:nvSpPr>
+          <p:spPr>
+            <a:xfrm>
+              <a:off x="5392189" y="2873060"/>
+              <a:ext cx="1350879" cy="1151124"/>
+            </a:xfrm>
+            <a:custGeom>
+              <a:avLst/>
+              <a:gdLst>
+                <a:gd name="connsiteX0" fmla="*/ 224482 w 1242397"/>
+                <a:gd name="connsiteY0" fmla="*/ 837621 h 1084970"/>
+                <a:gd name="connsiteX1" fmla="*/ 34217 w 1242397"/>
+                <a:gd name="connsiteY1" fmla="*/ 637839 h 1084970"/>
+                <a:gd name="connsiteX2" fmla="*/ 148376 w 1242397"/>
+                <a:gd name="connsiteY2" fmla="*/ 476110 h 1084970"/>
+                <a:gd name="connsiteX3" fmla="*/ 921 w 1242397"/>
+                <a:gd name="connsiteY3" fmla="*/ 309625 h 1084970"/>
+                <a:gd name="connsiteX4" fmla="*/ 233995 w 1242397"/>
+                <a:gd name="connsiteY4" fmla="*/ 276328 h 1084970"/>
+                <a:gd name="connsiteX5" fmla="*/ 124593 w 1242397"/>
+                <a:gd name="connsiteY5" fmla="*/ 90816 h 1084970"/>
+                <a:gd name="connsiteX6" fmla="*/ 371937 w 1242397"/>
+                <a:gd name="connsiteY6" fmla="*/ 152653 h 1084970"/>
+                <a:gd name="connsiteX7" fmla="*/ 390963 w 1242397"/>
+                <a:gd name="connsiteY7" fmla="*/ 5195 h 1084970"/>
+                <a:gd name="connsiteX8" fmla="*/ 533662 w 1242397"/>
+                <a:gd name="connsiteY8" fmla="*/ 100330 h 1084970"/>
+                <a:gd name="connsiteX9" fmla="*/ 609768 w 1242397"/>
+                <a:gd name="connsiteY9" fmla="*/ 5195 h 1084970"/>
+                <a:gd name="connsiteX10" fmla="*/ 681117 w 1242397"/>
+                <a:gd name="connsiteY10" fmla="*/ 95573 h 1084970"/>
+                <a:gd name="connsiteX11" fmla="*/ 814302 w 1242397"/>
+                <a:gd name="connsiteY11" fmla="*/ 438 h 1084970"/>
+                <a:gd name="connsiteX12" fmla="*/ 823815 w 1242397"/>
+                <a:gd name="connsiteY12" fmla="*/ 143140 h 1084970"/>
+                <a:gd name="connsiteX13" fmla="*/ 971270 w 1242397"/>
+                <a:gd name="connsiteY13" fmla="*/ 124113 h 1084970"/>
+                <a:gd name="connsiteX14" fmla="*/ 937974 w 1242397"/>
+                <a:gd name="connsiteY14" fmla="*/ 243031 h 1084970"/>
+                <a:gd name="connsiteX15" fmla="*/ 1109212 w 1242397"/>
+                <a:gd name="connsiteY15" fmla="*/ 295355 h 1084970"/>
+                <a:gd name="connsiteX16" fmla="*/ 1071159 w 1242397"/>
+                <a:gd name="connsiteY16" fmla="*/ 466597 h 1084970"/>
+                <a:gd name="connsiteX17" fmla="*/ 1194831 w 1242397"/>
+                <a:gd name="connsiteY17" fmla="*/ 637839 h 1084970"/>
+                <a:gd name="connsiteX18" fmla="*/ 1056889 w 1242397"/>
+                <a:gd name="connsiteY18" fmla="*/ 804324 h 1084970"/>
+                <a:gd name="connsiteX19" fmla="*/ 1204345 w 1242397"/>
+                <a:gd name="connsiteY19" fmla="*/ 918485 h 1084970"/>
+                <a:gd name="connsiteX20" fmla="*/ 1137752 w 1242397"/>
+                <a:gd name="connsiteY20" fmla="*/ 994593 h 1084970"/>
+                <a:gd name="connsiteX21" fmla="*/ 1242397 w 1242397"/>
+                <a:gd name="connsiteY21" fmla="*/ 1084970 h 1084970"/>
+                <a:gd name="connsiteX22" fmla="*/ 1242397 w 1242397"/>
+                <a:gd name="connsiteY22" fmla="*/ 1084970 h 1084970"/>
+              </a:gdLst>
+              <a:ahLst/>
+              <a:cxnLst>
+                <a:cxn ang="0">
+                  <a:pos x="connsiteX0" y="connsiteY0"/>
+                </a:cxn>
+                <a:cxn ang="0">
+                  <a:pos x="connsiteX1" y="connsiteY1"/>
+                </a:cxn>
+                <a:cxn ang="0">
+                  <a:pos x="connsiteX2" y="connsiteY2"/>
+                </a:cxn>
+                <a:cxn ang="0">
+                  <a:pos x="connsiteX3" y="connsiteY3"/>
+                </a:cxn>
+                <a:cxn ang="0">
+                  <a:pos x="connsiteX4" y="connsiteY4"/>
+                </a:cxn>
+                <a:cxn ang="0">
+                  <a:pos x="connsiteX5" y="connsiteY5"/>
+                </a:cxn>
+                <a:cxn ang="0">
+                  <a:pos x="connsiteX6" y="connsiteY6"/>
+                </a:cxn>
+                <a:cxn ang="0">
+                  <a:pos x="connsiteX7" y="connsiteY7"/>
+                </a:cxn>
+                <a:cxn ang="0">
+                  <a:pos x="connsiteX8" y="connsiteY8"/>
+                </a:cxn>
+                <a:cxn ang="0">
+                  <a:pos x="connsiteX9" y="connsiteY9"/>
+                </a:cxn>
+                <a:cxn ang="0">
+                  <a:pos x="connsiteX10" y="connsiteY10"/>
+                </a:cxn>
+                <a:cxn ang="0">
+                  <a:pos x="connsiteX11" y="connsiteY11"/>
+                </a:cxn>
+                <a:cxn ang="0">
+                  <a:pos x="connsiteX12" y="connsiteY12"/>
+                </a:cxn>
+                <a:cxn ang="0">
+                  <a:pos x="connsiteX13" y="connsiteY13"/>
+                </a:cxn>
+                <a:cxn ang="0">
+                  <a:pos x="connsiteX14" y="connsiteY14"/>
+                </a:cxn>
+                <a:cxn ang="0">
+                  <a:pos x="connsiteX15" y="connsiteY15"/>
+                </a:cxn>
+                <a:cxn ang="0">
+                  <a:pos x="connsiteX16" y="connsiteY16"/>
+                </a:cxn>
+                <a:cxn ang="0">
+                  <a:pos x="connsiteX17" y="connsiteY17"/>
+                </a:cxn>
+                <a:cxn ang="0">
+                  <a:pos x="connsiteX18" y="connsiteY18"/>
+                </a:cxn>
+                <a:cxn ang="0">
+                  <a:pos x="connsiteX19" y="connsiteY19"/>
+                </a:cxn>
+                <a:cxn ang="0">
+                  <a:pos x="connsiteX20" y="connsiteY20"/>
+                </a:cxn>
+                <a:cxn ang="0">
+                  <a:pos x="connsiteX21" y="connsiteY21"/>
+                </a:cxn>
+                <a:cxn ang="0">
+                  <a:pos x="connsiteX22" y="connsiteY22"/>
+                </a:cxn>
+              </a:cxnLst>
+              <a:rect l="l" t="t" r="r" b="b"/>
+              <a:pathLst>
+                <a:path w="1242397" h="1084970">
+                  <a:moveTo>
+                    <a:pt x="224482" y="837621"/>
+                  </a:moveTo>
+                  <a:cubicBezTo>
+                    <a:pt x="135691" y="767856"/>
+                    <a:pt x="46901" y="698091"/>
+                    <a:pt x="34217" y="637839"/>
+                  </a:cubicBezTo>
+                  <a:cubicBezTo>
+                    <a:pt x="21533" y="577587"/>
+                    <a:pt x="153925" y="530812"/>
+                    <a:pt x="148376" y="476110"/>
+                  </a:cubicBezTo>
+                  <a:cubicBezTo>
+                    <a:pt x="142827" y="421408"/>
+                    <a:pt x="-13349" y="342922"/>
+                    <a:pt x="921" y="309625"/>
+                  </a:cubicBezTo>
+                  <a:cubicBezTo>
+                    <a:pt x="15191" y="276328"/>
+                    <a:pt x="213383" y="312796"/>
+                    <a:pt x="233995" y="276328"/>
+                  </a:cubicBezTo>
+                  <a:cubicBezTo>
+                    <a:pt x="254607" y="239860"/>
+                    <a:pt x="101603" y="111428"/>
+                    <a:pt x="124593" y="90816"/>
+                  </a:cubicBezTo>
+                  <a:cubicBezTo>
+                    <a:pt x="147583" y="70203"/>
+                    <a:pt x="327542" y="166923"/>
+                    <a:pt x="371937" y="152653"/>
+                  </a:cubicBezTo>
+                  <a:cubicBezTo>
+                    <a:pt x="416332" y="138383"/>
+                    <a:pt x="364009" y="13915"/>
+                    <a:pt x="390963" y="5195"/>
+                  </a:cubicBezTo>
+                  <a:cubicBezTo>
+                    <a:pt x="417917" y="-3525"/>
+                    <a:pt x="497195" y="100330"/>
+                    <a:pt x="533662" y="100330"/>
+                  </a:cubicBezTo>
+                  <a:cubicBezTo>
+                    <a:pt x="570129" y="100330"/>
+                    <a:pt x="585192" y="5988"/>
+                    <a:pt x="609768" y="5195"/>
+                  </a:cubicBezTo>
+                  <a:cubicBezTo>
+                    <a:pt x="634344" y="4402"/>
+                    <a:pt x="647028" y="96366"/>
+                    <a:pt x="681117" y="95573"/>
+                  </a:cubicBezTo>
+                  <a:cubicBezTo>
+                    <a:pt x="715206" y="94780"/>
+                    <a:pt x="790519" y="-7490"/>
+                    <a:pt x="814302" y="438"/>
+                  </a:cubicBezTo>
+                  <a:cubicBezTo>
+                    <a:pt x="838085" y="8366"/>
+                    <a:pt x="797654" y="122528"/>
+                    <a:pt x="823815" y="143140"/>
+                  </a:cubicBezTo>
+                  <a:cubicBezTo>
+                    <a:pt x="849976" y="163752"/>
+                    <a:pt x="952244" y="107465"/>
+                    <a:pt x="971270" y="124113"/>
+                  </a:cubicBezTo>
+                  <a:cubicBezTo>
+                    <a:pt x="990296" y="140761"/>
+                    <a:pt x="914984" y="214491"/>
+                    <a:pt x="937974" y="243031"/>
+                  </a:cubicBezTo>
+                  <a:cubicBezTo>
+                    <a:pt x="960964" y="271571"/>
+                    <a:pt x="1087015" y="258094"/>
+                    <a:pt x="1109212" y="295355"/>
+                  </a:cubicBezTo>
+                  <a:cubicBezTo>
+                    <a:pt x="1131409" y="332616"/>
+                    <a:pt x="1056889" y="409516"/>
+                    <a:pt x="1071159" y="466597"/>
+                  </a:cubicBezTo>
+                  <a:cubicBezTo>
+                    <a:pt x="1085429" y="523678"/>
+                    <a:pt x="1197209" y="581551"/>
+                    <a:pt x="1194831" y="637839"/>
+                  </a:cubicBezTo>
+                  <a:cubicBezTo>
+                    <a:pt x="1192453" y="694127"/>
+                    <a:pt x="1055303" y="757550"/>
+                    <a:pt x="1056889" y="804324"/>
+                  </a:cubicBezTo>
+                  <a:cubicBezTo>
+                    <a:pt x="1058475" y="851098"/>
+                    <a:pt x="1190868" y="886774"/>
+                    <a:pt x="1204345" y="918485"/>
+                  </a:cubicBezTo>
+                  <a:cubicBezTo>
+                    <a:pt x="1217822" y="950197"/>
+                    <a:pt x="1131410" y="966846"/>
+                    <a:pt x="1137752" y="994593"/>
+                  </a:cubicBezTo>
+                  <a:cubicBezTo>
+                    <a:pt x="1144094" y="1022341"/>
+                    <a:pt x="1242397" y="1084970"/>
+                    <a:pt x="1242397" y="1084970"/>
+                  </a:cubicBezTo>
+                  <a:lnTo>
+                    <a:pt x="1242397" y="1084970"/>
+                  </a:lnTo>
+                </a:path>
+              </a:pathLst>
+            </a:custGeom>
+            <a:ln>
+              <a:solidFill>
+                <a:srgbClr val="FFFFFF"/>
+              </a:solidFill>
+            </a:ln>
+          </p:spPr>
+          <p:style>
+            <a:lnRef idx="2">
+              <a:schemeClr val="accent1"/>
+            </a:lnRef>
+            <a:fillRef idx="0">
+              <a:schemeClr val="accent1"/>
+            </a:fillRef>
+            <a:effectRef idx="1">
+              <a:schemeClr val="accent1"/>
+            </a:effectRef>
+            <a:fontRef idx="minor">
+              <a:schemeClr val="tx1"/>
+            </a:fontRef>
+          </p:style>
+          <p:txBody>
+            <a:bodyPr rtlCol="0" anchor="ctr"/>
+            <a:lstStyle/>
+            <a:p>
+              <a:pPr algn="ctr"/>
+              <a:endParaRPr lang="en-US"/>
+            </a:p>
+          </p:txBody>
+        </p:sp>
+      </p:grpSp>
+      <p:sp>
+        <p:nvSpPr>
+          <p:cNvPr id="73" name="TextBox 72"/>
+          <p:cNvSpPr txBox="1"/>
+          <p:nvPr/>
+        </p:nvSpPr>
+        <p:spPr>
+          <a:xfrm>
+            <a:off x="3287468" y="6289331"/>
+            <a:ext cx="2341548" cy="584776"/>
+          </a:xfrm>
+          <a:prstGeom prst="rect">
+            <a:avLst/>
+          </a:prstGeom>
+          <a:noFill/>
+        </p:spPr>
+        <p:txBody>
+          <a:bodyPr wrap="square" rtlCol="0">
+            <a:spAutoFit/>
+          </a:bodyPr>
+          <a:lstStyle/>
+          <a:p>
+            <a:pPr algn="ctr"/>
+            <a:r>
+              <a:rPr lang="en-US" sz="1600" dirty="0" smtClean="0">
+                <a:solidFill>
+                  <a:srgbClr val="FFFFFF"/>
+                </a:solidFill>
+                <a:latin typeface="Anime Ace 2.0 BB"/>
+                <a:cs typeface="Anime Ace 2.0 BB"/>
+              </a:rPr>
+              <a:t>What the heck is a module?</a:t>
+            </a:r>
+            <a:endParaRPr lang="en-US" sz="1600" dirty="0">
+              <a:solidFill>
+                <a:srgbClr val="FFFFFF"/>
+              </a:solidFill>
+              <a:latin typeface="Anime Ace 2.0 BB"/>
+              <a:cs typeface="Anime Ace 2.0 BB"/>
+            </a:endParaRPr>
+          </a:p>
+        </p:txBody>
+      </p:sp>
+      <p:grpSp>
+        <p:nvGrpSpPr>
+          <p:cNvPr id="75" name="Group 74"/>
+          <p:cNvGrpSpPr/>
+          <p:nvPr/>
+        </p:nvGrpSpPr>
+        <p:grpSpPr>
+          <a:xfrm rot="20261768">
+            <a:off x="4202559" y="5392323"/>
+            <a:ext cx="110687" cy="41716"/>
+            <a:chOff x="4399839" y="4307371"/>
+            <a:chExt cx="110687" cy="41716"/>
+          </a:xfrm>
+        </p:grpSpPr>
+        <p:cxnSp>
+          <p:nvCxnSpPr>
+            <p:cNvPr id="76" name="Straight Connector 75"/>
+            <p:cNvCxnSpPr/>
+            <p:nvPr/>
+          </p:nvCxnSpPr>
+          <p:spPr>
+            <a:xfrm>
+              <a:off x="4399839" y="4307371"/>
+              <a:ext cx="110687" cy="0"/>
+            </a:xfrm>
+            <a:prstGeom prst="line">
+              <a:avLst/>
+            </a:prstGeom>
+            <a:ln>
+              <a:solidFill>
+                <a:srgbClr val="FFFFFF"/>
+              </a:solidFill>
+            </a:ln>
+          </p:spPr>
+          <p:style>
+            <a:lnRef idx="2">
+              <a:schemeClr val="accent1"/>
+            </a:lnRef>
+            <a:fillRef idx="0">
+              <a:schemeClr val="accent1"/>
+            </a:fillRef>
+            <a:effectRef idx="1">
+              <a:schemeClr val="accent1"/>
+            </a:effectRef>
+            <a:fontRef idx="minor">
+              <a:schemeClr val="tx1"/>
+            </a:fontRef>
+          </p:style>
+        </p:cxnSp>
+        <p:cxnSp>
+          <p:nvCxnSpPr>
+            <p:cNvPr id="77" name="Straight Connector 76"/>
+            <p:cNvCxnSpPr/>
+            <p:nvPr/>
+          </p:nvCxnSpPr>
+          <p:spPr>
+            <a:xfrm>
+              <a:off x="4399839" y="4349087"/>
+              <a:ext cx="110687" cy="0"/>
+            </a:xfrm>
+            <a:prstGeom prst="line">
+              <a:avLst/>
+            </a:prstGeom>
+            <a:ln>
+              <a:solidFill>
+                <a:srgbClr val="FFFFFF"/>
+              </a:solidFill>
+            </a:ln>
+          </p:spPr>
+          <p:style>
+            <a:lnRef idx="2">
+              <a:schemeClr val="accent1"/>
+            </a:lnRef>
+            <a:fillRef idx="0">
+              <a:schemeClr val="accent1"/>
+            </a:fillRef>
+            <a:effectRef idx="1">
+              <a:schemeClr val="accent1"/>
+            </a:effectRef>
+            <a:fontRef idx="minor">
+              <a:schemeClr val="tx1"/>
+            </a:fontRef>
+          </p:style>
+        </p:cxnSp>
+      </p:grpSp>
+      <p:grpSp>
+        <p:nvGrpSpPr>
+          <p:cNvPr id="78" name="Group 77"/>
+          <p:cNvGrpSpPr/>
+          <p:nvPr/>
+        </p:nvGrpSpPr>
+        <p:grpSpPr>
+          <a:xfrm rot="985139">
+            <a:off x="4396673" y="5392323"/>
+            <a:ext cx="110687" cy="41716"/>
+            <a:chOff x="4593953" y="4307371"/>
+            <a:chExt cx="110687" cy="41716"/>
+          </a:xfrm>
+        </p:grpSpPr>
+        <p:cxnSp>
+          <p:nvCxnSpPr>
+            <p:cNvPr id="79" name="Straight Connector 78"/>
+            <p:cNvCxnSpPr/>
+            <p:nvPr/>
+          </p:nvCxnSpPr>
+          <p:spPr>
+            <a:xfrm>
+              <a:off x="4593953" y="4307371"/>
+              <a:ext cx="110687" cy="0"/>
+            </a:xfrm>
+            <a:prstGeom prst="line">
+              <a:avLst/>
+            </a:prstGeom>
+            <a:ln>
+              <a:solidFill>
+                <a:srgbClr val="FFFFFF"/>
+              </a:solidFill>
+            </a:ln>
+          </p:spPr>
+          <p:style>
+            <a:lnRef idx="2">
+              <a:schemeClr val="accent1"/>
+            </a:lnRef>
+            <a:fillRef idx="0">
+              <a:schemeClr val="accent1"/>
+            </a:fillRef>
+            <a:effectRef idx="1">
+              <a:schemeClr val="accent1"/>
+            </a:effectRef>
+            <a:fontRef idx="minor">
+              <a:schemeClr val="tx1"/>
+            </a:fontRef>
+          </p:style>
+        </p:cxnSp>
+        <p:cxnSp>
+          <p:nvCxnSpPr>
+            <p:cNvPr id="80" name="Straight Connector 79"/>
+            <p:cNvCxnSpPr/>
+            <p:nvPr/>
+          </p:nvCxnSpPr>
+          <p:spPr>
+            <a:xfrm>
+              <a:off x="4593953" y="4349087"/>
+              <a:ext cx="110687" cy="0"/>
+            </a:xfrm>
+            <a:prstGeom prst="line">
+              <a:avLst/>
+            </a:prstGeom>
+            <a:ln>
+              <a:solidFill>
+                <a:srgbClr val="FFFFFF"/>
+              </a:solidFill>
+            </a:ln>
+          </p:spPr>
+          <p:style>
+            <a:lnRef idx="2">
+              <a:schemeClr val="accent1"/>
+            </a:lnRef>
+            <a:fillRef idx="0">
+              <a:schemeClr val="accent1"/>
+            </a:fillRef>
+            <a:effectRef idx="1">
+              <a:schemeClr val="accent1"/>
+            </a:effectRef>
+            <a:fontRef idx="minor">
+              <a:schemeClr val="tx1"/>
+            </a:fontRef>
+          </p:style>
+        </p:cxnSp>
+      </p:grpSp>
+      <p:cxnSp>
+        <p:nvCxnSpPr>
+          <p:cNvPr id="81" name="Straight Arrow Connector 80"/>
+          <p:cNvCxnSpPr/>
+          <p:nvPr/>
+        </p:nvCxnSpPr>
+        <p:spPr>
+          <a:xfrm flipH="1">
+            <a:off x="2009738" y="4229547"/>
+            <a:ext cx="4536230" cy="923891"/>
+          </a:xfrm>
+          <a:prstGeom prst="straightConnector1">
+            <a:avLst/>
+          </a:prstGeom>
+          <a:ln w="38100" cmpd="sng">
+            <a:solidFill>
+              <a:schemeClr val="tx1">
+                <a:lumMod val="50000"/>
+                <a:lumOff val="50000"/>
+              </a:schemeClr>
+            </a:solidFill>
+            <a:tailEnd type="arrow"/>
+          </a:ln>
+        </p:spPr>
+        <p:style>
+          <a:lnRef idx="2">
+            <a:schemeClr val="accent1"/>
+          </a:lnRef>
+          <a:fillRef idx="0">
+            <a:schemeClr val="accent1"/>
+          </a:fillRef>
+          <a:effectRef idx="1">
+            <a:schemeClr val="accent1"/>
+          </a:effectRef>
+          <a:fontRef idx="minor">
+            <a:schemeClr val="tx1"/>
+          </a:fontRef>
+        </p:style>
+      </p:cxnSp>
+      <p:pic>
+        <p:nvPicPr>
+          <p:cNvPr id="82" name="Picture 81"/>
+          <p:cNvPicPr>
+            <a:picLocks noChangeAspect="1"/>
+          </p:cNvPicPr>
+          <p:nvPr/>
+        </p:nvPicPr>
+        <p:blipFill>
+          <a:blip r:embed="rId3"/>
+          <a:stretch>
+            <a:fillRect/>
+          </a:stretch>
+        </p:blipFill>
+        <p:spPr>
+          <a:xfrm>
+            <a:off x="944558" y="4931332"/>
+            <a:ext cx="934443" cy="1235834"/>
+          </a:xfrm>
+          <a:prstGeom prst="rect">
+            <a:avLst/>
+          </a:prstGeom>
+        </p:spPr>
+      </p:pic>
+      <p:sp>
+        <p:nvSpPr>
+          <p:cNvPr id="83" name="TextBox 82"/>
+          <p:cNvSpPr txBox="1"/>
+          <p:nvPr/>
+        </p:nvSpPr>
+        <p:spPr>
+          <a:xfrm>
+            <a:off x="305649" y="6196522"/>
+            <a:ext cx="2341548" cy="584776"/>
+          </a:xfrm>
+          <a:prstGeom prst="rect">
+            <a:avLst/>
+          </a:prstGeom>
+          <a:noFill/>
+        </p:spPr>
+        <p:txBody>
+          <a:bodyPr wrap="square" rtlCol="0">
+            <a:spAutoFit/>
+          </a:bodyPr>
+          <a:lstStyle/>
+          <a:p>
+            <a:pPr algn="ctr"/>
+            <a:r>
+              <a:rPr lang="en-US" sz="1600" dirty="0" smtClean="0">
+                <a:solidFill>
+                  <a:srgbClr val="FFFFFF"/>
+                </a:solidFill>
+                <a:latin typeface="Anime Ace 2.0 BB"/>
+                <a:cs typeface="Anime Ace 2.0 BB"/>
+              </a:rPr>
+              <a:t>Download Examples!</a:t>
+            </a:r>
+            <a:endParaRPr lang="en-US" sz="1600" dirty="0">
+              <a:solidFill>
+                <a:srgbClr val="FFFFFF"/>
+              </a:solidFill>
+              <a:latin typeface="Anime Ace 2.0 BB"/>
+              <a:cs typeface="Anime Ace 2.0 BB"/>
+            </a:endParaRPr>
+          </a:p>
+        </p:txBody>
+      </p:sp>
+      <p:cxnSp>
+        <p:nvCxnSpPr>
+          <p:cNvPr id="84" name="Straight Arrow Connector 83"/>
+          <p:cNvCxnSpPr/>
+          <p:nvPr/>
+        </p:nvCxnSpPr>
+        <p:spPr>
+          <a:xfrm>
+            <a:off x="2009738" y="5650394"/>
+            <a:ext cx="1178113" cy="0"/>
+          </a:xfrm>
+          <a:prstGeom prst="straightConnector1">
+            <a:avLst/>
+          </a:prstGeom>
+          <a:ln w="38100" cmpd="sng">
+            <a:solidFill>
+              <a:schemeClr val="tx1">
+                <a:lumMod val="50000"/>
+                <a:lumOff val="50000"/>
+              </a:schemeClr>
+            </a:solidFill>
+            <a:tailEnd type="arrow"/>
+          </a:ln>
+        </p:spPr>
+        <p:style>
+          <a:lnRef idx="2">
+            <a:schemeClr val="accent1"/>
+          </a:lnRef>
+          <a:fillRef idx="0">
+            <a:schemeClr val="accent1"/>
+          </a:fillRef>
+          <a:effectRef idx="1">
+            <a:schemeClr val="accent1"/>
+          </a:effectRef>
+          <a:fontRef idx="minor">
+            <a:schemeClr val="tx1"/>
+          </a:fontRef>
+        </p:style>
+      </p:cxnSp>
+      <p:sp>
+        <p:nvSpPr>
+          <p:cNvPr id="86" name="TextBox 85"/>
+          <p:cNvSpPr txBox="1"/>
+          <p:nvPr/>
+        </p:nvSpPr>
+        <p:spPr>
+          <a:xfrm rot="20700000">
+            <a:off x="6545968" y="5184095"/>
+            <a:ext cx="1797801" cy="276999"/>
+          </a:xfrm>
+          <a:prstGeom prst="rect">
+            <a:avLst/>
+          </a:prstGeom>
+          <a:noFill/>
+        </p:spPr>
+        <p:txBody>
+          <a:bodyPr wrap="square" rtlCol="0">
+            <a:spAutoFit/>
+          </a:bodyPr>
+          <a:lstStyle/>
+          <a:p>
+            <a:pPr algn="ctr"/>
+            <a:r>
+              <a:rPr lang="en-US" sz="1200" dirty="0" smtClean="0">
+                <a:solidFill>
+                  <a:srgbClr val="FFFFFF"/>
+                </a:solidFill>
+                <a:latin typeface="Anime Ace 2.0 BB"/>
+                <a:cs typeface="Anime Ace 2.0 BB"/>
+              </a:rPr>
+              <a:t>*</a:t>
+            </a:r>
+            <a:r>
+              <a:rPr lang="en-US" sz="1200" dirty="0" err="1" smtClean="0">
+                <a:solidFill>
+                  <a:srgbClr val="FFFFFF"/>
+                </a:solidFill>
+                <a:latin typeface="Anime Ace 2.0 BB"/>
+                <a:cs typeface="Anime Ace 2.0 BB"/>
+              </a:rPr>
+              <a:t>headdesk</a:t>
+            </a:r>
+            <a:r>
+              <a:rPr lang="en-US" sz="1200" dirty="0" smtClean="0">
+                <a:solidFill>
+                  <a:srgbClr val="FFFFFF"/>
+                </a:solidFill>
+                <a:latin typeface="Anime Ace 2.0 BB"/>
+                <a:cs typeface="Anime Ace 2.0 BB"/>
+              </a:rPr>
+              <a:t>*</a:t>
+            </a:r>
+            <a:endParaRPr lang="en-US" sz="1200" dirty="0">
+              <a:solidFill>
+                <a:srgbClr val="FFFFFF"/>
+              </a:solidFill>
+              <a:latin typeface="Anime Ace 2.0 BB"/>
+              <a:cs typeface="Anime Ace 2.0 BB"/>
+            </a:endParaRPr>
+          </a:p>
+        </p:txBody>
+      </p:sp>
+      <p:sp>
+        <p:nvSpPr>
+          <p:cNvPr id="88" name="TextBox 87"/>
+          <p:cNvSpPr txBox="1"/>
+          <p:nvPr/>
+        </p:nvSpPr>
+        <p:spPr>
+          <a:xfrm>
+            <a:off x="6719024" y="5633049"/>
+            <a:ext cx="1797801" cy="307777"/>
+          </a:xfrm>
+          <a:prstGeom prst="rect">
+            <a:avLst/>
+          </a:prstGeom>
+          <a:noFill/>
+        </p:spPr>
+        <p:txBody>
+          <a:bodyPr wrap="square" rtlCol="0">
+            <a:spAutoFit/>
+          </a:bodyPr>
+          <a:lstStyle/>
+          <a:p>
+            <a:pPr algn="ctr"/>
+            <a:r>
+              <a:rPr lang="en-US" sz="1400" dirty="0" smtClean="0">
+                <a:solidFill>
+                  <a:srgbClr val="FFFFFF"/>
+                </a:solidFill>
+                <a:latin typeface="Anime Ace 2.0 BB"/>
+                <a:cs typeface="Anime Ace 2.0 BB"/>
+              </a:rPr>
+              <a:t>*</a:t>
+            </a:r>
+            <a:r>
+              <a:rPr lang="en-US" sz="1400" dirty="0" err="1" smtClean="0">
+                <a:solidFill>
+                  <a:srgbClr val="FFFFFF"/>
+                </a:solidFill>
+                <a:latin typeface="Anime Ace 2.0 BB"/>
+                <a:cs typeface="Anime Ace 2.0 BB"/>
+              </a:rPr>
+              <a:t>headdesk</a:t>
+            </a:r>
+            <a:r>
+              <a:rPr lang="en-US" sz="1400" dirty="0" smtClean="0">
+                <a:solidFill>
+                  <a:srgbClr val="FFFFFF"/>
+                </a:solidFill>
+                <a:latin typeface="Anime Ace 2.0 BB"/>
+                <a:cs typeface="Anime Ace 2.0 BB"/>
+              </a:rPr>
+              <a:t>*</a:t>
+            </a:r>
+            <a:endParaRPr lang="en-US" sz="1400" dirty="0">
+              <a:solidFill>
+                <a:srgbClr val="FFFFFF"/>
+              </a:solidFill>
+              <a:latin typeface="Anime Ace 2.0 BB"/>
+              <a:cs typeface="Anime Ace 2.0 BB"/>
+            </a:endParaRPr>
+          </a:p>
+        </p:txBody>
+      </p:sp>
+      <p:cxnSp>
+        <p:nvCxnSpPr>
+          <p:cNvPr id="89" name="Straight Arrow Connector 88"/>
+          <p:cNvCxnSpPr/>
+          <p:nvPr/>
+        </p:nvCxnSpPr>
+        <p:spPr>
+          <a:xfrm>
+            <a:off x="5529399" y="5645506"/>
+            <a:ext cx="1178113" cy="0"/>
+          </a:xfrm>
+          <a:prstGeom prst="straightConnector1">
+            <a:avLst/>
+          </a:prstGeom>
+          <a:ln w="38100" cmpd="sng">
+            <a:solidFill>
+              <a:schemeClr val="tx1">
+                <a:lumMod val="50000"/>
+                <a:lumOff val="50000"/>
+              </a:schemeClr>
+            </a:solidFill>
+            <a:tailEnd type="arrow"/>
+          </a:ln>
+        </p:spPr>
+        <p:style>
+          <a:lnRef idx="2">
+            <a:schemeClr val="accent1"/>
+          </a:lnRef>
+          <a:fillRef idx="0">
+            <a:schemeClr val="accent1"/>
+          </a:fillRef>
+          <a:effectRef idx="1">
+            <a:schemeClr val="accent1"/>
+          </a:effectRef>
+          <a:fontRef idx="minor">
+            <a:schemeClr val="tx1"/>
+          </a:fontRef>
+        </p:style>
+      </p:cxnSp>
+    </p:spTree>
+    <p:extLst>
+      <p:ext uri="{BB962C8B-B14F-4D97-AF65-F5344CB8AC3E}">
+        <p14:creationId xmlns:p14="http://schemas.microsoft.com/office/powerpoint/2010/main" val="2855741628"/>
+      </p:ext>
+    </p:extLst>
+  </p:cSld>
+  <p:clrMapOvr>
+    <a:masterClrMapping/>
+  </p:clrMapOvr>
+</p:sld>
+</file>
+
 <file path=ppt/slides/slide4.xml><?xml version="1.0" encoding="utf-8"?>
 <p:sld xmlns:a="http://schemas.openxmlformats.org/drawingml/2006/main" xmlns:r="http://schemas.openxmlformats.org/officeDocument/2006/relationships" xmlns:p="http://schemas.openxmlformats.org/presentationml/2006/main">
   <p:cSld>

</xml_diff>